<commit_message>
added cards to sentence enhancement portion
</commit_message>
<xml_diff>
--- a/Presentation.pptx
+++ b/Presentation.pptx
@@ -23,13 +23,12 @@
     <p:sldId id="299" r:id="rId17"/>
     <p:sldId id="280" r:id="rId18"/>
     <p:sldId id="295" r:id="rId19"/>
-    <p:sldId id="297" r:id="rId20"/>
-    <p:sldId id="296" r:id="rId21"/>
-    <p:sldId id="294" r:id="rId22"/>
-    <p:sldId id="293" r:id="rId23"/>
-    <p:sldId id="289" r:id="rId24"/>
-    <p:sldId id="279" r:id="rId25"/>
-    <p:sldId id="298" r:id="rId26"/>
+    <p:sldId id="300" r:id="rId20"/>
+    <p:sldId id="301" r:id="rId21"/>
+    <p:sldId id="302" r:id="rId22"/>
+    <p:sldId id="289" r:id="rId23"/>
+    <p:sldId id="279" r:id="rId24"/>
+    <p:sldId id="298" r:id="rId25"/>
   </p:sldIdLst>
   <p:sldSz cx="12192000" cy="6858000"/>
   <p:notesSz cx="6858000" cy="9144000"/>
@@ -7463,17 +7462,17 @@
         <p:spPr>
           <a:xfrm>
             <a:off x="838200" y="557189"/>
-            <a:ext cx="3966463" cy="1620403"/>
+            <a:ext cx="5349536" cy="1620403"/>
           </a:xfrm>
         </p:spPr>
         <p:txBody>
           <a:bodyPr vert="horz" lIns="91440" tIns="45720" rIns="91440" bIns="45720" rtlCol="0" anchor="ctr">
-            <a:normAutofit fontScale="90000"/>
+            <a:noAutofit/>
           </a:bodyPr>
           <a:lstStyle/>
           <a:p>
             <a:r>
-              <a:rPr lang="en-US" sz="5200" dirty="0"/>
+              <a:rPr lang="en-US" dirty="0"/>
               <a:t>Closer Look: Immigration Offenses </a:t>
             </a:r>
           </a:p>
@@ -7493,8 +7492,8 @@
         </p:nvSpPr>
         <p:spPr>
           <a:xfrm>
-            <a:off x="502572" y="2610467"/>
-            <a:ext cx="4050519" cy="1200329"/>
+            <a:off x="502571" y="2123783"/>
+            <a:ext cx="4424078" cy="1323439"/>
           </a:xfrm>
           <a:prstGeom prst="rect">
             <a:avLst/>
@@ -7512,7 +7511,7 @@
               <a:buChar char="•"/>
             </a:pPr>
             <a:r>
-              <a:rPr lang="en-US" dirty="0"/>
+              <a:rPr lang="en-US" sz="2000" dirty="0"/>
               <a:t>71% of nonviolent offenses by Hispanic offenders are immigration related offenses, which carry no mandatory minimum sentence.</a:t>
             </a:r>
           </a:p>
@@ -7545,7 +7544,7 @@
         </p:blipFill>
         <p:spPr>
           <a:xfrm>
-            <a:off x="5055663" y="2016464"/>
+            <a:off x="5055657" y="1865086"/>
             <a:ext cx="7262303" cy="4841536"/>
           </a:xfrm>
           <a:prstGeom prst="rect">
@@ -7567,8 +7566,8 @@
         </p:nvSpPr>
         <p:spPr>
           <a:xfrm>
-            <a:off x="7629846" y="506485"/>
-            <a:ext cx="1975793" cy="1620404"/>
+            <a:off x="7843429" y="355107"/>
+            <a:ext cx="1686757" cy="1509979"/>
           </a:xfrm>
           <a:prstGeom prst="roundRect">
             <a:avLst/>
@@ -7590,7 +7589,7 @@
         </p:style>
         <p:txBody>
           <a:bodyPr rtlCol="0" anchor="ctr">
-            <a:normAutofit/>
+            <a:normAutofit fontScale="85000" lnSpcReduction="10000"/>
           </a:bodyPr>
           <a:lstStyle/>
           <a:p>
@@ -7624,8 +7623,8 @@
         </p:nvSpPr>
         <p:spPr>
           <a:xfrm>
-            <a:off x="502572" y="3710866"/>
-            <a:ext cx="4050519" cy="1477328"/>
+            <a:off x="502571" y="3393412"/>
+            <a:ext cx="4553086" cy="1631216"/>
           </a:xfrm>
           <a:prstGeom prst="rect">
             <a:avLst/>
@@ -7643,7 +7642,7 @@
               <a:buChar char="•"/>
             </a:pPr>
             <a:r>
-              <a:rPr lang="en-US" dirty="0"/>
+              <a:rPr lang="en-US" sz="2000" dirty="0"/>
               <a:t>Of those, exactly half received credit for time served and therefore receive no additional sentence.</a:t>
             </a:r>
           </a:p>
@@ -7653,7 +7652,7 @@
               <a:buChar char="•"/>
             </a:pPr>
             <a:r>
-              <a:rPr lang="en-US" dirty="0"/>
+              <a:rPr lang="en-US" sz="2000" dirty="0"/>
               <a:t>The average time served prior to sentencing for this group is 70 days.</a:t>
             </a:r>
           </a:p>
@@ -7673,8 +7672,8 @@
         </p:nvSpPr>
         <p:spPr>
           <a:xfrm>
-            <a:off x="502572" y="5188194"/>
-            <a:ext cx="4050519" cy="1477328"/>
+            <a:off x="502571" y="5023934"/>
+            <a:ext cx="4553086" cy="1631216"/>
           </a:xfrm>
           <a:prstGeom prst="rect">
             <a:avLst/>
@@ -7692,12 +7691,12 @@
               <a:buChar char="•"/>
             </a:pPr>
             <a:r>
-              <a:rPr lang="en-US" dirty="0"/>
+              <a:rPr lang="en-US" sz="2000" dirty="0"/>
               <a:t>Additionally, 97% of them are not legal residents of the U.S., meaning they may have been deported rather than sentenced to additional time.</a:t>
             </a:r>
           </a:p>
           <a:p>
-            <a:endParaRPr lang="en-US" dirty="0"/>
+            <a:endParaRPr lang="en-US" sz="2000" dirty="0"/>
           </a:p>
         </p:txBody>
       </p:sp>
@@ -10819,7 +10818,7 @@
                   <a:schemeClr val="bg1"/>
                 </a:solidFill>
               </a:rPr>
-              <a:t>Criminal history points are applied in 64% of cases and increases sentences an average of by 2.6 years</a:t>
+              <a:t>Distribution roughly matches demographics of general sentencing population</a:t>
             </a:r>
           </a:p>
         </p:txBody>
@@ -10851,7 +10850,7 @@
         </p:blipFill>
         <p:spPr>
           <a:xfrm>
-            <a:off x="6643857" y="1850234"/>
+            <a:off x="6643857" y="1487286"/>
             <a:ext cx="5051318" cy="3157074"/>
           </a:xfrm>
           <a:prstGeom prst="rect">
@@ -10892,6 +10891,134 @@
               <a:rPr lang="en-US" sz="2400" dirty="0"/>
               <a:t>Criminal History Points Applied</a:t>
             </a:r>
+          </a:p>
+        </p:txBody>
+      </p:sp>
+      <p:sp>
+        <p:nvSpPr>
+          <p:cNvPr id="11" name="Rectangle: Rounded Corners 10">
+            <a:extLst>
+              <a:ext uri="{FF2B5EF4-FFF2-40B4-BE49-F238E27FC236}">
+                <a16:creationId xmlns:a16="http://schemas.microsoft.com/office/drawing/2014/main" id="{092FD124-60D7-4DA1-816D-52308CCC12D8}"/>
+              </a:ext>
+            </a:extLst>
+          </p:cNvPr>
+          <p:cNvSpPr/>
+          <p:nvPr/>
+        </p:nvSpPr>
+        <p:spPr>
+          <a:xfrm>
+            <a:off x="7301183" y="4792771"/>
+            <a:ext cx="1754480" cy="1693072"/>
+          </a:xfrm>
+          <a:prstGeom prst="roundRect">
+            <a:avLst/>
+          </a:prstGeom>
+        </p:spPr>
+        <p:style>
+          <a:lnRef idx="2">
+            <a:schemeClr val="dk1"/>
+          </a:lnRef>
+          <a:fillRef idx="1">
+            <a:schemeClr val="lt1"/>
+          </a:fillRef>
+          <a:effectRef idx="0">
+            <a:schemeClr val="dk1"/>
+          </a:effectRef>
+          <a:fontRef idx="minor">
+            <a:schemeClr val="dk1"/>
+          </a:fontRef>
+        </p:style>
+        <p:txBody>
+          <a:bodyPr rtlCol="0" anchor="ctr">
+            <a:normAutofit fontScale="92500"/>
+          </a:bodyPr>
+          <a:lstStyle/>
+          <a:p>
+            <a:pPr algn="ctr"/>
+            <a:r>
+              <a:rPr lang="en-US" sz="1400" dirty="0"/>
+              <a:t>Applied in</a:t>
+            </a:r>
+          </a:p>
+          <a:p>
+            <a:pPr algn="ctr"/>
+            <a:r>
+              <a:rPr lang="en-US" sz="6600" dirty="0"/>
+              <a:t>64%</a:t>
+            </a:r>
+          </a:p>
+          <a:p>
+            <a:pPr algn="ctr"/>
+            <a:r>
+              <a:rPr lang="en-US" sz="1400" dirty="0"/>
+              <a:t>of cases</a:t>
+            </a:r>
+            <a:endParaRPr lang="en-US" dirty="0"/>
+          </a:p>
+        </p:txBody>
+      </p:sp>
+      <p:sp>
+        <p:nvSpPr>
+          <p:cNvPr id="12" name="Rectangle: Rounded Corners 11">
+            <a:extLst>
+              <a:ext uri="{FF2B5EF4-FFF2-40B4-BE49-F238E27FC236}">
+                <a16:creationId xmlns:a16="http://schemas.microsoft.com/office/drawing/2014/main" id="{C9CAD8C2-985C-408A-B02A-8BCED32AFF37}"/>
+              </a:ext>
+            </a:extLst>
+          </p:cNvPr>
+          <p:cNvSpPr/>
+          <p:nvPr/>
+        </p:nvSpPr>
+        <p:spPr>
+          <a:xfrm>
+            <a:off x="9473949" y="4799605"/>
+            <a:ext cx="1754480" cy="1693072"/>
+          </a:xfrm>
+          <a:prstGeom prst="roundRect">
+            <a:avLst/>
+          </a:prstGeom>
+        </p:spPr>
+        <p:style>
+          <a:lnRef idx="2">
+            <a:schemeClr val="dk1"/>
+          </a:lnRef>
+          <a:fillRef idx="1">
+            <a:schemeClr val="lt1"/>
+          </a:fillRef>
+          <a:effectRef idx="0">
+            <a:schemeClr val="dk1"/>
+          </a:effectRef>
+          <a:fontRef idx="minor">
+            <a:schemeClr val="dk1"/>
+          </a:fontRef>
+        </p:style>
+        <p:txBody>
+          <a:bodyPr rtlCol="0" anchor="ctr">
+            <a:normAutofit fontScale="92500" lnSpcReduction="10000"/>
+          </a:bodyPr>
+          <a:lstStyle/>
+          <a:p>
+            <a:pPr algn="ctr"/>
+            <a:r>
+              <a:rPr lang="en-US" sz="1400" dirty="0"/>
+              <a:t>Increases sentence by average of</a:t>
+            </a:r>
+          </a:p>
+          <a:p>
+            <a:pPr algn="ctr"/>
+            <a:r>
+              <a:rPr lang="en-US" sz="6600" dirty="0"/>
+              <a:t>2.6</a:t>
+            </a:r>
+          </a:p>
+          <a:p>
+            <a:pPr algn="ctr"/>
+            <a:r>
+              <a:rPr lang="en-US" sz="1400" dirty="0"/>
+              <a:t>years</a:t>
+            </a:r>
+            <a:endParaRPr lang="en-US" dirty="0"/>
           </a:p>
         </p:txBody>
       </p:sp>
@@ -11622,7 +11749,7 @@
                   <a:schemeClr val="bg1"/>
                 </a:solidFill>
               </a:rPr>
-              <a:t>Career Offender status is applied in 7% of cases and increases sentences an average of by 12.7 years</a:t>
+              <a:t>Distribution skews heavily towards black offenders</a:t>
             </a:r>
           </a:p>
         </p:txBody>
@@ -11654,8 +11781,8 @@
         </p:blipFill>
         <p:spPr>
           <a:xfrm>
-            <a:off x="6645576" y="1851309"/>
-            <a:ext cx="5047880" cy="3154924"/>
+            <a:off x="6643857" y="1487286"/>
+            <a:ext cx="5051318" cy="3157073"/>
           </a:xfrm>
           <a:prstGeom prst="rect">
             <a:avLst/>
@@ -11664,10 +11791,10 @@
       </p:pic>
       <p:sp>
         <p:nvSpPr>
-          <p:cNvPr id="12" name="TextBox 11">
+          <p:cNvPr id="3" name="TextBox 2">
             <a:extLst>
               <a:ext uri="{FF2B5EF4-FFF2-40B4-BE49-F238E27FC236}">
-                <a16:creationId xmlns:a16="http://schemas.microsoft.com/office/drawing/2014/main" id="{0F326A35-EA1E-4A30-AD4A-58ACDF3C1BA1}"/>
+                <a16:creationId xmlns:a16="http://schemas.microsoft.com/office/drawing/2014/main" id="{DDB58F66-CD44-4CFC-A17F-FA279E375A85}"/>
               </a:ext>
             </a:extLst>
           </p:cNvPr>
@@ -11676,8 +11803,8 @@
         </p:nvSpPr>
         <p:spPr>
           <a:xfrm>
-            <a:off x="6645576" y="882733"/>
-            <a:ext cx="5047880" cy="461665"/>
+            <a:off x="6866186" y="882733"/>
+            <a:ext cx="4606660" cy="461665"/>
           </a:xfrm>
           <a:prstGeom prst="rect">
             <a:avLst/>
@@ -11690,22 +11817,146 @@
           </a:bodyPr>
           <a:lstStyle/>
           <a:p>
-            <a:pPr algn="ctr">
-              <a:spcAft>
-                <a:spcPts val="600"/>
-              </a:spcAft>
-            </a:pPr>
+            <a:pPr algn="ctr"/>
             <a:r>
               <a:rPr lang="en-US" sz="2400" dirty="0"/>
               <a:t>Career Offender Status Applied</a:t>
             </a:r>
+          </a:p>
+        </p:txBody>
+      </p:sp>
+      <p:sp>
+        <p:nvSpPr>
+          <p:cNvPr id="11" name="Rectangle: Rounded Corners 10">
+            <a:extLst>
+              <a:ext uri="{FF2B5EF4-FFF2-40B4-BE49-F238E27FC236}">
+                <a16:creationId xmlns:a16="http://schemas.microsoft.com/office/drawing/2014/main" id="{092FD124-60D7-4DA1-816D-52308CCC12D8}"/>
+              </a:ext>
+            </a:extLst>
+          </p:cNvPr>
+          <p:cNvSpPr/>
+          <p:nvPr/>
+        </p:nvSpPr>
+        <p:spPr>
+          <a:xfrm>
+            <a:off x="7301183" y="4792771"/>
+            <a:ext cx="1754480" cy="1693072"/>
+          </a:xfrm>
+          <a:prstGeom prst="roundRect">
+            <a:avLst/>
+          </a:prstGeom>
+        </p:spPr>
+        <p:style>
+          <a:lnRef idx="2">
+            <a:schemeClr val="dk1"/>
+          </a:lnRef>
+          <a:fillRef idx="1">
+            <a:schemeClr val="lt1"/>
+          </a:fillRef>
+          <a:effectRef idx="0">
+            <a:schemeClr val="dk1"/>
+          </a:effectRef>
+          <a:fontRef idx="minor">
+            <a:schemeClr val="dk1"/>
+          </a:fontRef>
+        </p:style>
+        <p:txBody>
+          <a:bodyPr rtlCol="0" anchor="ctr">
+            <a:normAutofit/>
+          </a:bodyPr>
+          <a:lstStyle/>
+          <a:p>
+            <a:pPr algn="ctr"/>
+            <a:r>
+              <a:rPr lang="en-US" sz="1400" dirty="0"/>
+              <a:t>Applied in</a:t>
+            </a:r>
+          </a:p>
+          <a:p>
+            <a:pPr algn="ctr"/>
+            <a:r>
+              <a:rPr lang="en-US" sz="6600" dirty="0"/>
+              <a:t>7%</a:t>
+            </a:r>
+          </a:p>
+          <a:p>
+            <a:pPr algn="ctr"/>
+            <a:r>
+              <a:rPr lang="en-US" sz="1400" dirty="0"/>
+              <a:t>of cases</a:t>
+            </a:r>
+            <a:endParaRPr lang="en-US" dirty="0"/>
+          </a:p>
+        </p:txBody>
+      </p:sp>
+      <p:sp>
+        <p:nvSpPr>
+          <p:cNvPr id="12" name="Rectangle: Rounded Corners 11">
+            <a:extLst>
+              <a:ext uri="{FF2B5EF4-FFF2-40B4-BE49-F238E27FC236}">
+                <a16:creationId xmlns:a16="http://schemas.microsoft.com/office/drawing/2014/main" id="{C9CAD8C2-985C-408A-B02A-8BCED32AFF37}"/>
+              </a:ext>
+            </a:extLst>
+          </p:cNvPr>
+          <p:cNvSpPr/>
+          <p:nvPr/>
+        </p:nvSpPr>
+        <p:spPr>
+          <a:xfrm>
+            <a:off x="9473949" y="4799605"/>
+            <a:ext cx="1754480" cy="1693072"/>
+          </a:xfrm>
+          <a:prstGeom prst="roundRect">
+            <a:avLst/>
+          </a:prstGeom>
+        </p:spPr>
+        <p:style>
+          <a:lnRef idx="2">
+            <a:schemeClr val="dk1"/>
+          </a:lnRef>
+          <a:fillRef idx="1">
+            <a:schemeClr val="lt1"/>
+          </a:fillRef>
+          <a:effectRef idx="0">
+            <a:schemeClr val="dk1"/>
+          </a:effectRef>
+          <a:fontRef idx="minor">
+            <a:schemeClr val="dk1"/>
+          </a:fontRef>
+        </p:style>
+        <p:txBody>
+          <a:bodyPr rtlCol="0" anchor="ctr">
+            <a:normAutofit fontScale="92500" lnSpcReduction="10000"/>
+          </a:bodyPr>
+          <a:lstStyle/>
+          <a:p>
+            <a:pPr algn="ctr"/>
+            <a:r>
+              <a:rPr lang="en-US" sz="1400" dirty="0"/>
+              <a:t>Increases sentence by average of</a:t>
+            </a:r>
+          </a:p>
+          <a:p>
+            <a:pPr algn="ctr"/>
+            <a:r>
+              <a:rPr lang="en-US" sz="6600" dirty="0"/>
+              <a:t>12.7</a:t>
+            </a:r>
+          </a:p>
+          <a:p>
+            <a:pPr algn="ctr"/>
+            <a:r>
+              <a:rPr lang="en-US" sz="1400" dirty="0"/>
+              <a:t>years</a:t>
+            </a:r>
+            <a:endParaRPr lang="en-US" dirty="0"/>
           </a:p>
         </p:txBody>
       </p:sp>
     </p:spTree>
     <p:extLst>
       <p:ext uri="{BB962C8B-B14F-4D97-AF65-F5344CB8AC3E}">
-        <p14:creationId xmlns:p14="http://schemas.microsoft.com/office/powerpoint/2010/main" val="4064713189"/>
+        <p14:creationId xmlns:p14="http://schemas.microsoft.com/office/powerpoint/2010/main" val="3715800747"/>
       </p:ext>
     </p:extLst>
   </p:cSld>
@@ -13690,14 +13941,14 @@
           </a:bodyPr>
           <a:lstStyle/>
           <a:p>
-            <a:pPr marL="285750" indent="-285750" algn="just"/>
+            <a:pPr marL="285750" indent="-285750"/>
             <a:r>
               <a:rPr lang="en-US" sz="2000" dirty="0">
                 <a:solidFill>
                   <a:schemeClr val="bg1"/>
                 </a:solidFill>
               </a:rPr>
-              <a:t>Armed Career Offender status is applied in only 2% of cases, but increases sentences an average of by 25.3 years</a:t>
+              <a:t>Distribution skews even further toward black offenders</a:t>
             </a:r>
           </a:p>
         </p:txBody>
@@ -13729,8 +13980,8 @@
         </p:blipFill>
         <p:spPr>
           <a:xfrm>
-            <a:off x="6645576" y="1851309"/>
-            <a:ext cx="5047880" cy="3154924"/>
+            <a:off x="6643857" y="1487286"/>
+            <a:ext cx="5051317" cy="3157073"/>
           </a:xfrm>
           <a:prstGeom prst="rect">
             <a:avLst/>
@@ -13739,10 +13990,10 @@
       </p:pic>
       <p:sp>
         <p:nvSpPr>
-          <p:cNvPr id="12" name="TextBox 11">
+          <p:cNvPr id="3" name="TextBox 2">
             <a:extLst>
               <a:ext uri="{FF2B5EF4-FFF2-40B4-BE49-F238E27FC236}">
-                <a16:creationId xmlns:a16="http://schemas.microsoft.com/office/drawing/2014/main" id="{0F326A35-EA1E-4A30-AD4A-58ACDF3C1BA1}"/>
+                <a16:creationId xmlns:a16="http://schemas.microsoft.com/office/drawing/2014/main" id="{DDB58F66-CD44-4CFC-A17F-FA279E375A85}"/>
               </a:ext>
             </a:extLst>
           </p:cNvPr>
@@ -13751,8 +14002,8 @@
         </p:nvSpPr>
         <p:spPr>
           <a:xfrm>
-            <a:off x="6645576" y="894553"/>
-            <a:ext cx="5047880" cy="461665"/>
+            <a:off x="6577421" y="882733"/>
+            <a:ext cx="5117754" cy="461665"/>
           </a:xfrm>
           <a:prstGeom prst="rect">
             <a:avLst/>
@@ -13765,22 +14016,146 @@
           </a:bodyPr>
           <a:lstStyle/>
           <a:p>
-            <a:pPr algn="ctr">
-              <a:spcAft>
-                <a:spcPts val="600"/>
-              </a:spcAft>
-            </a:pPr>
+            <a:pPr algn="ctr"/>
             <a:r>
               <a:rPr lang="en-US" sz="2400" dirty="0"/>
               <a:t>Armed Career Offender Status Applied</a:t>
             </a:r>
+          </a:p>
+        </p:txBody>
+      </p:sp>
+      <p:sp>
+        <p:nvSpPr>
+          <p:cNvPr id="11" name="Rectangle: Rounded Corners 10">
+            <a:extLst>
+              <a:ext uri="{FF2B5EF4-FFF2-40B4-BE49-F238E27FC236}">
+                <a16:creationId xmlns:a16="http://schemas.microsoft.com/office/drawing/2014/main" id="{092FD124-60D7-4DA1-816D-52308CCC12D8}"/>
+              </a:ext>
+            </a:extLst>
+          </p:cNvPr>
+          <p:cNvSpPr/>
+          <p:nvPr/>
+        </p:nvSpPr>
+        <p:spPr>
+          <a:xfrm>
+            <a:off x="7301183" y="4792771"/>
+            <a:ext cx="1754480" cy="1693072"/>
+          </a:xfrm>
+          <a:prstGeom prst="roundRect">
+            <a:avLst/>
+          </a:prstGeom>
+        </p:spPr>
+        <p:style>
+          <a:lnRef idx="2">
+            <a:schemeClr val="dk1"/>
+          </a:lnRef>
+          <a:fillRef idx="1">
+            <a:schemeClr val="lt1"/>
+          </a:fillRef>
+          <a:effectRef idx="0">
+            <a:schemeClr val="dk1"/>
+          </a:effectRef>
+          <a:fontRef idx="minor">
+            <a:schemeClr val="dk1"/>
+          </a:fontRef>
+        </p:style>
+        <p:txBody>
+          <a:bodyPr rtlCol="0" anchor="ctr">
+            <a:normAutofit/>
+          </a:bodyPr>
+          <a:lstStyle/>
+          <a:p>
+            <a:pPr algn="ctr"/>
+            <a:r>
+              <a:rPr lang="en-US" sz="1400" dirty="0"/>
+              <a:t>Applied in</a:t>
+            </a:r>
+          </a:p>
+          <a:p>
+            <a:pPr algn="ctr"/>
+            <a:r>
+              <a:rPr lang="en-US" sz="6600" dirty="0"/>
+              <a:t>2%</a:t>
+            </a:r>
+          </a:p>
+          <a:p>
+            <a:pPr algn="ctr"/>
+            <a:r>
+              <a:rPr lang="en-US" sz="1400" dirty="0"/>
+              <a:t>of cases</a:t>
+            </a:r>
+            <a:endParaRPr lang="en-US" dirty="0"/>
+          </a:p>
+        </p:txBody>
+      </p:sp>
+      <p:sp>
+        <p:nvSpPr>
+          <p:cNvPr id="12" name="Rectangle: Rounded Corners 11">
+            <a:extLst>
+              <a:ext uri="{FF2B5EF4-FFF2-40B4-BE49-F238E27FC236}">
+                <a16:creationId xmlns:a16="http://schemas.microsoft.com/office/drawing/2014/main" id="{C9CAD8C2-985C-408A-B02A-8BCED32AFF37}"/>
+              </a:ext>
+            </a:extLst>
+          </p:cNvPr>
+          <p:cNvSpPr/>
+          <p:nvPr/>
+        </p:nvSpPr>
+        <p:spPr>
+          <a:xfrm>
+            <a:off x="9473949" y="4799605"/>
+            <a:ext cx="1754480" cy="1693072"/>
+          </a:xfrm>
+          <a:prstGeom prst="roundRect">
+            <a:avLst/>
+          </a:prstGeom>
+        </p:spPr>
+        <p:style>
+          <a:lnRef idx="2">
+            <a:schemeClr val="dk1"/>
+          </a:lnRef>
+          <a:fillRef idx="1">
+            <a:schemeClr val="lt1"/>
+          </a:fillRef>
+          <a:effectRef idx="0">
+            <a:schemeClr val="dk1"/>
+          </a:effectRef>
+          <a:fontRef idx="minor">
+            <a:schemeClr val="dk1"/>
+          </a:fontRef>
+        </p:style>
+        <p:txBody>
+          <a:bodyPr rtlCol="0" anchor="ctr">
+            <a:normAutofit fontScale="92500" lnSpcReduction="10000"/>
+          </a:bodyPr>
+          <a:lstStyle/>
+          <a:p>
+            <a:pPr algn="ctr"/>
+            <a:r>
+              <a:rPr lang="en-US" sz="1400" dirty="0"/>
+              <a:t>Increases sentence by average of</a:t>
+            </a:r>
+          </a:p>
+          <a:p>
+            <a:pPr algn="ctr"/>
+            <a:r>
+              <a:rPr lang="en-US" sz="6600" dirty="0"/>
+              <a:t>25.3</a:t>
+            </a:r>
+          </a:p>
+          <a:p>
+            <a:pPr algn="ctr"/>
+            <a:r>
+              <a:rPr lang="en-US" sz="1400" dirty="0"/>
+              <a:t>years</a:t>
+            </a:r>
+            <a:endParaRPr lang="en-US" dirty="0"/>
           </a:p>
         </p:txBody>
       </p:sp>
     </p:spTree>
     <p:extLst>
       <p:ext uri="{BB962C8B-B14F-4D97-AF65-F5344CB8AC3E}">
-        <p14:creationId xmlns:p14="http://schemas.microsoft.com/office/powerpoint/2010/main" val="2508452652"/>
+        <p14:creationId xmlns:p14="http://schemas.microsoft.com/office/powerpoint/2010/main" val="2303565138"/>
       </p:ext>
     </p:extLst>
   </p:cSld>
@@ -14497,25 +14872,25 @@
           </a:bodyPr>
           <a:lstStyle/>
           <a:p>
-            <a:pPr marL="285750" indent="-285750" algn="just"/>
+            <a:pPr marL="285750" indent="-285750"/>
             <a:r>
               <a:rPr lang="en-US" sz="2000" dirty="0">
                 <a:solidFill>
                   <a:schemeClr val="bg1"/>
                 </a:solidFill>
               </a:rPr>
-              <a:t>The safety valve is applied in approximately 19% of drug offenses involving 2 or less drugs and reduces sentences by an average of 7.2 years</a:t>
+              <a:t>Disproportionately applied to white and Hispanic offenders</a:t>
             </a:r>
           </a:p>
           <a:p>
-            <a:pPr marL="285750" indent="-285750" algn="just"/>
+            <a:pPr marL="285750" indent="-285750"/>
             <a:r>
               <a:rPr lang="en-US" sz="2000" dirty="0">
                 <a:solidFill>
                   <a:schemeClr val="bg1"/>
                 </a:solidFill>
               </a:rPr>
-              <a:t>Safety valve offenders have an average of 2025x the drugs of non-safety valve offenders</a:t>
+              <a:t>Note: Safety valve offenders have an average of 2025x the drugs of non-safety valve offenders</a:t>
             </a:r>
           </a:p>
         </p:txBody>
@@ -14542,12 +14917,13 @@
               </a:ext>
             </a:extLst>
           </a:blip>
+          <a:srcRect/>
           <a:stretch/>
         </p:blipFill>
         <p:spPr>
           <a:xfrm>
-            <a:off x="6643856" y="1850234"/>
-            <a:ext cx="5051320" cy="3157074"/>
+            <a:off x="6643857" y="1487286"/>
+            <a:ext cx="5051317" cy="3157072"/>
           </a:xfrm>
           <a:prstGeom prst="rect">
             <a:avLst/>
@@ -14556,10 +14932,10 @@
       </p:pic>
       <p:sp>
         <p:nvSpPr>
-          <p:cNvPr id="12" name="TextBox 11">
+          <p:cNvPr id="3" name="TextBox 2">
             <a:extLst>
               <a:ext uri="{FF2B5EF4-FFF2-40B4-BE49-F238E27FC236}">
-                <a16:creationId xmlns:a16="http://schemas.microsoft.com/office/drawing/2014/main" id="{0F326A35-EA1E-4A30-AD4A-58ACDF3C1BA1}"/>
+                <a16:creationId xmlns:a16="http://schemas.microsoft.com/office/drawing/2014/main" id="{DDB58F66-CD44-4CFC-A17F-FA279E375A85}"/>
               </a:ext>
             </a:extLst>
           </p:cNvPr>
@@ -14568,8 +14944,8 @@
         </p:nvSpPr>
         <p:spPr>
           <a:xfrm>
-            <a:off x="6373390" y="882733"/>
-            <a:ext cx="5051320" cy="461665"/>
+            <a:off x="6577421" y="882733"/>
+            <a:ext cx="5117754" cy="461665"/>
           </a:xfrm>
           <a:prstGeom prst="rect">
             <a:avLst/>
@@ -14582,22 +14958,150 @@
           </a:bodyPr>
           <a:lstStyle/>
           <a:p>
-            <a:pPr algn="ctr">
-              <a:spcAft>
-                <a:spcPts val="600"/>
-              </a:spcAft>
-            </a:pPr>
+            <a:pPr algn="ctr"/>
             <a:r>
               <a:rPr lang="en-US" sz="2400" dirty="0"/>
-              <a:t>Safety Valve Applied</a:t>
+              <a:t>Safety Valve Measure Applied</a:t>
             </a:r>
+          </a:p>
+        </p:txBody>
+      </p:sp>
+      <p:sp>
+        <p:nvSpPr>
+          <p:cNvPr id="11" name="Rectangle: Rounded Corners 10">
+            <a:extLst>
+              <a:ext uri="{FF2B5EF4-FFF2-40B4-BE49-F238E27FC236}">
+                <a16:creationId xmlns:a16="http://schemas.microsoft.com/office/drawing/2014/main" id="{092FD124-60D7-4DA1-816D-52308CCC12D8}"/>
+              </a:ext>
+            </a:extLst>
+          </p:cNvPr>
+          <p:cNvSpPr/>
+          <p:nvPr/>
+        </p:nvSpPr>
+        <p:spPr>
+          <a:xfrm>
+            <a:off x="7301183" y="4792771"/>
+            <a:ext cx="1754480" cy="1693072"/>
+          </a:xfrm>
+          <a:prstGeom prst="roundRect">
+            <a:avLst/>
+          </a:prstGeom>
+        </p:spPr>
+        <p:style>
+          <a:lnRef idx="2">
+            <a:schemeClr val="dk1"/>
+          </a:lnRef>
+          <a:fillRef idx="1">
+            <a:schemeClr val="lt1"/>
+          </a:fillRef>
+          <a:effectRef idx="0">
+            <a:schemeClr val="dk1"/>
+          </a:effectRef>
+          <a:fontRef idx="minor">
+            <a:schemeClr val="dk1"/>
+          </a:fontRef>
+        </p:style>
+        <p:txBody>
+          <a:bodyPr rtlCol="0" anchor="ctr">
+            <a:normAutofit fontScale="92500"/>
+          </a:bodyPr>
+          <a:lstStyle/>
+          <a:p>
+            <a:pPr algn="ctr"/>
+            <a:r>
+              <a:rPr lang="en-US" sz="1400" dirty="0"/>
+              <a:t>Applied in</a:t>
+            </a:r>
+          </a:p>
+          <a:p>
+            <a:pPr algn="ctr"/>
+            <a:r>
+              <a:rPr lang="en-US" sz="6600" dirty="0"/>
+              <a:t>19%</a:t>
+            </a:r>
+          </a:p>
+          <a:p>
+            <a:pPr algn="ctr"/>
+            <a:r>
+              <a:rPr lang="en-US" sz="1300" dirty="0"/>
+              <a:t>of drug cases</a:t>
+            </a:r>
+            <a:endParaRPr lang="en-US" sz="1700" dirty="0"/>
+          </a:p>
+        </p:txBody>
+      </p:sp>
+      <p:sp>
+        <p:nvSpPr>
+          <p:cNvPr id="12" name="Rectangle: Rounded Corners 11">
+            <a:extLst>
+              <a:ext uri="{FF2B5EF4-FFF2-40B4-BE49-F238E27FC236}">
+                <a16:creationId xmlns:a16="http://schemas.microsoft.com/office/drawing/2014/main" id="{C9CAD8C2-985C-408A-B02A-8BCED32AFF37}"/>
+              </a:ext>
+            </a:extLst>
+          </p:cNvPr>
+          <p:cNvSpPr/>
+          <p:nvPr/>
+        </p:nvSpPr>
+        <p:spPr>
+          <a:xfrm>
+            <a:off x="9473949" y="4799605"/>
+            <a:ext cx="1754480" cy="1693072"/>
+          </a:xfrm>
+          <a:prstGeom prst="roundRect">
+            <a:avLst/>
+          </a:prstGeom>
+        </p:spPr>
+        <p:style>
+          <a:lnRef idx="2">
+            <a:schemeClr val="dk1"/>
+          </a:lnRef>
+          <a:fillRef idx="1">
+            <a:schemeClr val="lt1"/>
+          </a:fillRef>
+          <a:effectRef idx="0">
+            <a:schemeClr val="dk1"/>
+          </a:effectRef>
+          <a:fontRef idx="minor">
+            <a:schemeClr val="dk1"/>
+          </a:fontRef>
+        </p:style>
+        <p:txBody>
+          <a:bodyPr rtlCol="0" anchor="ctr">
+            <a:normAutofit fontScale="92500" lnSpcReduction="10000"/>
+          </a:bodyPr>
+          <a:lstStyle/>
+          <a:p>
+            <a:pPr algn="ctr"/>
+            <a:r>
+              <a:rPr lang="en-US" sz="1400" b="1" dirty="0"/>
+              <a:t>Reduces</a:t>
+            </a:r>
+            <a:r>
+              <a:rPr lang="en-US" sz="1400" dirty="0"/>
+              <a:t> sentence by average of</a:t>
+            </a:r>
+          </a:p>
+          <a:p>
+            <a:pPr algn="ctr"/>
+            <a:r>
+              <a:rPr lang="en-US" sz="6600" dirty="0"/>
+              <a:t>7.2</a:t>
+            </a:r>
+          </a:p>
+          <a:p>
+            <a:pPr algn="ctr"/>
+            <a:r>
+              <a:rPr lang="en-US" sz="1400" dirty="0"/>
+              <a:t>years</a:t>
+            </a:r>
+            <a:endParaRPr lang="en-US" dirty="0"/>
           </a:p>
         </p:txBody>
       </p:sp>
     </p:spTree>
     <p:extLst>
       <p:ext uri="{BB962C8B-B14F-4D97-AF65-F5344CB8AC3E}">
-        <p14:creationId xmlns:p14="http://schemas.microsoft.com/office/powerpoint/2010/main" val="1952991284"/>
+        <p14:creationId xmlns:p14="http://schemas.microsoft.com/office/powerpoint/2010/main" val="1885620330"/>
       </p:ext>
     </p:extLst>
   </p:cSld>
@@ -14608,714 +15112,6 @@
 </file>
 
 <file path=ppt/slides/slide22.xml><?xml version="1.0" encoding="utf-8"?>
-<p:sld xmlns:a="http://schemas.openxmlformats.org/drawingml/2006/main" xmlns:r="http://schemas.openxmlformats.org/officeDocument/2006/relationships" xmlns:p="http://schemas.openxmlformats.org/presentationml/2006/main">
-  <p:cSld>
-    <p:bg>
-      <p:bgPr>
-        <a:solidFill>
-          <a:schemeClr val="bg1"/>
-        </a:solidFill>
-        <a:effectLst/>
-      </p:bgPr>
-    </p:bg>
-    <p:spTree>
-      <p:nvGrpSpPr>
-        <p:cNvPr id="1" name=""/>
-        <p:cNvGrpSpPr/>
-        <p:nvPr/>
-      </p:nvGrpSpPr>
-      <p:grpSpPr>
-        <a:xfrm>
-          <a:off x="0" y="0"/>
-          <a:ext cx="0" cy="0"/>
-          <a:chOff x="0" y="0"/>
-          <a:chExt cx="0" cy="0"/>
-        </a:xfrm>
-      </p:grpSpPr>
-      <p:sp useBgFill="1">
-        <p:nvSpPr>
-          <p:cNvPr id="8" name="Rectangle 7">
-            <a:extLst>
-              <a:ext uri="{FF2B5EF4-FFF2-40B4-BE49-F238E27FC236}">
-                <a16:creationId xmlns:a16="http://schemas.microsoft.com/office/drawing/2014/main" id="{1557A916-FDD1-44A1-A7A1-70009FD6BE46}"/>
-              </a:ext>
-              <a:ext uri="{C183D7F6-B498-43B3-948B-1728B52AA6E4}">
-                <adec:decorative xmlns:adec="http://schemas.microsoft.com/office/drawing/2017/decorative" val="1"/>
-              </a:ext>
-            </a:extLst>
-          </p:cNvPr>
-          <p:cNvSpPr>
-            <a:spLocks noGrp="1" noRot="1" noChangeAspect="1" noMove="1" noResize="1" noEditPoints="1" noAdjustHandles="1" noChangeArrowheads="1" noChangeShapeType="1" noTextEdit="1"/>
-          </p:cNvSpPr>
-          <p:nvPr>
-            <p:extLst>
-              <p:ext uri="{386F3935-93C4-4BCD-93E2-E3B085C9AB24}">
-                <p16:designElem xmlns:p16="http://schemas.microsoft.com/office/powerpoint/2015/main" val="1"/>
-              </p:ext>
-            </p:extLst>
-          </p:nvPr>
-        </p:nvSpPr>
-        <p:spPr>
-          <a:xfrm>
-            <a:off x="0" y="0"/>
-            <a:ext cx="12192000" cy="6858000"/>
-          </a:xfrm>
-          <a:prstGeom prst="rect">
-            <a:avLst/>
-          </a:prstGeom>
-          <a:ln>
-            <a:noFill/>
-          </a:ln>
-        </p:spPr>
-        <p:style>
-          <a:lnRef idx="2">
-            <a:schemeClr val="accent1">
-              <a:shade val="50000"/>
-            </a:schemeClr>
-          </a:lnRef>
-          <a:fillRef idx="1">
-            <a:schemeClr val="accent1"/>
-          </a:fillRef>
-          <a:effectRef idx="0">
-            <a:schemeClr val="accent1"/>
-          </a:effectRef>
-          <a:fontRef idx="minor">
-            <a:schemeClr val="lt1"/>
-          </a:fontRef>
-        </p:style>
-        <p:txBody>
-          <a:bodyPr rtlCol="0" anchor="ctr"/>
-          <a:lstStyle/>
-          <a:p>
-            <a:pPr algn="ctr"/>
-            <a:endParaRPr lang="en-US"/>
-          </a:p>
-        </p:txBody>
-      </p:sp>
-      <p:sp>
-        <p:nvSpPr>
-          <p:cNvPr id="2" name="Title 1">
-            <a:extLst>
-              <a:ext uri="{FF2B5EF4-FFF2-40B4-BE49-F238E27FC236}">
-                <a16:creationId xmlns:a16="http://schemas.microsoft.com/office/drawing/2014/main" id="{BC0C6EAF-EDF9-4C47-9CD0-4AA3B76E6E66}"/>
-              </a:ext>
-            </a:extLst>
-          </p:cNvPr>
-          <p:cNvSpPr>
-            <a:spLocks noGrp="1"/>
-          </p:cNvSpPr>
-          <p:nvPr>
-            <p:ph type="title"/>
-          </p:nvPr>
-        </p:nvSpPr>
-        <p:spPr>
-          <a:xfrm>
-            <a:off x="8006085" y="1470990"/>
-            <a:ext cx="3689091" cy="3777665"/>
-          </a:xfrm>
-        </p:spPr>
-        <p:txBody>
-          <a:bodyPr anchor="t">
-            <a:normAutofit/>
-          </a:bodyPr>
-          <a:lstStyle/>
-          <a:p>
-            <a:r>
-              <a:rPr lang="en-US" dirty="0"/>
-              <a:t>Sentence Enhancements &amp; Mitigation</a:t>
-            </a:r>
-          </a:p>
-        </p:txBody>
-      </p:sp>
-      <p:sp>
-        <p:nvSpPr>
-          <p:cNvPr id="10" name="Freeform: Shape 9">
-            <a:extLst>
-              <a:ext uri="{FF2B5EF4-FFF2-40B4-BE49-F238E27FC236}">
-                <a16:creationId xmlns:a16="http://schemas.microsoft.com/office/drawing/2014/main" id="{4B874C19-9B23-4B12-823E-D67615A9B3AC}"/>
-              </a:ext>
-              <a:ext uri="{C183D7F6-B498-43B3-948B-1728B52AA6E4}">
-                <adec:decorative xmlns:adec="http://schemas.microsoft.com/office/drawing/2017/decorative" val="1"/>
-              </a:ext>
-            </a:extLst>
-          </p:cNvPr>
-          <p:cNvSpPr>
-            <a:spLocks noGrp="1" noRot="1" noChangeAspect="1" noMove="1" noResize="1" noEditPoints="1" noAdjustHandles="1" noChangeArrowheads="1" noChangeShapeType="1" noTextEdit="1"/>
-          </p:cNvSpPr>
-          <p:nvPr>
-            <p:extLst>
-              <p:ext uri="{386F3935-93C4-4BCD-93E2-E3B085C9AB24}">
-                <p16:designElem xmlns:p16="http://schemas.microsoft.com/office/powerpoint/2015/main" val="1"/>
-              </p:ext>
-            </p:extLst>
-          </p:nvPr>
-        </p:nvSpPr>
-        <p:spPr>
-          <a:xfrm>
-            <a:off x="0" y="0"/>
-            <a:ext cx="7743949" cy="6858000"/>
-          </a:xfrm>
-          <a:custGeom>
-            <a:avLst/>
-            <a:gdLst>
-              <a:gd name="connsiteX0" fmla="*/ 956085 w 7743949"/>
-              <a:gd name="connsiteY0" fmla="*/ 2071857 h 6858000"/>
-              <a:gd name="connsiteX1" fmla="*/ 4999548 w 7743949"/>
-              <a:gd name="connsiteY1" fmla="*/ 2071857 h 6858000"/>
-              <a:gd name="connsiteX2" fmla="*/ 5619604 w 7743949"/>
-              <a:gd name="connsiteY2" fmla="*/ 2437296 h 6858000"/>
-              <a:gd name="connsiteX3" fmla="*/ 7645701 w 7743949"/>
-              <a:gd name="connsiteY3" fmla="*/ 5926372 h 6858000"/>
-              <a:gd name="connsiteX4" fmla="*/ 7645701 w 7743949"/>
-              <a:gd name="connsiteY4" fmla="*/ 6639850 h 6858000"/>
-              <a:gd name="connsiteX5" fmla="*/ 7538856 w 7743949"/>
-              <a:gd name="connsiteY5" fmla="*/ 6823844 h 6858000"/>
-              <a:gd name="connsiteX6" fmla="*/ 7519022 w 7743949"/>
-              <a:gd name="connsiteY6" fmla="*/ 6858000 h 6858000"/>
-              <a:gd name="connsiteX7" fmla="*/ 0 w 7743949"/>
-              <a:gd name="connsiteY7" fmla="*/ 6858000 h 6858000"/>
-              <a:gd name="connsiteX8" fmla="*/ 0 w 7743949"/>
-              <a:gd name="connsiteY8" fmla="*/ 3003362 h 6858000"/>
-              <a:gd name="connsiteX9" fmla="*/ 144017 w 7743949"/>
-              <a:gd name="connsiteY9" fmla="*/ 2754282 h 6858000"/>
-              <a:gd name="connsiteX10" fmla="*/ 327296 w 7743949"/>
-              <a:gd name="connsiteY10" fmla="*/ 2437296 h 6858000"/>
-              <a:gd name="connsiteX11" fmla="*/ 956085 w 7743949"/>
-              <a:gd name="connsiteY11" fmla="*/ 2071857 h 6858000"/>
-              <a:gd name="connsiteX12" fmla="*/ 6281397 w 7743949"/>
-              <a:gd name="connsiteY12" fmla="*/ 1163923 h 6858000"/>
-              <a:gd name="connsiteX13" fmla="*/ 7148441 w 7743949"/>
-              <a:gd name="connsiteY13" fmla="*/ 1163923 h 6858000"/>
-              <a:gd name="connsiteX14" fmla="*/ 7281401 w 7743949"/>
-              <a:gd name="connsiteY14" fmla="*/ 1242285 h 6858000"/>
-              <a:gd name="connsiteX15" fmla="*/ 7715859 w 7743949"/>
-              <a:gd name="connsiteY15" fmla="*/ 1990451 h 6858000"/>
-              <a:gd name="connsiteX16" fmla="*/ 7715859 w 7743949"/>
-              <a:gd name="connsiteY16" fmla="*/ 2143443 h 6858000"/>
-              <a:gd name="connsiteX17" fmla="*/ 7281401 w 7743949"/>
-              <a:gd name="connsiteY17" fmla="*/ 2891610 h 6858000"/>
-              <a:gd name="connsiteX18" fmla="*/ 7148441 w 7743949"/>
-              <a:gd name="connsiteY18" fmla="*/ 2969971 h 6858000"/>
-              <a:gd name="connsiteX19" fmla="*/ 6281397 w 7743949"/>
-              <a:gd name="connsiteY19" fmla="*/ 2969971 h 6858000"/>
-              <a:gd name="connsiteX20" fmla="*/ 6146565 w 7743949"/>
-              <a:gd name="connsiteY20" fmla="*/ 2891610 h 6858000"/>
-              <a:gd name="connsiteX21" fmla="*/ 5713979 w 7743949"/>
-              <a:gd name="connsiteY21" fmla="*/ 2143443 h 6858000"/>
-              <a:gd name="connsiteX22" fmla="*/ 5713979 w 7743949"/>
-              <a:gd name="connsiteY22" fmla="*/ 1990451 h 6858000"/>
-              <a:gd name="connsiteX23" fmla="*/ 6146565 w 7743949"/>
-              <a:gd name="connsiteY23" fmla="*/ 1242285 h 6858000"/>
-              <a:gd name="connsiteX24" fmla="*/ 6281397 w 7743949"/>
-              <a:gd name="connsiteY24" fmla="*/ 1163923 h 6858000"/>
-              <a:gd name="connsiteX25" fmla="*/ 0 w 7743949"/>
-              <a:gd name="connsiteY25" fmla="*/ 0 h 6858000"/>
-              <a:gd name="connsiteX26" fmla="*/ 6600525 w 7743949"/>
-              <a:gd name="connsiteY26" fmla="*/ 0 h 6858000"/>
-              <a:gd name="connsiteX27" fmla="*/ 6486618 w 7743949"/>
-              <a:gd name="connsiteY27" fmla="*/ 196155 h 6858000"/>
-              <a:gd name="connsiteX28" fmla="*/ 5677553 w 7743949"/>
-              <a:gd name="connsiteY28" fmla="*/ 1589421 h 6858000"/>
-              <a:gd name="connsiteX29" fmla="*/ 5057496 w 7743949"/>
-              <a:gd name="connsiteY29" fmla="*/ 1954861 h 6858000"/>
-              <a:gd name="connsiteX30" fmla="*/ 1014033 w 7743949"/>
-              <a:gd name="connsiteY30" fmla="*/ 1954861 h 6858000"/>
-              <a:gd name="connsiteX31" fmla="*/ 385244 w 7743949"/>
-              <a:gd name="connsiteY31" fmla="*/ 1589421 h 6858000"/>
-              <a:gd name="connsiteX32" fmla="*/ 69234 w 7743949"/>
-              <a:gd name="connsiteY32" fmla="*/ 1042874 h 6858000"/>
-              <a:gd name="connsiteX33" fmla="*/ 0 w 7743949"/>
-              <a:gd name="connsiteY33" fmla="*/ 923133 h 6858000"/>
-            </a:gdLst>
-            <a:ahLst/>
-            <a:cxnLst>
-              <a:cxn ang="0">
-                <a:pos x="connsiteX0" y="connsiteY0"/>
-              </a:cxn>
-              <a:cxn ang="0">
-                <a:pos x="connsiteX1" y="connsiteY1"/>
-              </a:cxn>
-              <a:cxn ang="0">
-                <a:pos x="connsiteX2" y="connsiteY2"/>
-              </a:cxn>
-              <a:cxn ang="0">
-                <a:pos x="connsiteX3" y="connsiteY3"/>
-              </a:cxn>
-              <a:cxn ang="0">
-                <a:pos x="connsiteX4" y="connsiteY4"/>
-              </a:cxn>
-              <a:cxn ang="0">
-                <a:pos x="connsiteX5" y="connsiteY5"/>
-              </a:cxn>
-              <a:cxn ang="0">
-                <a:pos x="connsiteX6" y="connsiteY6"/>
-              </a:cxn>
-              <a:cxn ang="0">
-                <a:pos x="connsiteX7" y="connsiteY7"/>
-              </a:cxn>
-              <a:cxn ang="0">
-                <a:pos x="connsiteX8" y="connsiteY8"/>
-              </a:cxn>
-              <a:cxn ang="0">
-                <a:pos x="connsiteX9" y="connsiteY9"/>
-              </a:cxn>
-              <a:cxn ang="0">
-                <a:pos x="connsiteX10" y="connsiteY10"/>
-              </a:cxn>
-              <a:cxn ang="0">
-                <a:pos x="connsiteX11" y="connsiteY11"/>
-              </a:cxn>
-              <a:cxn ang="0">
-                <a:pos x="connsiteX12" y="connsiteY12"/>
-              </a:cxn>
-              <a:cxn ang="0">
-                <a:pos x="connsiteX13" y="connsiteY13"/>
-              </a:cxn>
-              <a:cxn ang="0">
-                <a:pos x="connsiteX14" y="connsiteY14"/>
-              </a:cxn>
-              <a:cxn ang="0">
-                <a:pos x="connsiteX15" y="connsiteY15"/>
-              </a:cxn>
-              <a:cxn ang="0">
-                <a:pos x="connsiteX16" y="connsiteY16"/>
-              </a:cxn>
-              <a:cxn ang="0">
-                <a:pos x="connsiteX17" y="connsiteY17"/>
-              </a:cxn>
-              <a:cxn ang="0">
-                <a:pos x="connsiteX18" y="connsiteY18"/>
-              </a:cxn>
-              <a:cxn ang="0">
-                <a:pos x="connsiteX19" y="connsiteY19"/>
-              </a:cxn>
-              <a:cxn ang="0">
-                <a:pos x="connsiteX20" y="connsiteY20"/>
-              </a:cxn>
-              <a:cxn ang="0">
-                <a:pos x="connsiteX21" y="connsiteY21"/>
-              </a:cxn>
-              <a:cxn ang="0">
-                <a:pos x="connsiteX22" y="connsiteY22"/>
-              </a:cxn>
-              <a:cxn ang="0">
-                <a:pos x="connsiteX23" y="connsiteY23"/>
-              </a:cxn>
-              <a:cxn ang="0">
-                <a:pos x="connsiteX24" y="connsiteY24"/>
-              </a:cxn>
-              <a:cxn ang="0">
-                <a:pos x="connsiteX25" y="connsiteY25"/>
-              </a:cxn>
-              <a:cxn ang="0">
-                <a:pos x="connsiteX26" y="connsiteY26"/>
-              </a:cxn>
-              <a:cxn ang="0">
-                <a:pos x="connsiteX27" y="connsiteY27"/>
-              </a:cxn>
-              <a:cxn ang="0">
-                <a:pos x="connsiteX28" y="connsiteY28"/>
-              </a:cxn>
-              <a:cxn ang="0">
-                <a:pos x="connsiteX29" y="connsiteY29"/>
-              </a:cxn>
-              <a:cxn ang="0">
-                <a:pos x="connsiteX30" y="connsiteY30"/>
-              </a:cxn>
-              <a:cxn ang="0">
-                <a:pos x="connsiteX31" y="connsiteY31"/>
-              </a:cxn>
-              <a:cxn ang="0">
-                <a:pos x="connsiteX32" y="connsiteY32"/>
-              </a:cxn>
-              <a:cxn ang="0">
-                <a:pos x="connsiteX33" y="connsiteY33"/>
-              </a:cxn>
-            </a:cxnLst>
-            <a:rect l="l" t="t" r="r" b="b"/>
-            <a:pathLst>
-              <a:path w="7743949" h="6858000">
-                <a:moveTo>
-                  <a:pt x="956085" y="2071857"/>
-                </a:moveTo>
-                <a:cubicBezTo>
-                  <a:pt x="956085" y="2071857"/>
-                  <a:pt x="956085" y="2071857"/>
-                  <a:pt x="4999548" y="2071857"/>
-                </a:cubicBezTo>
-                <a:cubicBezTo>
-                  <a:pt x="5252811" y="2071857"/>
-                  <a:pt x="5497339" y="2211072"/>
-                  <a:pt x="5619604" y="2437296"/>
-                </a:cubicBezTo>
-                <a:cubicBezTo>
-                  <a:pt x="5619604" y="2437296"/>
-                  <a:pt x="5619604" y="2437296"/>
-                  <a:pt x="7645701" y="5926372"/>
-                </a:cubicBezTo>
-                <a:cubicBezTo>
-                  <a:pt x="7776699" y="6143896"/>
-                  <a:pt x="7776699" y="6422327"/>
-                  <a:pt x="7645701" y="6639850"/>
-                </a:cubicBezTo>
-                <a:cubicBezTo>
-                  <a:pt x="7645701" y="6639850"/>
-                  <a:pt x="7645701" y="6639850"/>
-                  <a:pt x="7538856" y="6823844"/>
-                </a:cubicBezTo>
-                <a:lnTo>
-                  <a:pt x="7519022" y="6858000"/>
-                </a:lnTo>
-                <a:lnTo>
-                  <a:pt x="0" y="6858000"/>
-                </a:lnTo>
-                <a:lnTo>
-                  <a:pt x="0" y="3003362"/>
-                </a:lnTo>
-                <a:lnTo>
-                  <a:pt x="144017" y="2754282"/>
-                </a:lnTo>
-                <a:cubicBezTo>
-                  <a:pt x="203181" y="2651956"/>
-                  <a:pt x="264254" y="2546330"/>
-                  <a:pt x="327296" y="2437296"/>
-                </a:cubicBezTo>
-                <a:cubicBezTo>
-                  <a:pt x="458294" y="2211072"/>
-                  <a:pt x="694090" y="2071857"/>
-                  <a:pt x="956085" y="2071857"/>
-                </a:cubicBezTo>
-                <a:close/>
-                <a:moveTo>
-                  <a:pt x="6281397" y="1163923"/>
-                </a:moveTo>
-                <a:cubicBezTo>
-                  <a:pt x="6281397" y="1163923"/>
-                  <a:pt x="6281397" y="1163923"/>
-                  <a:pt x="7148441" y="1163923"/>
-                </a:cubicBezTo>
-                <a:cubicBezTo>
-                  <a:pt x="7202749" y="1163923"/>
-                  <a:pt x="7255183" y="1193775"/>
-                  <a:pt x="7281401" y="1242285"/>
-                </a:cubicBezTo>
-                <a:cubicBezTo>
-                  <a:pt x="7281401" y="1242285"/>
-                  <a:pt x="7281401" y="1242285"/>
-                  <a:pt x="7715859" y="1990451"/>
-                </a:cubicBezTo>
-                <a:cubicBezTo>
-                  <a:pt x="7743949" y="2037095"/>
-                  <a:pt x="7743949" y="2096799"/>
-                  <a:pt x="7715859" y="2143443"/>
-                </a:cubicBezTo>
-                <a:cubicBezTo>
-                  <a:pt x="7715859" y="2143443"/>
-                  <a:pt x="7715859" y="2143443"/>
-                  <a:pt x="7281401" y="2891610"/>
-                </a:cubicBezTo>
-                <a:cubicBezTo>
-                  <a:pt x="7255183" y="2940119"/>
-                  <a:pt x="7202749" y="2969971"/>
-                  <a:pt x="7148441" y="2969971"/>
-                </a:cubicBezTo>
-                <a:cubicBezTo>
-                  <a:pt x="7148441" y="2969971"/>
-                  <a:pt x="7148441" y="2969971"/>
-                  <a:pt x="6281397" y="2969971"/>
-                </a:cubicBezTo>
-                <a:cubicBezTo>
-                  <a:pt x="6225217" y="2969971"/>
-                  <a:pt x="6174655" y="2940119"/>
-                  <a:pt x="6146565" y="2891610"/>
-                </a:cubicBezTo>
-                <a:cubicBezTo>
-                  <a:pt x="6146565" y="2891610"/>
-                  <a:pt x="6146565" y="2891610"/>
-                  <a:pt x="5713979" y="2143443"/>
-                </a:cubicBezTo>
-                <a:cubicBezTo>
-                  <a:pt x="5685889" y="2096799"/>
-                  <a:pt x="5685889" y="2037095"/>
-                  <a:pt x="5713979" y="1990451"/>
-                </a:cubicBezTo>
-                <a:cubicBezTo>
-                  <a:pt x="5713979" y="1990451"/>
-                  <a:pt x="5713979" y="1990451"/>
-                  <a:pt x="6146565" y="1242285"/>
-                </a:cubicBezTo>
-                <a:cubicBezTo>
-                  <a:pt x="6174655" y="1193775"/>
-                  <a:pt x="6225217" y="1163923"/>
-                  <a:pt x="6281397" y="1163923"/>
-                </a:cubicBezTo>
-                <a:close/>
-                <a:moveTo>
-                  <a:pt x="0" y="0"/>
-                </a:moveTo>
-                <a:lnTo>
-                  <a:pt x="6600525" y="0"/>
-                </a:lnTo>
-                <a:lnTo>
-                  <a:pt x="6486618" y="196155"/>
-                </a:lnTo>
-                <a:cubicBezTo>
-                  <a:pt x="6261242" y="584267"/>
-                  <a:pt x="5994130" y="1044253"/>
-                  <a:pt x="5677553" y="1589421"/>
-                </a:cubicBezTo>
-                <a:cubicBezTo>
-                  <a:pt x="5555288" y="1815646"/>
-                  <a:pt x="5310759" y="1954861"/>
-                  <a:pt x="5057496" y="1954861"/>
-                </a:cubicBezTo>
-                <a:cubicBezTo>
-                  <a:pt x="5057496" y="1954861"/>
-                  <a:pt x="5057496" y="1954861"/>
-                  <a:pt x="1014033" y="1954861"/>
-                </a:cubicBezTo>
-                <a:cubicBezTo>
-                  <a:pt x="752038" y="1954861"/>
-                  <a:pt x="516243" y="1815646"/>
-                  <a:pt x="385244" y="1589421"/>
-                </a:cubicBezTo>
-                <a:cubicBezTo>
-                  <a:pt x="385244" y="1589421"/>
-                  <a:pt x="385244" y="1589421"/>
-                  <a:pt x="69234" y="1042874"/>
-                </a:cubicBezTo>
-                <a:lnTo>
-                  <a:pt x="0" y="923133"/>
-                </a:lnTo>
-                <a:close/>
-              </a:path>
-            </a:pathLst>
-          </a:custGeom>
-          <a:solidFill>
-            <a:schemeClr val="tx1"/>
-          </a:solidFill>
-          <a:ln>
-            <a:noFill/>
-          </a:ln>
-        </p:spPr>
-        <p:style>
-          <a:lnRef idx="2">
-            <a:schemeClr val="accent1">
-              <a:shade val="50000"/>
-            </a:schemeClr>
-          </a:lnRef>
-          <a:fillRef idx="1">
-            <a:schemeClr val="accent1"/>
-          </a:fillRef>
-          <a:effectRef idx="0">
-            <a:schemeClr val="accent1"/>
-          </a:effectRef>
-          <a:fontRef idx="minor">
-            <a:schemeClr val="lt1"/>
-          </a:fontRef>
-        </p:style>
-        <p:txBody>
-          <a:bodyPr wrap="square" rtlCol="0" anchor="ctr">
-            <a:noAutofit/>
-          </a:bodyPr>
-          <a:lstStyle/>
-          <a:p>
-            <a:pPr algn="ctr"/>
-            <a:endParaRPr lang="en-US"/>
-          </a:p>
-        </p:txBody>
-      </p:sp>
-      <p:sp>
-        <p:nvSpPr>
-          <p:cNvPr id="3" name="Content Placeholder 2">
-            <a:extLst>
-              <a:ext uri="{FF2B5EF4-FFF2-40B4-BE49-F238E27FC236}">
-                <a16:creationId xmlns:a16="http://schemas.microsoft.com/office/drawing/2014/main" id="{1442EF80-DD5B-49B5-8897-D94B795222DC}"/>
-              </a:ext>
-            </a:extLst>
-          </p:cNvPr>
-          <p:cNvSpPr>
-            <a:spLocks noGrp="1"/>
-          </p:cNvSpPr>
-          <p:nvPr>
-            <p:ph idx="1"/>
-          </p:nvPr>
-        </p:nvSpPr>
-        <p:spPr>
-          <a:xfrm>
-            <a:off x="756746" y="2863018"/>
-            <a:ext cx="4666592" cy="3304451"/>
-          </a:xfrm>
-        </p:spPr>
-        <p:txBody>
-          <a:bodyPr>
-            <a:normAutofit/>
-          </a:bodyPr>
-          <a:lstStyle/>
-          <a:p>
-            <a:r>
-              <a:rPr lang="en-US" sz="2400" dirty="0">
-                <a:solidFill>
-                  <a:schemeClr val="bg1"/>
-                </a:solidFill>
-              </a:rPr>
-              <a:t>While criminal history points are applied proportionately across racial lines, career offender and armed career offender status are applied disproportionately to black offenders</a:t>
-            </a:r>
-          </a:p>
-          <a:p>
-            <a:r>
-              <a:rPr lang="en-US" sz="2400" dirty="0">
-                <a:solidFill>
-                  <a:schemeClr val="bg1"/>
-                </a:solidFill>
-              </a:rPr>
-              <a:t>Safety valve measures are applied disproportionately to white and Hispanic offenders</a:t>
-            </a:r>
-          </a:p>
-        </p:txBody>
-      </p:sp>
-    </p:spTree>
-    <p:extLst>
-      <p:ext uri="{BB962C8B-B14F-4D97-AF65-F5344CB8AC3E}">
-        <p14:creationId xmlns:p14="http://schemas.microsoft.com/office/powerpoint/2010/main" val="3601569138"/>
-      </p:ext>
-    </p:extLst>
-  </p:cSld>
-  <p:clrMapOvr>
-    <a:masterClrMapping/>
-  </p:clrMapOvr>
-  <p:timing>
-    <p:tnLst>
-      <p:par>
-        <p:cTn id="1" dur="indefinite" restart="never" nodeType="tmRoot">
-          <p:childTnLst>
-            <p:seq concurrent="1" nextAc="seek">
-              <p:cTn id="2" dur="indefinite" nodeType="mainSeq">
-                <p:childTnLst>
-                  <p:par>
-                    <p:cTn id="3" fill="hold">
-                      <p:stCondLst>
-                        <p:cond delay="indefinite"/>
-                      </p:stCondLst>
-                      <p:childTnLst>
-                        <p:par>
-                          <p:cTn id="4" fill="hold">
-                            <p:stCondLst>
-                              <p:cond delay="0"/>
-                            </p:stCondLst>
-                            <p:childTnLst>
-                              <p:par>
-                                <p:cTn id="5" presetID="1" presetClass="entr" presetSubtype="0" fill="hold" nodeType="clickEffect">
-                                  <p:stCondLst>
-                                    <p:cond delay="0"/>
-                                  </p:stCondLst>
-                                  <p:childTnLst>
-                                    <p:set>
-                                      <p:cBhvr>
-                                        <p:cTn id="6" dur="1" fill="hold">
-                                          <p:stCondLst>
-                                            <p:cond delay="0"/>
-                                          </p:stCondLst>
-                                        </p:cTn>
-                                        <p:tgtEl>
-                                          <p:spTgt spid="3">
-                                            <p:txEl>
-                                              <p:pRg st="0" end="0"/>
-                                            </p:txEl>
-                                          </p:spTgt>
-                                        </p:tgtEl>
-                                        <p:attrNameLst>
-                                          <p:attrName>style.visibility</p:attrName>
-                                        </p:attrNameLst>
-                                      </p:cBhvr>
-                                      <p:to>
-                                        <p:strVal val="visible"/>
-                                      </p:to>
-                                    </p:set>
-                                  </p:childTnLst>
-                                </p:cTn>
-                              </p:par>
-                            </p:childTnLst>
-                          </p:cTn>
-                        </p:par>
-                      </p:childTnLst>
-                    </p:cTn>
-                  </p:par>
-                  <p:par>
-                    <p:cTn id="7" fill="hold">
-                      <p:stCondLst>
-                        <p:cond delay="indefinite"/>
-                      </p:stCondLst>
-                      <p:childTnLst>
-                        <p:par>
-                          <p:cTn id="8" fill="hold">
-                            <p:stCondLst>
-                              <p:cond delay="0"/>
-                            </p:stCondLst>
-                            <p:childTnLst>
-                              <p:par>
-                                <p:cTn id="9" presetID="1" presetClass="entr" presetSubtype="0" fill="hold" nodeType="clickEffect">
-                                  <p:stCondLst>
-                                    <p:cond delay="0"/>
-                                  </p:stCondLst>
-                                  <p:childTnLst>
-                                    <p:set>
-                                      <p:cBhvr>
-                                        <p:cTn id="10" dur="1" fill="hold">
-                                          <p:stCondLst>
-                                            <p:cond delay="0"/>
-                                          </p:stCondLst>
-                                        </p:cTn>
-                                        <p:tgtEl>
-                                          <p:spTgt spid="3">
-                                            <p:txEl>
-                                              <p:pRg st="1" end="1"/>
-                                            </p:txEl>
-                                          </p:spTgt>
-                                        </p:tgtEl>
-                                        <p:attrNameLst>
-                                          <p:attrName>style.visibility</p:attrName>
-                                        </p:attrNameLst>
-                                      </p:cBhvr>
-                                      <p:to>
-                                        <p:strVal val="visible"/>
-                                      </p:to>
-                                    </p:set>
-                                  </p:childTnLst>
-                                </p:cTn>
-                              </p:par>
-                            </p:childTnLst>
-                          </p:cTn>
-                        </p:par>
-                      </p:childTnLst>
-                    </p:cTn>
-                  </p:par>
-                </p:childTnLst>
-              </p:cTn>
-              <p:prevCondLst>
-                <p:cond evt="onPrev" delay="0">
-                  <p:tgtEl>
-                    <p:sldTgt/>
-                  </p:tgtEl>
-                </p:cond>
-              </p:prevCondLst>
-              <p:nextCondLst>
-                <p:cond evt="onNext" delay="0">
-                  <p:tgtEl>
-                    <p:sldTgt/>
-                  </p:tgtEl>
-                </p:cond>
-              </p:nextCondLst>
-            </p:seq>
-          </p:childTnLst>
-        </p:cTn>
-      </p:par>
-    </p:tnLst>
-  </p:timing>
-</p:sld>
-</file>
-
-<file path=ppt/slides/slide23.xml><?xml version="1.0" encoding="utf-8"?>
 <p:sld xmlns:a="http://schemas.openxmlformats.org/drawingml/2006/main" xmlns:r="http://schemas.openxmlformats.org/officeDocument/2006/relationships" xmlns:p="http://schemas.openxmlformats.org/presentationml/2006/main">
   <p:cSld>
     <p:bg>
@@ -15534,7 +15330,7 @@
             </a:pPr>
             <a:r>
               <a:rPr lang="en-US" dirty="0"/>
-              <a:t>Hispanic: 81.5 years</a:t>
+              <a:t>Hispanic 81.5 years</a:t>
             </a:r>
           </a:p>
           <a:p>
@@ -15725,7 +15521,7 @@
                                           </p:stCondLst>
                                         </p:cTn>
                                         <p:tgtEl>
-                                          <p:spTgt spid="11"/>
+                                          <p:spTgt spid="10"/>
                                         </p:tgtEl>
                                         <p:attrNameLst>
                                           <p:attrName>style.visibility</p:attrName>
@@ -15739,293 +15535,7 @@
                                       <p:cBhvr>
                                         <p:cTn id="7" dur="500"/>
                                         <p:tgtEl>
-                                          <p:spTgt spid="11"/>
-                                        </p:tgtEl>
-                                      </p:cBhvr>
-                                    </p:animEffect>
-                                  </p:childTnLst>
-                                </p:cTn>
-                              </p:par>
-                              <p:par>
-                                <p:cTn id="8" presetID="10" presetClass="entr" presetSubtype="0" fill="hold" grpId="0" nodeType="withEffect">
-                                  <p:stCondLst>
-                                    <p:cond delay="0"/>
-                                  </p:stCondLst>
-                                  <p:childTnLst>
-                                    <p:set>
-                                      <p:cBhvr>
-                                        <p:cTn id="9" dur="1" fill="hold">
-                                          <p:stCondLst>
-                                            <p:cond delay="0"/>
-                                          </p:stCondLst>
-                                        </p:cTn>
-                                        <p:tgtEl>
-                                          <p:spTgt spid="13"/>
-                                        </p:tgtEl>
-                                        <p:attrNameLst>
-                                          <p:attrName>style.visibility</p:attrName>
-                                        </p:attrNameLst>
-                                      </p:cBhvr>
-                                      <p:to>
-                                        <p:strVal val="visible"/>
-                                      </p:to>
-                                    </p:set>
-                                    <p:animEffect transition="in" filter="fade">
-                                      <p:cBhvr>
-                                        <p:cTn id="10" dur="500"/>
-                                        <p:tgtEl>
-                                          <p:spTgt spid="13"/>
-                                        </p:tgtEl>
-                                      </p:cBhvr>
-                                    </p:animEffect>
-                                  </p:childTnLst>
-                                </p:cTn>
-                              </p:par>
-                            </p:childTnLst>
-                          </p:cTn>
-                        </p:par>
-                      </p:childTnLst>
-                    </p:cTn>
-                  </p:par>
-                  <p:par>
-                    <p:cTn id="11" fill="hold">
-                      <p:stCondLst>
-                        <p:cond delay="indefinite"/>
-                      </p:stCondLst>
-                      <p:childTnLst>
-                        <p:par>
-                          <p:cTn id="12" fill="hold">
-                            <p:stCondLst>
-                              <p:cond delay="0"/>
-                            </p:stCondLst>
-                            <p:childTnLst>
-                              <p:par>
-                                <p:cTn id="13" presetID="10" presetClass="entr" presetSubtype="0" fill="hold" nodeType="clickEffect">
-                                  <p:stCondLst>
-                                    <p:cond delay="0"/>
-                                  </p:stCondLst>
-                                  <p:childTnLst>
-                                    <p:set>
-                                      <p:cBhvr>
-                                        <p:cTn id="14" dur="1" fill="hold">
-                                          <p:stCondLst>
-                                            <p:cond delay="0"/>
-                                          </p:stCondLst>
-                                        </p:cTn>
-                                        <p:tgtEl>
-                                          <p:spTgt spid="10">
-                                            <p:txEl>
-                                              <p:pRg st="0" end="0"/>
-                                            </p:txEl>
-                                          </p:spTgt>
-                                        </p:tgtEl>
-                                        <p:attrNameLst>
-                                          <p:attrName>style.visibility</p:attrName>
-                                        </p:attrNameLst>
-                                      </p:cBhvr>
-                                      <p:to>
-                                        <p:strVal val="visible"/>
-                                      </p:to>
-                                    </p:set>
-                                    <p:animEffect transition="in" filter="fade">
-                                      <p:cBhvr>
-                                        <p:cTn id="15" dur="500"/>
-                                        <p:tgtEl>
-                                          <p:spTgt spid="10">
-                                            <p:txEl>
-                                              <p:pRg st="0" end="0"/>
-                                            </p:txEl>
-                                          </p:spTgt>
-                                        </p:tgtEl>
-                                      </p:cBhvr>
-                                    </p:animEffect>
-                                  </p:childTnLst>
-                                </p:cTn>
-                              </p:par>
-                              <p:par>
-                                <p:cTn id="16" presetID="10" presetClass="entr" presetSubtype="0" fill="hold" nodeType="withEffect">
-                                  <p:stCondLst>
-                                    <p:cond delay="0"/>
-                                  </p:stCondLst>
-                                  <p:childTnLst>
-                                    <p:set>
-                                      <p:cBhvr>
-                                        <p:cTn id="17" dur="1" fill="hold">
-                                          <p:stCondLst>
-                                            <p:cond delay="0"/>
-                                          </p:stCondLst>
-                                        </p:cTn>
-                                        <p:tgtEl>
-                                          <p:spTgt spid="10">
-                                            <p:txEl>
-                                              <p:pRg st="2" end="2"/>
-                                            </p:txEl>
-                                          </p:spTgt>
-                                        </p:tgtEl>
-                                        <p:attrNameLst>
-                                          <p:attrName>style.visibility</p:attrName>
-                                        </p:attrNameLst>
-                                      </p:cBhvr>
-                                      <p:to>
-                                        <p:strVal val="visible"/>
-                                      </p:to>
-                                    </p:set>
-                                    <p:animEffect transition="in" filter="fade">
-                                      <p:cBhvr>
-                                        <p:cTn id="18" dur="500"/>
-                                        <p:tgtEl>
-                                          <p:spTgt spid="10">
-                                            <p:txEl>
-                                              <p:pRg st="2" end="2"/>
-                                            </p:txEl>
-                                          </p:spTgt>
-                                        </p:tgtEl>
-                                      </p:cBhvr>
-                                    </p:animEffect>
-                                  </p:childTnLst>
-                                </p:cTn>
-                              </p:par>
-                              <p:par>
-                                <p:cTn id="19" presetID="10" presetClass="entr" presetSubtype="0" fill="hold" nodeType="withEffect">
-                                  <p:stCondLst>
-                                    <p:cond delay="0"/>
-                                  </p:stCondLst>
-                                  <p:childTnLst>
-                                    <p:set>
-                                      <p:cBhvr>
-                                        <p:cTn id="20" dur="1" fill="hold">
-                                          <p:stCondLst>
-                                            <p:cond delay="0"/>
-                                          </p:stCondLst>
-                                        </p:cTn>
-                                        <p:tgtEl>
-                                          <p:spTgt spid="10">
-                                            <p:txEl>
-                                              <p:pRg st="1" end="1"/>
-                                            </p:txEl>
-                                          </p:spTgt>
-                                        </p:tgtEl>
-                                        <p:attrNameLst>
-                                          <p:attrName>style.visibility</p:attrName>
-                                        </p:attrNameLst>
-                                      </p:cBhvr>
-                                      <p:to>
-                                        <p:strVal val="visible"/>
-                                      </p:to>
-                                    </p:set>
-                                    <p:animEffect transition="in" filter="fade">
-                                      <p:cBhvr>
-                                        <p:cTn id="21" dur="500"/>
-                                        <p:tgtEl>
-                                          <p:spTgt spid="10">
-                                            <p:txEl>
-                                              <p:pRg st="1" end="1"/>
-                                            </p:txEl>
-                                          </p:spTgt>
-                                        </p:tgtEl>
-                                      </p:cBhvr>
-                                    </p:animEffect>
-                                  </p:childTnLst>
-                                </p:cTn>
-                              </p:par>
-                              <p:par>
-                                <p:cTn id="22" presetID="10" presetClass="entr" presetSubtype="0" fill="hold" nodeType="withEffect">
-                                  <p:stCondLst>
-                                    <p:cond delay="0"/>
-                                  </p:stCondLst>
-                                  <p:childTnLst>
-                                    <p:set>
-                                      <p:cBhvr>
-                                        <p:cTn id="23" dur="1" fill="hold">
-                                          <p:stCondLst>
-                                            <p:cond delay="0"/>
-                                          </p:stCondLst>
-                                        </p:cTn>
-                                        <p:tgtEl>
-                                          <p:spTgt spid="10">
-                                            <p:txEl>
-                                              <p:pRg st="3" end="3"/>
-                                            </p:txEl>
-                                          </p:spTgt>
-                                        </p:tgtEl>
-                                        <p:attrNameLst>
-                                          <p:attrName>style.visibility</p:attrName>
-                                        </p:attrNameLst>
-                                      </p:cBhvr>
-                                      <p:to>
-                                        <p:strVal val="visible"/>
-                                      </p:to>
-                                    </p:set>
-                                    <p:animEffect transition="in" filter="fade">
-                                      <p:cBhvr>
-                                        <p:cTn id="24" dur="500"/>
-                                        <p:tgtEl>
-                                          <p:spTgt spid="10">
-                                            <p:txEl>
-                                              <p:pRg st="3" end="3"/>
-                                            </p:txEl>
-                                          </p:spTgt>
-                                        </p:tgtEl>
-                                      </p:cBhvr>
-                                    </p:animEffect>
-                                  </p:childTnLst>
-                                </p:cTn>
-                              </p:par>
-                            </p:childTnLst>
-                          </p:cTn>
-                        </p:par>
-                      </p:childTnLst>
-                    </p:cTn>
-                  </p:par>
-                  <p:par>
-                    <p:cTn id="25" fill="hold">
-                      <p:stCondLst>
-                        <p:cond delay="indefinite"/>
-                      </p:stCondLst>
-                      <p:childTnLst>
-                        <p:par>
-                          <p:cTn id="26" fill="hold">
-                            <p:stCondLst>
-                              <p:cond delay="0"/>
-                            </p:stCondLst>
-                            <p:childTnLst>
-                              <p:par>
-                                <p:cTn id="27" presetID="10" presetClass="entr" presetSubtype="0" fill="hold" nodeType="clickEffect">
-                                  <p:stCondLst>
-                                    <p:cond delay="0"/>
-                                  </p:stCondLst>
-                                  <p:childTnLst>
-                                    <p:set>
-                                      <p:cBhvr>
-                                        <p:cTn id="28" dur="1" fill="hold">
-                                          <p:stCondLst>
-                                            <p:cond delay="0"/>
-                                          </p:stCondLst>
-                                        </p:cTn>
-                                        <p:tgtEl>
-                                          <p:spTgt spid="10">
-                                            <p:txEl>
-                                              <p:pRg st="4" end="4"/>
-                                            </p:txEl>
-                                          </p:spTgt>
-                                        </p:tgtEl>
-                                        <p:attrNameLst>
-                                          <p:attrName>style.visibility</p:attrName>
-                                        </p:attrNameLst>
-                                      </p:cBhvr>
-                                      <p:to>
-                                        <p:strVal val="visible"/>
-                                      </p:to>
-                                    </p:set>
-                                    <p:animEffect transition="in" filter="fade">
-                                      <p:cBhvr>
-                                        <p:cTn id="29" dur="500"/>
-                                        <p:tgtEl>
-                                          <p:spTgt spid="10">
-                                            <p:txEl>
-                                              <p:pRg st="4" end="4"/>
-                                            </p:txEl>
-                                          </p:spTgt>
+                                          <p:spTgt spid="10"/>
                                         </p:tgtEl>
                                       </p:cBhvr>
                                     </p:animEffect>
@@ -16060,14 +15570,13 @@
       </p:par>
     </p:tnLst>
     <p:bldLst>
-      <p:bldP spid="11" grpId="0" animBg="1"/>
-      <p:bldP spid="13" grpId="0" animBg="1"/>
+      <p:bldP spid="10" grpId="0"/>
     </p:bldLst>
   </p:timing>
 </p:sld>
 </file>
 
-<file path=ppt/slides/slide24.xml><?xml version="1.0" encoding="utf-8"?>
+<file path=ppt/slides/slide23.xml><?xml version="1.0" encoding="utf-8"?>
 <p:sld xmlns:a="http://schemas.openxmlformats.org/drawingml/2006/main" xmlns:r="http://schemas.openxmlformats.org/officeDocument/2006/relationships" xmlns:p="http://schemas.openxmlformats.org/presentationml/2006/main">
   <p:cSld>
     <p:bg>
@@ -16382,7 +15891,7 @@
                                           </p:stCondLst>
                                         </p:cTn>
                                         <p:tgtEl>
-                                          <p:spTgt spid="13"/>
+                                          <p:spTgt spid="10"/>
                                         </p:tgtEl>
                                         <p:attrNameLst>
                                           <p:attrName>style.visibility</p:attrName>
@@ -16395,59 +15904,6 @@
                                     <p:animEffect transition="in" filter="fade">
                                       <p:cBhvr>
                                         <p:cTn id="7" dur="500"/>
-                                        <p:tgtEl>
-                                          <p:spTgt spid="13"/>
-                                        </p:tgtEl>
-                                      </p:cBhvr>
-                                    </p:animEffect>
-                                  </p:childTnLst>
-                                </p:cTn>
-                              </p:par>
-                            </p:childTnLst>
-                          </p:cTn>
-                        </p:par>
-                      </p:childTnLst>
-                    </p:cTn>
-                  </p:par>
-                  <p:par>
-                    <p:cTn id="8" fill="hold">
-                      <p:stCondLst>
-                        <p:cond delay="indefinite"/>
-                      </p:stCondLst>
-                      <p:childTnLst>
-                        <p:par>
-                          <p:cTn id="9" fill="hold">
-                            <p:stCondLst>
-                              <p:cond delay="0"/>
-                            </p:stCondLst>
-                            <p:childTnLst>
-                              <p:par>
-                                <p:cTn id="10" presetID="10" presetClass="entr" presetSubtype="0" fill="hold" grpId="0" nodeType="clickEffect">
-                                  <p:stCondLst>
-                                    <p:cond delay="0"/>
-                                  </p:stCondLst>
-                                  <p:childTnLst>
-                                    <p:set>
-                                      <p:cBhvr>
-                                        <p:cTn id="11" dur="1" fill="hold">
-                                          <p:stCondLst>
-                                            <p:cond delay="0"/>
-                                          </p:stCondLst>
-                                        </p:cTn>
-                                        <p:tgtEl>
-                                          <p:spTgt spid="10"/>
-                                        </p:tgtEl>
-                                        <p:attrNameLst>
-                                          <p:attrName>style.visibility</p:attrName>
-                                        </p:attrNameLst>
-                                      </p:cBhvr>
-                                      <p:to>
-                                        <p:strVal val="visible"/>
-                                      </p:to>
-                                    </p:set>
-                                    <p:animEffect transition="in" filter="fade">
-                                      <p:cBhvr>
-                                        <p:cTn id="12" dur="500"/>
                                         <p:tgtEl>
                                           <p:spTgt spid="10"/>
                                         </p:tgtEl>
@@ -16485,19 +15941,18 @@
     </p:tnLst>
     <p:bldLst>
       <p:bldP spid="10" grpId="0"/>
-      <p:bldP spid="13" grpId="0" animBg="1"/>
     </p:bldLst>
   </p:timing>
 </p:sld>
 </file>
 
-<file path=ppt/slides/slide25.xml><?xml version="1.0" encoding="utf-8"?>
+<file path=ppt/slides/slide24.xml><?xml version="1.0" encoding="utf-8"?>
 <p:sld xmlns:a="http://schemas.openxmlformats.org/drawingml/2006/main" xmlns:r="http://schemas.openxmlformats.org/officeDocument/2006/relationships" xmlns:p="http://schemas.openxmlformats.org/presentationml/2006/main">
   <p:cSld>
     <p:bg>
       <p:bgPr>
         <a:solidFill>
-          <a:srgbClr val="B3CEDE"/>
+          <a:srgbClr val="26455C"/>
         </a:solidFill>
         <a:effectLst/>
       </p:bgPr>
@@ -16712,30 +16167,30 @@
         </p:spPr>
         <p:txBody>
           <a:bodyPr>
-            <a:normAutofit lnSpcReduction="10000"/>
+            <a:normAutofit/>
           </a:bodyPr>
           <a:lstStyle/>
           <a:p>
             <a:r>
-              <a:rPr lang="en-US" sz="2400"/>
-              <a:t>5 .sas files and 5 .dat files from ussc.gov (The U.S. Sentencing Commission)</a:t>
+              <a:rPr lang="en-US" sz="2400" dirty="0"/>
+              <a:t>SAS files from ussc.gov (The U.S. Sentencing Commission)</a:t>
             </a:r>
           </a:p>
           <a:p>
             <a:r>
-              <a:rPr lang="en-US" sz="2400"/>
+              <a:rPr lang="en-US" sz="2400" dirty="0"/>
               <a:t>Nationwide dataset with over 300k rows and 1000+ columns</a:t>
             </a:r>
           </a:p>
           <a:p>
             <a:r>
-              <a:rPr lang="en-US" sz="2400"/>
+              <a:rPr lang="en-US" sz="2400" dirty="0"/>
               <a:t>Identified 195 columns for analysis</a:t>
             </a:r>
           </a:p>
           <a:p>
             <a:r>
-              <a:rPr lang="en-US" sz="2400"/>
+              <a:rPr lang="en-US" sz="2400" dirty="0"/>
               <a:t>Extracted Tennessee specific data </a:t>
             </a:r>
           </a:p>

</xml_diff>

<commit_message>
updated color palette for box plot
</commit_message>
<xml_diff>
--- a/Presentation.pptx
+++ b/Presentation.pptx
@@ -18,17 +18,16 @@
     <p:sldId id="277" r:id="rId12"/>
     <p:sldId id="286" r:id="rId13"/>
     <p:sldId id="261" r:id="rId14"/>
-    <p:sldId id="258" r:id="rId15"/>
-    <p:sldId id="278" r:id="rId16"/>
-    <p:sldId id="299" r:id="rId17"/>
-    <p:sldId id="280" r:id="rId18"/>
-    <p:sldId id="295" r:id="rId19"/>
-    <p:sldId id="300" r:id="rId20"/>
-    <p:sldId id="301" r:id="rId21"/>
-    <p:sldId id="302" r:id="rId22"/>
-    <p:sldId id="289" r:id="rId23"/>
-    <p:sldId id="279" r:id="rId24"/>
-    <p:sldId id="298" r:id="rId25"/>
+    <p:sldId id="278" r:id="rId15"/>
+    <p:sldId id="299" r:id="rId16"/>
+    <p:sldId id="280" r:id="rId17"/>
+    <p:sldId id="295" r:id="rId18"/>
+    <p:sldId id="300" r:id="rId19"/>
+    <p:sldId id="301" r:id="rId20"/>
+    <p:sldId id="302" r:id="rId21"/>
+    <p:sldId id="289" r:id="rId22"/>
+    <p:sldId id="279" r:id="rId23"/>
+    <p:sldId id="298" r:id="rId24"/>
   </p:sldIdLst>
   <p:sldSz cx="12192000" cy="6858000"/>
   <p:notesSz cx="6858000" cy="9144000"/>
@@ -5835,7 +5834,7 @@
     <p:bg>
       <p:bgPr>
         <a:solidFill>
-          <a:schemeClr val="bg1"/>
+          <a:srgbClr val="EAF1F6"/>
         </a:solidFill>
         <a:effectLst/>
       </p:bgPr>
@@ -7093,8 +7092,8 @@
         </p:blipFill>
         <p:spPr>
           <a:xfrm>
-            <a:off x="659169" y="1875493"/>
-            <a:ext cx="5918971" cy="4582429"/>
+            <a:off x="5795" y="1452386"/>
+            <a:ext cx="6572345" cy="5257876"/>
           </a:xfrm>
           <a:prstGeom prst="rect">
             <a:avLst/>
@@ -7130,7 +7129,7 @@
         </p:blipFill>
         <p:spPr>
           <a:xfrm>
-            <a:off x="6578140" y="1875493"/>
+            <a:off x="6578140" y="1875492"/>
             <a:ext cx="4908550" cy="4411663"/>
           </a:xfrm>
           <a:prstGeom prst="rect">
@@ -7266,99 +7265,6 @@
 </file>
 
 <file path=ppt/slides/slide14.xml><?xml version="1.0" encoding="utf-8"?>
-<p:sld xmlns:a="http://schemas.openxmlformats.org/drawingml/2006/main" xmlns:r="http://schemas.openxmlformats.org/officeDocument/2006/relationships" xmlns:p="http://schemas.openxmlformats.org/presentationml/2006/main">
-  <p:cSld>
-    <p:spTree>
-      <p:nvGrpSpPr>
-        <p:cNvPr id="1" name=""/>
-        <p:cNvGrpSpPr/>
-        <p:nvPr/>
-      </p:nvGrpSpPr>
-      <p:grpSpPr>
-        <a:xfrm>
-          <a:off x="0" y="0"/>
-          <a:ext cx="0" cy="0"/>
-          <a:chOff x="0" y="0"/>
-          <a:chExt cx="0" cy="0"/>
-        </a:xfrm>
-      </p:grpSpPr>
-      <p:sp>
-        <p:nvSpPr>
-          <p:cNvPr id="2" name="Title 1">
-            <a:extLst>
-              <a:ext uri="{FF2B5EF4-FFF2-40B4-BE49-F238E27FC236}">
-                <a16:creationId xmlns:a16="http://schemas.microsoft.com/office/drawing/2014/main" id="{E050FDFB-81A2-4288-A4D6-DD846C5E10E6}"/>
-              </a:ext>
-            </a:extLst>
-          </p:cNvPr>
-          <p:cNvSpPr>
-            <a:spLocks noGrp="1"/>
-          </p:cNvSpPr>
-          <p:nvPr>
-            <p:ph type="title"/>
-          </p:nvPr>
-        </p:nvSpPr>
-        <p:spPr/>
-        <p:txBody>
-          <a:bodyPr/>
-          <a:lstStyle/>
-          <a:p>
-            <a:r>
-              <a:rPr lang="en-US" dirty="0"/>
-              <a:t>Distribution of Sentence Length by Race</a:t>
-            </a:r>
-          </a:p>
-        </p:txBody>
-      </p:sp>
-      <p:pic>
-        <p:nvPicPr>
-          <p:cNvPr id="5" name="Picture 4">
-            <a:extLst>
-              <a:ext uri="{FF2B5EF4-FFF2-40B4-BE49-F238E27FC236}">
-                <a16:creationId xmlns:a16="http://schemas.microsoft.com/office/drawing/2014/main" id="{61EE6ACF-3F79-45BB-8A61-BAF30BD4C61B}"/>
-              </a:ext>
-            </a:extLst>
-          </p:cNvPr>
-          <p:cNvPicPr>
-            <a:picLocks noChangeAspect="1"/>
-          </p:cNvPicPr>
-          <p:nvPr/>
-        </p:nvPicPr>
-        <p:blipFill>
-          <a:blip r:embed="rId2">
-            <a:extLst>
-              <a:ext uri="{28A0092B-C50C-407E-A947-70E740481C1C}">
-                <a14:useLocalDpi xmlns:a14="http://schemas.microsoft.com/office/drawing/2010/main" val="0"/>
-              </a:ext>
-            </a:extLst>
-          </a:blip>
-          <a:srcRect/>
-          <a:stretch/>
-        </p:blipFill>
-        <p:spPr>
-          <a:xfrm>
-            <a:off x="1459342" y="837900"/>
-            <a:ext cx="9273315" cy="6182210"/>
-          </a:xfrm>
-          <a:prstGeom prst="rect">
-            <a:avLst/>
-          </a:prstGeom>
-        </p:spPr>
-      </p:pic>
-    </p:spTree>
-    <p:extLst>
-      <p:ext uri="{BB962C8B-B14F-4D97-AF65-F5344CB8AC3E}">
-        <p14:creationId xmlns:p14="http://schemas.microsoft.com/office/powerpoint/2010/main" val="2722760057"/>
-      </p:ext>
-    </p:extLst>
-  </p:cSld>
-  <p:clrMapOvr>
-    <a:masterClrMapping/>
-  </p:clrMapOvr>
-</p:sld>
-</file>
-
-<file path=ppt/slides/slide15.xml><?xml version="1.0" encoding="utf-8"?>
 <p:sld xmlns:a="http://schemas.openxmlformats.org/drawingml/2006/main" xmlns:r="http://schemas.openxmlformats.org/officeDocument/2006/relationships" xmlns:p="http://schemas.openxmlformats.org/presentationml/2006/main">
   <p:cSld>
     <p:bg>
@@ -7978,13 +7884,13 @@
 </p:sld>
 </file>
 
-<file path=ppt/slides/slide16.xml><?xml version="1.0" encoding="utf-8"?>
+<file path=ppt/slides/slide15.xml><?xml version="1.0" encoding="utf-8"?>
 <p:sld xmlns:a="http://schemas.openxmlformats.org/drawingml/2006/main" xmlns:r="http://schemas.openxmlformats.org/officeDocument/2006/relationships" xmlns:p="http://schemas.openxmlformats.org/presentationml/2006/main">
   <p:cSld>
     <p:bg>
       <p:bgPr>
         <a:solidFill>
-          <a:schemeClr val="bg1"/>
+          <a:srgbClr val="EAF1F6"/>
         </a:solidFill>
         <a:effectLst/>
       </p:bgPr>
@@ -9130,7 +9036,7 @@
 </p:sld>
 </file>
 
-<file path=ppt/slides/slide17.xml><?xml version="1.0" encoding="utf-8"?>
+<file path=ppt/slides/slide16.xml><?xml version="1.0" encoding="utf-8"?>
 <p:sld xmlns:a="http://schemas.openxmlformats.org/drawingml/2006/main" xmlns:r="http://schemas.openxmlformats.org/officeDocument/2006/relationships" xmlns:p="http://schemas.openxmlformats.org/presentationml/2006/main">
   <p:cSld>
     <p:bg>
@@ -10104,7 +10010,7 @@
 </p:sld>
 </file>
 
-<file path=ppt/slides/slide18.xml><?xml version="1.0" encoding="utf-8"?>
+<file path=ppt/slides/slide17.xml><?xml version="1.0" encoding="utf-8"?>
 <p:sld xmlns:a="http://schemas.openxmlformats.org/drawingml/2006/main" xmlns:r="http://schemas.openxmlformats.org/officeDocument/2006/relationships" xmlns:p="http://schemas.openxmlformats.org/presentationml/2006/main">
   <p:cSld>
     <p:bg>
@@ -10850,8 +10756,8 @@
         </p:blipFill>
         <p:spPr>
           <a:xfrm>
-            <a:off x="6643857" y="1487286"/>
-            <a:ext cx="5051318" cy="3157074"/>
+            <a:off x="6662428" y="1487286"/>
+            <a:ext cx="5014176" cy="3157074"/>
           </a:xfrm>
           <a:prstGeom prst="rect">
             <a:avLst/>
@@ -11035,7 +10941,7 @@
 </p:sld>
 </file>
 
-<file path=ppt/slides/slide19.xml><?xml version="1.0" encoding="utf-8"?>
+<file path=ppt/slides/slide18.xml><?xml version="1.0" encoding="utf-8"?>
 <p:sld xmlns:a="http://schemas.openxmlformats.org/drawingml/2006/main" xmlns:r="http://schemas.openxmlformats.org/officeDocument/2006/relationships" xmlns:p="http://schemas.openxmlformats.org/presentationml/2006/main">
   <p:cSld>
     <p:bg>
@@ -11781,8 +11687,8 @@
         </p:blipFill>
         <p:spPr>
           <a:xfrm>
-            <a:off x="6643857" y="1487286"/>
-            <a:ext cx="5051318" cy="3157073"/>
+            <a:off x="6664509" y="1487286"/>
+            <a:ext cx="5010013" cy="3157073"/>
           </a:xfrm>
           <a:prstGeom prst="rect">
             <a:avLst/>
@@ -11966,1275 +11872,7 @@
 </p:sld>
 </file>
 
-<file path=ppt/slides/slide2.xml><?xml version="1.0" encoding="utf-8"?>
-<p:sld xmlns:a="http://schemas.openxmlformats.org/drawingml/2006/main" xmlns:r="http://schemas.openxmlformats.org/officeDocument/2006/relationships" xmlns:p="http://schemas.openxmlformats.org/presentationml/2006/main">
-  <p:cSld>
-    <p:bg>
-      <p:bgPr>
-        <a:solidFill>
-          <a:schemeClr val="bg1"/>
-        </a:solidFill>
-        <a:effectLst/>
-      </p:bgPr>
-    </p:bg>
-    <p:spTree>
-      <p:nvGrpSpPr>
-        <p:cNvPr id="1" name=""/>
-        <p:cNvGrpSpPr/>
-        <p:nvPr/>
-      </p:nvGrpSpPr>
-      <p:grpSpPr>
-        <a:xfrm>
-          <a:off x="0" y="0"/>
-          <a:ext cx="0" cy="0"/>
-          <a:chOff x="0" y="0"/>
-          <a:chExt cx="0" cy="0"/>
-        </a:xfrm>
-      </p:grpSpPr>
-      <p:sp useBgFill="1">
-        <p:nvSpPr>
-          <p:cNvPr id="11" name="Rectangle 10">
-            <a:extLst>
-              <a:ext uri="{FF2B5EF4-FFF2-40B4-BE49-F238E27FC236}">
-                <a16:creationId xmlns:a16="http://schemas.microsoft.com/office/drawing/2014/main" id="{91F32EBA-ED97-466E-8CFA-8382584155D0}"/>
-              </a:ext>
-              <a:ext uri="{C183D7F6-B498-43B3-948B-1728B52AA6E4}">
-                <adec:decorative xmlns:adec="http://schemas.microsoft.com/office/drawing/2017/decorative" val="1"/>
-              </a:ext>
-            </a:extLst>
-          </p:cNvPr>
-          <p:cNvSpPr>
-            <a:spLocks noGrp="1" noRot="1" noChangeAspect="1" noMove="1" noResize="1" noEditPoints="1" noAdjustHandles="1" noChangeArrowheads="1" noChangeShapeType="1" noTextEdit="1"/>
-          </p:cNvSpPr>
-          <p:nvPr>
-            <p:extLst>
-              <p:ext uri="{386F3935-93C4-4BCD-93E2-E3B085C9AB24}">
-                <p16:designElem xmlns:p16="http://schemas.microsoft.com/office/powerpoint/2015/main" val="1"/>
-              </p:ext>
-            </p:extLst>
-          </p:nvPr>
-        </p:nvSpPr>
-        <p:spPr>
-          <a:xfrm>
-            <a:off x="0" y="0"/>
-            <a:ext cx="12192000" cy="6858000"/>
-          </a:xfrm>
-          <a:prstGeom prst="rect">
-            <a:avLst/>
-          </a:prstGeom>
-          <a:ln>
-            <a:noFill/>
-          </a:ln>
-        </p:spPr>
-        <p:style>
-          <a:lnRef idx="2">
-            <a:schemeClr val="accent1">
-              <a:shade val="50000"/>
-            </a:schemeClr>
-          </a:lnRef>
-          <a:fillRef idx="1">
-            <a:schemeClr val="accent1"/>
-          </a:fillRef>
-          <a:effectRef idx="0">
-            <a:schemeClr val="accent1"/>
-          </a:effectRef>
-          <a:fontRef idx="minor">
-            <a:schemeClr val="lt1"/>
-          </a:fontRef>
-        </p:style>
-        <p:txBody>
-          <a:bodyPr rtlCol="0" anchor="ctr"/>
-          <a:lstStyle/>
-          <a:p>
-            <a:pPr algn="ctr"/>
-            <a:endParaRPr lang="en-US"/>
-          </a:p>
-        </p:txBody>
-      </p:sp>
-      <p:sp>
-        <p:nvSpPr>
-          <p:cNvPr id="2" name="Title 1">
-            <a:extLst>
-              <a:ext uri="{FF2B5EF4-FFF2-40B4-BE49-F238E27FC236}">
-                <a16:creationId xmlns:a16="http://schemas.microsoft.com/office/drawing/2014/main" id="{A799583B-9ACC-449B-95CE-FE9E6C88012A}"/>
-              </a:ext>
-            </a:extLst>
-          </p:cNvPr>
-          <p:cNvSpPr>
-            <a:spLocks noGrp="1"/>
-          </p:cNvSpPr>
-          <p:nvPr>
-            <p:ph type="title"/>
-          </p:nvPr>
-        </p:nvSpPr>
-        <p:spPr>
-          <a:xfrm>
-            <a:off x="965199" y="851517"/>
-            <a:ext cx="5130795" cy="1461778"/>
-          </a:xfrm>
-        </p:spPr>
-        <p:txBody>
-          <a:bodyPr vert="horz" lIns="91440" tIns="45720" rIns="91440" bIns="45720" rtlCol="0" anchor="ctr">
-            <a:normAutofit/>
-          </a:bodyPr>
-          <a:lstStyle/>
-          <a:p>
-            <a:r>
-              <a:rPr lang="en-US" sz="4000" kern="1200">
-                <a:solidFill>
-                  <a:schemeClr val="tx1"/>
-                </a:solidFill>
-                <a:latin typeface="+mj-lt"/>
-                <a:ea typeface="+mj-ea"/>
-                <a:cs typeface="+mj-cs"/>
-              </a:rPr>
-              <a:t>Guiding Questions</a:t>
-            </a:r>
-          </a:p>
-        </p:txBody>
-      </p:sp>
-      <p:sp>
-        <p:nvSpPr>
-          <p:cNvPr id="3" name="Content Placeholder 2">
-            <a:extLst>
-              <a:ext uri="{FF2B5EF4-FFF2-40B4-BE49-F238E27FC236}">
-                <a16:creationId xmlns:a16="http://schemas.microsoft.com/office/drawing/2014/main" id="{606A0FD7-B64A-497D-A54A-67D403C5C515}"/>
-              </a:ext>
-            </a:extLst>
-          </p:cNvPr>
-          <p:cNvSpPr>
-            <a:spLocks noGrp="1"/>
-          </p:cNvSpPr>
-          <p:nvPr>
-            <p:ph sz="half" idx="1"/>
-          </p:nvPr>
-        </p:nvSpPr>
-        <p:spPr>
-          <a:xfrm>
-            <a:off x="965200" y="2470248"/>
-            <a:ext cx="4048344" cy="3983818"/>
-          </a:xfrm>
-        </p:spPr>
-        <p:txBody>
-          <a:bodyPr vert="horz" lIns="91440" tIns="45720" rIns="91440" bIns="45720" rtlCol="0">
-            <a:normAutofit fontScale="92500" lnSpcReduction="10000"/>
-          </a:bodyPr>
-          <a:lstStyle/>
-          <a:p>
-            <a:r>
-              <a:rPr lang="en-US" sz="2200" dirty="0"/>
-              <a:t>Are there racial disparities between the sentencing population and the general population in Tennessee?</a:t>
-            </a:r>
-          </a:p>
-          <a:p>
-            <a:r>
-              <a:rPr lang="en-US" sz="2200" dirty="0"/>
-              <a:t>What kinds of crimes are most common among different racial groups?</a:t>
-            </a:r>
-          </a:p>
-          <a:p>
-            <a:r>
-              <a:rPr lang="en-US" sz="2200" dirty="0"/>
-              <a:t>Are people of color receiving longer sentences on average?</a:t>
-            </a:r>
-          </a:p>
-          <a:p>
-            <a:r>
-              <a:rPr lang="en-US" sz="2200" dirty="0"/>
-              <a:t>Are there disparities in the application of sentence enhancements and sentence mitigation measures?</a:t>
-            </a:r>
-          </a:p>
-        </p:txBody>
-      </p:sp>
-      <p:sp>
-        <p:nvSpPr>
-          <p:cNvPr id="13" name="Freeform: Shape 12">
-            <a:extLst>
-              <a:ext uri="{FF2B5EF4-FFF2-40B4-BE49-F238E27FC236}">
-                <a16:creationId xmlns:a16="http://schemas.microsoft.com/office/drawing/2014/main" id="{62A38935-BB53-4DF7-A56E-48DD25B685D7}"/>
-              </a:ext>
-              <a:ext uri="{C183D7F6-B498-43B3-948B-1728B52AA6E4}">
-                <adec:decorative xmlns:adec="http://schemas.microsoft.com/office/drawing/2017/decorative" val="1"/>
-              </a:ext>
-            </a:extLst>
-          </p:cNvPr>
-          <p:cNvSpPr>
-            <a:spLocks noGrp="1" noRot="1" noChangeAspect="1" noMove="1" noResize="1" noEditPoints="1" noAdjustHandles="1" noChangeArrowheads="1" noChangeShapeType="1" noTextEdit="1"/>
-          </p:cNvSpPr>
-          <p:nvPr>
-            <p:extLst>
-              <p:ext uri="{386F3935-93C4-4BCD-93E2-E3B085C9AB24}">
-                <p16:designElem xmlns:p16="http://schemas.microsoft.com/office/powerpoint/2015/main" val="1"/>
-              </p:ext>
-            </p:extLst>
-          </p:nvPr>
-        </p:nvSpPr>
-        <p:spPr>
-          <a:xfrm>
-            <a:off x="5510370" y="851518"/>
-            <a:ext cx="6184806" cy="5154967"/>
-          </a:xfrm>
-          <a:custGeom>
-            <a:avLst/>
-            <a:gdLst>
-              <a:gd name="connsiteX0" fmla="*/ 363179 w 6184806"/>
-              <a:gd name="connsiteY0" fmla="*/ 3125191 h 5154967"/>
-              <a:gd name="connsiteX1" fmla="*/ 898270 w 6184806"/>
-              <a:gd name="connsiteY1" fmla="*/ 3125191 h 5154967"/>
-              <a:gd name="connsiteX2" fmla="*/ 980326 w 6184806"/>
-              <a:gd name="connsiteY2" fmla="*/ 3173551 h 5154967"/>
-              <a:gd name="connsiteX3" fmla="*/ 1248448 w 6184806"/>
-              <a:gd name="connsiteY3" fmla="*/ 3635277 h 5154967"/>
-              <a:gd name="connsiteX4" fmla="*/ 1248448 w 6184806"/>
-              <a:gd name="connsiteY4" fmla="*/ 3729695 h 5154967"/>
-              <a:gd name="connsiteX5" fmla="*/ 980326 w 6184806"/>
-              <a:gd name="connsiteY5" fmla="*/ 4191421 h 5154967"/>
-              <a:gd name="connsiteX6" fmla="*/ 898270 w 6184806"/>
-              <a:gd name="connsiteY6" fmla="*/ 4239781 h 5154967"/>
-              <a:gd name="connsiteX7" fmla="*/ 363179 w 6184806"/>
-              <a:gd name="connsiteY7" fmla="*/ 4239781 h 5154967"/>
-              <a:gd name="connsiteX8" fmla="*/ 279969 w 6184806"/>
-              <a:gd name="connsiteY8" fmla="*/ 4191421 h 5154967"/>
-              <a:gd name="connsiteX9" fmla="*/ 13002 w 6184806"/>
-              <a:gd name="connsiteY9" fmla="*/ 3729695 h 5154967"/>
-              <a:gd name="connsiteX10" fmla="*/ 13002 w 6184806"/>
-              <a:gd name="connsiteY10" fmla="*/ 3635277 h 5154967"/>
-              <a:gd name="connsiteX11" fmla="*/ 279969 w 6184806"/>
-              <a:gd name="connsiteY11" fmla="*/ 3173551 h 5154967"/>
-              <a:gd name="connsiteX12" fmla="*/ 363179 w 6184806"/>
-              <a:gd name="connsiteY12" fmla="*/ 3125191 h 5154967"/>
-              <a:gd name="connsiteX13" fmla="*/ 2489721 w 6184806"/>
-              <a:gd name="connsiteY13" fmla="*/ 570035 h 5154967"/>
-              <a:gd name="connsiteX14" fmla="*/ 2764862 w 6184806"/>
-              <a:gd name="connsiteY14" fmla="*/ 570035 h 5154967"/>
-              <a:gd name="connsiteX15" fmla="*/ 2796959 w 6184806"/>
-              <a:gd name="connsiteY15" fmla="*/ 570035 h 5154967"/>
-              <a:gd name="connsiteX16" fmla="*/ 2827587 w 6184806"/>
-              <a:gd name="connsiteY16" fmla="*/ 622777 h 5154967"/>
-              <a:gd name="connsiteX17" fmla="*/ 2977604 w 6184806"/>
-              <a:gd name="connsiteY17" fmla="*/ 881117 h 5154967"/>
-              <a:gd name="connsiteX18" fmla="*/ 2977604 w 6184806"/>
-              <a:gd name="connsiteY18" fmla="*/ 1025720 h 5154967"/>
-              <a:gd name="connsiteX19" fmla="*/ 2566968 w 6184806"/>
-              <a:gd name="connsiteY19" fmla="*/ 1732863 h 5154967"/>
-              <a:gd name="connsiteX20" fmla="*/ 2441299 w 6184806"/>
-              <a:gd name="connsiteY20" fmla="*/ 1806927 h 5154967"/>
-              <a:gd name="connsiteX21" fmla="*/ 1621798 w 6184806"/>
-              <a:gd name="connsiteY21" fmla="*/ 1806927 h 5154967"/>
-              <a:gd name="connsiteX22" fmla="*/ 1583218 w 6184806"/>
-              <a:gd name="connsiteY22" fmla="*/ 1801802 h 5154967"/>
-              <a:gd name="connsiteX23" fmla="*/ 1556683 w 6184806"/>
-              <a:gd name="connsiteY23" fmla="*/ 1790677 h 5154967"/>
-              <a:gd name="connsiteX24" fmla="*/ 1572899 w 6184806"/>
-              <a:gd name="connsiteY24" fmla="*/ 1762631 h 5154967"/>
-              <a:gd name="connsiteX25" fmla="*/ 2147429 w 6184806"/>
-              <a:gd name="connsiteY25" fmla="*/ 768968 h 5154967"/>
-              <a:gd name="connsiteX26" fmla="*/ 2489721 w 6184806"/>
-              <a:gd name="connsiteY26" fmla="*/ 570035 h 5154967"/>
-              <a:gd name="connsiteX27" fmla="*/ 1573268 w 6184806"/>
-              <a:gd name="connsiteY27" fmla="*/ 0 h 5154967"/>
-              <a:gd name="connsiteX28" fmla="*/ 2497662 w 6184806"/>
-              <a:gd name="connsiteY28" fmla="*/ 0 h 5154967"/>
-              <a:gd name="connsiteX29" fmla="*/ 2639415 w 6184806"/>
-              <a:gd name="connsiteY29" fmla="*/ 83546 h 5154967"/>
-              <a:gd name="connsiteX30" fmla="*/ 2887862 w 6184806"/>
-              <a:gd name="connsiteY30" fmla="*/ 511387 h 5154967"/>
-              <a:gd name="connsiteX31" fmla="*/ 2915928 w 6184806"/>
-              <a:gd name="connsiteY31" fmla="*/ 559720 h 5154967"/>
-              <a:gd name="connsiteX32" fmla="*/ 2893844 w 6184806"/>
-              <a:gd name="connsiteY32" fmla="*/ 559720 h 5154967"/>
-              <a:gd name="connsiteX33" fmla="*/ 2789466 w 6184806"/>
-              <a:gd name="connsiteY33" fmla="*/ 559720 h 5154967"/>
-              <a:gd name="connsiteX34" fmla="*/ 2744122 w 6184806"/>
-              <a:gd name="connsiteY34" fmla="*/ 481634 h 5154967"/>
-              <a:gd name="connsiteX35" fmla="*/ 2570885 w 6184806"/>
-              <a:gd name="connsiteY35" fmla="*/ 183309 h 5154967"/>
-              <a:gd name="connsiteX36" fmla="*/ 2445216 w 6184806"/>
-              <a:gd name="connsiteY36" fmla="*/ 109244 h 5154967"/>
-              <a:gd name="connsiteX37" fmla="*/ 1625714 w 6184806"/>
-              <a:gd name="connsiteY37" fmla="*/ 109244 h 5154967"/>
-              <a:gd name="connsiteX38" fmla="*/ 1498276 w 6184806"/>
-              <a:gd name="connsiteY38" fmla="*/ 183309 h 5154967"/>
-              <a:gd name="connsiteX39" fmla="*/ 1089410 w 6184806"/>
-              <a:gd name="connsiteY39" fmla="*/ 890450 h 5154967"/>
-              <a:gd name="connsiteX40" fmla="*/ 1089410 w 6184806"/>
-              <a:gd name="connsiteY40" fmla="*/ 1035054 h 5154967"/>
-              <a:gd name="connsiteX41" fmla="*/ 1498276 w 6184806"/>
-              <a:gd name="connsiteY41" fmla="*/ 1742196 h 5154967"/>
-              <a:gd name="connsiteX42" fmla="*/ 1552039 w 6184806"/>
-              <a:gd name="connsiteY42" fmla="*/ 1796421 h 5154967"/>
-              <a:gd name="connsiteX43" fmla="*/ 1558260 w 6184806"/>
-              <a:gd name="connsiteY43" fmla="*/ 1799029 h 5154967"/>
-              <a:gd name="connsiteX44" fmla="*/ 1524911 w 6184806"/>
-              <a:gd name="connsiteY44" fmla="*/ 1856707 h 5154967"/>
-              <a:gd name="connsiteX45" fmla="*/ 1500108 w 6184806"/>
-              <a:gd name="connsiteY45" fmla="*/ 1899604 h 5154967"/>
-              <a:gd name="connsiteX46" fmla="*/ 1525834 w 6184806"/>
-              <a:gd name="connsiteY46" fmla="*/ 1910390 h 5154967"/>
-              <a:gd name="connsiteX47" fmla="*/ 1569352 w 6184806"/>
-              <a:gd name="connsiteY47" fmla="*/ 1916170 h 5154967"/>
-              <a:gd name="connsiteX48" fmla="*/ 2493745 w 6184806"/>
-              <a:gd name="connsiteY48" fmla="*/ 1916170 h 5154967"/>
-              <a:gd name="connsiteX49" fmla="*/ 2635498 w 6184806"/>
-              <a:gd name="connsiteY49" fmla="*/ 1832627 h 5154967"/>
-              <a:gd name="connsiteX50" fmla="*/ 3098693 w 6184806"/>
-              <a:gd name="connsiteY50" fmla="*/ 1034974 h 5154967"/>
-              <a:gd name="connsiteX51" fmla="*/ 3098693 w 6184806"/>
-              <a:gd name="connsiteY51" fmla="*/ 871863 h 5154967"/>
-              <a:gd name="connsiteX52" fmla="*/ 2945803 w 6184806"/>
-              <a:gd name="connsiteY52" fmla="*/ 608576 h 5154967"/>
-              <a:gd name="connsiteX53" fmla="*/ 2923422 w 6184806"/>
-              <a:gd name="connsiteY53" fmla="*/ 570035 h 5154967"/>
-              <a:gd name="connsiteX54" fmla="*/ 3027104 w 6184806"/>
-              <a:gd name="connsiteY54" fmla="*/ 570035 h 5154967"/>
-              <a:gd name="connsiteX55" fmla="*/ 4690846 w 6184806"/>
-              <a:gd name="connsiteY55" fmla="*/ 570035 h 5154967"/>
-              <a:gd name="connsiteX56" fmla="*/ 5028384 w 6184806"/>
-              <a:gd name="connsiteY56" fmla="*/ 768968 h 5154967"/>
-              <a:gd name="connsiteX57" fmla="*/ 6131323 w 6184806"/>
-              <a:gd name="connsiteY57" fmla="*/ 2668304 h 5154967"/>
-              <a:gd name="connsiteX58" fmla="*/ 6131323 w 6184806"/>
-              <a:gd name="connsiteY58" fmla="*/ 3056698 h 5154967"/>
-              <a:gd name="connsiteX59" fmla="*/ 5028384 w 6184806"/>
-              <a:gd name="connsiteY59" fmla="*/ 4956035 h 5154967"/>
-              <a:gd name="connsiteX60" fmla="*/ 4690846 w 6184806"/>
-              <a:gd name="connsiteY60" fmla="*/ 5154967 h 5154967"/>
-              <a:gd name="connsiteX61" fmla="*/ 2489721 w 6184806"/>
-              <a:gd name="connsiteY61" fmla="*/ 5154967 h 5154967"/>
-              <a:gd name="connsiteX62" fmla="*/ 2147429 w 6184806"/>
-              <a:gd name="connsiteY62" fmla="*/ 4956035 h 5154967"/>
-              <a:gd name="connsiteX63" fmla="*/ 1049243 w 6184806"/>
-              <a:gd name="connsiteY63" fmla="*/ 3056698 h 5154967"/>
-              <a:gd name="connsiteX64" fmla="*/ 1049243 w 6184806"/>
-              <a:gd name="connsiteY64" fmla="*/ 2668304 h 5154967"/>
-              <a:gd name="connsiteX65" fmla="*/ 1457007 w 6184806"/>
-              <a:gd name="connsiteY65" fmla="*/ 1963067 h 5154967"/>
-              <a:gd name="connsiteX66" fmla="*/ 1491373 w 6184806"/>
-              <a:gd name="connsiteY66" fmla="*/ 1903634 h 5154967"/>
-              <a:gd name="connsiteX67" fmla="*/ 1490164 w 6184806"/>
-              <a:gd name="connsiteY67" fmla="*/ 1903127 h 5154967"/>
-              <a:gd name="connsiteX68" fmla="*/ 1429519 w 6184806"/>
-              <a:gd name="connsiteY68" fmla="*/ 1841960 h 5154967"/>
-              <a:gd name="connsiteX69" fmla="*/ 968320 w 6184806"/>
-              <a:gd name="connsiteY69" fmla="*/ 1044307 h 5154967"/>
-              <a:gd name="connsiteX70" fmla="*/ 968320 w 6184806"/>
-              <a:gd name="connsiteY70" fmla="*/ 881196 h 5154967"/>
-              <a:gd name="connsiteX71" fmla="*/ 1429519 w 6184806"/>
-              <a:gd name="connsiteY71" fmla="*/ 83546 h 5154967"/>
-              <a:gd name="connsiteX72" fmla="*/ 1573268 w 6184806"/>
-              <a:gd name="connsiteY72" fmla="*/ 0 h 5154967"/>
-            </a:gdLst>
-            <a:ahLst/>
-            <a:cxnLst>
-              <a:cxn ang="0">
-                <a:pos x="connsiteX0" y="connsiteY0"/>
-              </a:cxn>
-              <a:cxn ang="0">
-                <a:pos x="connsiteX1" y="connsiteY1"/>
-              </a:cxn>
-              <a:cxn ang="0">
-                <a:pos x="connsiteX2" y="connsiteY2"/>
-              </a:cxn>
-              <a:cxn ang="0">
-                <a:pos x="connsiteX3" y="connsiteY3"/>
-              </a:cxn>
-              <a:cxn ang="0">
-                <a:pos x="connsiteX4" y="connsiteY4"/>
-              </a:cxn>
-              <a:cxn ang="0">
-                <a:pos x="connsiteX5" y="connsiteY5"/>
-              </a:cxn>
-              <a:cxn ang="0">
-                <a:pos x="connsiteX6" y="connsiteY6"/>
-              </a:cxn>
-              <a:cxn ang="0">
-                <a:pos x="connsiteX7" y="connsiteY7"/>
-              </a:cxn>
-              <a:cxn ang="0">
-                <a:pos x="connsiteX8" y="connsiteY8"/>
-              </a:cxn>
-              <a:cxn ang="0">
-                <a:pos x="connsiteX9" y="connsiteY9"/>
-              </a:cxn>
-              <a:cxn ang="0">
-                <a:pos x="connsiteX10" y="connsiteY10"/>
-              </a:cxn>
-              <a:cxn ang="0">
-                <a:pos x="connsiteX11" y="connsiteY11"/>
-              </a:cxn>
-              <a:cxn ang="0">
-                <a:pos x="connsiteX12" y="connsiteY12"/>
-              </a:cxn>
-              <a:cxn ang="0">
-                <a:pos x="connsiteX13" y="connsiteY13"/>
-              </a:cxn>
-              <a:cxn ang="0">
-                <a:pos x="connsiteX14" y="connsiteY14"/>
-              </a:cxn>
-              <a:cxn ang="0">
-                <a:pos x="connsiteX15" y="connsiteY15"/>
-              </a:cxn>
-              <a:cxn ang="0">
-                <a:pos x="connsiteX16" y="connsiteY16"/>
-              </a:cxn>
-              <a:cxn ang="0">
-                <a:pos x="connsiteX17" y="connsiteY17"/>
-              </a:cxn>
-              <a:cxn ang="0">
-                <a:pos x="connsiteX18" y="connsiteY18"/>
-              </a:cxn>
-              <a:cxn ang="0">
-                <a:pos x="connsiteX19" y="connsiteY19"/>
-              </a:cxn>
-              <a:cxn ang="0">
-                <a:pos x="connsiteX20" y="connsiteY20"/>
-              </a:cxn>
-              <a:cxn ang="0">
-                <a:pos x="connsiteX21" y="connsiteY21"/>
-              </a:cxn>
-              <a:cxn ang="0">
-                <a:pos x="connsiteX22" y="connsiteY22"/>
-              </a:cxn>
-              <a:cxn ang="0">
-                <a:pos x="connsiteX23" y="connsiteY23"/>
-              </a:cxn>
-              <a:cxn ang="0">
-                <a:pos x="connsiteX24" y="connsiteY24"/>
-              </a:cxn>
-              <a:cxn ang="0">
-                <a:pos x="connsiteX25" y="connsiteY25"/>
-              </a:cxn>
-              <a:cxn ang="0">
-                <a:pos x="connsiteX26" y="connsiteY26"/>
-              </a:cxn>
-              <a:cxn ang="0">
-                <a:pos x="connsiteX27" y="connsiteY27"/>
-              </a:cxn>
-              <a:cxn ang="0">
-                <a:pos x="connsiteX28" y="connsiteY28"/>
-              </a:cxn>
-              <a:cxn ang="0">
-                <a:pos x="connsiteX29" y="connsiteY29"/>
-              </a:cxn>
-              <a:cxn ang="0">
-                <a:pos x="connsiteX30" y="connsiteY30"/>
-              </a:cxn>
-              <a:cxn ang="0">
-                <a:pos x="connsiteX31" y="connsiteY31"/>
-              </a:cxn>
-              <a:cxn ang="0">
-                <a:pos x="connsiteX32" y="connsiteY32"/>
-              </a:cxn>
-              <a:cxn ang="0">
-                <a:pos x="connsiteX33" y="connsiteY33"/>
-              </a:cxn>
-              <a:cxn ang="0">
-                <a:pos x="connsiteX34" y="connsiteY34"/>
-              </a:cxn>
-              <a:cxn ang="0">
-                <a:pos x="connsiteX35" y="connsiteY35"/>
-              </a:cxn>
-              <a:cxn ang="0">
-                <a:pos x="connsiteX36" y="connsiteY36"/>
-              </a:cxn>
-              <a:cxn ang="0">
-                <a:pos x="connsiteX37" y="connsiteY37"/>
-              </a:cxn>
-              <a:cxn ang="0">
-                <a:pos x="connsiteX38" y="connsiteY38"/>
-              </a:cxn>
-              <a:cxn ang="0">
-                <a:pos x="connsiteX39" y="connsiteY39"/>
-              </a:cxn>
-              <a:cxn ang="0">
-                <a:pos x="connsiteX40" y="connsiteY40"/>
-              </a:cxn>
-              <a:cxn ang="0">
-                <a:pos x="connsiteX41" y="connsiteY41"/>
-              </a:cxn>
-              <a:cxn ang="0">
-                <a:pos x="connsiteX42" y="connsiteY42"/>
-              </a:cxn>
-              <a:cxn ang="0">
-                <a:pos x="connsiteX43" y="connsiteY43"/>
-              </a:cxn>
-              <a:cxn ang="0">
-                <a:pos x="connsiteX44" y="connsiteY44"/>
-              </a:cxn>
-              <a:cxn ang="0">
-                <a:pos x="connsiteX45" y="connsiteY45"/>
-              </a:cxn>
-              <a:cxn ang="0">
-                <a:pos x="connsiteX46" y="connsiteY46"/>
-              </a:cxn>
-              <a:cxn ang="0">
-                <a:pos x="connsiteX47" y="connsiteY47"/>
-              </a:cxn>
-              <a:cxn ang="0">
-                <a:pos x="connsiteX48" y="connsiteY48"/>
-              </a:cxn>
-              <a:cxn ang="0">
-                <a:pos x="connsiteX49" y="connsiteY49"/>
-              </a:cxn>
-              <a:cxn ang="0">
-                <a:pos x="connsiteX50" y="connsiteY50"/>
-              </a:cxn>
-              <a:cxn ang="0">
-                <a:pos x="connsiteX51" y="connsiteY51"/>
-              </a:cxn>
-              <a:cxn ang="0">
-                <a:pos x="connsiteX52" y="connsiteY52"/>
-              </a:cxn>
-              <a:cxn ang="0">
-                <a:pos x="connsiteX53" y="connsiteY53"/>
-              </a:cxn>
-              <a:cxn ang="0">
-                <a:pos x="connsiteX54" y="connsiteY54"/>
-              </a:cxn>
-              <a:cxn ang="0">
-                <a:pos x="connsiteX55" y="connsiteY55"/>
-              </a:cxn>
-              <a:cxn ang="0">
-                <a:pos x="connsiteX56" y="connsiteY56"/>
-              </a:cxn>
-              <a:cxn ang="0">
-                <a:pos x="connsiteX57" y="connsiteY57"/>
-              </a:cxn>
-              <a:cxn ang="0">
-                <a:pos x="connsiteX58" y="connsiteY58"/>
-              </a:cxn>
-              <a:cxn ang="0">
-                <a:pos x="connsiteX59" y="connsiteY59"/>
-              </a:cxn>
-              <a:cxn ang="0">
-                <a:pos x="connsiteX60" y="connsiteY60"/>
-              </a:cxn>
-              <a:cxn ang="0">
-                <a:pos x="connsiteX61" y="connsiteY61"/>
-              </a:cxn>
-              <a:cxn ang="0">
-                <a:pos x="connsiteX62" y="connsiteY62"/>
-              </a:cxn>
-              <a:cxn ang="0">
-                <a:pos x="connsiteX63" y="connsiteY63"/>
-              </a:cxn>
-              <a:cxn ang="0">
-                <a:pos x="connsiteX64" y="connsiteY64"/>
-              </a:cxn>
-              <a:cxn ang="0">
-                <a:pos x="connsiteX65" y="connsiteY65"/>
-              </a:cxn>
-              <a:cxn ang="0">
-                <a:pos x="connsiteX66" y="connsiteY66"/>
-              </a:cxn>
-              <a:cxn ang="0">
-                <a:pos x="connsiteX67" y="connsiteY67"/>
-              </a:cxn>
-              <a:cxn ang="0">
-                <a:pos x="connsiteX68" y="connsiteY68"/>
-              </a:cxn>
-              <a:cxn ang="0">
-                <a:pos x="connsiteX69" y="connsiteY69"/>
-              </a:cxn>
-              <a:cxn ang="0">
-                <a:pos x="connsiteX70" y="connsiteY70"/>
-              </a:cxn>
-              <a:cxn ang="0">
-                <a:pos x="connsiteX71" y="connsiteY71"/>
-              </a:cxn>
-              <a:cxn ang="0">
-                <a:pos x="connsiteX72" y="connsiteY72"/>
-              </a:cxn>
-            </a:cxnLst>
-            <a:rect l="l" t="t" r="r" b="b"/>
-            <a:pathLst>
-              <a:path w="6184806" h="5154967">
-                <a:moveTo>
-                  <a:pt x="363179" y="3125191"/>
-                </a:moveTo>
-                <a:cubicBezTo>
-                  <a:pt x="363179" y="3125191"/>
-                  <a:pt x="363179" y="3125191"/>
-                  <a:pt x="898270" y="3125191"/>
-                </a:cubicBezTo>
-                <a:cubicBezTo>
-                  <a:pt x="931786" y="3125191"/>
-                  <a:pt x="964145" y="3143614"/>
-                  <a:pt x="980326" y="3173551"/>
-                </a:cubicBezTo>
-                <a:cubicBezTo>
-                  <a:pt x="980326" y="3173551"/>
-                  <a:pt x="980326" y="3173551"/>
-                  <a:pt x="1248448" y="3635277"/>
-                </a:cubicBezTo>
-                <a:cubicBezTo>
-                  <a:pt x="1265784" y="3664063"/>
-                  <a:pt x="1265784" y="3700909"/>
-                  <a:pt x="1248448" y="3729695"/>
-                </a:cubicBezTo>
-                <a:cubicBezTo>
-                  <a:pt x="1248448" y="3729695"/>
-                  <a:pt x="1248448" y="3729695"/>
-                  <a:pt x="980326" y="4191421"/>
-                </a:cubicBezTo>
-                <a:cubicBezTo>
-                  <a:pt x="964145" y="4221358"/>
-                  <a:pt x="931786" y="4239781"/>
-                  <a:pt x="898270" y="4239781"/>
-                </a:cubicBezTo>
-                <a:cubicBezTo>
-                  <a:pt x="898270" y="4239781"/>
-                  <a:pt x="898270" y="4239781"/>
-                  <a:pt x="363179" y="4239781"/>
-                </a:cubicBezTo>
-                <a:cubicBezTo>
-                  <a:pt x="328508" y="4239781"/>
-                  <a:pt x="297305" y="4221358"/>
-                  <a:pt x="279969" y="4191421"/>
-                </a:cubicBezTo>
-                <a:cubicBezTo>
-                  <a:pt x="279969" y="4191421"/>
-                  <a:pt x="279969" y="4191421"/>
-                  <a:pt x="13002" y="3729695"/>
-                </a:cubicBezTo>
-                <a:cubicBezTo>
-                  <a:pt x="-4334" y="3700909"/>
-                  <a:pt x="-4334" y="3664063"/>
-                  <a:pt x="13002" y="3635277"/>
-                </a:cubicBezTo>
-                <a:cubicBezTo>
-                  <a:pt x="13002" y="3635277"/>
-                  <a:pt x="13002" y="3635277"/>
-                  <a:pt x="279969" y="3173551"/>
-                </a:cubicBezTo>
-                <a:cubicBezTo>
-                  <a:pt x="297305" y="3143614"/>
-                  <a:pt x="328508" y="3125191"/>
-                  <a:pt x="363179" y="3125191"/>
-                </a:cubicBezTo>
-                <a:close/>
-                <a:moveTo>
-                  <a:pt x="2489721" y="570035"/>
-                </a:moveTo>
-                <a:cubicBezTo>
-                  <a:pt x="2489721" y="570035"/>
-                  <a:pt x="2489721" y="570035"/>
-                  <a:pt x="2764862" y="570035"/>
-                </a:cubicBezTo>
-                <a:lnTo>
-                  <a:pt x="2796959" y="570035"/>
-                </a:lnTo>
-                <a:lnTo>
-                  <a:pt x="2827587" y="622777"/>
-                </a:lnTo>
-                <a:cubicBezTo>
-                  <a:pt x="2870233" y="696217"/>
-                  <a:pt x="2919858" y="781675"/>
-                  <a:pt x="2977604" y="881117"/>
-                </a:cubicBezTo>
-                <a:cubicBezTo>
-                  <a:pt x="3004153" y="925204"/>
-                  <a:pt x="3004153" y="981634"/>
-                  <a:pt x="2977604" y="1025720"/>
-                </a:cubicBezTo>
-                <a:cubicBezTo>
-                  <a:pt x="2977604" y="1025720"/>
-                  <a:pt x="2977604" y="1025720"/>
-                  <a:pt x="2566968" y="1732863"/>
-                </a:cubicBezTo>
-                <a:cubicBezTo>
-                  <a:pt x="2542188" y="1778712"/>
-                  <a:pt x="2492629" y="1806927"/>
-                  <a:pt x="2441299" y="1806927"/>
-                </a:cubicBezTo>
-                <a:cubicBezTo>
-                  <a:pt x="2441299" y="1806927"/>
-                  <a:pt x="2441299" y="1806927"/>
-                  <a:pt x="1621798" y="1806927"/>
-                </a:cubicBezTo>
-                <a:cubicBezTo>
-                  <a:pt x="1608523" y="1806927"/>
-                  <a:pt x="1595580" y="1805163"/>
-                  <a:pt x="1583218" y="1801802"/>
-                </a:cubicBezTo>
-                <a:lnTo>
-                  <a:pt x="1556683" y="1790677"/>
-                </a:lnTo>
-                <a:lnTo>
-                  <a:pt x="1572899" y="1762631"/>
-                </a:lnTo>
-                <a:cubicBezTo>
-                  <a:pt x="1719523" y="1509042"/>
-                  <a:pt x="1907201" y="1184448"/>
-                  <a:pt x="2147429" y="768968"/>
-                </a:cubicBezTo>
-                <a:cubicBezTo>
-                  <a:pt x="2218739" y="645819"/>
-                  <a:pt x="2347099" y="570035"/>
-                  <a:pt x="2489721" y="570035"/>
-                </a:cubicBezTo>
-                <a:close/>
-                <a:moveTo>
-                  <a:pt x="1573268" y="0"/>
-                </a:moveTo>
-                <a:cubicBezTo>
-                  <a:pt x="1573268" y="0"/>
-                  <a:pt x="1573268" y="0"/>
-                  <a:pt x="2497662" y="0"/>
-                </a:cubicBezTo>
-                <a:cubicBezTo>
-                  <a:pt x="2555561" y="0"/>
-                  <a:pt x="2611463" y="31828"/>
-                  <a:pt x="2639415" y="83546"/>
-                </a:cubicBezTo>
-                <a:cubicBezTo>
-                  <a:pt x="2639415" y="83546"/>
-                  <a:pt x="2639415" y="83546"/>
-                  <a:pt x="2887862" y="511387"/>
-                </a:cubicBezTo>
-                <a:lnTo>
-                  <a:pt x="2915928" y="559720"/>
-                </a:lnTo>
-                <a:lnTo>
-                  <a:pt x="2893844" y="559720"/>
-                </a:lnTo>
-                <a:lnTo>
-                  <a:pt x="2789466" y="559720"/>
-                </a:lnTo>
-                <a:lnTo>
-                  <a:pt x="2744122" y="481634"/>
-                </a:lnTo>
-                <a:cubicBezTo>
-                  <a:pt x="2570885" y="183309"/>
-                  <a:pt x="2570885" y="183309"/>
-                  <a:pt x="2570885" y="183309"/>
-                </a:cubicBezTo>
-                <a:cubicBezTo>
-                  <a:pt x="2546104" y="137459"/>
-                  <a:pt x="2496545" y="109244"/>
-                  <a:pt x="2445216" y="109244"/>
-                </a:cubicBezTo>
-                <a:cubicBezTo>
-                  <a:pt x="1625714" y="109244"/>
-                  <a:pt x="1625714" y="109244"/>
-                  <a:pt x="1625714" y="109244"/>
-                </a:cubicBezTo>
-                <a:cubicBezTo>
-                  <a:pt x="1572615" y="109244"/>
-                  <a:pt x="1524825" y="137459"/>
-                  <a:pt x="1498276" y="183309"/>
-                </a:cubicBezTo>
-                <a:cubicBezTo>
-                  <a:pt x="1089410" y="890450"/>
-                  <a:pt x="1089410" y="890450"/>
-                  <a:pt x="1089410" y="890450"/>
-                </a:cubicBezTo>
-                <a:cubicBezTo>
-                  <a:pt x="1062860" y="934537"/>
-                  <a:pt x="1062860" y="990968"/>
-                  <a:pt x="1089410" y="1035054"/>
-                </a:cubicBezTo>
-                <a:cubicBezTo>
-                  <a:pt x="1498276" y="1742196"/>
-                  <a:pt x="1498276" y="1742196"/>
-                  <a:pt x="1498276" y="1742196"/>
-                </a:cubicBezTo>
-                <a:cubicBezTo>
-                  <a:pt x="1511551" y="1765121"/>
-                  <a:pt x="1530135" y="1783637"/>
-                  <a:pt x="1552039" y="1796421"/>
-                </a:cubicBezTo>
-                <a:lnTo>
-                  <a:pt x="1558260" y="1799029"/>
-                </a:lnTo>
-                <a:lnTo>
-                  <a:pt x="1524911" y="1856707"/>
-                </a:lnTo>
-                <a:lnTo>
-                  <a:pt x="1500108" y="1899604"/>
-                </a:lnTo>
-                <a:lnTo>
-                  <a:pt x="1525834" y="1910390"/>
-                </a:lnTo>
-                <a:cubicBezTo>
-                  <a:pt x="1539779" y="1914181"/>
-                  <a:pt x="1554378" y="1916170"/>
-                  <a:pt x="1569352" y="1916170"/>
-                </a:cubicBezTo>
-                <a:cubicBezTo>
-                  <a:pt x="2493745" y="1916170"/>
-                  <a:pt x="2493745" y="1916170"/>
-                  <a:pt x="2493745" y="1916170"/>
-                </a:cubicBezTo>
-                <a:cubicBezTo>
-                  <a:pt x="2551645" y="1916170"/>
-                  <a:pt x="2607546" y="1884345"/>
-                  <a:pt x="2635498" y="1832627"/>
-                </a:cubicBezTo>
-                <a:cubicBezTo>
-                  <a:pt x="3098693" y="1034974"/>
-                  <a:pt x="3098693" y="1034974"/>
-                  <a:pt x="3098693" y="1034974"/>
-                </a:cubicBezTo>
-                <a:cubicBezTo>
-                  <a:pt x="3128641" y="985246"/>
-                  <a:pt x="3128641" y="921593"/>
-                  <a:pt x="3098693" y="871863"/>
-                </a:cubicBezTo>
-                <a:cubicBezTo>
-                  <a:pt x="3040794" y="772157"/>
-                  <a:pt x="2990132" y="684914"/>
-                  <a:pt x="2945803" y="608576"/>
-                </a:cubicBezTo>
-                <a:lnTo>
-                  <a:pt x="2923422" y="570035"/>
-                </a:lnTo>
-                <a:lnTo>
-                  <a:pt x="3027104" y="570035"/>
-                </a:lnTo>
-                <a:cubicBezTo>
-                  <a:pt x="3349535" y="570035"/>
-                  <a:pt x="3865424" y="570035"/>
-                  <a:pt x="4690846" y="570035"/>
-                </a:cubicBezTo>
-                <a:cubicBezTo>
-                  <a:pt x="4828714" y="570035"/>
-                  <a:pt x="4961827" y="645819"/>
-                  <a:pt x="5028384" y="768968"/>
-                </a:cubicBezTo>
-                <a:cubicBezTo>
-                  <a:pt x="5028384" y="768968"/>
-                  <a:pt x="5028384" y="768968"/>
-                  <a:pt x="6131323" y="2668304"/>
-                </a:cubicBezTo>
-                <a:cubicBezTo>
-                  <a:pt x="6202634" y="2786717"/>
-                  <a:pt x="6202634" y="2938285"/>
-                  <a:pt x="6131323" y="3056698"/>
-                </a:cubicBezTo>
-                <a:cubicBezTo>
-                  <a:pt x="6131323" y="3056698"/>
-                  <a:pt x="6131323" y="3056698"/>
-                  <a:pt x="5028384" y="4956035"/>
-                </a:cubicBezTo>
-                <a:cubicBezTo>
-                  <a:pt x="4961827" y="5079184"/>
-                  <a:pt x="4828714" y="5154967"/>
-                  <a:pt x="4690846" y="5154967"/>
-                </a:cubicBezTo>
-                <a:cubicBezTo>
-                  <a:pt x="4690846" y="5154967"/>
-                  <a:pt x="4690846" y="5154967"/>
-                  <a:pt x="2489721" y="5154967"/>
-                </a:cubicBezTo>
-                <a:cubicBezTo>
-                  <a:pt x="2347099" y="5154967"/>
-                  <a:pt x="2218739" y="5079184"/>
-                  <a:pt x="2147429" y="4956035"/>
-                </a:cubicBezTo>
-                <a:cubicBezTo>
-                  <a:pt x="2147429" y="4956035"/>
-                  <a:pt x="2147429" y="4956035"/>
-                  <a:pt x="1049243" y="3056698"/>
-                </a:cubicBezTo>
-                <a:cubicBezTo>
-                  <a:pt x="977932" y="2938285"/>
-                  <a:pt x="977932" y="2786717"/>
-                  <a:pt x="1049243" y="2668304"/>
-                </a:cubicBezTo>
-                <a:cubicBezTo>
-                  <a:pt x="1049243" y="2668304"/>
-                  <a:pt x="1049243" y="2668304"/>
-                  <a:pt x="1457007" y="1963067"/>
-                </a:cubicBezTo>
-                <a:lnTo>
-                  <a:pt x="1491373" y="1903634"/>
-                </a:lnTo>
-                <a:lnTo>
-                  <a:pt x="1490164" y="1903127"/>
-                </a:lnTo>
-                <a:cubicBezTo>
-                  <a:pt x="1465456" y="1888705"/>
-                  <a:pt x="1444493" y="1867820"/>
-                  <a:pt x="1429519" y="1841960"/>
-                </a:cubicBezTo>
-                <a:cubicBezTo>
-                  <a:pt x="1429519" y="1841960"/>
-                  <a:pt x="1429519" y="1841960"/>
-                  <a:pt x="968320" y="1044307"/>
-                </a:cubicBezTo>
-                <a:cubicBezTo>
-                  <a:pt x="938371" y="994579"/>
-                  <a:pt x="938371" y="930926"/>
-                  <a:pt x="968320" y="881196"/>
-                </a:cubicBezTo>
-                <a:cubicBezTo>
-                  <a:pt x="968320" y="881196"/>
-                  <a:pt x="968320" y="881196"/>
-                  <a:pt x="1429519" y="83546"/>
-                </a:cubicBezTo>
-                <a:cubicBezTo>
-                  <a:pt x="1459466" y="31828"/>
-                  <a:pt x="1513373" y="0"/>
-                  <a:pt x="1573268" y="0"/>
-                </a:cubicBezTo>
-                <a:close/>
-              </a:path>
-            </a:pathLst>
-          </a:custGeom>
-          <a:solidFill>
-            <a:schemeClr val="tx1">
-              <a:lumMod val="50000"/>
-              <a:lumOff val="50000"/>
-              <a:alpha val="15000"/>
-            </a:schemeClr>
-          </a:solidFill>
-          <a:ln>
-            <a:noFill/>
-          </a:ln>
-        </p:spPr>
-        <p:style>
-          <a:lnRef idx="2">
-            <a:schemeClr val="accent1">
-              <a:shade val="50000"/>
-            </a:schemeClr>
-          </a:lnRef>
-          <a:fillRef idx="1">
-            <a:schemeClr val="accent1"/>
-          </a:fillRef>
-          <a:effectRef idx="0">
-            <a:schemeClr val="accent1"/>
-          </a:effectRef>
-          <a:fontRef idx="minor">
-            <a:schemeClr val="lt1"/>
-          </a:fontRef>
-        </p:style>
-        <p:txBody>
-          <a:bodyPr wrap="square" rtlCol="0" anchor="ctr">
-            <a:noAutofit/>
-          </a:bodyPr>
-          <a:lstStyle/>
-          <a:p>
-            <a:pPr algn="ctr"/>
-            <a:endParaRPr lang="en-US"/>
-          </a:p>
-        </p:txBody>
-      </p:sp>
-      <p:pic>
-        <p:nvPicPr>
-          <p:cNvPr id="6" name="Graphic 5" descr="Help with solid fill">
-            <a:extLst>
-              <a:ext uri="{FF2B5EF4-FFF2-40B4-BE49-F238E27FC236}">
-                <a16:creationId xmlns:a16="http://schemas.microsoft.com/office/drawing/2014/main" id="{5D1B45EE-EE74-4916-A832-5235393504C2}"/>
-              </a:ext>
-            </a:extLst>
-          </p:cNvPr>
-          <p:cNvPicPr>
-            <a:picLocks noChangeAspect="1"/>
-          </p:cNvPicPr>
-          <p:nvPr/>
-        </p:nvPicPr>
-        <p:blipFill>
-          <a:blip r:embed="rId2">
-            <a:extLst>
-              <a:ext uri="{28A0092B-C50C-407E-A947-70E740481C1C}">
-                <a14:useLocalDpi xmlns:a14="http://schemas.microsoft.com/office/drawing/2010/main" val="0"/>
-              </a:ext>
-              <a:ext uri="{96DAC541-7B7A-43D3-8B79-37D633B846F1}">
-                <asvg:svgBlip xmlns:asvg="http://schemas.microsoft.com/office/drawing/2016/SVG/main" r:embed="rId3"/>
-              </a:ext>
-            </a:extLst>
-          </a:blip>
-          <a:stretch>
-            <a:fillRect/>
-          </a:stretch>
-        </p:blipFill>
-        <p:spPr>
-          <a:xfrm>
-            <a:off x="7535330" y="2105470"/>
-            <a:ext cx="3217333" cy="3217333"/>
-          </a:xfrm>
-          <a:prstGeom prst="rect">
-            <a:avLst/>
-          </a:prstGeom>
-        </p:spPr>
-      </p:pic>
-    </p:spTree>
-    <p:extLst>
-      <p:ext uri="{BB962C8B-B14F-4D97-AF65-F5344CB8AC3E}">
-        <p14:creationId xmlns:p14="http://schemas.microsoft.com/office/powerpoint/2010/main" val="668814964"/>
-      </p:ext>
-    </p:extLst>
-  </p:cSld>
-  <p:clrMapOvr>
-    <a:masterClrMapping/>
-  </p:clrMapOvr>
-  <p:timing>
-    <p:tnLst>
-      <p:par>
-        <p:cTn id="1" dur="indefinite" restart="never" nodeType="tmRoot">
-          <p:childTnLst>
-            <p:seq concurrent="1" nextAc="seek">
-              <p:cTn id="2" dur="indefinite" nodeType="mainSeq">
-                <p:childTnLst>
-                  <p:par>
-                    <p:cTn id="3" fill="hold">
-                      <p:stCondLst>
-                        <p:cond delay="indefinite"/>
-                      </p:stCondLst>
-                      <p:childTnLst>
-                        <p:par>
-                          <p:cTn id="4" fill="hold">
-                            <p:stCondLst>
-                              <p:cond delay="0"/>
-                            </p:stCondLst>
-                            <p:childTnLst>
-                              <p:par>
-                                <p:cTn id="5" presetID="10" presetClass="entr" presetSubtype="0" fill="hold" nodeType="clickEffect">
-                                  <p:stCondLst>
-                                    <p:cond delay="0"/>
-                                  </p:stCondLst>
-                                  <p:childTnLst>
-                                    <p:set>
-                                      <p:cBhvr>
-                                        <p:cTn id="6" dur="1" fill="hold">
-                                          <p:stCondLst>
-                                            <p:cond delay="0"/>
-                                          </p:stCondLst>
-                                        </p:cTn>
-                                        <p:tgtEl>
-                                          <p:spTgt spid="3">
-                                            <p:txEl>
-                                              <p:pRg st="0" end="0"/>
-                                            </p:txEl>
-                                          </p:spTgt>
-                                        </p:tgtEl>
-                                        <p:attrNameLst>
-                                          <p:attrName>style.visibility</p:attrName>
-                                        </p:attrNameLst>
-                                      </p:cBhvr>
-                                      <p:to>
-                                        <p:strVal val="visible"/>
-                                      </p:to>
-                                    </p:set>
-                                    <p:animEffect transition="in" filter="fade">
-                                      <p:cBhvr>
-                                        <p:cTn id="7" dur="500"/>
-                                        <p:tgtEl>
-                                          <p:spTgt spid="3">
-                                            <p:txEl>
-                                              <p:pRg st="0" end="0"/>
-                                            </p:txEl>
-                                          </p:spTgt>
-                                        </p:tgtEl>
-                                      </p:cBhvr>
-                                    </p:animEffect>
-                                  </p:childTnLst>
-                                </p:cTn>
-                              </p:par>
-                            </p:childTnLst>
-                          </p:cTn>
-                        </p:par>
-                      </p:childTnLst>
-                    </p:cTn>
-                  </p:par>
-                  <p:par>
-                    <p:cTn id="8" fill="hold">
-                      <p:stCondLst>
-                        <p:cond delay="indefinite"/>
-                      </p:stCondLst>
-                      <p:childTnLst>
-                        <p:par>
-                          <p:cTn id="9" fill="hold">
-                            <p:stCondLst>
-                              <p:cond delay="0"/>
-                            </p:stCondLst>
-                            <p:childTnLst>
-                              <p:par>
-                                <p:cTn id="10" presetID="1" presetClass="entr" presetSubtype="0" fill="hold" nodeType="clickEffect">
-                                  <p:stCondLst>
-                                    <p:cond delay="0"/>
-                                  </p:stCondLst>
-                                  <p:childTnLst>
-                                    <p:set>
-                                      <p:cBhvr>
-                                        <p:cTn id="11" dur="1" fill="hold">
-                                          <p:stCondLst>
-                                            <p:cond delay="0"/>
-                                          </p:stCondLst>
-                                        </p:cTn>
-                                        <p:tgtEl>
-                                          <p:spTgt spid="3">
-                                            <p:txEl>
-                                              <p:pRg st="1" end="1"/>
-                                            </p:txEl>
-                                          </p:spTgt>
-                                        </p:tgtEl>
-                                        <p:attrNameLst>
-                                          <p:attrName>style.visibility</p:attrName>
-                                        </p:attrNameLst>
-                                      </p:cBhvr>
-                                      <p:to>
-                                        <p:strVal val="visible"/>
-                                      </p:to>
-                                    </p:set>
-                                  </p:childTnLst>
-                                </p:cTn>
-                              </p:par>
-                            </p:childTnLst>
-                          </p:cTn>
-                        </p:par>
-                      </p:childTnLst>
-                    </p:cTn>
-                  </p:par>
-                  <p:par>
-                    <p:cTn id="12" fill="hold">
-                      <p:stCondLst>
-                        <p:cond delay="indefinite"/>
-                      </p:stCondLst>
-                      <p:childTnLst>
-                        <p:par>
-                          <p:cTn id="13" fill="hold">
-                            <p:stCondLst>
-                              <p:cond delay="0"/>
-                            </p:stCondLst>
-                            <p:childTnLst>
-                              <p:par>
-                                <p:cTn id="14" presetID="10" presetClass="entr" presetSubtype="0" fill="hold" nodeType="clickEffect">
-                                  <p:stCondLst>
-                                    <p:cond delay="0"/>
-                                  </p:stCondLst>
-                                  <p:childTnLst>
-                                    <p:set>
-                                      <p:cBhvr>
-                                        <p:cTn id="15" dur="1" fill="hold">
-                                          <p:stCondLst>
-                                            <p:cond delay="0"/>
-                                          </p:stCondLst>
-                                        </p:cTn>
-                                        <p:tgtEl>
-                                          <p:spTgt spid="3">
-                                            <p:txEl>
-                                              <p:pRg st="2" end="2"/>
-                                            </p:txEl>
-                                          </p:spTgt>
-                                        </p:tgtEl>
-                                        <p:attrNameLst>
-                                          <p:attrName>style.visibility</p:attrName>
-                                        </p:attrNameLst>
-                                      </p:cBhvr>
-                                      <p:to>
-                                        <p:strVal val="visible"/>
-                                      </p:to>
-                                    </p:set>
-                                    <p:animEffect transition="in" filter="fade">
-                                      <p:cBhvr>
-                                        <p:cTn id="16" dur="500"/>
-                                        <p:tgtEl>
-                                          <p:spTgt spid="3">
-                                            <p:txEl>
-                                              <p:pRg st="2" end="2"/>
-                                            </p:txEl>
-                                          </p:spTgt>
-                                        </p:tgtEl>
-                                      </p:cBhvr>
-                                    </p:animEffect>
-                                  </p:childTnLst>
-                                </p:cTn>
-                              </p:par>
-                            </p:childTnLst>
-                          </p:cTn>
-                        </p:par>
-                      </p:childTnLst>
-                    </p:cTn>
-                  </p:par>
-                  <p:par>
-                    <p:cTn id="17" fill="hold">
-                      <p:stCondLst>
-                        <p:cond delay="indefinite"/>
-                      </p:stCondLst>
-                      <p:childTnLst>
-                        <p:par>
-                          <p:cTn id="18" fill="hold">
-                            <p:stCondLst>
-                              <p:cond delay="0"/>
-                            </p:stCondLst>
-                            <p:childTnLst>
-                              <p:par>
-                                <p:cTn id="19" presetID="10" presetClass="entr" presetSubtype="0" fill="hold" nodeType="clickEffect">
-                                  <p:stCondLst>
-                                    <p:cond delay="0"/>
-                                  </p:stCondLst>
-                                  <p:childTnLst>
-                                    <p:set>
-                                      <p:cBhvr>
-                                        <p:cTn id="20" dur="1" fill="hold">
-                                          <p:stCondLst>
-                                            <p:cond delay="0"/>
-                                          </p:stCondLst>
-                                        </p:cTn>
-                                        <p:tgtEl>
-                                          <p:spTgt spid="3">
-                                            <p:txEl>
-                                              <p:pRg st="3" end="3"/>
-                                            </p:txEl>
-                                          </p:spTgt>
-                                        </p:tgtEl>
-                                        <p:attrNameLst>
-                                          <p:attrName>style.visibility</p:attrName>
-                                        </p:attrNameLst>
-                                      </p:cBhvr>
-                                      <p:to>
-                                        <p:strVal val="visible"/>
-                                      </p:to>
-                                    </p:set>
-                                    <p:animEffect transition="in" filter="fade">
-                                      <p:cBhvr>
-                                        <p:cTn id="21" dur="500"/>
-                                        <p:tgtEl>
-                                          <p:spTgt spid="3">
-                                            <p:txEl>
-                                              <p:pRg st="3" end="3"/>
-                                            </p:txEl>
-                                          </p:spTgt>
-                                        </p:tgtEl>
-                                      </p:cBhvr>
-                                    </p:animEffect>
-                                  </p:childTnLst>
-                                </p:cTn>
-                              </p:par>
-                            </p:childTnLst>
-                          </p:cTn>
-                        </p:par>
-                      </p:childTnLst>
-                    </p:cTn>
-                  </p:par>
-                </p:childTnLst>
-              </p:cTn>
-              <p:prevCondLst>
-                <p:cond evt="onPrev" delay="0">
-                  <p:tgtEl>
-                    <p:sldTgt/>
-                  </p:tgtEl>
-                </p:cond>
-              </p:prevCondLst>
-              <p:nextCondLst>
-                <p:cond evt="onNext" delay="0">
-                  <p:tgtEl>
-                    <p:sldTgt/>
-                  </p:tgtEl>
-                </p:cond>
-              </p:nextCondLst>
-            </p:seq>
-          </p:childTnLst>
-        </p:cTn>
-      </p:par>
-    </p:tnLst>
-  </p:timing>
-</p:sld>
-</file>
-
-<file path=ppt/slides/slide20.xml><?xml version="1.0" encoding="utf-8"?>
+<file path=ppt/slides/slide19.xml><?xml version="1.0" encoding="utf-8"?>
 <p:sld xmlns:a="http://schemas.openxmlformats.org/drawingml/2006/main" xmlns:r="http://schemas.openxmlformats.org/officeDocument/2006/relationships" xmlns:p="http://schemas.openxmlformats.org/presentationml/2006/main">
   <p:cSld>
     <p:bg>
@@ -13980,8 +12618,8 @@
         </p:blipFill>
         <p:spPr>
           <a:xfrm>
-            <a:off x="6643857" y="1487286"/>
-            <a:ext cx="5051317" cy="3157073"/>
+            <a:off x="6664509" y="1487286"/>
+            <a:ext cx="5010013" cy="3157073"/>
           </a:xfrm>
           <a:prstGeom prst="rect">
             <a:avLst/>
@@ -14165,7 +12803,1275 @@
 </p:sld>
 </file>
 
-<file path=ppt/slides/slide21.xml><?xml version="1.0" encoding="utf-8"?>
+<file path=ppt/slides/slide2.xml><?xml version="1.0" encoding="utf-8"?>
+<p:sld xmlns:a="http://schemas.openxmlformats.org/drawingml/2006/main" xmlns:r="http://schemas.openxmlformats.org/officeDocument/2006/relationships" xmlns:p="http://schemas.openxmlformats.org/presentationml/2006/main">
+  <p:cSld>
+    <p:bg>
+      <p:bgPr>
+        <a:solidFill>
+          <a:schemeClr val="bg1"/>
+        </a:solidFill>
+        <a:effectLst/>
+      </p:bgPr>
+    </p:bg>
+    <p:spTree>
+      <p:nvGrpSpPr>
+        <p:cNvPr id="1" name=""/>
+        <p:cNvGrpSpPr/>
+        <p:nvPr/>
+      </p:nvGrpSpPr>
+      <p:grpSpPr>
+        <a:xfrm>
+          <a:off x="0" y="0"/>
+          <a:ext cx="0" cy="0"/>
+          <a:chOff x="0" y="0"/>
+          <a:chExt cx="0" cy="0"/>
+        </a:xfrm>
+      </p:grpSpPr>
+      <p:sp useBgFill="1">
+        <p:nvSpPr>
+          <p:cNvPr id="11" name="Rectangle 10">
+            <a:extLst>
+              <a:ext uri="{FF2B5EF4-FFF2-40B4-BE49-F238E27FC236}">
+                <a16:creationId xmlns:a16="http://schemas.microsoft.com/office/drawing/2014/main" id="{91F32EBA-ED97-466E-8CFA-8382584155D0}"/>
+              </a:ext>
+              <a:ext uri="{C183D7F6-B498-43B3-948B-1728B52AA6E4}">
+                <adec:decorative xmlns:adec="http://schemas.microsoft.com/office/drawing/2017/decorative" val="1"/>
+              </a:ext>
+            </a:extLst>
+          </p:cNvPr>
+          <p:cNvSpPr>
+            <a:spLocks noGrp="1" noRot="1" noChangeAspect="1" noMove="1" noResize="1" noEditPoints="1" noAdjustHandles="1" noChangeArrowheads="1" noChangeShapeType="1" noTextEdit="1"/>
+          </p:cNvSpPr>
+          <p:nvPr>
+            <p:extLst>
+              <p:ext uri="{386F3935-93C4-4BCD-93E2-E3B085C9AB24}">
+                <p16:designElem xmlns:p16="http://schemas.microsoft.com/office/powerpoint/2015/main" val="1"/>
+              </p:ext>
+            </p:extLst>
+          </p:nvPr>
+        </p:nvSpPr>
+        <p:spPr>
+          <a:xfrm>
+            <a:off x="0" y="0"/>
+            <a:ext cx="12192000" cy="6858000"/>
+          </a:xfrm>
+          <a:prstGeom prst="rect">
+            <a:avLst/>
+          </a:prstGeom>
+          <a:ln>
+            <a:noFill/>
+          </a:ln>
+        </p:spPr>
+        <p:style>
+          <a:lnRef idx="2">
+            <a:schemeClr val="accent1">
+              <a:shade val="50000"/>
+            </a:schemeClr>
+          </a:lnRef>
+          <a:fillRef idx="1">
+            <a:schemeClr val="accent1"/>
+          </a:fillRef>
+          <a:effectRef idx="0">
+            <a:schemeClr val="accent1"/>
+          </a:effectRef>
+          <a:fontRef idx="minor">
+            <a:schemeClr val="lt1"/>
+          </a:fontRef>
+        </p:style>
+        <p:txBody>
+          <a:bodyPr rtlCol="0" anchor="ctr"/>
+          <a:lstStyle/>
+          <a:p>
+            <a:pPr algn="ctr"/>
+            <a:endParaRPr lang="en-US"/>
+          </a:p>
+        </p:txBody>
+      </p:sp>
+      <p:sp>
+        <p:nvSpPr>
+          <p:cNvPr id="2" name="Title 1">
+            <a:extLst>
+              <a:ext uri="{FF2B5EF4-FFF2-40B4-BE49-F238E27FC236}">
+                <a16:creationId xmlns:a16="http://schemas.microsoft.com/office/drawing/2014/main" id="{A799583B-9ACC-449B-95CE-FE9E6C88012A}"/>
+              </a:ext>
+            </a:extLst>
+          </p:cNvPr>
+          <p:cNvSpPr>
+            <a:spLocks noGrp="1"/>
+          </p:cNvSpPr>
+          <p:nvPr>
+            <p:ph type="title"/>
+          </p:nvPr>
+        </p:nvSpPr>
+        <p:spPr>
+          <a:xfrm>
+            <a:off x="965199" y="851517"/>
+            <a:ext cx="5130795" cy="1461778"/>
+          </a:xfrm>
+        </p:spPr>
+        <p:txBody>
+          <a:bodyPr vert="horz" lIns="91440" tIns="45720" rIns="91440" bIns="45720" rtlCol="0" anchor="ctr">
+            <a:normAutofit/>
+          </a:bodyPr>
+          <a:lstStyle/>
+          <a:p>
+            <a:r>
+              <a:rPr lang="en-US" sz="4000" kern="1200">
+                <a:solidFill>
+                  <a:schemeClr val="tx1"/>
+                </a:solidFill>
+                <a:latin typeface="+mj-lt"/>
+                <a:ea typeface="+mj-ea"/>
+                <a:cs typeface="+mj-cs"/>
+              </a:rPr>
+              <a:t>Guiding Questions</a:t>
+            </a:r>
+          </a:p>
+        </p:txBody>
+      </p:sp>
+      <p:sp>
+        <p:nvSpPr>
+          <p:cNvPr id="3" name="Content Placeholder 2">
+            <a:extLst>
+              <a:ext uri="{FF2B5EF4-FFF2-40B4-BE49-F238E27FC236}">
+                <a16:creationId xmlns:a16="http://schemas.microsoft.com/office/drawing/2014/main" id="{606A0FD7-B64A-497D-A54A-67D403C5C515}"/>
+              </a:ext>
+            </a:extLst>
+          </p:cNvPr>
+          <p:cNvSpPr>
+            <a:spLocks noGrp="1"/>
+          </p:cNvSpPr>
+          <p:nvPr>
+            <p:ph sz="half" idx="1"/>
+          </p:nvPr>
+        </p:nvSpPr>
+        <p:spPr>
+          <a:xfrm>
+            <a:off x="965200" y="2470248"/>
+            <a:ext cx="4545170" cy="3983818"/>
+          </a:xfrm>
+        </p:spPr>
+        <p:txBody>
+          <a:bodyPr vert="horz" lIns="91440" tIns="45720" rIns="91440" bIns="45720" rtlCol="0">
+            <a:normAutofit lnSpcReduction="10000"/>
+          </a:bodyPr>
+          <a:lstStyle/>
+          <a:p>
+            <a:r>
+              <a:rPr lang="en-US" sz="2200" dirty="0"/>
+              <a:t>Are there racial disparities between the sentencing population and the general population in Tennessee?</a:t>
+            </a:r>
+          </a:p>
+          <a:p>
+            <a:r>
+              <a:rPr lang="en-US" sz="2200" dirty="0"/>
+              <a:t>What kinds of crimes are most common among different racial groups?</a:t>
+            </a:r>
+          </a:p>
+          <a:p>
+            <a:r>
+              <a:rPr lang="en-US" sz="2200" dirty="0"/>
+              <a:t>Are people of color receiving longer sentences on average?</a:t>
+            </a:r>
+          </a:p>
+          <a:p>
+            <a:r>
+              <a:rPr lang="en-US" sz="2200" dirty="0"/>
+              <a:t>Are there disparities in the application of sentence enhancements and sentence mitigation measures?</a:t>
+            </a:r>
+          </a:p>
+        </p:txBody>
+      </p:sp>
+      <p:sp>
+        <p:nvSpPr>
+          <p:cNvPr id="13" name="Freeform: Shape 12">
+            <a:extLst>
+              <a:ext uri="{FF2B5EF4-FFF2-40B4-BE49-F238E27FC236}">
+                <a16:creationId xmlns:a16="http://schemas.microsoft.com/office/drawing/2014/main" id="{62A38935-BB53-4DF7-A56E-48DD25B685D7}"/>
+              </a:ext>
+              <a:ext uri="{C183D7F6-B498-43B3-948B-1728B52AA6E4}">
+                <adec:decorative xmlns:adec="http://schemas.microsoft.com/office/drawing/2017/decorative" val="1"/>
+              </a:ext>
+            </a:extLst>
+          </p:cNvPr>
+          <p:cNvSpPr>
+            <a:spLocks noGrp="1" noRot="1" noChangeAspect="1" noMove="1" noResize="1" noEditPoints="1" noAdjustHandles="1" noChangeArrowheads="1" noChangeShapeType="1" noTextEdit="1"/>
+          </p:cNvSpPr>
+          <p:nvPr>
+            <p:extLst>
+              <p:ext uri="{386F3935-93C4-4BCD-93E2-E3B085C9AB24}">
+                <p16:designElem xmlns:p16="http://schemas.microsoft.com/office/powerpoint/2015/main" val="1"/>
+              </p:ext>
+            </p:extLst>
+          </p:nvPr>
+        </p:nvSpPr>
+        <p:spPr>
+          <a:xfrm>
+            <a:off x="5510370" y="851518"/>
+            <a:ext cx="6184806" cy="5154967"/>
+          </a:xfrm>
+          <a:custGeom>
+            <a:avLst/>
+            <a:gdLst>
+              <a:gd name="connsiteX0" fmla="*/ 363179 w 6184806"/>
+              <a:gd name="connsiteY0" fmla="*/ 3125191 h 5154967"/>
+              <a:gd name="connsiteX1" fmla="*/ 898270 w 6184806"/>
+              <a:gd name="connsiteY1" fmla="*/ 3125191 h 5154967"/>
+              <a:gd name="connsiteX2" fmla="*/ 980326 w 6184806"/>
+              <a:gd name="connsiteY2" fmla="*/ 3173551 h 5154967"/>
+              <a:gd name="connsiteX3" fmla="*/ 1248448 w 6184806"/>
+              <a:gd name="connsiteY3" fmla="*/ 3635277 h 5154967"/>
+              <a:gd name="connsiteX4" fmla="*/ 1248448 w 6184806"/>
+              <a:gd name="connsiteY4" fmla="*/ 3729695 h 5154967"/>
+              <a:gd name="connsiteX5" fmla="*/ 980326 w 6184806"/>
+              <a:gd name="connsiteY5" fmla="*/ 4191421 h 5154967"/>
+              <a:gd name="connsiteX6" fmla="*/ 898270 w 6184806"/>
+              <a:gd name="connsiteY6" fmla="*/ 4239781 h 5154967"/>
+              <a:gd name="connsiteX7" fmla="*/ 363179 w 6184806"/>
+              <a:gd name="connsiteY7" fmla="*/ 4239781 h 5154967"/>
+              <a:gd name="connsiteX8" fmla="*/ 279969 w 6184806"/>
+              <a:gd name="connsiteY8" fmla="*/ 4191421 h 5154967"/>
+              <a:gd name="connsiteX9" fmla="*/ 13002 w 6184806"/>
+              <a:gd name="connsiteY9" fmla="*/ 3729695 h 5154967"/>
+              <a:gd name="connsiteX10" fmla="*/ 13002 w 6184806"/>
+              <a:gd name="connsiteY10" fmla="*/ 3635277 h 5154967"/>
+              <a:gd name="connsiteX11" fmla="*/ 279969 w 6184806"/>
+              <a:gd name="connsiteY11" fmla="*/ 3173551 h 5154967"/>
+              <a:gd name="connsiteX12" fmla="*/ 363179 w 6184806"/>
+              <a:gd name="connsiteY12" fmla="*/ 3125191 h 5154967"/>
+              <a:gd name="connsiteX13" fmla="*/ 2489721 w 6184806"/>
+              <a:gd name="connsiteY13" fmla="*/ 570035 h 5154967"/>
+              <a:gd name="connsiteX14" fmla="*/ 2764862 w 6184806"/>
+              <a:gd name="connsiteY14" fmla="*/ 570035 h 5154967"/>
+              <a:gd name="connsiteX15" fmla="*/ 2796959 w 6184806"/>
+              <a:gd name="connsiteY15" fmla="*/ 570035 h 5154967"/>
+              <a:gd name="connsiteX16" fmla="*/ 2827587 w 6184806"/>
+              <a:gd name="connsiteY16" fmla="*/ 622777 h 5154967"/>
+              <a:gd name="connsiteX17" fmla="*/ 2977604 w 6184806"/>
+              <a:gd name="connsiteY17" fmla="*/ 881117 h 5154967"/>
+              <a:gd name="connsiteX18" fmla="*/ 2977604 w 6184806"/>
+              <a:gd name="connsiteY18" fmla="*/ 1025720 h 5154967"/>
+              <a:gd name="connsiteX19" fmla="*/ 2566968 w 6184806"/>
+              <a:gd name="connsiteY19" fmla="*/ 1732863 h 5154967"/>
+              <a:gd name="connsiteX20" fmla="*/ 2441299 w 6184806"/>
+              <a:gd name="connsiteY20" fmla="*/ 1806927 h 5154967"/>
+              <a:gd name="connsiteX21" fmla="*/ 1621798 w 6184806"/>
+              <a:gd name="connsiteY21" fmla="*/ 1806927 h 5154967"/>
+              <a:gd name="connsiteX22" fmla="*/ 1583218 w 6184806"/>
+              <a:gd name="connsiteY22" fmla="*/ 1801802 h 5154967"/>
+              <a:gd name="connsiteX23" fmla="*/ 1556683 w 6184806"/>
+              <a:gd name="connsiteY23" fmla="*/ 1790677 h 5154967"/>
+              <a:gd name="connsiteX24" fmla="*/ 1572899 w 6184806"/>
+              <a:gd name="connsiteY24" fmla="*/ 1762631 h 5154967"/>
+              <a:gd name="connsiteX25" fmla="*/ 2147429 w 6184806"/>
+              <a:gd name="connsiteY25" fmla="*/ 768968 h 5154967"/>
+              <a:gd name="connsiteX26" fmla="*/ 2489721 w 6184806"/>
+              <a:gd name="connsiteY26" fmla="*/ 570035 h 5154967"/>
+              <a:gd name="connsiteX27" fmla="*/ 1573268 w 6184806"/>
+              <a:gd name="connsiteY27" fmla="*/ 0 h 5154967"/>
+              <a:gd name="connsiteX28" fmla="*/ 2497662 w 6184806"/>
+              <a:gd name="connsiteY28" fmla="*/ 0 h 5154967"/>
+              <a:gd name="connsiteX29" fmla="*/ 2639415 w 6184806"/>
+              <a:gd name="connsiteY29" fmla="*/ 83546 h 5154967"/>
+              <a:gd name="connsiteX30" fmla="*/ 2887862 w 6184806"/>
+              <a:gd name="connsiteY30" fmla="*/ 511387 h 5154967"/>
+              <a:gd name="connsiteX31" fmla="*/ 2915928 w 6184806"/>
+              <a:gd name="connsiteY31" fmla="*/ 559720 h 5154967"/>
+              <a:gd name="connsiteX32" fmla="*/ 2893844 w 6184806"/>
+              <a:gd name="connsiteY32" fmla="*/ 559720 h 5154967"/>
+              <a:gd name="connsiteX33" fmla="*/ 2789466 w 6184806"/>
+              <a:gd name="connsiteY33" fmla="*/ 559720 h 5154967"/>
+              <a:gd name="connsiteX34" fmla="*/ 2744122 w 6184806"/>
+              <a:gd name="connsiteY34" fmla="*/ 481634 h 5154967"/>
+              <a:gd name="connsiteX35" fmla="*/ 2570885 w 6184806"/>
+              <a:gd name="connsiteY35" fmla="*/ 183309 h 5154967"/>
+              <a:gd name="connsiteX36" fmla="*/ 2445216 w 6184806"/>
+              <a:gd name="connsiteY36" fmla="*/ 109244 h 5154967"/>
+              <a:gd name="connsiteX37" fmla="*/ 1625714 w 6184806"/>
+              <a:gd name="connsiteY37" fmla="*/ 109244 h 5154967"/>
+              <a:gd name="connsiteX38" fmla="*/ 1498276 w 6184806"/>
+              <a:gd name="connsiteY38" fmla="*/ 183309 h 5154967"/>
+              <a:gd name="connsiteX39" fmla="*/ 1089410 w 6184806"/>
+              <a:gd name="connsiteY39" fmla="*/ 890450 h 5154967"/>
+              <a:gd name="connsiteX40" fmla="*/ 1089410 w 6184806"/>
+              <a:gd name="connsiteY40" fmla="*/ 1035054 h 5154967"/>
+              <a:gd name="connsiteX41" fmla="*/ 1498276 w 6184806"/>
+              <a:gd name="connsiteY41" fmla="*/ 1742196 h 5154967"/>
+              <a:gd name="connsiteX42" fmla="*/ 1552039 w 6184806"/>
+              <a:gd name="connsiteY42" fmla="*/ 1796421 h 5154967"/>
+              <a:gd name="connsiteX43" fmla="*/ 1558260 w 6184806"/>
+              <a:gd name="connsiteY43" fmla="*/ 1799029 h 5154967"/>
+              <a:gd name="connsiteX44" fmla="*/ 1524911 w 6184806"/>
+              <a:gd name="connsiteY44" fmla="*/ 1856707 h 5154967"/>
+              <a:gd name="connsiteX45" fmla="*/ 1500108 w 6184806"/>
+              <a:gd name="connsiteY45" fmla="*/ 1899604 h 5154967"/>
+              <a:gd name="connsiteX46" fmla="*/ 1525834 w 6184806"/>
+              <a:gd name="connsiteY46" fmla="*/ 1910390 h 5154967"/>
+              <a:gd name="connsiteX47" fmla="*/ 1569352 w 6184806"/>
+              <a:gd name="connsiteY47" fmla="*/ 1916170 h 5154967"/>
+              <a:gd name="connsiteX48" fmla="*/ 2493745 w 6184806"/>
+              <a:gd name="connsiteY48" fmla="*/ 1916170 h 5154967"/>
+              <a:gd name="connsiteX49" fmla="*/ 2635498 w 6184806"/>
+              <a:gd name="connsiteY49" fmla="*/ 1832627 h 5154967"/>
+              <a:gd name="connsiteX50" fmla="*/ 3098693 w 6184806"/>
+              <a:gd name="connsiteY50" fmla="*/ 1034974 h 5154967"/>
+              <a:gd name="connsiteX51" fmla="*/ 3098693 w 6184806"/>
+              <a:gd name="connsiteY51" fmla="*/ 871863 h 5154967"/>
+              <a:gd name="connsiteX52" fmla="*/ 2945803 w 6184806"/>
+              <a:gd name="connsiteY52" fmla="*/ 608576 h 5154967"/>
+              <a:gd name="connsiteX53" fmla="*/ 2923422 w 6184806"/>
+              <a:gd name="connsiteY53" fmla="*/ 570035 h 5154967"/>
+              <a:gd name="connsiteX54" fmla="*/ 3027104 w 6184806"/>
+              <a:gd name="connsiteY54" fmla="*/ 570035 h 5154967"/>
+              <a:gd name="connsiteX55" fmla="*/ 4690846 w 6184806"/>
+              <a:gd name="connsiteY55" fmla="*/ 570035 h 5154967"/>
+              <a:gd name="connsiteX56" fmla="*/ 5028384 w 6184806"/>
+              <a:gd name="connsiteY56" fmla="*/ 768968 h 5154967"/>
+              <a:gd name="connsiteX57" fmla="*/ 6131323 w 6184806"/>
+              <a:gd name="connsiteY57" fmla="*/ 2668304 h 5154967"/>
+              <a:gd name="connsiteX58" fmla="*/ 6131323 w 6184806"/>
+              <a:gd name="connsiteY58" fmla="*/ 3056698 h 5154967"/>
+              <a:gd name="connsiteX59" fmla="*/ 5028384 w 6184806"/>
+              <a:gd name="connsiteY59" fmla="*/ 4956035 h 5154967"/>
+              <a:gd name="connsiteX60" fmla="*/ 4690846 w 6184806"/>
+              <a:gd name="connsiteY60" fmla="*/ 5154967 h 5154967"/>
+              <a:gd name="connsiteX61" fmla="*/ 2489721 w 6184806"/>
+              <a:gd name="connsiteY61" fmla="*/ 5154967 h 5154967"/>
+              <a:gd name="connsiteX62" fmla="*/ 2147429 w 6184806"/>
+              <a:gd name="connsiteY62" fmla="*/ 4956035 h 5154967"/>
+              <a:gd name="connsiteX63" fmla="*/ 1049243 w 6184806"/>
+              <a:gd name="connsiteY63" fmla="*/ 3056698 h 5154967"/>
+              <a:gd name="connsiteX64" fmla="*/ 1049243 w 6184806"/>
+              <a:gd name="connsiteY64" fmla="*/ 2668304 h 5154967"/>
+              <a:gd name="connsiteX65" fmla="*/ 1457007 w 6184806"/>
+              <a:gd name="connsiteY65" fmla="*/ 1963067 h 5154967"/>
+              <a:gd name="connsiteX66" fmla="*/ 1491373 w 6184806"/>
+              <a:gd name="connsiteY66" fmla="*/ 1903634 h 5154967"/>
+              <a:gd name="connsiteX67" fmla="*/ 1490164 w 6184806"/>
+              <a:gd name="connsiteY67" fmla="*/ 1903127 h 5154967"/>
+              <a:gd name="connsiteX68" fmla="*/ 1429519 w 6184806"/>
+              <a:gd name="connsiteY68" fmla="*/ 1841960 h 5154967"/>
+              <a:gd name="connsiteX69" fmla="*/ 968320 w 6184806"/>
+              <a:gd name="connsiteY69" fmla="*/ 1044307 h 5154967"/>
+              <a:gd name="connsiteX70" fmla="*/ 968320 w 6184806"/>
+              <a:gd name="connsiteY70" fmla="*/ 881196 h 5154967"/>
+              <a:gd name="connsiteX71" fmla="*/ 1429519 w 6184806"/>
+              <a:gd name="connsiteY71" fmla="*/ 83546 h 5154967"/>
+              <a:gd name="connsiteX72" fmla="*/ 1573268 w 6184806"/>
+              <a:gd name="connsiteY72" fmla="*/ 0 h 5154967"/>
+            </a:gdLst>
+            <a:ahLst/>
+            <a:cxnLst>
+              <a:cxn ang="0">
+                <a:pos x="connsiteX0" y="connsiteY0"/>
+              </a:cxn>
+              <a:cxn ang="0">
+                <a:pos x="connsiteX1" y="connsiteY1"/>
+              </a:cxn>
+              <a:cxn ang="0">
+                <a:pos x="connsiteX2" y="connsiteY2"/>
+              </a:cxn>
+              <a:cxn ang="0">
+                <a:pos x="connsiteX3" y="connsiteY3"/>
+              </a:cxn>
+              <a:cxn ang="0">
+                <a:pos x="connsiteX4" y="connsiteY4"/>
+              </a:cxn>
+              <a:cxn ang="0">
+                <a:pos x="connsiteX5" y="connsiteY5"/>
+              </a:cxn>
+              <a:cxn ang="0">
+                <a:pos x="connsiteX6" y="connsiteY6"/>
+              </a:cxn>
+              <a:cxn ang="0">
+                <a:pos x="connsiteX7" y="connsiteY7"/>
+              </a:cxn>
+              <a:cxn ang="0">
+                <a:pos x="connsiteX8" y="connsiteY8"/>
+              </a:cxn>
+              <a:cxn ang="0">
+                <a:pos x="connsiteX9" y="connsiteY9"/>
+              </a:cxn>
+              <a:cxn ang="0">
+                <a:pos x="connsiteX10" y="connsiteY10"/>
+              </a:cxn>
+              <a:cxn ang="0">
+                <a:pos x="connsiteX11" y="connsiteY11"/>
+              </a:cxn>
+              <a:cxn ang="0">
+                <a:pos x="connsiteX12" y="connsiteY12"/>
+              </a:cxn>
+              <a:cxn ang="0">
+                <a:pos x="connsiteX13" y="connsiteY13"/>
+              </a:cxn>
+              <a:cxn ang="0">
+                <a:pos x="connsiteX14" y="connsiteY14"/>
+              </a:cxn>
+              <a:cxn ang="0">
+                <a:pos x="connsiteX15" y="connsiteY15"/>
+              </a:cxn>
+              <a:cxn ang="0">
+                <a:pos x="connsiteX16" y="connsiteY16"/>
+              </a:cxn>
+              <a:cxn ang="0">
+                <a:pos x="connsiteX17" y="connsiteY17"/>
+              </a:cxn>
+              <a:cxn ang="0">
+                <a:pos x="connsiteX18" y="connsiteY18"/>
+              </a:cxn>
+              <a:cxn ang="0">
+                <a:pos x="connsiteX19" y="connsiteY19"/>
+              </a:cxn>
+              <a:cxn ang="0">
+                <a:pos x="connsiteX20" y="connsiteY20"/>
+              </a:cxn>
+              <a:cxn ang="0">
+                <a:pos x="connsiteX21" y="connsiteY21"/>
+              </a:cxn>
+              <a:cxn ang="0">
+                <a:pos x="connsiteX22" y="connsiteY22"/>
+              </a:cxn>
+              <a:cxn ang="0">
+                <a:pos x="connsiteX23" y="connsiteY23"/>
+              </a:cxn>
+              <a:cxn ang="0">
+                <a:pos x="connsiteX24" y="connsiteY24"/>
+              </a:cxn>
+              <a:cxn ang="0">
+                <a:pos x="connsiteX25" y="connsiteY25"/>
+              </a:cxn>
+              <a:cxn ang="0">
+                <a:pos x="connsiteX26" y="connsiteY26"/>
+              </a:cxn>
+              <a:cxn ang="0">
+                <a:pos x="connsiteX27" y="connsiteY27"/>
+              </a:cxn>
+              <a:cxn ang="0">
+                <a:pos x="connsiteX28" y="connsiteY28"/>
+              </a:cxn>
+              <a:cxn ang="0">
+                <a:pos x="connsiteX29" y="connsiteY29"/>
+              </a:cxn>
+              <a:cxn ang="0">
+                <a:pos x="connsiteX30" y="connsiteY30"/>
+              </a:cxn>
+              <a:cxn ang="0">
+                <a:pos x="connsiteX31" y="connsiteY31"/>
+              </a:cxn>
+              <a:cxn ang="0">
+                <a:pos x="connsiteX32" y="connsiteY32"/>
+              </a:cxn>
+              <a:cxn ang="0">
+                <a:pos x="connsiteX33" y="connsiteY33"/>
+              </a:cxn>
+              <a:cxn ang="0">
+                <a:pos x="connsiteX34" y="connsiteY34"/>
+              </a:cxn>
+              <a:cxn ang="0">
+                <a:pos x="connsiteX35" y="connsiteY35"/>
+              </a:cxn>
+              <a:cxn ang="0">
+                <a:pos x="connsiteX36" y="connsiteY36"/>
+              </a:cxn>
+              <a:cxn ang="0">
+                <a:pos x="connsiteX37" y="connsiteY37"/>
+              </a:cxn>
+              <a:cxn ang="0">
+                <a:pos x="connsiteX38" y="connsiteY38"/>
+              </a:cxn>
+              <a:cxn ang="0">
+                <a:pos x="connsiteX39" y="connsiteY39"/>
+              </a:cxn>
+              <a:cxn ang="0">
+                <a:pos x="connsiteX40" y="connsiteY40"/>
+              </a:cxn>
+              <a:cxn ang="0">
+                <a:pos x="connsiteX41" y="connsiteY41"/>
+              </a:cxn>
+              <a:cxn ang="0">
+                <a:pos x="connsiteX42" y="connsiteY42"/>
+              </a:cxn>
+              <a:cxn ang="0">
+                <a:pos x="connsiteX43" y="connsiteY43"/>
+              </a:cxn>
+              <a:cxn ang="0">
+                <a:pos x="connsiteX44" y="connsiteY44"/>
+              </a:cxn>
+              <a:cxn ang="0">
+                <a:pos x="connsiteX45" y="connsiteY45"/>
+              </a:cxn>
+              <a:cxn ang="0">
+                <a:pos x="connsiteX46" y="connsiteY46"/>
+              </a:cxn>
+              <a:cxn ang="0">
+                <a:pos x="connsiteX47" y="connsiteY47"/>
+              </a:cxn>
+              <a:cxn ang="0">
+                <a:pos x="connsiteX48" y="connsiteY48"/>
+              </a:cxn>
+              <a:cxn ang="0">
+                <a:pos x="connsiteX49" y="connsiteY49"/>
+              </a:cxn>
+              <a:cxn ang="0">
+                <a:pos x="connsiteX50" y="connsiteY50"/>
+              </a:cxn>
+              <a:cxn ang="0">
+                <a:pos x="connsiteX51" y="connsiteY51"/>
+              </a:cxn>
+              <a:cxn ang="0">
+                <a:pos x="connsiteX52" y="connsiteY52"/>
+              </a:cxn>
+              <a:cxn ang="0">
+                <a:pos x="connsiteX53" y="connsiteY53"/>
+              </a:cxn>
+              <a:cxn ang="0">
+                <a:pos x="connsiteX54" y="connsiteY54"/>
+              </a:cxn>
+              <a:cxn ang="0">
+                <a:pos x="connsiteX55" y="connsiteY55"/>
+              </a:cxn>
+              <a:cxn ang="0">
+                <a:pos x="connsiteX56" y="connsiteY56"/>
+              </a:cxn>
+              <a:cxn ang="0">
+                <a:pos x="connsiteX57" y="connsiteY57"/>
+              </a:cxn>
+              <a:cxn ang="0">
+                <a:pos x="connsiteX58" y="connsiteY58"/>
+              </a:cxn>
+              <a:cxn ang="0">
+                <a:pos x="connsiteX59" y="connsiteY59"/>
+              </a:cxn>
+              <a:cxn ang="0">
+                <a:pos x="connsiteX60" y="connsiteY60"/>
+              </a:cxn>
+              <a:cxn ang="0">
+                <a:pos x="connsiteX61" y="connsiteY61"/>
+              </a:cxn>
+              <a:cxn ang="0">
+                <a:pos x="connsiteX62" y="connsiteY62"/>
+              </a:cxn>
+              <a:cxn ang="0">
+                <a:pos x="connsiteX63" y="connsiteY63"/>
+              </a:cxn>
+              <a:cxn ang="0">
+                <a:pos x="connsiteX64" y="connsiteY64"/>
+              </a:cxn>
+              <a:cxn ang="0">
+                <a:pos x="connsiteX65" y="connsiteY65"/>
+              </a:cxn>
+              <a:cxn ang="0">
+                <a:pos x="connsiteX66" y="connsiteY66"/>
+              </a:cxn>
+              <a:cxn ang="0">
+                <a:pos x="connsiteX67" y="connsiteY67"/>
+              </a:cxn>
+              <a:cxn ang="0">
+                <a:pos x="connsiteX68" y="connsiteY68"/>
+              </a:cxn>
+              <a:cxn ang="0">
+                <a:pos x="connsiteX69" y="connsiteY69"/>
+              </a:cxn>
+              <a:cxn ang="0">
+                <a:pos x="connsiteX70" y="connsiteY70"/>
+              </a:cxn>
+              <a:cxn ang="0">
+                <a:pos x="connsiteX71" y="connsiteY71"/>
+              </a:cxn>
+              <a:cxn ang="0">
+                <a:pos x="connsiteX72" y="connsiteY72"/>
+              </a:cxn>
+            </a:cxnLst>
+            <a:rect l="l" t="t" r="r" b="b"/>
+            <a:pathLst>
+              <a:path w="6184806" h="5154967">
+                <a:moveTo>
+                  <a:pt x="363179" y="3125191"/>
+                </a:moveTo>
+                <a:cubicBezTo>
+                  <a:pt x="363179" y="3125191"/>
+                  <a:pt x="363179" y="3125191"/>
+                  <a:pt x="898270" y="3125191"/>
+                </a:cubicBezTo>
+                <a:cubicBezTo>
+                  <a:pt x="931786" y="3125191"/>
+                  <a:pt x="964145" y="3143614"/>
+                  <a:pt x="980326" y="3173551"/>
+                </a:cubicBezTo>
+                <a:cubicBezTo>
+                  <a:pt x="980326" y="3173551"/>
+                  <a:pt x="980326" y="3173551"/>
+                  <a:pt x="1248448" y="3635277"/>
+                </a:cubicBezTo>
+                <a:cubicBezTo>
+                  <a:pt x="1265784" y="3664063"/>
+                  <a:pt x="1265784" y="3700909"/>
+                  <a:pt x="1248448" y="3729695"/>
+                </a:cubicBezTo>
+                <a:cubicBezTo>
+                  <a:pt x="1248448" y="3729695"/>
+                  <a:pt x="1248448" y="3729695"/>
+                  <a:pt x="980326" y="4191421"/>
+                </a:cubicBezTo>
+                <a:cubicBezTo>
+                  <a:pt x="964145" y="4221358"/>
+                  <a:pt x="931786" y="4239781"/>
+                  <a:pt x="898270" y="4239781"/>
+                </a:cubicBezTo>
+                <a:cubicBezTo>
+                  <a:pt x="898270" y="4239781"/>
+                  <a:pt x="898270" y="4239781"/>
+                  <a:pt x="363179" y="4239781"/>
+                </a:cubicBezTo>
+                <a:cubicBezTo>
+                  <a:pt x="328508" y="4239781"/>
+                  <a:pt x="297305" y="4221358"/>
+                  <a:pt x="279969" y="4191421"/>
+                </a:cubicBezTo>
+                <a:cubicBezTo>
+                  <a:pt x="279969" y="4191421"/>
+                  <a:pt x="279969" y="4191421"/>
+                  <a:pt x="13002" y="3729695"/>
+                </a:cubicBezTo>
+                <a:cubicBezTo>
+                  <a:pt x="-4334" y="3700909"/>
+                  <a:pt x="-4334" y="3664063"/>
+                  <a:pt x="13002" y="3635277"/>
+                </a:cubicBezTo>
+                <a:cubicBezTo>
+                  <a:pt x="13002" y="3635277"/>
+                  <a:pt x="13002" y="3635277"/>
+                  <a:pt x="279969" y="3173551"/>
+                </a:cubicBezTo>
+                <a:cubicBezTo>
+                  <a:pt x="297305" y="3143614"/>
+                  <a:pt x="328508" y="3125191"/>
+                  <a:pt x="363179" y="3125191"/>
+                </a:cubicBezTo>
+                <a:close/>
+                <a:moveTo>
+                  <a:pt x="2489721" y="570035"/>
+                </a:moveTo>
+                <a:cubicBezTo>
+                  <a:pt x="2489721" y="570035"/>
+                  <a:pt x="2489721" y="570035"/>
+                  <a:pt x="2764862" y="570035"/>
+                </a:cubicBezTo>
+                <a:lnTo>
+                  <a:pt x="2796959" y="570035"/>
+                </a:lnTo>
+                <a:lnTo>
+                  <a:pt x="2827587" y="622777"/>
+                </a:lnTo>
+                <a:cubicBezTo>
+                  <a:pt x="2870233" y="696217"/>
+                  <a:pt x="2919858" y="781675"/>
+                  <a:pt x="2977604" y="881117"/>
+                </a:cubicBezTo>
+                <a:cubicBezTo>
+                  <a:pt x="3004153" y="925204"/>
+                  <a:pt x="3004153" y="981634"/>
+                  <a:pt x="2977604" y="1025720"/>
+                </a:cubicBezTo>
+                <a:cubicBezTo>
+                  <a:pt x="2977604" y="1025720"/>
+                  <a:pt x="2977604" y="1025720"/>
+                  <a:pt x="2566968" y="1732863"/>
+                </a:cubicBezTo>
+                <a:cubicBezTo>
+                  <a:pt x="2542188" y="1778712"/>
+                  <a:pt x="2492629" y="1806927"/>
+                  <a:pt x="2441299" y="1806927"/>
+                </a:cubicBezTo>
+                <a:cubicBezTo>
+                  <a:pt x="2441299" y="1806927"/>
+                  <a:pt x="2441299" y="1806927"/>
+                  <a:pt x="1621798" y="1806927"/>
+                </a:cubicBezTo>
+                <a:cubicBezTo>
+                  <a:pt x="1608523" y="1806927"/>
+                  <a:pt x="1595580" y="1805163"/>
+                  <a:pt x="1583218" y="1801802"/>
+                </a:cubicBezTo>
+                <a:lnTo>
+                  <a:pt x="1556683" y="1790677"/>
+                </a:lnTo>
+                <a:lnTo>
+                  <a:pt x="1572899" y="1762631"/>
+                </a:lnTo>
+                <a:cubicBezTo>
+                  <a:pt x="1719523" y="1509042"/>
+                  <a:pt x="1907201" y="1184448"/>
+                  <a:pt x="2147429" y="768968"/>
+                </a:cubicBezTo>
+                <a:cubicBezTo>
+                  <a:pt x="2218739" y="645819"/>
+                  <a:pt x="2347099" y="570035"/>
+                  <a:pt x="2489721" y="570035"/>
+                </a:cubicBezTo>
+                <a:close/>
+                <a:moveTo>
+                  <a:pt x="1573268" y="0"/>
+                </a:moveTo>
+                <a:cubicBezTo>
+                  <a:pt x="1573268" y="0"/>
+                  <a:pt x="1573268" y="0"/>
+                  <a:pt x="2497662" y="0"/>
+                </a:cubicBezTo>
+                <a:cubicBezTo>
+                  <a:pt x="2555561" y="0"/>
+                  <a:pt x="2611463" y="31828"/>
+                  <a:pt x="2639415" y="83546"/>
+                </a:cubicBezTo>
+                <a:cubicBezTo>
+                  <a:pt x="2639415" y="83546"/>
+                  <a:pt x="2639415" y="83546"/>
+                  <a:pt x="2887862" y="511387"/>
+                </a:cubicBezTo>
+                <a:lnTo>
+                  <a:pt x="2915928" y="559720"/>
+                </a:lnTo>
+                <a:lnTo>
+                  <a:pt x="2893844" y="559720"/>
+                </a:lnTo>
+                <a:lnTo>
+                  <a:pt x="2789466" y="559720"/>
+                </a:lnTo>
+                <a:lnTo>
+                  <a:pt x="2744122" y="481634"/>
+                </a:lnTo>
+                <a:cubicBezTo>
+                  <a:pt x="2570885" y="183309"/>
+                  <a:pt x="2570885" y="183309"/>
+                  <a:pt x="2570885" y="183309"/>
+                </a:cubicBezTo>
+                <a:cubicBezTo>
+                  <a:pt x="2546104" y="137459"/>
+                  <a:pt x="2496545" y="109244"/>
+                  <a:pt x="2445216" y="109244"/>
+                </a:cubicBezTo>
+                <a:cubicBezTo>
+                  <a:pt x="1625714" y="109244"/>
+                  <a:pt x="1625714" y="109244"/>
+                  <a:pt x="1625714" y="109244"/>
+                </a:cubicBezTo>
+                <a:cubicBezTo>
+                  <a:pt x="1572615" y="109244"/>
+                  <a:pt x="1524825" y="137459"/>
+                  <a:pt x="1498276" y="183309"/>
+                </a:cubicBezTo>
+                <a:cubicBezTo>
+                  <a:pt x="1089410" y="890450"/>
+                  <a:pt x="1089410" y="890450"/>
+                  <a:pt x="1089410" y="890450"/>
+                </a:cubicBezTo>
+                <a:cubicBezTo>
+                  <a:pt x="1062860" y="934537"/>
+                  <a:pt x="1062860" y="990968"/>
+                  <a:pt x="1089410" y="1035054"/>
+                </a:cubicBezTo>
+                <a:cubicBezTo>
+                  <a:pt x="1498276" y="1742196"/>
+                  <a:pt x="1498276" y="1742196"/>
+                  <a:pt x="1498276" y="1742196"/>
+                </a:cubicBezTo>
+                <a:cubicBezTo>
+                  <a:pt x="1511551" y="1765121"/>
+                  <a:pt x="1530135" y="1783637"/>
+                  <a:pt x="1552039" y="1796421"/>
+                </a:cubicBezTo>
+                <a:lnTo>
+                  <a:pt x="1558260" y="1799029"/>
+                </a:lnTo>
+                <a:lnTo>
+                  <a:pt x="1524911" y="1856707"/>
+                </a:lnTo>
+                <a:lnTo>
+                  <a:pt x="1500108" y="1899604"/>
+                </a:lnTo>
+                <a:lnTo>
+                  <a:pt x="1525834" y="1910390"/>
+                </a:lnTo>
+                <a:cubicBezTo>
+                  <a:pt x="1539779" y="1914181"/>
+                  <a:pt x="1554378" y="1916170"/>
+                  <a:pt x="1569352" y="1916170"/>
+                </a:cubicBezTo>
+                <a:cubicBezTo>
+                  <a:pt x="2493745" y="1916170"/>
+                  <a:pt x="2493745" y="1916170"/>
+                  <a:pt x="2493745" y="1916170"/>
+                </a:cubicBezTo>
+                <a:cubicBezTo>
+                  <a:pt x="2551645" y="1916170"/>
+                  <a:pt x="2607546" y="1884345"/>
+                  <a:pt x="2635498" y="1832627"/>
+                </a:cubicBezTo>
+                <a:cubicBezTo>
+                  <a:pt x="3098693" y="1034974"/>
+                  <a:pt x="3098693" y="1034974"/>
+                  <a:pt x="3098693" y="1034974"/>
+                </a:cubicBezTo>
+                <a:cubicBezTo>
+                  <a:pt x="3128641" y="985246"/>
+                  <a:pt x="3128641" y="921593"/>
+                  <a:pt x="3098693" y="871863"/>
+                </a:cubicBezTo>
+                <a:cubicBezTo>
+                  <a:pt x="3040794" y="772157"/>
+                  <a:pt x="2990132" y="684914"/>
+                  <a:pt x="2945803" y="608576"/>
+                </a:cubicBezTo>
+                <a:lnTo>
+                  <a:pt x="2923422" y="570035"/>
+                </a:lnTo>
+                <a:lnTo>
+                  <a:pt x="3027104" y="570035"/>
+                </a:lnTo>
+                <a:cubicBezTo>
+                  <a:pt x="3349535" y="570035"/>
+                  <a:pt x="3865424" y="570035"/>
+                  <a:pt x="4690846" y="570035"/>
+                </a:cubicBezTo>
+                <a:cubicBezTo>
+                  <a:pt x="4828714" y="570035"/>
+                  <a:pt x="4961827" y="645819"/>
+                  <a:pt x="5028384" y="768968"/>
+                </a:cubicBezTo>
+                <a:cubicBezTo>
+                  <a:pt x="5028384" y="768968"/>
+                  <a:pt x="5028384" y="768968"/>
+                  <a:pt x="6131323" y="2668304"/>
+                </a:cubicBezTo>
+                <a:cubicBezTo>
+                  <a:pt x="6202634" y="2786717"/>
+                  <a:pt x="6202634" y="2938285"/>
+                  <a:pt x="6131323" y="3056698"/>
+                </a:cubicBezTo>
+                <a:cubicBezTo>
+                  <a:pt x="6131323" y="3056698"/>
+                  <a:pt x="6131323" y="3056698"/>
+                  <a:pt x="5028384" y="4956035"/>
+                </a:cubicBezTo>
+                <a:cubicBezTo>
+                  <a:pt x="4961827" y="5079184"/>
+                  <a:pt x="4828714" y="5154967"/>
+                  <a:pt x="4690846" y="5154967"/>
+                </a:cubicBezTo>
+                <a:cubicBezTo>
+                  <a:pt x="4690846" y="5154967"/>
+                  <a:pt x="4690846" y="5154967"/>
+                  <a:pt x="2489721" y="5154967"/>
+                </a:cubicBezTo>
+                <a:cubicBezTo>
+                  <a:pt x="2347099" y="5154967"/>
+                  <a:pt x="2218739" y="5079184"/>
+                  <a:pt x="2147429" y="4956035"/>
+                </a:cubicBezTo>
+                <a:cubicBezTo>
+                  <a:pt x="2147429" y="4956035"/>
+                  <a:pt x="2147429" y="4956035"/>
+                  <a:pt x="1049243" y="3056698"/>
+                </a:cubicBezTo>
+                <a:cubicBezTo>
+                  <a:pt x="977932" y="2938285"/>
+                  <a:pt x="977932" y="2786717"/>
+                  <a:pt x="1049243" y="2668304"/>
+                </a:cubicBezTo>
+                <a:cubicBezTo>
+                  <a:pt x="1049243" y="2668304"/>
+                  <a:pt x="1049243" y="2668304"/>
+                  <a:pt x="1457007" y="1963067"/>
+                </a:cubicBezTo>
+                <a:lnTo>
+                  <a:pt x="1491373" y="1903634"/>
+                </a:lnTo>
+                <a:lnTo>
+                  <a:pt x="1490164" y="1903127"/>
+                </a:lnTo>
+                <a:cubicBezTo>
+                  <a:pt x="1465456" y="1888705"/>
+                  <a:pt x="1444493" y="1867820"/>
+                  <a:pt x="1429519" y="1841960"/>
+                </a:cubicBezTo>
+                <a:cubicBezTo>
+                  <a:pt x="1429519" y="1841960"/>
+                  <a:pt x="1429519" y="1841960"/>
+                  <a:pt x="968320" y="1044307"/>
+                </a:cubicBezTo>
+                <a:cubicBezTo>
+                  <a:pt x="938371" y="994579"/>
+                  <a:pt x="938371" y="930926"/>
+                  <a:pt x="968320" y="881196"/>
+                </a:cubicBezTo>
+                <a:cubicBezTo>
+                  <a:pt x="968320" y="881196"/>
+                  <a:pt x="968320" y="881196"/>
+                  <a:pt x="1429519" y="83546"/>
+                </a:cubicBezTo>
+                <a:cubicBezTo>
+                  <a:pt x="1459466" y="31828"/>
+                  <a:pt x="1513373" y="0"/>
+                  <a:pt x="1573268" y="0"/>
+                </a:cubicBezTo>
+                <a:close/>
+              </a:path>
+            </a:pathLst>
+          </a:custGeom>
+          <a:solidFill>
+            <a:schemeClr val="tx1">
+              <a:lumMod val="50000"/>
+              <a:lumOff val="50000"/>
+              <a:alpha val="15000"/>
+            </a:schemeClr>
+          </a:solidFill>
+          <a:ln>
+            <a:noFill/>
+          </a:ln>
+        </p:spPr>
+        <p:style>
+          <a:lnRef idx="2">
+            <a:schemeClr val="accent1">
+              <a:shade val="50000"/>
+            </a:schemeClr>
+          </a:lnRef>
+          <a:fillRef idx="1">
+            <a:schemeClr val="accent1"/>
+          </a:fillRef>
+          <a:effectRef idx="0">
+            <a:schemeClr val="accent1"/>
+          </a:effectRef>
+          <a:fontRef idx="minor">
+            <a:schemeClr val="lt1"/>
+          </a:fontRef>
+        </p:style>
+        <p:txBody>
+          <a:bodyPr wrap="square" rtlCol="0" anchor="ctr">
+            <a:noAutofit/>
+          </a:bodyPr>
+          <a:lstStyle/>
+          <a:p>
+            <a:pPr algn="ctr"/>
+            <a:endParaRPr lang="en-US"/>
+          </a:p>
+        </p:txBody>
+      </p:sp>
+      <p:pic>
+        <p:nvPicPr>
+          <p:cNvPr id="6" name="Graphic 5" descr="Help with solid fill">
+            <a:extLst>
+              <a:ext uri="{FF2B5EF4-FFF2-40B4-BE49-F238E27FC236}">
+                <a16:creationId xmlns:a16="http://schemas.microsoft.com/office/drawing/2014/main" id="{5D1B45EE-EE74-4916-A832-5235393504C2}"/>
+              </a:ext>
+            </a:extLst>
+          </p:cNvPr>
+          <p:cNvPicPr>
+            <a:picLocks noChangeAspect="1"/>
+          </p:cNvPicPr>
+          <p:nvPr/>
+        </p:nvPicPr>
+        <p:blipFill>
+          <a:blip r:embed="rId2">
+            <a:extLst>
+              <a:ext uri="{28A0092B-C50C-407E-A947-70E740481C1C}">
+                <a14:useLocalDpi xmlns:a14="http://schemas.microsoft.com/office/drawing/2010/main" val="0"/>
+              </a:ext>
+              <a:ext uri="{96DAC541-7B7A-43D3-8B79-37D633B846F1}">
+                <asvg:svgBlip xmlns:asvg="http://schemas.microsoft.com/office/drawing/2016/SVG/main" r:embed="rId3"/>
+              </a:ext>
+            </a:extLst>
+          </a:blip>
+          <a:stretch>
+            <a:fillRect/>
+          </a:stretch>
+        </p:blipFill>
+        <p:spPr>
+          <a:xfrm>
+            <a:off x="7535330" y="2105470"/>
+            <a:ext cx="3217333" cy="3217333"/>
+          </a:xfrm>
+          <a:prstGeom prst="rect">
+            <a:avLst/>
+          </a:prstGeom>
+        </p:spPr>
+      </p:pic>
+    </p:spTree>
+    <p:extLst>
+      <p:ext uri="{BB962C8B-B14F-4D97-AF65-F5344CB8AC3E}">
+        <p14:creationId xmlns:p14="http://schemas.microsoft.com/office/powerpoint/2010/main" val="668814964"/>
+      </p:ext>
+    </p:extLst>
+  </p:cSld>
+  <p:clrMapOvr>
+    <a:masterClrMapping/>
+  </p:clrMapOvr>
+  <p:timing>
+    <p:tnLst>
+      <p:par>
+        <p:cTn id="1" dur="indefinite" restart="never" nodeType="tmRoot">
+          <p:childTnLst>
+            <p:seq concurrent="1" nextAc="seek">
+              <p:cTn id="2" dur="indefinite" nodeType="mainSeq">
+                <p:childTnLst>
+                  <p:par>
+                    <p:cTn id="3" fill="hold">
+                      <p:stCondLst>
+                        <p:cond delay="indefinite"/>
+                      </p:stCondLst>
+                      <p:childTnLst>
+                        <p:par>
+                          <p:cTn id="4" fill="hold">
+                            <p:stCondLst>
+                              <p:cond delay="0"/>
+                            </p:stCondLst>
+                            <p:childTnLst>
+                              <p:par>
+                                <p:cTn id="5" presetID="10" presetClass="entr" presetSubtype="0" fill="hold" nodeType="clickEffect">
+                                  <p:stCondLst>
+                                    <p:cond delay="0"/>
+                                  </p:stCondLst>
+                                  <p:childTnLst>
+                                    <p:set>
+                                      <p:cBhvr>
+                                        <p:cTn id="6" dur="1" fill="hold">
+                                          <p:stCondLst>
+                                            <p:cond delay="0"/>
+                                          </p:stCondLst>
+                                        </p:cTn>
+                                        <p:tgtEl>
+                                          <p:spTgt spid="3">
+                                            <p:txEl>
+                                              <p:pRg st="0" end="0"/>
+                                            </p:txEl>
+                                          </p:spTgt>
+                                        </p:tgtEl>
+                                        <p:attrNameLst>
+                                          <p:attrName>style.visibility</p:attrName>
+                                        </p:attrNameLst>
+                                      </p:cBhvr>
+                                      <p:to>
+                                        <p:strVal val="visible"/>
+                                      </p:to>
+                                    </p:set>
+                                    <p:animEffect transition="in" filter="fade">
+                                      <p:cBhvr>
+                                        <p:cTn id="7" dur="500"/>
+                                        <p:tgtEl>
+                                          <p:spTgt spid="3">
+                                            <p:txEl>
+                                              <p:pRg st="0" end="0"/>
+                                            </p:txEl>
+                                          </p:spTgt>
+                                        </p:tgtEl>
+                                      </p:cBhvr>
+                                    </p:animEffect>
+                                  </p:childTnLst>
+                                </p:cTn>
+                              </p:par>
+                            </p:childTnLst>
+                          </p:cTn>
+                        </p:par>
+                      </p:childTnLst>
+                    </p:cTn>
+                  </p:par>
+                  <p:par>
+                    <p:cTn id="8" fill="hold">
+                      <p:stCondLst>
+                        <p:cond delay="indefinite"/>
+                      </p:stCondLst>
+                      <p:childTnLst>
+                        <p:par>
+                          <p:cTn id="9" fill="hold">
+                            <p:stCondLst>
+                              <p:cond delay="0"/>
+                            </p:stCondLst>
+                            <p:childTnLst>
+                              <p:par>
+                                <p:cTn id="10" presetID="1" presetClass="entr" presetSubtype="0" fill="hold" nodeType="clickEffect">
+                                  <p:stCondLst>
+                                    <p:cond delay="0"/>
+                                  </p:stCondLst>
+                                  <p:childTnLst>
+                                    <p:set>
+                                      <p:cBhvr>
+                                        <p:cTn id="11" dur="1" fill="hold">
+                                          <p:stCondLst>
+                                            <p:cond delay="0"/>
+                                          </p:stCondLst>
+                                        </p:cTn>
+                                        <p:tgtEl>
+                                          <p:spTgt spid="3">
+                                            <p:txEl>
+                                              <p:pRg st="1" end="1"/>
+                                            </p:txEl>
+                                          </p:spTgt>
+                                        </p:tgtEl>
+                                        <p:attrNameLst>
+                                          <p:attrName>style.visibility</p:attrName>
+                                        </p:attrNameLst>
+                                      </p:cBhvr>
+                                      <p:to>
+                                        <p:strVal val="visible"/>
+                                      </p:to>
+                                    </p:set>
+                                  </p:childTnLst>
+                                </p:cTn>
+                              </p:par>
+                            </p:childTnLst>
+                          </p:cTn>
+                        </p:par>
+                      </p:childTnLst>
+                    </p:cTn>
+                  </p:par>
+                  <p:par>
+                    <p:cTn id="12" fill="hold">
+                      <p:stCondLst>
+                        <p:cond delay="indefinite"/>
+                      </p:stCondLst>
+                      <p:childTnLst>
+                        <p:par>
+                          <p:cTn id="13" fill="hold">
+                            <p:stCondLst>
+                              <p:cond delay="0"/>
+                            </p:stCondLst>
+                            <p:childTnLst>
+                              <p:par>
+                                <p:cTn id="14" presetID="10" presetClass="entr" presetSubtype="0" fill="hold" nodeType="clickEffect">
+                                  <p:stCondLst>
+                                    <p:cond delay="0"/>
+                                  </p:stCondLst>
+                                  <p:childTnLst>
+                                    <p:set>
+                                      <p:cBhvr>
+                                        <p:cTn id="15" dur="1" fill="hold">
+                                          <p:stCondLst>
+                                            <p:cond delay="0"/>
+                                          </p:stCondLst>
+                                        </p:cTn>
+                                        <p:tgtEl>
+                                          <p:spTgt spid="3">
+                                            <p:txEl>
+                                              <p:pRg st="2" end="2"/>
+                                            </p:txEl>
+                                          </p:spTgt>
+                                        </p:tgtEl>
+                                        <p:attrNameLst>
+                                          <p:attrName>style.visibility</p:attrName>
+                                        </p:attrNameLst>
+                                      </p:cBhvr>
+                                      <p:to>
+                                        <p:strVal val="visible"/>
+                                      </p:to>
+                                    </p:set>
+                                    <p:animEffect transition="in" filter="fade">
+                                      <p:cBhvr>
+                                        <p:cTn id="16" dur="500"/>
+                                        <p:tgtEl>
+                                          <p:spTgt spid="3">
+                                            <p:txEl>
+                                              <p:pRg st="2" end="2"/>
+                                            </p:txEl>
+                                          </p:spTgt>
+                                        </p:tgtEl>
+                                      </p:cBhvr>
+                                    </p:animEffect>
+                                  </p:childTnLst>
+                                </p:cTn>
+                              </p:par>
+                            </p:childTnLst>
+                          </p:cTn>
+                        </p:par>
+                      </p:childTnLst>
+                    </p:cTn>
+                  </p:par>
+                  <p:par>
+                    <p:cTn id="17" fill="hold">
+                      <p:stCondLst>
+                        <p:cond delay="indefinite"/>
+                      </p:stCondLst>
+                      <p:childTnLst>
+                        <p:par>
+                          <p:cTn id="18" fill="hold">
+                            <p:stCondLst>
+                              <p:cond delay="0"/>
+                            </p:stCondLst>
+                            <p:childTnLst>
+                              <p:par>
+                                <p:cTn id="19" presetID="10" presetClass="entr" presetSubtype="0" fill="hold" nodeType="clickEffect">
+                                  <p:stCondLst>
+                                    <p:cond delay="0"/>
+                                  </p:stCondLst>
+                                  <p:childTnLst>
+                                    <p:set>
+                                      <p:cBhvr>
+                                        <p:cTn id="20" dur="1" fill="hold">
+                                          <p:stCondLst>
+                                            <p:cond delay="0"/>
+                                          </p:stCondLst>
+                                        </p:cTn>
+                                        <p:tgtEl>
+                                          <p:spTgt spid="3">
+                                            <p:txEl>
+                                              <p:pRg st="3" end="3"/>
+                                            </p:txEl>
+                                          </p:spTgt>
+                                        </p:tgtEl>
+                                        <p:attrNameLst>
+                                          <p:attrName>style.visibility</p:attrName>
+                                        </p:attrNameLst>
+                                      </p:cBhvr>
+                                      <p:to>
+                                        <p:strVal val="visible"/>
+                                      </p:to>
+                                    </p:set>
+                                    <p:animEffect transition="in" filter="fade">
+                                      <p:cBhvr>
+                                        <p:cTn id="21" dur="500"/>
+                                        <p:tgtEl>
+                                          <p:spTgt spid="3">
+                                            <p:txEl>
+                                              <p:pRg st="3" end="3"/>
+                                            </p:txEl>
+                                          </p:spTgt>
+                                        </p:tgtEl>
+                                      </p:cBhvr>
+                                    </p:animEffect>
+                                  </p:childTnLst>
+                                </p:cTn>
+                              </p:par>
+                            </p:childTnLst>
+                          </p:cTn>
+                        </p:par>
+                      </p:childTnLst>
+                    </p:cTn>
+                  </p:par>
+                </p:childTnLst>
+              </p:cTn>
+              <p:prevCondLst>
+                <p:cond evt="onPrev" delay="0">
+                  <p:tgtEl>
+                    <p:sldTgt/>
+                  </p:tgtEl>
+                </p:cond>
+              </p:prevCondLst>
+              <p:nextCondLst>
+                <p:cond evt="onNext" delay="0">
+                  <p:tgtEl>
+                    <p:sldTgt/>
+                  </p:tgtEl>
+                </p:cond>
+              </p:nextCondLst>
+            </p:seq>
+          </p:childTnLst>
+        </p:cTn>
+      </p:par>
+    </p:tnLst>
+  </p:timing>
+</p:sld>
+</file>
+
+<file path=ppt/slides/slide20.xml><?xml version="1.0" encoding="utf-8"?>
 <p:sld xmlns:a="http://schemas.openxmlformats.org/drawingml/2006/main" xmlns:r="http://schemas.openxmlformats.org/officeDocument/2006/relationships" xmlns:p="http://schemas.openxmlformats.org/presentationml/2006/main">
   <p:cSld>
     <p:bg>
@@ -14922,8 +14828,8 @@
         </p:blipFill>
         <p:spPr>
           <a:xfrm>
-            <a:off x="6643857" y="1487286"/>
-            <a:ext cx="5051317" cy="3157072"/>
+            <a:off x="6664510" y="1487286"/>
+            <a:ext cx="5010011" cy="3157072"/>
           </a:xfrm>
           <a:prstGeom prst="rect">
             <a:avLst/>
@@ -15111,7 +15017,7 @@
 </p:sld>
 </file>
 
-<file path=ppt/slides/slide22.xml><?xml version="1.0" encoding="utf-8"?>
+<file path=ppt/slides/slide21.xml><?xml version="1.0" encoding="utf-8"?>
 <p:sld xmlns:a="http://schemas.openxmlformats.org/drawingml/2006/main" xmlns:r="http://schemas.openxmlformats.org/officeDocument/2006/relationships" xmlns:p="http://schemas.openxmlformats.org/presentationml/2006/main">
   <p:cSld>
     <p:bg>
@@ -15576,7 +15482,7 @@
 </p:sld>
 </file>
 
-<file path=ppt/slides/slide23.xml><?xml version="1.0" encoding="utf-8"?>
+<file path=ppt/slides/slide22.xml><?xml version="1.0" encoding="utf-8"?>
 <p:sld xmlns:a="http://schemas.openxmlformats.org/drawingml/2006/main" xmlns:r="http://schemas.openxmlformats.org/officeDocument/2006/relationships" xmlns:p="http://schemas.openxmlformats.org/presentationml/2006/main">
   <p:cSld>
     <p:bg>
@@ -15946,7 +15852,7 @@
 </p:sld>
 </file>
 
-<file path=ppt/slides/slide24.xml><?xml version="1.0" encoding="utf-8"?>
+<file path=ppt/slides/slide23.xml><?xml version="1.0" encoding="utf-8"?>
 <p:sld xmlns:a="http://schemas.openxmlformats.org/drawingml/2006/main" xmlns:r="http://schemas.openxmlformats.org/officeDocument/2006/relationships" xmlns:p="http://schemas.openxmlformats.org/presentationml/2006/main">
   <p:cSld>
     <p:bg>
@@ -17321,48 +17227,37 @@
           <a:lstStyle/>
           <a:p>
             <a:r>
-              <a:rPr lang="en-US"/>
+              <a:rPr lang="en-US" dirty="0"/>
               <a:t>State law:</a:t>
             </a:r>
           </a:p>
           <a:p>
             <a:pPr lvl="1"/>
             <a:r>
-              <a:rPr lang="en-US"/>
+              <a:rPr lang="en-US" dirty="0"/>
               <a:t>Murder</a:t>
             </a:r>
           </a:p>
           <a:p>
             <a:pPr lvl="1"/>
             <a:r>
-              <a:rPr lang="en-US"/>
+              <a:rPr lang="en-US" dirty="0"/>
               <a:t>Sexual assault</a:t>
             </a:r>
           </a:p>
           <a:p>
             <a:pPr lvl="1"/>
             <a:r>
-              <a:rPr lang="en-US"/>
+              <a:rPr lang="en-US" dirty="0"/>
               <a:t>Robbery/burglary</a:t>
             </a:r>
           </a:p>
           <a:p>
             <a:pPr lvl="1"/>
             <a:r>
-              <a:rPr lang="en-US"/>
+              <a:rPr lang="en-US" dirty="0"/>
               <a:t>Most violent crime</a:t>
             </a:r>
-          </a:p>
-          <a:p>
-            <a:pPr lvl="1"/>
-            <a:r>
-              <a:rPr lang="en-US"/>
-              <a:t>Violations of state drug laws</a:t>
-            </a:r>
-          </a:p>
-          <a:p>
-            <a:pPr lvl="1"/>
-            <a:endParaRPr lang="en-US" dirty="0"/>
           </a:p>
         </p:txBody>
       </p:sp>
@@ -17652,23 +17547,41 @@
                                   </p:childTnLst>
                                 </p:cTn>
                               </p:par>
+                            </p:childTnLst>
+                          </p:cTn>
+                        </p:par>
+                      </p:childTnLst>
+                    </p:cTn>
+                  </p:par>
+                  <p:par>
+                    <p:cTn id="15" fill="hold">
+                      <p:stCondLst>
+                        <p:cond delay="indefinite"/>
+                      </p:stCondLst>
+                      <p:childTnLst>
+                        <p:par>
+                          <p:cTn id="16" fill="hold">
+                            <p:stCondLst>
+                              <p:cond delay="0"/>
+                            </p:stCondLst>
+                            <p:childTnLst>
                               <p:par>
-                                <p:cTn id="15" presetID="1" presetClass="entr" presetSubtype="0" fill="hold" grpId="0" nodeType="withEffect">
+                                <p:cTn id="17" presetID="1" presetClass="entr" presetSubtype="0" fill="hold" grpId="0" nodeType="clickEffect">
                                   <p:stCondLst>
                                     <p:cond delay="0"/>
                                   </p:stCondLst>
                                   <p:childTnLst>
                                     <p:set>
                                       <p:cBhvr>
-                                        <p:cTn id="16" dur="1" fill="hold">
+                                        <p:cTn id="18" dur="1" fill="hold">
                                           <p:stCondLst>
                                             <p:cond delay="0"/>
                                           </p:stCondLst>
                                         </p:cTn>
                                         <p:tgtEl>
-                                          <p:spTgt spid="3">
+                                          <p:spTgt spid="4">
                                             <p:txEl>
-                                              <p:pRg st="5" end="5"/>
+                                              <p:pRg st="0" end="0"/>
                                             </p:txEl>
                                           </p:spTgt>
                                         </p:tgtEl>
@@ -17683,26 +17596,8 @@
                                   </p:childTnLst>
                                 </p:cTn>
                               </p:par>
-                            </p:childTnLst>
-                          </p:cTn>
-                        </p:par>
-                      </p:childTnLst>
-                    </p:cTn>
-                  </p:par>
-                  <p:par>
-                    <p:cTn id="17" fill="hold">
-                      <p:stCondLst>
-                        <p:cond delay="indefinite"/>
-                      </p:stCondLst>
-                      <p:childTnLst>
-                        <p:par>
-                          <p:cTn id="18" fill="hold">
-                            <p:stCondLst>
-                              <p:cond delay="0"/>
-                            </p:stCondLst>
-                            <p:childTnLst>
                               <p:par>
-                                <p:cTn id="19" presetID="1" presetClass="entr" presetSubtype="0" fill="hold" grpId="0" nodeType="clickEffect">
+                                <p:cTn id="19" presetID="1" presetClass="entr" presetSubtype="0" fill="hold" grpId="0" nodeType="withEffect">
                                   <p:stCondLst>
                                     <p:cond delay="0"/>
                                   </p:stCondLst>
@@ -17717,7 +17612,7 @@
                                         <p:tgtEl>
                                           <p:spTgt spid="4">
                                             <p:txEl>
-                                              <p:pRg st="0" end="0"/>
+                                              <p:pRg st="1" end="1"/>
                                             </p:txEl>
                                           </p:spTgt>
                                         </p:tgtEl>
@@ -17748,7 +17643,7 @@
                                         <p:tgtEl>
                                           <p:spTgt spid="4">
                                             <p:txEl>
-                                              <p:pRg st="1" end="1"/>
+                                              <p:pRg st="2" end="2"/>
                                             </p:txEl>
                                           </p:spTgt>
                                         </p:tgtEl>
@@ -17779,7 +17674,7 @@
                                         <p:tgtEl>
                                           <p:spTgt spid="4">
                                             <p:txEl>
-                                              <p:pRg st="2" end="2"/>
+                                              <p:pRg st="3" end="3"/>
                                             </p:txEl>
                                           </p:spTgt>
                                         </p:tgtEl>
@@ -17810,7 +17705,7 @@
                                         <p:tgtEl>
                                           <p:spTgt spid="4">
                                             <p:txEl>
-                                              <p:pRg st="3" end="3"/>
+                                              <p:pRg st="4" end="4"/>
                                             </p:txEl>
                                           </p:spTgt>
                                         </p:tgtEl>
@@ -17841,7 +17736,7 @@
                                         <p:tgtEl>
                                           <p:spTgt spid="4">
                                             <p:txEl>
-                                              <p:pRg st="4" end="4"/>
+                                              <p:pRg st="5" end="5"/>
                                             </p:txEl>
                                           </p:spTgt>
                                         </p:tgtEl>
@@ -17872,7 +17767,7 @@
                                         <p:tgtEl>
                                           <p:spTgt spid="4">
                                             <p:txEl>
-                                              <p:pRg st="5" end="5"/>
+                                              <p:pRg st="6" end="6"/>
                                             </p:txEl>
                                           </p:spTgt>
                                         </p:tgtEl>
@@ -17903,7 +17798,7 @@
                                         <p:tgtEl>
                                           <p:spTgt spid="4">
                                             <p:txEl>
-                                              <p:pRg st="6" end="6"/>
+                                              <p:pRg st="7" end="7"/>
                                             </p:txEl>
                                           </p:spTgt>
                                         </p:tgtEl>
@@ -17934,7 +17829,7 @@
                                         <p:tgtEl>
                                           <p:spTgt spid="4">
                                             <p:txEl>
-                                              <p:pRg st="7" end="7"/>
+                                              <p:pRg st="8" end="8"/>
                                             </p:txEl>
                                           </p:spTgt>
                                         </p:tgtEl>
@@ -17965,7 +17860,7 @@
                                         <p:tgtEl>
                                           <p:spTgt spid="4">
                                             <p:txEl>
-                                              <p:pRg st="8" end="8"/>
+                                              <p:pRg st="9" end="9"/>
                                             </p:txEl>
                                           </p:spTgt>
                                         </p:tgtEl>
@@ -17989,37 +17884,6 @@
                                     <p:set>
                                       <p:cBhvr>
                                         <p:cTn id="38" dur="1" fill="hold">
-                                          <p:stCondLst>
-                                            <p:cond delay="0"/>
-                                          </p:stCondLst>
-                                        </p:cTn>
-                                        <p:tgtEl>
-                                          <p:spTgt spid="4">
-                                            <p:txEl>
-                                              <p:pRg st="9" end="9"/>
-                                            </p:txEl>
-                                          </p:spTgt>
-                                        </p:tgtEl>
-                                        <p:attrNameLst>
-                                          <p:attrName>style.visibility</p:attrName>
-                                        </p:attrNameLst>
-                                      </p:cBhvr>
-                                      <p:to>
-                                        <p:strVal val="visible"/>
-                                      </p:to>
-                                    </p:set>
-                                  </p:childTnLst>
-                                </p:cTn>
-                              </p:par>
-                              <p:par>
-                                <p:cTn id="39" presetID="1" presetClass="entr" presetSubtype="0" fill="hold" grpId="0" nodeType="withEffect">
-                                  <p:stCondLst>
-                                    <p:cond delay="0"/>
-                                  </p:stCondLst>
-                                  <p:childTnLst>
-                                    <p:set>
-                                      <p:cBhvr>
-                                        <p:cTn id="40" dur="1" fill="hold">
                                           <p:stCondLst>
                                             <p:cond delay="0"/>
                                           </p:stCondLst>
@@ -18153,7 +18017,7 @@
     <p:bg>
       <p:bgPr>
         <a:solidFill>
-          <a:schemeClr val="bg1"/>
+          <a:srgbClr val="EAF1F6"/>
         </a:solidFill>
         <a:effectLst/>
       </p:bgPr>
@@ -19840,7 +19704,7 @@
     <p:bg>
       <p:bgPr>
         <a:solidFill>
-          <a:schemeClr val="bg1"/>
+          <a:srgbClr val="EAF1F6"/>
         </a:solidFill>
         <a:effectLst/>
       </p:bgPr>

</xml_diff>

<commit_message>
adding updated presentation and supplemental slides
</commit_message>
<xml_diff>
--- a/Presentation.pptx
+++ b/Presentation.pptx
@@ -5,28 +5,27 @@
     <p:sldMasterId id="2147483648" r:id="rId1"/>
   </p:sldMasterIdLst>
   <p:notesMasterIdLst>
-    <p:notesMasterId r:id="rId21"/>
+    <p:notesMasterId r:id="rId20"/>
   </p:notesMasterIdLst>
   <p:sldIdLst>
     <p:sldId id="256" r:id="rId2"/>
     <p:sldId id="267" r:id="rId3"/>
-    <p:sldId id="268" r:id="rId4"/>
-    <p:sldId id="274" r:id="rId5"/>
-    <p:sldId id="275" r:id="rId6"/>
-    <p:sldId id="257" r:id="rId7"/>
-    <p:sldId id="309" r:id="rId8"/>
-    <p:sldId id="261" r:id="rId9"/>
-    <p:sldId id="278" r:id="rId10"/>
-    <p:sldId id="310" r:id="rId11"/>
-    <p:sldId id="280" r:id="rId12"/>
-    <p:sldId id="295" r:id="rId13"/>
-    <p:sldId id="305" r:id="rId14"/>
-    <p:sldId id="306" r:id="rId15"/>
-    <p:sldId id="307" r:id="rId16"/>
-    <p:sldId id="311" r:id="rId17"/>
-    <p:sldId id="289" r:id="rId18"/>
-    <p:sldId id="312" r:id="rId19"/>
-    <p:sldId id="303" r:id="rId20"/>
+    <p:sldId id="274" r:id="rId4"/>
+    <p:sldId id="275" r:id="rId5"/>
+    <p:sldId id="257" r:id="rId6"/>
+    <p:sldId id="309" r:id="rId7"/>
+    <p:sldId id="261" r:id="rId8"/>
+    <p:sldId id="278" r:id="rId9"/>
+    <p:sldId id="310" r:id="rId10"/>
+    <p:sldId id="280" r:id="rId11"/>
+    <p:sldId id="295" r:id="rId12"/>
+    <p:sldId id="305" r:id="rId13"/>
+    <p:sldId id="306" r:id="rId14"/>
+    <p:sldId id="307" r:id="rId15"/>
+    <p:sldId id="311" r:id="rId16"/>
+    <p:sldId id="289" r:id="rId17"/>
+    <p:sldId id="312" r:id="rId18"/>
+    <p:sldId id="303" r:id="rId19"/>
   </p:sldIdLst>
   <p:sldSz cx="12192000" cy="6858000"/>
   <p:notesSz cx="6858000" cy="9144000"/>
@@ -132,7 +131,6 @@
           <p14:sldIdLst>
             <p14:sldId id="256"/>
             <p14:sldId id="267"/>
-            <p14:sldId id="268"/>
             <p14:sldId id="274"/>
             <p14:sldId id="275"/>
             <p14:sldId id="257"/>
@@ -593,7 +591,7 @@
           <a:p>
             <a:fld id="{7DD90B5D-F117-4387-9A08-B238DF18B47B}" type="slidenum">
               <a:rPr lang="en-US" smtClean="0"/>
-              <a:t>8</a:t>
+              <a:t>7</a:t>
             </a:fld>
             <a:endParaRPr lang="en-US"/>
           </a:p>
@@ -692,7 +690,7 @@
           <a:p>
             <a:fld id="{7DD90B5D-F117-4387-9A08-B238DF18B47B}" type="slidenum">
               <a:rPr lang="en-US" smtClean="0"/>
-              <a:t>9</a:t>
+              <a:t>8</a:t>
             </a:fld>
             <a:endParaRPr lang="en-US"/>
           </a:p>
@@ -779,7 +777,7 @@
           <a:p>
             <a:fld id="{7DD90B5D-F117-4387-9A08-B238DF18B47B}" type="slidenum">
               <a:rPr lang="en-US" smtClean="0"/>
-              <a:t>13</a:t>
+              <a:t>12</a:t>
             </a:fld>
             <a:endParaRPr lang="en-US"/>
           </a:p>
@@ -863,7 +861,7 @@
           <a:p>
             <a:fld id="{7DD90B5D-F117-4387-9A08-B238DF18B47B}" type="slidenum">
               <a:rPr lang="en-US" smtClean="0"/>
-              <a:t>14</a:t>
+              <a:t>13</a:t>
             </a:fld>
             <a:endParaRPr lang="en-US"/>
           </a:p>
@@ -956,7 +954,7 @@
           <a:p>
             <a:fld id="{7DD90B5D-F117-4387-9A08-B238DF18B47B}" type="slidenum">
               <a:rPr lang="en-US" smtClean="0"/>
-              <a:t>15</a:t>
+              <a:t>14</a:t>
             </a:fld>
             <a:endParaRPr lang="en-US"/>
           </a:p>
@@ -1058,6 +1056,9 @@
               <a:t> an innocent defendant may feel pressured to plead rather than risk a much longer sentence at trial</a:t>
             </a:r>
           </a:p>
+          <a:p>
+            <a:endParaRPr lang="en-US" dirty="0"/>
+          </a:p>
         </p:txBody>
       </p:sp>
       <p:sp>
@@ -1077,7 +1078,7 @@
           <a:p>
             <a:fld id="{7DD90B5D-F117-4387-9A08-B238DF18B47B}" type="slidenum">
               <a:rPr lang="en-US" smtClean="0"/>
-              <a:t>17</a:t>
+              <a:t>15</a:t>
             </a:fld>
             <a:endParaRPr lang="en-US"/>
           </a:p>
@@ -1086,7 +1087,7 @@
     </p:spTree>
     <p:extLst>
       <p:ext uri="{BB962C8B-B14F-4D97-AF65-F5344CB8AC3E}">
-        <p14:creationId xmlns:p14="http://schemas.microsoft.com/office/powerpoint/2010/main" val="2296587956"/>
+        <p14:creationId xmlns:p14="http://schemas.microsoft.com/office/powerpoint/2010/main" val="3353782217"/>
       </p:ext>
     </p:extLst>
   </p:cSld>
@@ -1198,7 +1199,128 @@
           <a:p>
             <a:fld id="{7DD90B5D-F117-4387-9A08-B238DF18B47B}" type="slidenum">
               <a:rPr lang="en-US" smtClean="0"/>
-              <a:t>18</a:t>
+              <a:t>16</a:t>
+            </a:fld>
+            <a:endParaRPr lang="en-US"/>
+          </a:p>
+        </p:txBody>
+      </p:sp>
+    </p:spTree>
+    <p:extLst>
+      <p:ext uri="{BB962C8B-B14F-4D97-AF65-F5344CB8AC3E}">
+        <p14:creationId xmlns:p14="http://schemas.microsoft.com/office/powerpoint/2010/main" val="2296587956"/>
+      </p:ext>
+    </p:extLst>
+  </p:cSld>
+  <p:clrMapOvr>
+    <a:masterClrMapping/>
+  </p:clrMapOvr>
+</p:notes>
+</file>
+
+<file path=ppt/notesSlides/notesSlide8.xml><?xml version="1.0" encoding="utf-8"?>
+<p:notes xmlns:a="http://schemas.openxmlformats.org/drawingml/2006/main" xmlns:r="http://schemas.openxmlformats.org/officeDocument/2006/relationships" xmlns:p="http://schemas.openxmlformats.org/presentationml/2006/main">
+  <p:cSld>
+    <p:spTree>
+      <p:nvGrpSpPr>
+        <p:cNvPr id="1" name=""/>
+        <p:cNvGrpSpPr/>
+        <p:nvPr/>
+      </p:nvGrpSpPr>
+      <p:grpSpPr>
+        <a:xfrm>
+          <a:off x="0" y="0"/>
+          <a:ext cx="0" cy="0"/>
+          <a:chOff x="0" y="0"/>
+          <a:chExt cx="0" cy="0"/>
+        </a:xfrm>
+      </p:grpSpPr>
+      <p:sp>
+        <p:nvSpPr>
+          <p:cNvPr id="2" name="Slide Image Placeholder 1"/>
+          <p:cNvSpPr>
+            <a:spLocks noGrp="1" noRot="1" noChangeAspect="1"/>
+          </p:cNvSpPr>
+          <p:nvPr>
+            <p:ph type="sldImg"/>
+          </p:nvPr>
+        </p:nvSpPr>
+        <p:spPr/>
+      </p:sp>
+      <p:sp>
+        <p:nvSpPr>
+          <p:cNvPr id="3" name="Notes Placeholder 2"/>
+          <p:cNvSpPr>
+            <a:spLocks noGrp="1"/>
+          </p:cNvSpPr>
+          <p:nvPr>
+            <p:ph type="body" idx="1"/>
+          </p:nvPr>
+        </p:nvSpPr>
+        <p:spPr/>
+        <p:txBody>
+          <a:bodyPr/>
+          <a:lstStyle/>
+          <a:p>
+            <a:r>
+              <a:rPr lang="en-US" dirty="0"/>
+              <a:t>Judges and juries have less discretion, due to rigid sentencing guidelines</a:t>
+            </a:r>
+          </a:p>
+          <a:p>
+            <a:r>
+              <a:rPr lang="en-US" dirty="0"/>
+              <a:t>Only variance is in what you’re charged with, which is determined by prosecutors</a:t>
+            </a:r>
+          </a:p>
+          <a:p>
+            <a:r>
+              <a:rPr lang="en-US" dirty="0"/>
+              <a:t>They use harsh sentences as bargaining chips to encourage </a:t>
+            </a:r>
+            <a:r>
+              <a:rPr lang="en-US" dirty="0" err="1"/>
+              <a:t>defs</a:t>
+            </a:r>
+            <a:r>
+              <a:rPr lang="en-US" dirty="0"/>
+              <a:t> to plead</a:t>
+            </a:r>
+          </a:p>
+          <a:p>
+            <a:r>
+              <a:rPr lang="en-US" dirty="0"/>
+              <a:t>This can be a problem, </a:t>
+            </a:r>
+            <a:r>
+              <a:rPr lang="en-US" dirty="0" err="1"/>
+              <a:t>bc</a:t>
+            </a:r>
+            <a:r>
+              <a:rPr lang="en-US" dirty="0"/>
+              <a:t> an innocent defendant may feel pressured to plead rather than risk a much longer sentence at trial</a:t>
+            </a:r>
+          </a:p>
+        </p:txBody>
+      </p:sp>
+      <p:sp>
+        <p:nvSpPr>
+          <p:cNvPr id="4" name="Slide Number Placeholder 3"/>
+          <p:cNvSpPr>
+            <a:spLocks noGrp="1"/>
+          </p:cNvSpPr>
+          <p:nvPr>
+            <p:ph type="sldNum" sz="quarter" idx="5"/>
+          </p:nvPr>
+        </p:nvSpPr>
+        <p:spPr/>
+        <p:txBody>
+          <a:bodyPr/>
+          <a:lstStyle/>
+          <a:p>
+            <a:fld id="{7DD90B5D-F117-4387-9A08-B238DF18B47B}" type="slidenum">
+              <a:rPr lang="en-US" smtClean="0"/>
+              <a:t>17</a:t>
             </a:fld>
             <a:endParaRPr lang="en-US"/>
           </a:p>
@@ -5009,1160 +5131,6 @@
     <p:bg>
       <p:bgPr>
         <a:solidFill>
-          <a:srgbClr val="EAF1F6"/>
-        </a:solidFill>
-        <a:effectLst/>
-      </p:bgPr>
-    </p:bg>
-    <p:spTree>
-      <p:nvGrpSpPr>
-        <p:cNvPr id="1" name=""/>
-        <p:cNvGrpSpPr/>
-        <p:nvPr/>
-      </p:nvGrpSpPr>
-      <p:grpSpPr>
-        <a:xfrm>
-          <a:off x="0" y="0"/>
-          <a:ext cx="0" cy="0"/>
-          <a:chOff x="0" y="0"/>
-          <a:chExt cx="0" cy="0"/>
-        </a:xfrm>
-      </p:grpSpPr>
-      <p:sp useBgFill="1">
-        <p:nvSpPr>
-          <p:cNvPr id="27" name="Rectangle 26">
-            <a:extLst>
-              <a:ext uri="{FF2B5EF4-FFF2-40B4-BE49-F238E27FC236}">
-                <a16:creationId xmlns:a16="http://schemas.microsoft.com/office/drawing/2014/main" id="{C475749F-F487-4EFB-ABC7-C1359590EB76}"/>
-              </a:ext>
-              <a:ext uri="{C183D7F6-B498-43B3-948B-1728B52AA6E4}">
-                <adec:decorative xmlns:adec="http://schemas.microsoft.com/office/drawing/2017/decorative" val="1"/>
-              </a:ext>
-            </a:extLst>
-          </p:cNvPr>
-          <p:cNvSpPr>
-            <a:spLocks noGrp="1" noRot="1" noChangeAspect="1" noMove="1" noResize="1" noEditPoints="1" noAdjustHandles="1" noChangeArrowheads="1" noChangeShapeType="1" noTextEdit="1"/>
-          </p:cNvSpPr>
-          <p:nvPr>
-            <p:extLst>
-              <p:ext uri="{386F3935-93C4-4BCD-93E2-E3B085C9AB24}">
-                <p16:designElem xmlns:p16="http://schemas.microsoft.com/office/powerpoint/2015/main" val="1"/>
-              </p:ext>
-            </p:extLst>
-          </p:nvPr>
-        </p:nvSpPr>
-        <p:spPr>
-          <a:xfrm>
-            <a:off x="0" y="0"/>
-            <a:ext cx="12192000" cy="6858000"/>
-          </a:xfrm>
-          <a:prstGeom prst="rect">
-            <a:avLst/>
-          </a:prstGeom>
-          <a:ln>
-            <a:noFill/>
-          </a:ln>
-        </p:spPr>
-        <p:style>
-          <a:lnRef idx="2">
-            <a:schemeClr val="accent1">
-              <a:shade val="50000"/>
-            </a:schemeClr>
-          </a:lnRef>
-          <a:fillRef idx="1">
-            <a:schemeClr val="accent1"/>
-          </a:fillRef>
-          <a:effectRef idx="0">
-            <a:schemeClr val="accent1"/>
-          </a:effectRef>
-          <a:fontRef idx="minor">
-            <a:schemeClr val="lt1"/>
-          </a:fontRef>
-        </p:style>
-        <p:txBody>
-          <a:bodyPr rtlCol="0" anchor="ctr"/>
-          <a:lstStyle/>
-          <a:p>
-            <a:pPr algn="ctr"/>
-            <a:endParaRPr lang="en-US"/>
-          </a:p>
-        </p:txBody>
-      </p:sp>
-      <p:sp>
-        <p:nvSpPr>
-          <p:cNvPr id="29" name="Freeform 5">
-            <a:extLst>
-              <a:ext uri="{FF2B5EF4-FFF2-40B4-BE49-F238E27FC236}">
-                <a16:creationId xmlns:a16="http://schemas.microsoft.com/office/drawing/2014/main" id="{F6285A5F-6712-47A0-8A11-F0DFF60D0D20}"/>
-              </a:ext>
-              <a:ext uri="{C183D7F6-B498-43B3-948B-1728B52AA6E4}">
-                <adec:decorative xmlns:adec="http://schemas.microsoft.com/office/drawing/2017/decorative" val="1"/>
-              </a:ext>
-            </a:extLst>
-          </p:cNvPr>
-          <p:cNvSpPr>
-            <a:spLocks noGrp="1" noRot="1" noChangeAspect="1" noMove="1" noResize="1" noEditPoints="1" noAdjustHandles="1" noChangeArrowheads="1" noChangeShapeType="1" noTextEdit="1"/>
-          </p:cNvSpPr>
-          <p:nvPr>
-            <p:extLst>
-              <p:ext uri="{386F3935-93C4-4BCD-93E2-E3B085C9AB24}">
-                <p16:designElem xmlns:p16="http://schemas.microsoft.com/office/powerpoint/2015/main" val="1"/>
-              </p:ext>
-            </p:extLst>
-          </p:nvPr>
-        </p:nvSpPr>
-        <p:spPr bwMode="auto">
-          <a:xfrm>
-            <a:off x="7276856" y="1645695"/>
-            <a:ext cx="4418320" cy="3877280"/>
-          </a:xfrm>
-          <a:custGeom>
-            <a:avLst/>
-            <a:gdLst>
-              <a:gd name="T0" fmla="*/ 781 w 1099"/>
-              <a:gd name="T1" fmla="*/ 0 h 968"/>
-              <a:gd name="T2" fmla="*/ 318 w 1099"/>
-              <a:gd name="T3" fmla="*/ 0 h 968"/>
-              <a:gd name="T4" fmla="*/ 246 w 1099"/>
-              <a:gd name="T5" fmla="*/ 42 h 968"/>
-              <a:gd name="T6" fmla="*/ 15 w 1099"/>
-              <a:gd name="T7" fmla="*/ 443 h 968"/>
-              <a:gd name="T8" fmla="*/ 15 w 1099"/>
-              <a:gd name="T9" fmla="*/ 525 h 968"/>
-              <a:gd name="T10" fmla="*/ 246 w 1099"/>
-              <a:gd name="T11" fmla="*/ 926 h 968"/>
-              <a:gd name="T12" fmla="*/ 318 w 1099"/>
-              <a:gd name="T13" fmla="*/ 968 h 968"/>
-              <a:gd name="T14" fmla="*/ 781 w 1099"/>
-              <a:gd name="T15" fmla="*/ 968 h 968"/>
-              <a:gd name="T16" fmla="*/ 852 w 1099"/>
-              <a:gd name="T17" fmla="*/ 926 h 968"/>
-              <a:gd name="T18" fmla="*/ 1084 w 1099"/>
-              <a:gd name="T19" fmla="*/ 525 h 968"/>
-              <a:gd name="T20" fmla="*/ 1084 w 1099"/>
-              <a:gd name="T21" fmla="*/ 443 h 968"/>
-              <a:gd name="T22" fmla="*/ 852 w 1099"/>
-              <a:gd name="T23" fmla="*/ 42 h 968"/>
-              <a:gd name="T24" fmla="*/ 781 w 1099"/>
-              <a:gd name="T25" fmla="*/ 0 h 968"/>
-            </a:gdLst>
-            <a:ahLst/>
-            <a:cxnLst>
-              <a:cxn ang="0">
-                <a:pos x="T0" y="T1"/>
-              </a:cxn>
-              <a:cxn ang="0">
-                <a:pos x="T2" y="T3"/>
-              </a:cxn>
-              <a:cxn ang="0">
-                <a:pos x="T4" y="T5"/>
-              </a:cxn>
-              <a:cxn ang="0">
-                <a:pos x="T6" y="T7"/>
-              </a:cxn>
-              <a:cxn ang="0">
-                <a:pos x="T8" y="T9"/>
-              </a:cxn>
-              <a:cxn ang="0">
-                <a:pos x="T10" y="T11"/>
-              </a:cxn>
-              <a:cxn ang="0">
-                <a:pos x="T12" y="T13"/>
-              </a:cxn>
-              <a:cxn ang="0">
-                <a:pos x="T14" y="T15"/>
-              </a:cxn>
-              <a:cxn ang="0">
-                <a:pos x="T16" y="T17"/>
-              </a:cxn>
-              <a:cxn ang="0">
-                <a:pos x="T18" y="T19"/>
-              </a:cxn>
-              <a:cxn ang="0">
-                <a:pos x="T20" y="T21"/>
-              </a:cxn>
-              <a:cxn ang="0">
-                <a:pos x="T22" y="T23"/>
-              </a:cxn>
-              <a:cxn ang="0">
-                <a:pos x="T24" y="T25"/>
-              </a:cxn>
-            </a:cxnLst>
-            <a:rect l="0" t="0" r="r" b="b"/>
-            <a:pathLst>
-              <a:path w="1099" h="968">
-                <a:moveTo>
-                  <a:pt x="781" y="0"/>
-                </a:moveTo>
-                <a:cubicBezTo>
-                  <a:pt x="318" y="0"/>
-                  <a:pt x="318" y="0"/>
-                  <a:pt x="318" y="0"/>
-                </a:cubicBezTo>
-                <a:cubicBezTo>
-                  <a:pt x="288" y="0"/>
-                  <a:pt x="261" y="16"/>
-                  <a:pt x="246" y="42"/>
-                </a:cubicBezTo>
-                <a:cubicBezTo>
-                  <a:pt x="15" y="443"/>
-                  <a:pt x="15" y="443"/>
-                  <a:pt x="15" y="443"/>
-                </a:cubicBezTo>
-                <a:cubicBezTo>
-                  <a:pt x="0" y="468"/>
-                  <a:pt x="0" y="500"/>
-                  <a:pt x="15" y="525"/>
-                </a:cubicBezTo>
-                <a:cubicBezTo>
-                  <a:pt x="246" y="926"/>
-                  <a:pt x="246" y="926"/>
-                  <a:pt x="246" y="926"/>
-                </a:cubicBezTo>
-                <a:cubicBezTo>
-                  <a:pt x="261" y="952"/>
-                  <a:pt x="288" y="968"/>
-                  <a:pt x="318" y="968"/>
-                </a:cubicBezTo>
-                <a:cubicBezTo>
-                  <a:pt x="781" y="968"/>
-                  <a:pt x="781" y="968"/>
-                  <a:pt x="781" y="968"/>
-                </a:cubicBezTo>
-                <a:cubicBezTo>
-                  <a:pt x="810" y="968"/>
-                  <a:pt x="838" y="952"/>
-                  <a:pt x="852" y="926"/>
-                </a:cubicBezTo>
-                <a:cubicBezTo>
-                  <a:pt x="1084" y="525"/>
-                  <a:pt x="1084" y="525"/>
-                  <a:pt x="1084" y="525"/>
-                </a:cubicBezTo>
-                <a:cubicBezTo>
-                  <a:pt x="1099" y="500"/>
-                  <a:pt x="1099" y="468"/>
-                  <a:pt x="1084" y="443"/>
-                </a:cubicBezTo>
-                <a:cubicBezTo>
-                  <a:pt x="852" y="42"/>
-                  <a:pt x="852" y="42"/>
-                  <a:pt x="852" y="42"/>
-                </a:cubicBezTo>
-                <a:cubicBezTo>
-                  <a:pt x="838" y="16"/>
-                  <a:pt x="810" y="0"/>
-                  <a:pt x="781" y="0"/>
-                </a:cubicBezTo>
-                <a:close/>
-              </a:path>
-            </a:pathLst>
-          </a:custGeom>
-          <a:noFill/>
-          <a:ln w="50800" cap="flat">
-            <a:solidFill>
-              <a:schemeClr val="tx1"/>
-            </a:solidFill>
-            <a:prstDash val="solid"/>
-            <a:miter lim="800000"/>
-            <a:headEnd/>
-            <a:tailEnd/>
-          </a:ln>
-        </p:spPr>
-        <p:txBody>
-          <a:bodyPr vert="horz" wrap="square" lIns="91440" tIns="45720" rIns="91440" bIns="45720" numCol="1" anchor="t" anchorCtr="0" compatLnSpc="1">
-            <a:prstTxWarp prst="textNoShape">
-              <a:avLst/>
-            </a:prstTxWarp>
-          </a:bodyPr>
-          <a:lstStyle/>
-          <a:p>
-            <a:endParaRPr lang="en-US" dirty="0"/>
-          </a:p>
-        </p:txBody>
-      </p:sp>
-      <p:sp>
-        <p:nvSpPr>
-          <p:cNvPr id="31" name="Freeform: Shape 30">
-            <a:extLst>
-              <a:ext uri="{FF2B5EF4-FFF2-40B4-BE49-F238E27FC236}">
-                <a16:creationId xmlns:a16="http://schemas.microsoft.com/office/drawing/2014/main" id="{FA6F8ABB-6C5D-4349-9E1B-198D1ABFA804}"/>
-              </a:ext>
-              <a:ext uri="{C183D7F6-B498-43B3-948B-1728B52AA6E4}">
-                <adec:decorative xmlns:adec="http://schemas.microsoft.com/office/drawing/2017/decorative" val="1"/>
-              </a:ext>
-            </a:extLst>
-          </p:cNvPr>
-          <p:cNvSpPr>
-            <a:spLocks noGrp="1" noRot="1" noChangeAspect="1" noMove="1" noResize="1" noEditPoints="1" noAdjustHandles="1" noChangeArrowheads="1" noChangeShapeType="1" noTextEdit="1"/>
-          </p:cNvSpPr>
-          <p:nvPr>
-            <p:extLst>
-              <p:ext uri="{386F3935-93C4-4BCD-93E2-E3B085C9AB24}">
-                <p16:designElem xmlns:p16="http://schemas.microsoft.com/office/powerpoint/2015/main" val="1"/>
-              </p:ext>
-            </p:extLst>
-          </p:nvPr>
-        </p:nvSpPr>
-        <p:spPr>
-          <a:xfrm>
-            <a:off x="5952343" y="643383"/>
-            <a:ext cx="2926988" cy="2594434"/>
-          </a:xfrm>
-          <a:custGeom>
-            <a:avLst/>
-            <a:gdLst>
-              <a:gd name="connsiteX0" fmla="*/ 853538 w 2991693"/>
-              <a:gd name="connsiteY0" fmla="*/ 0 h 2651787"/>
-              <a:gd name="connsiteX1" fmla="*/ 2141030 w 2991693"/>
-              <a:gd name="connsiteY1" fmla="*/ 0 h 2651787"/>
-              <a:gd name="connsiteX2" fmla="*/ 2324957 w 2991693"/>
-              <a:gd name="connsiteY2" fmla="*/ 103466 h 2651787"/>
-              <a:gd name="connsiteX3" fmla="*/ 2968702 w 2991693"/>
-              <a:gd name="connsiteY3" fmla="*/ 1218596 h 2651787"/>
-              <a:gd name="connsiteX4" fmla="*/ 2968702 w 2991693"/>
-              <a:gd name="connsiteY4" fmla="*/ 1433192 h 2651787"/>
-              <a:gd name="connsiteX5" fmla="*/ 2324957 w 2991693"/>
-              <a:gd name="connsiteY5" fmla="*/ 2548321 h 2651787"/>
-              <a:gd name="connsiteX6" fmla="*/ 2141030 w 2991693"/>
-              <a:gd name="connsiteY6" fmla="*/ 2651787 h 2651787"/>
-              <a:gd name="connsiteX7" fmla="*/ 853538 w 2991693"/>
-              <a:gd name="connsiteY7" fmla="*/ 2651787 h 2651787"/>
-              <a:gd name="connsiteX8" fmla="*/ 669612 w 2991693"/>
-              <a:gd name="connsiteY8" fmla="*/ 2548321 h 2651787"/>
-              <a:gd name="connsiteX9" fmla="*/ 25866 w 2991693"/>
-              <a:gd name="connsiteY9" fmla="*/ 1433192 h 2651787"/>
-              <a:gd name="connsiteX10" fmla="*/ 25866 w 2991693"/>
-              <a:gd name="connsiteY10" fmla="*/ 1218596 h 2651787"/>
-              <a:gd name="connsiteX11" fmla="*/ 669612 w 2991693"/>
-              <a:gd name="connsiteY11" fmla="*/ 103466 h 2651787"/>
-              <a:gd name="connsiteX12" fmla="*/ 853538 w 2991693"/>
-              <a:gd name="connsiteY12" fmla="*/ 0 h 2651787"/>
-            </a:gdLst>
-            <a:ahLst/>
-            <a:cxnLst>
-              <a:cxn ang="0">
-                <a:pos x="connsiteX0" y="connsiteY0"/>
-              </a:cxn>
-              <a:cxn ang="0">
-                <a:pos x="connsiteX1" y="connsiteY1"/>
-              </a:cxn>
-              <a:cxn ang="0">
-                <a:pos x="connsiteX2" y="connsiteY2"/>
-              </a:cxn>
-              <a:cxn ang="0">
-                <a:pos x="connsiteX3" y="connsiteY3"/>
-              </a:cxn>
-              <a:cxn ang="0">
-                <a:pos x="connsiteX4" y="connsiteY4"/>
-              </a:cxn>
-              <a:cxn ang="0">
-                <a:pos x="connsiteX5" y="connsiteY5"/>
-              </a:cxn>
-              <a:cxn ang="0">
-                <a:pos x="connsiteX6" y="connsiteY6"/>
-              </a:cxn>
-              <a:cxn ang="0">
-                <a:pos x="connsiteX7" y="connsiteY7"/>
-              </a:cxn>
-              <a:cxn ang="0">
-                <a:pos x="connsiteX8" y="connsiteY8"/>
-              </a:cxn>
-              <a:cxn ang="0">
-                <a:pos x="connsiteX9" y="connsiteY9"/>
-              </a:cxn>
-              <a:cxn ang="0">
-                <a:pos x="connsiteX10" y="connsiteY10"/>
-              </a:cxn>
-              <a:cxn ang="0">
-                <a:pos x="connsiteX11" y="connsiteY11"/>
-              </a:cxn>
-              <a:cxn ang="0">
-                <a:pos x="connsiteX12" y="connsiteY12"/>
-              </a:cxn>
-            </a:cxnLst>
-            <a:rect l="l" t="t" r="r" b="b"/>
-            <a:pathLst>
-              <a:path w="2991693" h="2651787">
-                <a:moveTo>
-                  <a:pt x="853538" y="0"/>
-                </a:moveTo>
-                <a:cubicBezTo>
-                  <a:pt x="2141030" y="0"/>
-                  <a:pt x="2141030" y="0"/>
-                  <a:pt x="2141030" y="0"/>
-                </a:cubicBezTo>
-                <a:cubicBezTo>
-                  <a:pt x="2206170" y="0"/>
-                  <a:pt x="2290471" y="45985"/>
-                  <a:pt x="2324957" y="103466"/>
-                </a:cubicBezTo>
-                <a:cubicBezTo>
-                  <a:pt x="2968702" y="1218596"/>
-                  <a:pt x="2968702" y="1218596"/>
-                  <a:pt x="2968702" y="1218596"/>
-                </a:cubicBezTo>
-                <a:cubicBezTo>
-                  <a:pt x="2999357" y="1279909"/>
-                  <a:pt x="2999357" y="1371878"/>
-                  <a:pt x="2968702" y="1433192"/>
-                </a:cubicBezTo>
-                <a:cubicBezTo>
-                  <a:pt x="2324957" y="2548321"/>
-                  <a:pt x="2324957" y="2548321"/>
-                  <a:pt x="2324957" y="2548321"/>
-                </a:cubicBezTo>
-                <a:cubicBezTo>
-                  <a:pt x="2290471" y="2605803"/>
-                  <a:pt x="2206170" y="2651787"/>
-                  <a:pt x="2141030" y="2651787"/>
-                </a:cubicBezTo>
-                <a:lnTo>
-                  <a:pt x="853538" y="2651787"/>
-                </a:lnTo>
-                <a:cubicBezTo>
-                  <a:pt x="784566" y="2651787"/>
-                  <a:pt x="700266" y="2605803"/>
-                  <a:pt x="669612" y="2548321"/>
-                </a:cubicBezTo>
-                <a:cubicBezTo>
-                  <a:pt x="25866" y="1433192"/>
-                  <a:pt x="25866" y="1433192"/>
-                  <a:pt x="25866" y="1433192"/>
-                </a:cubicBezTo>
-                <a:cubicBezTo>
-                  <a:pt x="-8621" y="1371878"/>
-                  <a:pt x="-8621" y="1279909"/>
-                  <a:pt x="25866" y="1218596"/>
-                </a:cubicBezTo>
-                <a:cubicBezTo>
-                  <a:pt x="669612" y="103466"/>
-                  <a:pt x="669612" y="103466"/>
-                  <a:pt x="669612" y="103466"/>
-                </a:cubicBezTo>
-                <a:cubicBezTo>
-                  <a:pt x="700266" y="45985"/>
-                  <a:pt x="784566" y="0"/>
-                  <a:pt x="853538" y="0"/>
-                </a:cubicBezTo>
-                <a:close/>
-              </a:path>
-            </a:pathLst>
-          </a:custGeom>
-          <a:solidFill>
-            <a:schemeClr val="tx1"/>
-          </a:solidFill>
-          <a:ln w="50800">
-            <a:noFill/>
-          </a:ln>
-        </p:spPr>
-        <p:style>
-          <a:lnRef idx="2">
-            <a:schemeClr val="accent1">
-              <a:shade val="50000"/>
-            </a:schemeClr>
-          </a:lnRef>
-          <a:fillRef idx="1">
-            <a:schemeClr val="accent1"/>
-          </a:fillRef>
-          <a:effectRef idx="0">
-            <a:schemeClr val="accent1"/>
-          </a:effectRef>
-          <a:fontRef idx="minor">
-            <a:schemeClr val="lt1"/>
-          </a:fontRef>
-        </p:style>
-        <p:txBody>
-          <a:bodyPr wrap="square" rtlCol="0" anchor="ctr">
-            <a:noAutofit/>
-          </a:bodyPr>
-          <a:lstStyle/>
-          <a:p>
-            <a:pPr algn="ctr"/>
-            <a:endParaRPr lang="en-US" dirty="0"/>
-          </a:p>
-        </p:txBody>
-      </p:sp>
-      <p:sp>
-        <p:nvSpPr>
-          <p:cNvPr id="33" name="Freeform: Shape 32">
-            <a:extLst>
-              <a:ext uri="{FF2B5EF4-FFF2-40B4-BE49-F238E27FC236}">
-                <a16:creationId xmlns:a16="http://schemas.microsoft.com/office/drawing/2014/main" id="{B971ABA8-4CDB-4EEE-8C48-AA4FDB650782}"/>
-              </a:ext>
-              <a:ext uri="{C183D7F6-B498-43B3-948B-1728B52AA6E4}">
-                <adec:decorative xmlns:adec="http://schemas.microsoft.com/office/drawing/2017/decorative" val="1"/>
-              </a:ext>
-            </a:extLst>
-          </p:cNvPr>
-          <p:cNvSpPr>
-            <a:spLocks noGrp="1" noRot="1" noChangeAspect="1" noMove="1" noResize="1" noEditPoints="1" noAdjustHandles="1" noChangeArrowheads="1" noChangeShapeType="1" noTextEdit="1"/>
-          </p:cNvSpPr>
-          <p:nvPr>
-            <p:extLst>
-              <p:ext uri="{386F3935-93C4-4BCD-93E2-E3B085C9AB24}">
-                <p16:designElem xmlns:p16="http://schemas.microsoft.com/office/powerpoint/2015/main" val="1"/>
-              </p:ext>
-            </p:extLst>
-          </p:nvPr>
-        </p:nvSpPr>
-        <p:spPr>
-          <a:xfrm>
-            <a:off x="3" y="2071858"/>
-            <a:ext cx="8109718" cy="4786143"/>
-          </a:xfrm>
-          <a:custGeom>
-            <a:avLst/>
-            <a:gdLst>
-              <a:gd name="connsiteX0" fmla="*/ 7381313 w 8109718"/>
-              <a:gd name="connsiteY0" fmla="*/ 1839459 h 4786143"/>
-              <a:gd name="connsiteX1" fmla="*/ 7381313 w 8109718"/>
-              <a:gd name="connsiteY1" fmla="*/ 1853646 h 4786143"/>
-              <a:gd name="connsiteX2" fmla="*/ 7379359 w 8109718"/>
-              <a:gd name="connsiteY2" fmla="*/ 1846552 h 4786143"/>
-              <a:gd name="connsiteX3" fmla="*/ 1321854 w 8109718"/>
-              <a:gd name="connsiteY3" fmla="*/ 0 h 4786143"/>
-              <a:gd name="connsiteX4" fmla="*/ 5365317 w 8109718"/>
-              <a:gd name="connsiteY4" fmla="*/ 0 h 4786143"/>
-              <a:gd name="connsiteX5" fmla="*/ 5985373 w 8109718"/>
-              <a:gd name="connsiteY5" fmla="*/ 365439 h 4786143"/>
-              <a:gd name="connsiteX6" fmla="*/ 8011470 w 8109718"/>
-              <a:gd name="connsiteY6" fmla="*/ 3854515 h 4786143"/>
-              <a:gd name="connsiteX7" fmla="*/ 8011470 w 8109718"/>
-              <a:gd name="connsiteY7" fmla="*/ 4567993 h 4786143"/>
-              <a:gd name="connsiteX8" fmla="*/ 7904625 w 8109718"/>
-              <a:gd name="connsiteY8" fmla="*/ 4751987 h 4786143"/>
-              <a:gd name="connsiteX9" fmla="*/ 7884791 w 8109718"/>
-              <a:gd name="connsiteY9" fmla="*/ 4786143 h 4786143"/>
-              <a:gd name="connsiteX10" fmla="*/ 0 w 8109718"/>
-              <a:gd name="connsiteY10" fmla="*/ 4786143 h 4786143"/>
-              <a:gd name="connsiteX11" fmla="*/ 0 w 8109718"/>
-              <a:gd name="connsiteY11" fmla="*/ 1564110 h 4786143"/>
-              <a:gd name="connsiteX12" fmla="*/ 27177 w 8109718"/>
-              <a:gd name="connsiteY12" fmla="*/ 1517107 h 4786143"/>
-              <a:gd name="connsiteX13" fmla="*/ 693065 w 8109718"/>
-              <a:gd name="connsiteY13" fmla="*/ 365439 h 4786143"/>
-              <a:gd name="connsiteX14" fmla="*/ 1321854 w 8109718"/>
-              <a:gd name="connsiteY14" fmla="*/ 0 h 4786143"/>
-            </a:gdLst>
-            <a:ahLst/>
-            <a:cxnLst>
-              <a:cxn ang="0">
-                <a:pos x="connsiteX0" y="connsiteY0"/>
-              </a:cxn>
-              <a:cxn ang="0">
-                <a:pos x="connsiteX1" y="connsiteY1"/>
-              </a:cxn>
-              <a:cxn ang="0">
-                <a:pos x="connsiteX2" y="connsiteY2"/>
-              </a:cxn>
-              <a:cxn ang="0">
-                <a:pos x="connsiteX3" y="connsiteY3"/>
-              </a:cxn>
-              <a:cxn ang="0">
-                <a:pos x="connsiteX4" y="connsiteY4"/>
-              </a:cxn>
-              <a:cxn ang="0">
-                <a:pos x="connsiteX5" y="connsiteY5"/>
-              </a:cxn>
-              <a:cxn ang="0">
-                <a:pos x="connsiteX6" y="connsiteY6"/>
-              </a:cxn>
-              <a:cxn ang="0">
-                <a:pos x="connsiteX7" y="connsiteY7"/>
-              </a:cxn>
-              <a:cxn ang="0">
-                <a:pos x="connsiteX8" y="connsiteY8"/>
-              </a:cxn>
-              <a:cxn ang="0">
-                <a:pos x="connsiteX9" y="connsiteY9"/>
-              </a:cxn>
-              <a:cxn ang="0">
-                <a:pos x="connsiteX10" y="connsiteY10"/>
-              </a:cxn>
-              <a:cxn ang="0">
-                <a:pos x="connsiteX11" y="connsiteY11"/>
-              </a:cxn>
-              <a:cxn ang="0">
-                <a:pos x="connsiteX12" y="connsiteY12"/>
-              </a:cxn>
-              <a:cxn ang="0">
-                <a:pos x="connsiteX13" y="connsiteY13"/>
-              </a:cxn>
-              <a:cxn ang="0">
-                <a:pos x="connsiteX14" y="connsiteY14"/>
-              </a:cxn>
-            </a:cxnLst>
-            <a:rect l="l" t="t" r="r" b="b"/>
-            <a:pathLst>
-              <a:path w="8109718" h="4786143">
-                <a:moveTo>
-                  <a:pt x="7381313" y="1839459"/>
-                </a:moveTo>
-                <a:lnTo>
-                  <a:pt x="7381313" y="1853646"/>
-                </a:lnTo>
-                <a:lnTo>
-                  <a:pt x="7379359" y="1846552"/>
-                </a:lnTo>
-                <a:close/>
-                <a:moveTo>
-                  <a:pt x="1321854" y="0"/>
-                </a:moveTo>
-                <a:cubicBezTo>
-                  <a:pt x="1321854" y="0"/>
-                  <a:pt x="1321854" y="0"/>
-                  <a:pt x="5365317" y="0"/>
-                </a:cubicBezTo>
-                <a:cubicBezTo>
-                  <a:pt x="5618580" y="0"/>
-                  <a:pt x="5863108" y="139215"/>
-                  <a:pt x="5985373" y="365439"/>
-                </a:cubicBezTo>
-                <a:cubicBezTo>
-                  <a:pt x="5985373" y="365439"/>
-                  <a:pt x="5985373" y="365439"/>
-                  <a:pt x="8011470" y="3854515"/>
-                </a:cubicBezTo>
-                <a:cubicBezTo>
-                  <a:pt x="8142468" y="4072039"/>
-                  <a:pt x="8142468" y="4350470"/>
-                  <a:pt x="8011470" y="4567993"/>
-                </a:cubicBezTo>
-                <a:cubicBezTo>
-                  <a:pt x="8011470" y="4567993"/>
-                  <a:pt x="8011470" y="4567993"/>
-                  <a:pt x="7904625" y="4751987"/>
-                </a:cubicBezTo>
-                <a:lnTo>
-                  <a:pt x="7884791" y="4786143"/>
-                </a:lnTo>
-                <a:lnTo>
-                  <a:pt x="0" y="4786143"/>
-                </a:lnTo>
-                <a:lnTo>
-                  <a:pt x="0" y="1564110"/>
-                </a:lnTo>
-                <a:lnTo>
-                  <a:pt x="27177" y="1517107"/>
-                </a:lnTo>
-                <a:cubicBezTo>
-                  <a:pt x="220245" y="1183191"/>
-                  <a:pt x="440895" y="801574"/>
-                  <a:pt x="693065" y="365439"/>
-                </a:cubicBezTo>
-                <a:cubicBezTo>
-                  <a:pt x="824063" y="139215"/>
-                  <a:pt x="1059859" y="0"/>
-                  <a:pt x="1321854" y="0"/>
-                </a:cubicBezTo>
-                <a:close/>
-              </a:path>
-            </a:pathLst>
-          </a:custGeom>
-          <a:solidFill>
-            <a:schemeClr val="tx1">
-              <a:lumMod val="85000"/>
-              <a:lumOff val="15000"/>
-              <a:alpha val="99000"/>
-            </a:schemeClr>
-          </a:solidFill>
-          <a:ln>
-            <a:noFill/>
-          </a:ln>
-        </p:spPr>
-        <p:style>
-          <a:lnRef idx="2">
-            <a:schemeClr val="accent1">
-              <a:shade val="50000"/>
-            </a:schemeClr>
-          </a:lnRef>
-          <a:fillRef idx="1">
-            <a:schemeClr val="accent1"/>
-          </a:fillRef>
-          <a:effectRef idx="0">
-            <a:schemeClr val="accent1"/>
-          </a:effectRef>
-          <a:fontRef idx="minor">
-            <a:schemeClr val="lt1"/>
-          </a:fontRef>
-        </p:style>
-        <p:txBody>
-          <a:bodyPr wrap="square" rtlCol="0" anchor="ctr">
-            <a:noAutofit/>
-          </a:bodyPr>
-          <a:lstStyle/>
-          <a:p>
-            <a:pPr algn="ctr"/>
-            <a:endParaRPr lang="en-US"/>
-          </a:p>
-        </p:txBody>
-      </p:sp>
-      <p:sp>
-        <p:nvSpPr>
-          <p:cNvPr id="4" name="Title 3">
-            <a:extLst>
-              <a:ext uri="{FF2B5EF4-FFF2-40B4-BE49-F238E27FC236}">
-                <a16:creationId xmlns:a16="http://schemas.microsoft.com/office/drawing/2014/main" id="{BB2A1168-7759-4137-9142-9990CD1097B1}"/>
-              </a:ext>
-            </a:extLst>
-          </p:cNvPr>
-          <p:cNvSpPr>
-            <a:spLocks noGrp="1"/>
-          </p:cNvSpPr>
-          <p:nvPr>
-            <p:ph type="ctrTitle"/>
-          </p:nvPr>
-        </p:nvSpPr>
-        <p:spPr>
-          <a:xfrm>
-            <a:off x="880281" y="2961564"/>
-            <a:ext cx="5713024" cy="3268639"/>
-          </a:xfrm>
-        </p:spPr>
-        <p:txBody>
-          <a:bodyPr anchor="ctr">
-            <a:normAutofit/>
-          </a:bodyPr>
-          <a:lstStyle/>
-          <a:p>
-            <a:pPr algn="l"/>
-            <a:r>
-              <a:rPr lang="en-US" sz="5000" dirty="0">
-                <a:solidFill>
-                  <a:schemeClr val="bg1"/>
-                </a:solidFill>
-              </a:rPr>
-              <a:t>Sentence Enhancements &amp; Mitigation Measures</a:t>
-            </a:r>
-          </a:p>
-        </p:txBody>
-      </p:sp>
-      <p:grpSp>
-        <p:nvGrpSpPr>
-          <p:cNvPr id="35" name="Group 34">
-            <a:extLst>
-              <a:ext uri="{FF2B5EF4-FFF2-40B4-BE49-F238E27FC236}">
-                <a16:creationId xmlns:a16="http://schemas.microsoft.com/office/drawing/2014/main" id="{DAD463E1-6621-44B4-A995-C70A4631D388}"/>
-              </a:ext>
-              <a:ext uri="{C183D7F6-B498-43B3-948B-1728B52AA6E4}">
-                <adec:decorative xmlns:adec="http://schemas.microsoft.com/office/drawing/2017/decorative" val="1"/>
-              </a:ext>
-            </a:extLst>
-          </p:cNvPr>
-          <p:cNvGrpSpPr>
-            <a:grpSpLocks noGrp="1" noUngrp="1" noRot="1" noChangeAspect="1" noMove="1" noResize="1"/>
-          </p:cNvGrpSpPr>
-          <p:nvPr>
-            <p:extLst>
-              <p:ext uri="{386F3935-93C4-4BCD-93E2-E3B085C9AB24}">
-                <p16:designElem xmlns:p16="http://schemas.microsoft.com/office/powerpoint/2015/main" val="1"/>
-              </p:ext>
-            </p:extLst>
-          </p:nvPr>
-        </p:nvGrpSpPr>
-        <p:grpSpPr>
-          <a:xfrm>
-            <a:off x="5307830" y="385730"/>
-            <a:ext cx="1128382" cy="847206"/>
-            <a:chOff x="5307830" y="325570"/>
-            <a:chExt cx="1128382" cy="847206"/>
-          </a:xfrm>
-        </p:grpSpPr>
-        <p:sp>
-          <p:nvSpPr>
-            <p:cNvPr id="36" name="Freeform 5">
-              <a:extLst>
-                <a:ext uri="{FF2B5EF4-FFF2-40B4-BE49-F238E27FC236}">
-                  <a16:creationId xmlns:a16="http://schemas.microsoft.com/office/drawing/2014/main" id="{A152F29E-C625-4313-96BF-5675B357C03A}"/>
-                </a:ext>
-                <a:ext uri="{C183D7F6-B498-43B3-948B-1728B52AA6E4}">
-                  <adec:decorative xmlns:adec="http://schemas.microsoft.com/office/drawing/2017/decorative" val="1"/>
-                </a:ext>
-              </a:extLst>
-            </p:cNvPr>
-            <p:cNvSpPr>
-              <a:spLocks/>
-            </p:cNvSpPr>
-            <p:nvPr>
-              <p:extLst>
-                <p:ext uri="{386F3935-93C4-4BCD-93E2-E3B085C9AB24}">
-                  <p16:designElem xmlns:p16="http://schemas.microsoft.com/office/powerpoint/2015/main" val="1"/>
-                </p:ext>
-              </p:extLst>
-            </p:nvPr>
-          </p:nvSpPr>
-          <p:spPr bwMode="auto">
-            <a:xfrm>
-              <a:off x="5307830" y="577396"/>
-              <a:ext cx="675351" cy="595380"/>
-            </a:xfrm>
-            <a:custGeom>
-              <a:avLst/>
-              <a:gdLst>
-                <a:gd name="T0" fmla="*/ 225 w 785"/>
-                <a:gd name="T1" fmla="*/ 692 h 692"/>
-                <a:gd name="T2" fmla="*/ 177 w 785"/>
-                <a:gd name="T3" fmla="*/ 665 h 692"/>
-                <a:gd name="T4" fmla="*/ 9 w 785"/>
-                <a:gd name="T5" fmla="*/ 374 h 692"/>
-                <a:gd name="T6" fmla="*/ 9 w 785"/>
-                <a:gd name="T7" fmla="*/ 318 h 692"/>
-                <a:gd name="T8" fmla="*/ 177 w 785"/>
-                <a:gd name="T9" fmla="*/ 27 h 692"/>
-                <a:gd name="T10" fmla="*/ 225 w 785"/>
-                <a:gd name="T11" fmla="*/ 0 h 692"/>
-                <a:gd name="T12" fmla="*/ 561 w 785"/>
-                <a:gd name="T13" fmla="*/ 0 h 692"/>
-                <a:gd name="T14" fmla="*/ 609 w 785"/>
-                <a:gd name="T15" fmla="*/ 27 h 692"/>
-                <a:gd name="T16" fmla="*/ 777 w 785"/>
-                <a:gd name="T17" fmla="*/ 318 h 692"/>
-                <a:gd name="T18" fmla="*/ 777 w 785"/>
-                <a:gd name="T19" fmla="*/ 374 h 692"/>
-                <a:gd name="T20" fmla="*/ 609 w 785"/>
-                <a:gd name="T21" fmla="*/ 665 h 692"/>
-                <a:gd name="T22" fmla="*/ 561 w 785"/>
-                <a:gd name="T23" fmla="*/ 692 h 692"/>
-                <a:gd name="T24" fmla="*/ 225 w 785"/>
-                <a:gd name="T25" fmla="*/ 692 h 692"/>
-              </a:gdLst>
-              <a:ahLst/>
-              <a:cxnLst>
-                <a:cxn ang="0">
-                  <a:pos x="T0" y="T1"/>
-                </a:cxn>
-                <a:cxn ang="0">
-                  <a:pos x="T2" y="T3"/>
-                </a:cxn>
-                <a:cxn ang="0">
-                  <a:pos x="T4" y="T5"/>
-                </a:cxn>
-                <a:cxn ang="0">
-                  <a:pos x="T6" y="T7"/>
-                </a:cxn>
-                <a:cxn ang="0">
-                  <a:pos x="T8" y="T9"/>
-                </a:cxn>
-                <a:cxn ang="0">
-                  <a:pos x="T10" y="T11"/>
-                </a:cxn>
-                <a:cxn ang="0">
-                  <a:pos x="T12" y="T13"/>
-                </a:cxn>
-                <a:cxn ang="0">
-                  <a:pos x="T14" y="T15"/>
-                </a:cxn>
-                <a:cxn ang="0">
-                  <a:pos x="T16" y="T17"/>
-                </a:cxn>
-                <a:cxn ang="0">
-                  <a:pos x="T18" y="T19"/>
-                </a:cxn>
-                <a:cxn ang="0">
-                  <a:pos x="T20" y="T21"/>
-                </a:cxn>
-                <a:cxn ang="0">
-                  <a:pos x="T22" y="T23"/>
-                </a:cxn>
-                <a:cxn ang="0">
-                  <a:pos x="T24" y="T25"/>
-                </a:cxn>
-              </a:cxnLst>
-              <a:rect l="0" t="0" r="r" b="b"/>
-              <a:pathLst>
-                <a:path w="785" h="692">
-                  <a:moveTo>
-                    <a:pt x="225" y="692"/>
-                  </a:moveTo>
-                  <a:cubicBezTo>
-                    <a:pt x="207" y="692"/>
-                    <a:pt x="185" y="680"/>
-                    <a:pt x="177" y="665"/>
-                  </a:cubicBezTo>
-                  <a:cubicBezTo>
-                    <a:pt x="9" y="374"/>
-                    <a:pt x="9" y="374"/>
-                    <a:pt x="9" y="374"/>
-                  </a:cubicBezTo>
-                  <a:cubicBezTo>
-                    <a:pt x="0" y="358"/>
-                    <a:pt x="0" y="334"/>
-                    <a:pt x="9" y="318"/>
-                  </a:cubicBezTo>
-                  <a:cubicBezTo>
-                    <a:pt x="177" y="27"/>
-                    <a:pt x="177" y="27"/>
-                    <a:pt x="177" y="27"/>
-                  </a:cubicBezTo>
-                  <a:cubicBezTo>
-                    <a:pt x="185" y="12"/>
-                    <a:pt x="207" y="0"/>
-                    <a:pt x="225" y="0"/>
-                  </a:cubicBezTo>
-                  <a:cubicBezTo>
-                    <a:pt x="561" y="0"/>
-                    <a:pt x="561" y="0"/>
-                    <a:pt x="561" y="0"/>
-                  </a:cubicBezTo>
-                  <a:cubicBezTo>
-                    <a:pt x="578" y="0"/>
-                    <a:pt x="600" y="12"/>
-                    <a:pt x="609" y="27"/>
-                  </a:cubicBezTo>
-                  <a:cubicBezTo>
-                    <a:pt x="777" y="318"/>
-                    <a:pt x="777" y="318"/>
-                    <a:pt x="777" y="318"/>
-                  </a:cubicBezTo>
-                  <a:cubicBezTo>
-                    <a:pt x="785" y="334"/>
-                    <a:pt x="785" y="358"/>
-                    <a:pt x="777" y="374"/>
-                  </a:cubicBezTo>
-                  <a:cubicBezTo>
-                    <a:pt x="609" y="665"/>
-                    <a:pt x="609" y="665"/>
-                    <a:pt x="609" y="665"/>
-                  </a:cubicBezTo>
-                  <a:cubicBezTo>
-                    <a:pt x="600" y="680"/>
-                    <a:pt x="578" y="692"/>
-                    <a:pt x="561" y="692"/>
-                  </a:cubicBezTo>
-                  <a:lnTo>
-                    <a:pt x="225" y="692"/>
-                  </a:lnTo>
-                  <a:close/>
-                </a:path>
-              </a:pathLst>
-            </a:custGeom>
-            <a:noFill/>
-            <a:ln w="28575" cmpd="sng">
-              <a:solidFill>
-                <a:schemeClr val="tx1"/>
-              </a:solidFill>
-            </a:ln>
-          </p:spPr>
-          <p:txBody>
-            <a:bodyPr vert="horz" wrap="square" lIns="91440" tIns="45720" rIns="91440" bIns="45720" numCol="1" anchor="t" anchorCtr="0" compatLnSpc="1">
-              <a:prstTxWarp prst="textNoShape">
-                <a:avLst/>
-              </a:prstTxWarp>
-            </a:bodyPr>
-            <a:lstStyle/>
-            <a:p>
-              <a:endParaRPr lang="en-US"/>
-            </a:p>
-          </p:txBody>
-        </p:sp>
-        <p:sp>
-          <p:nvSpPr>
-            <p:cNvPr id="37" name="Freeform 5">
-              <a:extLst>
-                <a:ext uri="{FF2B5EF4-FFF2-40B4-BE49-F238E27FC236}">
-                  <a16:creationId xmlns:a16="http://schemas.microsoft.com/office/drawing/2014/main" id="{C2A5CB78-6497-4151-83B6-568BD27EC573}"/>
-                </a:ext>
-                <a:ext uri="{C183D7F6-B498-43B3-948B-1728B52AA6E4}">
-                  <adec:decorative xmlns:adec="http://schemas.microsoft.com/office/drawing/2017/decorative" val="1"/>
-                </a:ext>
-              </a:extLst>
-            </p:cNvPr>
-            <p:cNvSpPr>
-              <a:spLocks/>
-            </p:cNvSpPr>
-            <p:nvPr>
-              <p:extLst>
-                <p:ext uri="{386F3935-93C4-4BCD-93E2-E3B085C9AB24}">
-                  <p16:designElem xmlns:p16="http://schemas.microsoft.com/office/powerpoint/2015/main" val="1"/>
-                </p:ext>
-              </p:extLst>
-            </p:nvPr>
-          </p:nvSpPr>
-          <p:spPr bwMode="auto">
-            <a:xfrm>
-              <a:off x="5885720" y="325570"/>
-              <a:ext cx="550492" cy="485306"/>
-            </a:xfrm>
-            <a:custGeom>
-              <a:avLst/>
-              <a:gdLst>
-                <a:gd name="T0" fmla="*/ 225 w 785"/>
-                <a:gd name="T1" fmla="*/ 692 h 692"/>
-                <a:gd name="T2" fmla="*/ 177 w 785"/>
-                <a:gd name="T3" fmla="*/ 665 h 692"/>
-                <a:gd name="T4" fmla="*/ 9 w 785"/>
-                <a:gd name="T5" fmla="*/ 374 h 692"/>
-                <a:gd name="T6" fmla="*/ 9 w 785"/>
-                <a:gd name="T7" fmla="*/ 318 h 692"/>
-                <a:gd name="T8" fmla="*/ 177 w 785"/>
-                <a:gd name="T9" fmla="*/ 27 h 692"/>
-                <a:gd name="T10" fmla="*/ 225 w 785"/>
-                <a:gd name="T11" fmla="*/ 0 h 692"/>
-                <a:gd name="T12" fmla="*/ 561 w 785"/>
-                <a:gd name="T13" fmla="*/ 0 h 692"/>
-                <a:gd name="T14" fmla="*/ 609 w 785"/>
-                <a:gd name="T15" fmla="*/ 27 h 692"/>
-                <a:gd name="T16" fmla="*/ 777 w 785"/>
-                <a:gd name="T17" fmla="*/ 318 h 692"/>
-                <a:gd name="T18" fmla="*/ 777 w 785"/>
-                <a:gd name="T19" fmla="*/ 374 h 692"/>
-                <a:gd name="T20" fmla="*/ 609 w 785"/>
-                <a:gd name="T21" fmla="*/ 665 h 692"/>
-                <a:gd name="T22" fmla="*/ 561 w 785"/>
-                <a:gd name="T23" fmla="*/ 692 h 692"/>
-                <a:gd name="T24" fmla="*/ 225 w 785"/>
-                <a:gd name="T25" fmla="*/ 692 h 692"/>
-              </a:gdLst>
-              <a:ahLst/>
-              <a:cxnLst>
-                <a:cxn ang="0">
-                  <a:pos x="T0" y="T1"/>
-                </a:cxn>
-                <a:cxn ang="0">
-                  <a:pos x="T2" y="T3"/>
-                </a:cxn>
-                <a:cxn ang="0">
-                  <a:pos x="T4" y="T5"/>
-                </a:cxn>
-                <a:cxn ang="0">
-                  <a:pos x="T6" y="T7"/>
-                </a:cxn>
-                <a:cxn ang="0">
-                  <a:pos x="T8" y="T9"/>
-                </a:cxn>
-                <a:cxn ang="0">
-                  <a:pos x="T10" y="T11"/>
-                </a:cxn>
-                <a:cxn ang="0">
-                  <a:pos x="T12" y="T13"/>
-                </a:cxn>
-                <a:cxn ang="0">
-                  <a:pos x="T14" y="T15"/>
-                </a:cxn>
-                <a:cxn ang="0">
-                  <a:pos x="T16" y="T17"/>
-                </a:cxn>
-                <a:cxn ang="0">
-                  <a:pos x="T18" y="T19"/>
-                </a:cxn>
-                <a:cxn ang="0">
-                  <a:pos x="T20" y="T21"/>
-                </a:cxn>
-                <a:cxn ang="0">
-                  <a:pos x="T22" y="T23"/>
-                </a:cxn>
-                <a:cxn ang="0">
-                  <a:pos x="T24" y="T25"/>
-                </a:cxn>
-              </a:cxnLst>
-              <a:rect l="0" t="0" r="r" b="b"/>
-              <a:pathLst>
-                <a:path w="785" h="692">
-                  <a:moveTo>
-                    <a:pt x="225" y="692"/>
-                  </a:moveTo>
-                  <a:cubicBezTo>
-                    <a:pt x="207" y="692"/>
-                    <a:pt x="185" y="680"/>
-                    <a:pt x="177" y="665"/>
-                  </a:cubicBezTo>
-                  <a:cubicBezTo>
-                    <a:pt x="9" y="374"/>
-                    <a:pt x="9" y="374"/>
-                    <a:pt x="9" y="374"/>
-                  </a:cubicBezTo>
-                  <a:cubicBezTo>
-                    <a:pt x="0" y="358"/>
-                    <a:pt x="0" y="334"/>
-                    <a:pt x="9" y="318"/>
-                  </a:cubicBezTo>
-                  <a:cubicBezTo>
-                    <a:pt x="177" y="27"/>
-                    <a:pt x="177" y="27"/>
-                    <a:pt x="177" y="27"/>
-                  </a:cubicBezTo>
-                  <a:cubicBezTo>
-                    <a:pt x="185" y="12"/>
-                    <a:pt x="207" y="0"/>
-                    <a:pt x="225" y="0"/>
-                  </a:cubicBezTo>
-                  <a:cubicBezTo>
-                    <a:pt x="561" y="0"/>
-                    <a:pt x="561" y="0"/>
-                    <a:pt x="561" y="0"/>
-                  </a:cubicBezTo>
-                  <a:cubicBezTo>
-                    <a:pt x="578" y="0"/>
-                    <a:pt x="600" y="12"/>
-                    <a:pt x="609" y="27"/>
-                  </a:cubicBezTo>
-                  <a:cubicBezTo>
-                    <a:pt x="777" y="318"/>
-                    <a:pt x="777" y="318"/>
-                    <a:pt x="777" y="318"/>
-                  </a:cubicBezTo>
-                  <a:cubicBezTo>
-                    <a:pt x="785" y="334"/>
-                    <a:pt x="785" y="358"/>
-                    <a:pt x="777" y="374"/>
-                  </a:cubicBezTo>
-                  <a:cubicBezTo>
-                    <a:pt x="609" y="665"/>
-                    <a:pt x="609" y="665"/>
-                    <a:pt x="609" y="665"/>
-                  </a:cubicBezTo>
-                  <a:cubicBezTo>
-                    <a:pt x="600" y="680"/>
-                    <a:pt x="578" y="692"/>
-                    <a:pt x="561" y="692"/>
-                  </a:cubicBezTo>
-                  <a:lnTo>
-                    <a:pt x="225" y="692"/>
-                  </a:lnTo>
-                  <a:close/>
-                </a:path>
-              </a:pathLst>
-            </a:custGeom>
-            <a:noFill/>
-            <a:ln w="28575" cmpd="sng">
-              <a:solidFill>
-                <a:schemeClr val="tx1"/>
-              </a:solidFill>
-            </a:ln>
-          </p:spPr>
-          <p:txBody>
-            <a:bodyPr vert="horz" wrap="square" lIns="91440" tIns="45720" rIns="91440" bIns="45720" numCol="1" anchor="t" anchorCtr="0" compatLnSpc="1">
-              <a:prstTxWarp prst="textNoShape">
-                <a:avLst/>
-              </a:prstTxWarp>
-            </a:bodyPr>
-            <a:lstStyle/>
-            <a:p>
-              <a:endParaRPr lang="en-US"/>
-            </a:p>
-          </p:txBody>
-        </p:sp>
-      </p:grpSp>
-    </p:spTree>
-    <p:extLst>
-      <p:ext uri="{BB962C8B-B14F-4D97-AF65-F5344CB8AC3E}">
-        <p14:creationId xmlns:p14="http://schemas.microsoft.com/office/powerpoint/2010/main" val="3006479589"/>
-      </p:ext>
-    </p:extLst>
-  </p:cSld>
-  <p:clrMapOvr>
-    <a:masterClrMapping/>
-  </p:clrMapOvr>
-</p:sld>
-</file>
-
-<file path=ppt/slides/slide11.xml><?xml version="1.0" encoding="utf-8"?>
-<p:sld xmlns:a="http://schemas.openxmlformats.org/drawingml/2006/main" xmlns:r="http://schemas.openxmlformats.org/officeDocument/2006/relationships" xmlns:p="http://schemas.openxmlformats.org/presentationml/2006/main">
-  <p:cSld>
-    <p:bg>
-      <p:bgPr>
-        <a:solidFill>
           <a:schemeClr val="bg1"/>
         </a:solidFill>
         <a:effectLst/>
@@ -7138,7 +6106,7 @@
 </p:sld>
 </file>
 
-<file path=ppt/slides/slide12.xml><?xml version="1.0" encoding="utf-8"?>
+<file path=ppt/slides/slide11.xml><?xml version="1.0" encoding="utf-8"?>
 <p:sld xmlns:a="http://schemas.openxmlformats.org/drawingml/2006/main" xmlns:r="http://schemas.openxmlformats.org/officeDocument/2006/relationships" xmlns:p="http://schemas.openxmlformats.org/presentationml/2006/main">
   <p:cSld>
     <p:bg>
@@ -8095,7 +7063,7 @@
 </p:sld>
 </file>
 
-<file path=ppt/slides/slide13.xml><?xml version="1.0" encoding="utf-8"?>
+<file path=ppt/slides/slide12.xml><?xml version="1.0" encoding="utf-8"?>
 <p:sld xmlns:a="http://schemas.openxmlformats.org/drawingml/2006/main" xmlns:r="http://schemas.openxmlformats.org/officeDocument/2006/relationships" xmlns:p="http://schemas.openxmlformats.org/presentationml/2006/main">
   <p:cSld>
     <p:bg>
@@ -9052,7 +8020,7 @@
 </p:sld>
 </file>
 
-<file path=ppt/slides/slide14.xml><?xml version="1.0" encoding="utf-8"?>
+<file path=ppt/slides/slide13.xml><?xml version="1.0" encoding="utf-8"?>
 <p:sld xmlns:a="http://schemas.openxmlformats.org/drawingml/2006/main" xmlns:r="http://schemas.openxmlformats.org/officeDocument/2006/relationships" xmlns:p="http://schemas.openxmlformats.org/presentationml/2006/main">
   <p:cSld>
     <p:bg>
@@ -10017,7 +8985,7 @@
 </p:sld>
 </file>
 
-<file path=ppt/slides/slide15.xml><?xml version="1.0" encoding="utf-8"?>
+<file path=ppt/slides/slide14.xml><?xml version="1.0" encoding="utf-8"?>
 <p:sld xmlns:a="http://schemas.openxmlformats.org/drawingml/2006/main" xmlns:r="http://schemas.openxmlformats.org/officeDocument/2006/relationships" xmlns:p="http://schemas.openxmlformats.org/presentationml/2006/main">
   <p:cSld>
     <p:bg>
@@ -10978,7 +9946,7 @@
 </p:sld>
 </file>
 
-<file path=ppt/slides/slide16.xml><?xml version="1.0" encoding="utf-8"?>
+<file path=ppt/slides/slide15.xml><?xml version="1.0" encoding="utf-8"?>
 <p:sld xmlns:a="http://schemas.openxmlformats.org/drawingml/2006/main" xmlns:r="http://schemas.openxmlformats.org/officeDocument/2006/relationships" xmlns:p="http://schemas.openxmlformats.org/presentationml/2006/main">
   <p:cSld>
     <p:bg>
@@ -12132,7 +11100,7 @@
 </p:sld>
 </file>
 
-<file path=ppt/slides/slide17.xml><?xml version="1.0" encoding="utf-8"?>
+<file path=ppt/slides/slide16.xml><?xml version="1.0" encoding="utf-8"?>
 <p:sld xmlns:a="http://schemas.openxmlformats.org/drawingml/2006/main" xmlns:r="http://schemas.openxmlformats.org/officeDocument/2006/relationships" xmlns:p="http://schemas.openxmlformats.org/presentationml/2006/main">
   <p:cSld>
     <p:bg>
@@ -12274,7 +11242,7 @@
               </a:ext>
             </a:extLst>
           </a:blip>
-          <a:srcRect l="-5054" t="4340" r="-1" b="-714"/>
+          <a:srcRect l="-4446" t="655" r="-3818" b="27"/>
           <a:stretch/>
         </p:blipFill>
         <p:spPr>
@@ -12623,7 +11591,7 @@
 </p:sld>
 </file>
 
-<file path=ppt/slides/slide18.xml><?xml version="1.0" encoding="utf-8"?>
+<file path=ppt/slides/slide17.xml><?xml version="1.0" encoding="utf-8"?>
 <p:sld xmlns:a="http://schemas.openxmlformats.org/drawingml/2006/main" xmlns:r="http://schemas.openxmlformats.org/officeDocument/2006/relationships" xmlns:p="http://schemas.openxmlformats.org/presentationml/2006/main">
   <p:cSld>
     <p:bg>
@@ -12757,7 +11725,7 @@
           </p:cNvPicPr>
           <p:nvPr/>
         </p:nvPicPr>
-        <p:blipFill>
+        <p:blipFill rotWithShape="1">
           <a:blip r:embed="rId3">
             <a:extLst>
               <a:ext uri="{28A0092B-C50C-407E-A947-70E740481C1C}">
@@ -12765,7 +11733,7 @@
               </a:ext>
             </a:extLst>
           </a:blip>
-          <a:srcRect t="4241" b="4241"/>
+          <a:srcRect l="-4626" t="142" r="-4487"/>
           <a:stretch/>
         </p:blipFill>
         <p:spPr>
@@ -13006,7 +11974,7 @@
 </p:sld>
 </file>
 
-<file path=ppt/slides/slide19.xml><?xml version="1.0" encoding="utf-8"?>
+<file path=ppt/slides/slide18.xml><?xml version="1.0" encoding="utf-8"?>
 <p:sld xmlns:a="http://schemas.openxmlformats.org/drawingml/2006/main" xmlns:r="http://schemas.openxmlformats.org/officeDocument/2006/relationships" xmlns:p="http://schemas.openxmlformats.org/presentationml/2006/main">
   <p:cSld>
     <p:bg>
@@ -13110,7 +12078,7 @@
         <p:spPr>
           <a:xfrm>
             <a:off x="965199" y="851517"/>
-            <a:ext cx="5130795" cy="1461778"/>
+            <a:ext cx="5130795" cy="767213"/>
           </a:xfrm>
         </p:spPr>
         <p:txBody>
@@ -13147,8 +12115,8 @@
         </p:nvSpPr>
         <p:spPr>
           <a:xfrm>
-            <a:off x="587141" y="2470247"/>
-            <a:ext cx="4836602" cy="3536236"/>
+            <a:off x="587141" y="1819175"/>
+            <a:ext cx="4841507" cy="4187308"/>
           </a:xfrm>
         </p:spPr>
         <p:txBody>
@@ -13157,51 +12125,59 @@
           </a:bodyPr>
           <a:lstStyle/>
           <a:p>
-            <a:pPr marL="514350" indent="-228600" algn="just">
+            <a:pPr marL="628650" indent="-342900" algn="just">
               <a:lnSpc>
                 <a:spcPct val="90000"/>
               </a:lnSpc>
               <a:spcAft>
                 <a:spcPts val="600"/>
               </a:spcAft>
-              <a:buFont typeface="Arial" panose="020B0604020202020204" pitchFamily="34" charset="0"/>
-              <a:buChar char="•"/>
+              <a:buFont typeface="+mj-lt"/>
+              <a:buAutoNum type="arabicPeriod"/>
             </a:pPr>
             <a:r>
               <a:rPr lang="en-US" dirty="0"/>
-              <a:t>Black and Hispanic defendants are over 3.5x more likely to be incarcerated than white defendants</a:t>
-            </a:r>
-          </a:p>
-          <a:p>
-            <a:pPr marL="514350" indent="-228600" algn="just">
+              <a:t>Black and Hispanic Tennesseans are incarcerated at a rate of 3.5x that of white </a:t>
+            </a:r>
+            <a:r>
+              <a:rPr lang="en-US" dirty="0" err="1"/>
+              <a:t>Tennesseeans</a:t>
+            </a:r>
+            <a:r>
+              <a:rPr lang="en-US" dirty="0"/>
+              <a:t>.</a:t>
+            </a:r>
+          </a:p>
+          <a:p>
+            <a:pPr marL="628650" indent="-342900" algn="just">
               <a:lnSpc>
                 <a:spcPct val="90000"/>
               </a:lnSpc>
               <a:spcAft>
                 <a:spcPts val="600"/>
               </a:spcAft>
-              <a:buFont typeface="Arial" panose="020B0604020202020204" pitchFamily="34" charset="0"/>
-              <a:buChar char="•"/>
+              <a:buFont typeface="+mj-lt"/>
+              <a:buAutoNum type="arabicPeriod"/>
             </a:pPr>
             <a:r>
               <a:rPr lang="en-US" dirty="0"/>
-              <a:t>The most severe sentence enhancements are applied disproportionately to black defendants, while they receive a much smaller proportion of mitigating measures</a:t>
-            </a:r>
-          </a:p>
-          <a:p>
-            <a:pPr marL="514350" indent="-228600" algn="just">
+              <a:t>Black defendants are 40% less likely than white defendants to receive sentence reductions, but twice as likely to receive designations that substantially lengthen their sentences.</a:t>
+            </a:r>
+          </a:p>
+          <a:p>
+            <a:pPr marL="628650" indent="-342900" algn="just">
               <a:lnSpc>
                 <a:spcPct val="90000"/>
               </a:lnSpc>
               <a:spcAft>
                 <a:spcPts val="600"/>
               </a:spcAft>
-              <a:buFont typeface="Arial" panose="020B0604020202020204" pitchFamily="34" charset="0"/>
-              <a:buChar char="•"/>
+              <a:buFont typeface="+mj-lt"/>
+              <a:buAutoNum type="arabicPeriod"/>
             </a:pPr>
             <a:r>
               <a:rPr lang="en-US" dirty="0"/>
-              <a:t>There is a strong incentive for defendants (regardless of race) to plead out rather than pursue their constitutional right to a trial by jury</a:t>
+              <a:t>Defendants across racial lines receive sentences 10x longer on average than defendants who plead. This creates a strong incentive for defendants (regardless of race) to plead out rather than pursue their constitutional right to a trial by jury.</a:t>
             </a:r>
           </a:p>
         </p:txBody>
@@ -14161,7 +13137,7 @@
                                         <p:tgtEl>
                                           <p:spTgt spid="10">
                                             <p:txEl>
-                                              <p:pRg st="2" end="2"/>
+                                              <p:charRg st="274" end="519"/>
                                             </p:txEl>
                                           </p:spTgt>
                                         </p:tgtEl>
@@ -15303,1292 +14279,6 @@
 </file>
 
 <file path=ppt/slides/slide3.xml><?xml version="1.0" encoding="utf-8"?>
-<p:sld xmlns:a="http://schemas.openxmlformats.org/drawingml/2006/main" xmlns:r="http://schemas.openxmlformats.org/officeDocument/2006/relationships" xmlns:p="http://schemas.openxmlformats.org/presentationml/2006/main">
-  <p:cSld>
-    <p:bg>
-      <p:bgPr>
-        <a:solidFill>
-          <a:schemeClr val="bg1"/>
-        </a:solidFill>
-        <a:effectLst/>
-      </p:bgPr>
-    </p:bg>
-    <p:spTree>
-      <p:nvGrpSpPr>
-        <p:cNvPr id="1" name=""/>
-        <p:cNvGrpSpPr/>
-        <p:nvPr/>
-      </p:nvGrpSpPr>
-      <p:grpSpPr>
-        <a:xfrm>
-          <a:off x="0" y="0"/>
-          <a:ext cx="0" cy="0"/>
-          <a:chOff x="0" y="0"/>
-          <a:chExt cx="0" cy="0"/>
-        </a:xfrm>
-      </p:grpSpPr>
-      <p:sp useBgFill="1">
-        <p:nvSpPr>
-          <p:cNvPr id="18" name="Rectangle 17">
-            <a:extLst>
-              <a:ext uri="{FF2B5EF4-FFF2-40B4-BE49-F238E27FC236}">
-                <a16:creationId xmlns:a16="http://schemas.microsoft.com/office/drawing/2014/main" id="{91F32EBA-ED97-466E-8CFA-8382584155D0}"/>
-              </a:ext>
-              <a:ext uri="{C183D7F6-B498-43B3-948B-1728B52AA6E4}">
-                <adec:decorative xmlns:adec="http://schemas.microsoft.com/office/drawing/2017/decorative" val="1"/>
-              </a:ext>
-            </a:extLst>
-          </p:cNvPr>
-          <p:cNvSpPr>
-            <a:spLocks noGrp="1" noRot="1" noChangeAspect="1" noMove="1" noResize="1" noEditPoints="1" noAdjustHandles="1" noChangeArrowheads="1" noChangeShapeType="1" noTextEdit="1"/>
-          </p:cNvSpPr>
-          <p:nvPr>
-            <p:extLst>
-              <p:ext uri="{386F3935-93C4-4BCD-93E2-E3B085C9AB24}">
-                <p16:designElem xmlns:p16="http://schemas.microsoft.com/office/powerpoint/2015/main" val="1"/>
-              </p:ext>
-            </p:extLst>
-          </p:nvPr>
-        </p:nvSpPr>
-        <p:spPr>
-          <a:xfrm>
-            <a:off x="0" y="0"/>
-            <a:ext cx="12192000" cy="6858000"/>
-          </a:xfrm>
-          <a:prstGeom prst="rect">
-            <a:avLst/>
-          </a:prstGeom>
-          <a:ln>
-            <a:noFill/>
-          </a:ln>
-        </p:spPr>
-        <p:style>
-          <a:lnRef idx="2">
-            <a:schemeClr val="accent1">
-              <a:shade val="50000"/>
-            </a:schemeClr>
-          </a:lnRef>
-          <a:fillRef idx="1">
-            <a:schemeClr val="accent1"/>
-          </a:fillRef>
-          <a:effectRef idx="0">
-            <a:schemeClr val="accent1"/>
-          </a:effectRef>
-          <a:fontRef idx="minor">
-            <a:schemeClr val="lt1"/>
-          </a:fontRef>
-        </p:style>
-        <p:txBody>
-          <a:bodyPr rtlCol="0" anchor="ctr"/>
-          <a:lstStyle/>
-          <a:p>
-            <a:pPr marL="0" marR="0" lvl="0" indent="0" algn="ctr" defTabSz="914400" rtl="0" eaLnBrk="1" fontAlgn="auto" latinLnBrk="0" hangingPunct="1">
-              <a:lnSpc>
-                <a:spcPct val="100000"/>
-              </a:lnSpc>
-              <a:spcBef>
-                <a:spcPts val="0"/>
-              </a:spcBef>
-              <a:spcAft>
-                <a:spcPts val="0"/>
-              </a:spcAft>
-              <a:buClrTx/>
-              <a:buSzTx/>
-              <a:buFontTx/>
-              <a:buNone/>
-              <a:tabLst/>
-              <a:defRPr/>
-            </a:pPr>
-            <a:endParaRPr kumimoji="0" lang="en-US" sz="1800" b="0" i="0" u="none" strike="noStrike" kern="1200" cap="none" spc="0" normalizeH="0" baseline="0" noProof="0">
-              <a:ln>
-                <a:noFill/>
-              </a:ln>
-              <a:solidFill>
-                <a:prstClr val="white"/>
-              </a:solidFill>
-              <a:effectLst/>
-              <a:uLnTx/>
-              <a:uFillTx/>
-              <a:latin typeface="Calibri" panose="020F0502020204030204"/>
-              <a:ea typeface="+mn-ea"/>
-              <a:cs typeface="+mn-cs"/>
-            </a:endParaRPr>
-          </a:p>
-        </p:txBody>
-      </p:sp>
-      <p:sp>
-        <p:nvSpPr>
-          <p:cNvPr id="2" name="Title 1">
-            <a:extLst>
-              <a:ext uri="{FF2B5EF4-FFF2-40B4-BE49-F238E27FC236}">
-                <a16:creationId xmlns:a16="http://schemas.microsoft.com/office/drawing/2014/main" id="{32825A49-1FDF-42C1-B7CC-8DDA0F24D05F}"/>
-              </a:ext>
-            </a:extLst>
-          </p:cNvPr>
-          <p:cNvSpPr>
-            <a:spLocks noGrp="1"/>
-          </p:cNvSpPr>
-          <p:nvPr>
-            <p:ph type="title"/>
-          </p:nvPr>
-        </p:nvSpPr>
-        <p:spPr>
-          <a:xfrm>
-            <a:off x="965199" y="851517"/>
-            <a:ext cx="5130795" cy="1461778"/>
-          </a:xfrm>
-        </p:spPr>
-        <p:txBody>
-          <a:bodyPr>
-            <a:normAutofit/>
-          </a:bodyPr>
-          <a:lstStyle/>
-          <a:p>
-            <a:r>
-              <a:rPr lang="en-US" sz="4000"/>
-              <a:t>Data Collection and Cleaning</a:t>
-            </a:r>
-          </a:p>
-        </p:txBody>
-      </p:sp>
-      <p:sp>
-        <p:nvSpPr>
-          <p:cNvPr id="13" name="Content Placeholder 2">
-            <a:extLst>
-              <a:ext uri="{FF2B5EF4-FFF2-40B4-BE49-F238E27FC236}">
-                <a16:creationId xmlns:a16="http://schemas.microsoft.com/office/drawing/2014/main" id="{FC83074E-571F-4022-9FF2-454BF17FF74C}"/>
-              </a:ext>
-            </a:extLst>
-          </p:cNvPr>
-          <p:cNvSpPr>
-            <a:spLocks noGrp="1"/>
-          </p:cNvSpPr>
-          <p:nvPr>
-            <p:ph idx="1"/>
-          </p:nvPr>
-        </p:nvSpPr>
-        <p:spPr>
-          <a:xfrm>
-            <a:off x="965200" y="2470248"/>
-            <a:ext cx="4185640" cy="3536236"/>
-          </a:xfrm>
-        </p:spPr>
-        <p:txBody>
-          <a:bodyPr>
-            <a:normAutofit/>
-          </a:bodyPr>
-          <a:lstStyle/>
-          <a:p>
-            <a:r>
-              <a:rPr lang="en-US" sz="2400" dirty="0"/>
-              <a:t>SAS files from ussc.gov (The U.S. Sentencing Commission)</a:t>
-            </a:r>
-          </a:p>
-          <a:p>
-            <a:r>
-              <a:rPr lang="en-US" sz="2400" dirty="0"/>
-              <a:t>Nationwide dataset with over 300k rows and 1000+ columns</a:t>
-            </a:r>
-          </a:p>
-          <a:p>
-            <a:r>
-              <a:rPr lang="en-US" sz="2400" dirty="0"/>
-              <a:t>Identified 195 columns for analysis</a:t>
-            </a:r>
-          </a:p>
-          <a:p>
-            <a:r>
-              <a:rPr lang="en-US" sz="2400" dirty="0"/>
-              <a:t>Extracted Tennessee specific data </a:t>
-            </a:r>
-          </a:p>
-          <a:p>
-            <a:endParaRPr lang="en-US" sz="2400" dirty="0"/>
-          </a:p>
-        </p:txBody>
-      </p:sp>
-      <p:sp>
-        <p:nvSpPr>
-          <p:cNvPr id="20" name="Freeform: Shape 19">
-            <a:extLst>
-              <a:ext uri="{FF2B5EF4-FFF2-40B4-BE49-F238E27FC236}">
-                <a16:creationId xmlns:a16="http://schemas.microsoft.com/office/drawing/2014/main" id="{62A38935-BB53-4DF7-A56E-48DD25B685D7}"/>
-              </a:ext>
-              <a:ext uri="{C183D7F6-B498-43B3-948B-1728B52AA6E4}">
-                <adec:decorative xmlns:adec="http://schemas.microsoft.com/office/drawing/2017/decorative" val="1"/>
-              </a:ext>
-            </a:extLst>
-          </p:cNvPr>
-          <p:cNvSpPr>
-            <a:spLocks noGrp="1" noRot="1" noChangeAspect="1" noMove="1" noResize="1" noEditPoints="1" noAdjustHandles="1" noChangeArrowheads="1" noChangeShapeType="1" noTextEdit="1"/>
-          </p:cNvSpPr>
-          <p:nvPr>
-            <p:extLst>
-              <p:ext uri="{386F3935-93C4-4BCD-93E2-E3B085C9AB24}">
-                <p16:designElem xmlns:p16="http://schemas.microsoft.com/office/powerpoint/2015/main" val="1"/>
-              </p:ext>
-            </p:extLst>
-          </p:nvPr>
-        </p:nvSpPr>
-        <p:spPr>
-          <a:xfrm>
-            <a:off x="5510370" y="851518"/>
-            <a:ext cx="6184806" cy="5154967"/>
-          </a:xfrm>
-          <a:custGeom>
-            <a:avLst/>
-            <a:gdLst>
-              <a:gd name="connsiteX0" fmla="*/ 363179 w 6184806"/>
-              <a:gd name="connsiteY0" fmla="*/ 3125191 h 5154967"/>
-              <a:gd name="connsiteX1" fmla="*/ 898270 w 6184806"/>
-              <a:gd name="connsiteY1" fmla="*/ 3125191 h 5154967"/>
-              <a:gd name="connsiteX2" fmla="*/ 980326 w 6184806"/>
-              <a:gd name="connsiteY2" fmla="*/ 3173551 h 5154967"/>
-              <a:gd name="connsiteX3" fmla="*/ 1248448 w 6184806"/>
-              <a:gd name="connsiteY3" fmla="*/ 3635277 h 5154967"/>
-              <a:gd name="connsiteX4" fmla="*/ 1248448 w 6184806"/>
-              <a:gd name="connsiteY4" fmla="*/ 3729695 h 5154967"/>
-              <a:gd name="connsiteX5" fmla="*/ 980326 w 6184806"/>
-              <a:gd name="connsiteY5" fmla="*/ 4191421 h 5154967"/>
-              <a:gd name="connsiteX6" fmla="*/ 898270 w 6184806"/>
-              <a:gd name="connsiteY6" fmla="*/ 4239781 h 5154967"/>
-              <a:gd name="connsiteX7" fmla="*/ 363179 w 6184806"/>
-              <a:gd name="connsiteY7" fmla="*/ 4239781 h 5154967"/>
-              <a:gd name="connsiteX8" fmla="*/ 279969 w 6184806"/>
-              <a:gd name="connsiteY8" fmla="*/ 4191421 h 5154967"/>
-              <a:gd name="connsiteX9" fmla="*/ 13002 w 6184806"/>
-              <a:gd name="connsiteY9" fmla="*/ 3729695 h 5154967"/>
-              <a:gd name="connsiteX10" fmla="*/ 13002 w 6184806"/>
-              <a:gd name="connsiteY10" fmla="*/ 3635277 h 5154967"/>
-              <a:gd name="connsiteX11" fmla="*/ 279969 w 6184806"/>
-              <a:gd name="connsiteY11" fmla="*/ 3173551 h 5154967"/>
-              <a:gd name="connsiteX12" fmla="*/ 363179 w 6184806"/>
-              <a:gd name="connsiteY12" fmla="*/ 3125191 h 5154967"/>
-              <a:gd name="connsiteX13" fmla="*/ 2489721 w 6184806"/>
-              <a:gd name="connsiteY13" fmla="*/ 570035 h 5154967"/>
-              <a:gd name="connsiteX14" fmla="*/ 2764862 w 6184806"/>
-              <a:gd name="connsiteY14" fmla="*/ 570035 h 5154967"/>
-              <a:gd name="connsiteX15" fmla="*/ 2796959 w 6184806"/>
-              <a:gd name="connsiteY15" fmla="*/ 570035 h 5154967"/>
-              <a:gd name="connsiteX16" fmla="*/ 2827587 w 6184806"/>
-              <a:gd name="connsiteY16" fmla="*/ 622777 h 5154967"/>
-              <a:gd name="connsiteX17" fmla="*/ 2977604 w 6184806"/>
-              <a:gd name="connsiteY17" fmla="*/ 881117 h 5154967"/>
-              <a:gd name="connsiteX18" fmla="*/ 2977604 w 6184806"/>
-              <a:gd name="connsiteY18" fmla="*/ 1025720 h 5154967"/>
-              <a:gd name="connsiteX19" fmla="*/ 2566968 w 6184806"/>
-              <a:gd name="connsiteY19" fmla="*/ 1732863 h 5154967"/>
-              <a:gd name="connsiteX20" fmla="*/ 2441299 w 6184806"/>
-              <a:gd name="connsiteY20" fmla="*/ 1806927 h 5154967"/>
-              <a:gd name="connsiteX21" fmla="*/ 1621798 w 6184806"/>
-              <a:gd name="connsiteY21" fmla="*/ 1806927 h 5154967"/>
-              <a:gd name="connsiteX22" fmla="*/ 1583218 w 6184806"/>
-              <a:gd name="connsiteY22" fmla="*/ 1801802 h 5154967"/>
-              <a:gd name="connsiteX23" fmla="*/ 1556683 w 6184806"/>
-              <a:gd name="connsiteY23" fmla="*/ 1790677 h 5154967"/>
-              <a:gd name="connsiteX24" fmla="*/ 1572899 w 6184806"/>
-              <a:gd name="connsiteY24" fmla="*/ 1762631 h 5154967"/>
-              <a:gd name="connsiteX25" fmla="*/ 2147429 w 6184806"/>
-              <a:gd name="connsiteY25" fmla="*/ 768968 h 5154967"/>
-              <a:gd name="connsiteX26" fmla="*/ 2489721 w 6184806"/>
-              <a:gd name="connsiteY26" fmla="*/ 570035 h 5154967"/>
-              <a:gd name="connsiteX27" fmla="*/ 1573268 w 6184806"/>
-              <a:gd name="connsiteY27" fmla="*/ 0 h 5154967"/>
-              <a:gd name="connsiteX28" fmla="*/ 2497662 w 6184806"/>
-              <a:gd name="connsiteY28" fmla="*/ 0 h 5154967"/>
-              <a:gd name="connsiteX29" fmla="*/ 2639415 w 6184806"/>
-              <a:gd name="connsiteY29" fmla="*/ 83546 h 5154967"/>
-              <a:gd name="connsiteX30" fmla="*/ 2887862 w 6184806"/>
-              <a:gd name="connsiteY30" fmla="*/ 511387 h 5154967"/>
-              <a:gd name="connsiteX31" fmla="*/ 2915928 w 6184806"/>
-              <a:gd name="connsiteY31" fmla="*/ 559720 h 5154967"/>
-              <a:gd name="connsiteX32" fmla="*/ 2893844 w 6184806"/>
-              <a:gd name="connsiteY32" fmla="*/ 559720 h 5154967"/>
-              <a:gd name="connsiteX33" fmla="*/ 2789466 w 6184806"/>
-              <a:gd name="connsiteY33" fmla="*/ 559720 h 5154967"/>
-              <a:gd name="connsiteX34" fmla="*/ 2744122 w 6184806"/>
-              <a:gd name="connsiteY34" fmla="*/ 481634 h 5154967"/>
-              <a:gd name="connsiteX35" fmla="*/ 2570885 w 6184806"/>
-              <a:gd name="connsiteY35" fmla="*/ 183309 h 5154967"/>
-              <a:gd name="connsiteX36" fmla="*/ 2445216 w 6184806"/>
-              <a:gd name="connsiteY36" fmla="*/ 109244 h 5154967"/>
-              <a:gd name="connsiteX37" fmla="*/ 1625714 w 6184806"/>
-              <a:gd name="connsiteY37" fmla="*/ 109244 h 5154967"/>
-              <a:gd name="connsiteX38" fmla="*/ 1498276 w 6184806"/>
-              <a:gd name="connsiteY38" fmla="*/ 183309 h 5154967"/>
-              <a:gd name="connsiteX39" fmla="*/ 1089410 w 6184806"/>
-              <a:gd name="connsiteY39" fmla="*/ 890450 h 5154967"/>
-              <a:gd name="connsiteX40" fmla="*/ 1089410 w 6184806"/>
-              <a:gd name="connsiteY40" fmla="*/ 1035054 h 5154967"/>
-              <a:gd name="connsiteX41" fmla="*/ 1498276 w 6184806"/>
-              <a:gd name="connsiteY41" fmla="*/ 1742196 h 5154967"/>
-              <a:gd name="connsiteX42" fmla="*/ 1552039 w 6184806"/>
-              <a:gd name="connsiteY42" fmla="*/ 1796421 h 5154967"/>
-              <a:gd name="connsiteX43" fmla="*/ 1558260 w 6184806"/>
-              <a:gd name="connsiteY43" fmla="*/ 1799029 h 5154967"/>
-              <a:gd name="connsiteX44" fmla="*/ 1524911 w 6184806"/>
-              <a:gd name="connsiteY44" fmla="*/ 1856707 h 5154967"/>
-              <a:gd name="connsiteX45" fmla="*/ 1500108 w 6184806"/>
-              <a:gd name="connsiteY45" fmla="*/ 1899604 h 5154967"/>
-              <a:gd name="connsiteX46" fmla="*/ 1525834 w 6184806"/>
-              <a:gd name="connsiteY46" fmla="*/ 1910390 h 5154967"/>
-              <a:gd name="connsiteX47" fmla="*/ 1569352 w 6184806"/>
-              <a:gd name="connsiteY47" fmla="*/ 1916170 h 5154967"/>
-              <a:gd name="connsiteX48" fmla="*/ 2493745 w 6184806"/>
-              <a:gd name="connsiteY48" fmla="*/ 1916170 h 5154967"/>
-              <a:gd name="connsiteX49" fmla="*/ 2635498 w 6184806"/>
-              <a:gd name="connsiteY49" fmla="*/ 1832627 h 5154967"/>
-              <a:gd name="connsiteX50" fmla="*/ 3098693 w 6184806"/>
-              <a:gd name="connsiteY50" fmla="*/ 1034974 h 5154967"/>
-              <a:gd name="connsiteX51" fmla="*/ 3098693 w 6184806"/>
-              <a:gd name="connsiteY51" fmla="*/ 871863 h 5154967"/>
-              <a:gd name="connsiteX52" fmla="*/ 2945803 w 6184806"/>
-              <a:gd name="connsiteY52" fmla="*/ 608576 h 5154967"/>
-              <a:gd name="connsiteX53" fmla="*/ 2923422 w 6184806"/>
-              <a:gd name="connsiteY53" fmla="*/ 570035 h 5154967"/>
-              <a:gd name="connsiteX54" fmla="*/ 3027104 w 6184806"/>
-              <a:gd name="connsiteY54" fmla="*/ 570035 h 5154967"/>
-              <a:gd name="connsiteX55" fmla="*/ 4690846 w 6184806"/>
-              <a:gd name="connsiteY55" fmla="*/ 570035 h 5154967"/>
-              <a:gd name="connsiteX56" fmla="*/ 5028384 w 6184806"/>
-              <a:gd name="connsiteY56" fmla="*/ 768968 h 5154967"/>
-              <a:gd name="connsiteX57" fmla="*/ 6131323 w 6184806"/>
-              <a:gd name="connsiteY57" fmla="*/ 2668304 h 5154967"/>
-              <a:gd name="connsiteX58" fmla="*/ 6131323 w 6184806"/>
-              <a:gd name="connsiteY58" fmla="*/ 3056698 h 5154967"/>
-              <a:gd name="connsiteX59" fmla="*/ 5028384 w 6184806"/>
-              <a:gd name="connsiteY59" fmla="*/ 4956035 h 5154967"/>
-              <a:gd name="connsiteX60" fmla="*/ 4690846 w 6184806"/>
-              <a:gd name="connsiteY60" fmla="*/ 5154967 h 5154967"/>
-              <a:gd name="connsiteX61" fmla="*/ 2489721 w 6184806"/>
-              <a:gd name="connsiteY61" fmla="*/ 5154967 h 5154967"/>
-              <a:gd name="connsiteX62" fmla="*/ 2147429 w 6184806"/>
-              <a:gd name="connsiteY62" fmla="*/ 4956035 h 5154967"/>
-              <a:gd name="connsiteX63" fmla="*/ 1049243 w 6184806"/>
-              <a:gd name="connsiteY63" fmla="*/ 3056698 h 5154967"/>
-              <a:gd name="connsiteX64" fmla="*/ 1049243 w 6184806"/>
-              <a:gd name="connsiteY64" fmla="*/ 2668304 h 5154967"/>
-              <a:gd name="connsiteX65" fmla="*/ 1457007 w 6184806"/>
-              <a:gd name="connsiteY65" fmla="*/ 1963067 h 5154967"/>
-              <a:gd name="connsiteX66" fmla="*/ 1491373 w 6184806"/>
-              <a:gd name="connsiteY66" fmla="*/ 1903634 h 5154967"/>
-              <a:gd name="connsiteX67" fmla="*/ 1490164 w 6184806"/>
-              <a:gd name="connsiteY67" fmla="*/ 1903127 h 5154967"/>
-              <a:gd name="connsiteX68" fmla="*/ 1429519 w 6184806"/>
-              <a:gd name="connsiteY68" fmla="*/ 1841960 h 5154967"/>
-              <a:gd name="connsiteX69" fmla="*/ 968320 w 6184806"/>
-              <a:gd name="connsiteY69" fmla="*/ 1044307 h 5154967"/>
-              <a:gd name="connsiteX70" fmla="*/ 968320 w 6184806"/>
-              <a:gd name="connsiteY70" fmla="*/ 881196 h 5154967"/>
-              <a:gd name="connsiteX71" fmla="*/ 1429519 w 6184806"/>
-              <a:gd name="connsiteY71" fmla="*/ 83546 h 5154967"/>
-              <a:gd name="connsiteX72" fmla="*/ 1573268 w 6184806"/>
-              <a:gd name="connsiteY72" fmla="*/ 0 h 5154967"/>
-            </a:gdLst>
-            <a:ahLst/>
-            <a:cxnLst>
-              <a:cxn ang="0">
-                <a:pos x="connsiteX0" y="connsiteY0"/>
-              </a:cxn>
-              <a:cxn ang="0">
-                <a:pos x="connsiteX1" y="connsiteY1"/>
-              </a:cxn>
-              <a:cxn ang="0">
-                <a:pos x="connsiteX2" y="connsiteY2"/>
-              </a:cxn>
-              <a:cxn ang="0">
-                <a:pos x="connsiteX3" y="connsiteY3"/>
-              </a:cxn>
-              <a:cxn ang="0">
-                <a:pos x="connsiteX4" y="connsiteY4"/>
-              </a:cxn>
-              <a:cxn ang="0">
-                <a:pos x="connsiteX5" y="connsiteY5"/>
-              </a:cxn>
-              <a:cxn ang="0">
-                <a:pos x="connsiteX6" y="connsiteY6"/>
-              </a:cxn>
-              <a:cxn ang="0">
-                <a:pos x="connsiteX7" y="connsiteY7"/>
-              </a:cxn>
-              <a:cxn ang="0">
-                <a:pos x="connsiteX8" y="connsiteY8"/>
-              </a:cxn>
-              <a:cxn ang="0">
-                <a:pos x="connsiteX9" y="connsiteY9"/>
-              </a:cxn>
-              <a:cxn ang="0">
-                <a:pos x="connsiteX10" y="connsiteY10"/>
-              </a:cxn>
-              <a:cxn ang="0">
-                <a:pos x="connsiteX11" y="connsiteY11"/>
-              </a:cxn>
-              <a:cxn ang="0">
-                <a:pos x="connsiteX12" y="connsiteY12"/>
-              </a:cxn>
-              <a:cxn ang="0">
-                <a:pos x="connsiteX13" y="connsiteY13"/>
-              </a:cxn>
-              <a:cxn ang="0">
-                <a:pos x="connsiteX14" y="connsiteY14"/>
-              </a:cxn>
-              <a:cxn ang="0">
-                <a:pos x="connsiteX15" y="connsiteY15"/>
-              </a:cxn>
-              <a:cxn ang="0">
-                <a:pos x="connsiteX16" y="connsiteY16"/>
-              </a:cxn>
-              <a:cxn ang="0">
-                <a:pos x="connsiteX17" y="connsiteY17"/>
-              </a:cxn>
-              <a:cxn ang="0">
-                <a:pos x="connsiteX18" y="connsiteY18"/>
-              </a:cxn>
-              <a:cxn ang="0">
-                <a:pos x="connsiteX19" y="connsiteY19"/>
-              </a:cxn>
-              <a:cxn ang="0">
-                <a:pos x="connsiteX20" y="connsiteY20"/>
-              </a:cxn>
-              <a:cxn ang="0">
-                <a:pos x="connsiteX21" y="connsiteY21"/>
-              </a:cxn>
-              <a:cxn ang="0">
-                <a:pos x="connsiteX22" y="connsiteY22"/>
-              </a:cxn>
-              <a:cxn ang="0">
-                <a:pos x="connsiteX23" y="connsiteY23"/>
-              </a:cxn>
-              <a:cxn ang="0">
-                <a:pos x="connsiteX24" y="connsiteY24"/>
-              </a:cxn>
-              <a:cxn ang="0">
-                <a:pos x="connsiteX25" y="connsiteY25"/>
-              </a:cxn>
-              <a:cxn ang="0">
-                <a:pos x="connsiteX26" y="connsiteY26"/>
-              </a:cxn>
-              <a:cxn ang="0">
-                <a:pos x="connsiteX27" y="connsiteY27"/>
-              </a:cxn>
-              <a:cxn ang="0">
-                <a:pos x="connsiteX28" y="connsiteY28"/>
-              </a:cxn>
-              <a:cxn ang="0">
-                <a:pos x="connsiteX29" y="connsiteY29"/>
-              </a:cxn>
-              <a:cxn ang="0">
-                <a:pos x="connsiteX30" y="connsiteY30"/>
-              </a:cxn>
-              <a:cxn ang="0">
-                <a:pos x="connsiteX31" y="connsiteY31"/>
-              </a:cxn>
-              <a:cxn ang="0">
-                <a:pos x="connsiteX32" y="connsiteY32"/>
-              </a:cxn>
-              <a:cxn ang="0">
-                <a:pos x="connsiteX33" y="connsiteY33"/>
-              </a:cxn>
-              <a:cxn ang="0">
-                <a:pos x="connsiteX34" y="connsiteY34"/>
-              </a:cxn>
-              <a:cxn ang="0">
-                <a:pos x="connsiteX35" y="connsiteY35"/>
-              </a:cxn>
-              <a:cxn ang="0">
-                <a:pos x="connsiteX36" y="connsiteY36"/>
-              </a:cxn>
-              <a:cxn ang="0">
-                <a:pos x="connsiteX37" y="connsiteY37"/>
-              </a:cxn>
-              <a:cxn ang="0">
-                <a:pos x="connsiteX38" y="connsiteY38"/>
-              </a:cxn>
-              <a:cxn ang="0">
-                <a:pos x="connsiteX39" y="connsiteY39"/>
-              </a:cxn>
-              <a:cxn ang="0">
-                <a:pos x="connsiteX40" y="connsiteY40"/>
-              </a:cxn>
-              <a:cxn ang="0">
-                <a:pos x="connsiteX41" y="connsiteY41"/>
-              </a:cxn>
-              <a:cxn ang="0">
-                <a:pos x="connsiteX42" y="connsiteY42"/>
-              </a:cxn>
-              <a:cxn ang="0">
-                <a:pos x="connsiteX43" y="connsiteY43"/>
-              </a:cxn>
-              <a:cxn ang="0">
-                <a:pos x="connsiteX44" y="connsiteY44"/>
-              </a:cxn>
-              <a:cxn ang="0">
-                <a:pos x="connsiteX45" y="connsiteY45"/>
-              </a:cxn>
-              <a:cxn ang="0">
-                <a:pos x="connsiteX46" y="connsiteY46"/>
-              </a:cxn>
-              <a:cxn ang="0">
-                <a:pos x="connsiteX47" y="connsiteY47"/>
-              </a:cxn>
-              <a:cxn ang="0">
-                <a:pos x="connsiteX48" y="connsiteY48"/>
-              </a:cxn>
-              <a:cxn ang="0">
-                <a:pos x="connsiteX49" y="connsiteY49"/>
-              </a:cxn>
-              <a:cxn ang="0">
-                <a:pos x="connsiteX50" y="connsiteY50"/>
-              </a:cxn>
-              <a:cxn ang="0">
-                <a:pos x="connsiteX51" y="connsiteY51"/>
-              </a:cxn>
-              <a:cxn ang="0">
-                <a:pos x="connsiteX52" y="connsiteY52"/>
-              </a:cxn>
-              <a:cxn ang="0">
-                <a:pos x="connsiteX53" y="connsiteY53"/>
-              </a:cxn>
-              <a:cxn ang="0">
-                <a:pos x="connsiteX54" y="connsiteY54"/>
-              </a:cxn>
-              <a:cxn ang="0">
-                <a:pos x="connsiteX55" y="connsiteY55"/>
-              </a:cxn>
-              <a:cxn ang="0">
-                <a:pos x="connsiteX56" y="connsiteY56"/>
-              </a:cxn>
-              <a:cxn ang="0">
-                <a:pos x="connsiteX57" y="connsiteY57"/>
-              </a:cxn>
-              <a:cxn ang="0">
-                <a:pos x="connsiteX58" y="connsiteY58"/>
-              </a:cxn>
-              <a:cxn ang="0">
-                <a:pos x="connsiteX59" y="connsiteY59"/>
-              </a:cxn>
-              <a:cxn ang="0">
-                <a:pos x="connsiteX60" y="connsiteY60"/>
-              </a:cxn>
-              <a:cxn ang="0">
-                <a:pos x="connsiteX61" y="connsiteY61"/>
-              </a:cxn>
-              <a:cxn ang="0">
-                <a:pos x="connsiteX62" y="connsiteY62"/>
-              </a:cxn>
-              <a:cxn ang="0">
-                <a:pos x="connsiteX63" y="connsiteY63"/>
-              </a:cxn>
-              <a:cxn ang="0">
-                <a:pos x="connsiteX64" y="connsiteY64"/>
-              </a:cxn>
-              <a:cxn ang="0">
-                <a:pos x="connsiteX65" y="connsiteY65"/>
-              </a:cxn>
-              <a:cxn ang="0">
-                <a:pos x="connsiteX66" y="connsiteY66"/>
-              </a:cxn>
-              <a:cxn ang="0">
-                <a:pos x="connsiteX67" y="connsiteY67"/>
-              </a:cxn>
-              <a:cxn ang="0">
-                <a:pos x="connsiteX68" y="connsiteY68"/>
-              </a:cxn>
-              <a:cxn ang="0">
-                <a:pos x="connsiteX69" y="connsiteY69"/>
-              </a:cxn>
-              <a:cxn ang="0">
-                <a:pos x="connsiteX70" y="connsiteY70"/>
-              </a:cxn>
-              <a:cxn ang="0">
-                <a:pos x="connsiteX71" y="connsiteY71"/>
-              </a:cxn>
-              <a:cxn ang="0">
-                <a:pos x="connsiteX72" y="connsiteY72"/>
-              </a:cxn>
-            </a:cxnLst>
-            <a:rect l="l" t="t" r="r" b="b"/>
-            <a:pathLst>
-              <a:path w="6184806" h="5154967">
-                <a:moveTo>
-                  <a:pt x="363179" y="3125191"/>
-                </a:moveTo>
-                <a:cubicBezTo>
-                  <a:pt x="363179" y="3125191"/>
-                  <a:pt x="363179" y="3125191"/>
-                  <a:pt x="898270" y="3125191"/>
-                </a:cubicBezTo>
-                <a:cubicBezTo>
-                  <a:pt x="931786" y="3125191"/>
-                  <a:pt x="964145" y="3143614"/>
-                  <a:pt x="980326" y="3173551"/>
-                </a:cubicBezTo>
-                <a:cubicBezTo>
-                  <a:pt x="980326" y="3173551"/>
-                  <a:pt x="980326" y="3173551"/>
-                  <a:pt x="1248448" y="3635277"/>
-                </a:cubicBezTo>
-                <a:cubicBezTo>
-                  <a:pt x="1265784" y="3664063"/>
-                  <a:pt x="1265784" y="3700909"/>
-                  <a:pt x="1248448" y="3729695"/>
-                </a:cubicBezTo>
-                <a:cubicBezTo>
-                  <a:pt x="1248448" y="3729695"/>
-                  <a:pt x="1248448" y="3729695"/>
-                  <a:pt x="980326" y="4191421"/>
-                </a:cubicBezTo>
-                <a:cubicBezTo>
-                  <a:pt x="964145" y="4221358"/>
-                  <a:pt x="931786" y="4239781"/>
-                  <a:pt x="898270" y="4239781"/>
-                </a:cubicBezTo>
-                <a:cubicBezTo>
-                  <a:pt x="898270" y="4239781"/>
-                  <a:pt x="898270" y="4239781"/>
-                  <a:pt x="363179" y="4239781"/>
-                </a:cubicBezTo>
-                <a:cubicBezTo>
-                  <a:pt x="328508" y="4239781"/>
-                  <a:pt x="297305" y="4221358"/>
-                  <a:pt x="279969" y="4191421"/>
-                </a:cubicBezTo>
-                <a:cubicBezTo>
-                  <a:pt x="279969" y="4191421"/>
-                  <a:pt x="279969" y="4191421"/>
-                  <a:pt x="13002" y="3729695"/>
-                </a:cubicBezTo>
-                <a:cubicBezTo>
-                  <a:pt x="-4334" y="3700909"/>
-                  <a:pt x="-4334" y="3664063"/>
-                  <a:pt x="13002" y="3635277"/>
-                </a:cubicBezTo>
-                <a:cubicBezTo>
-                  <a:pt x="13002" y="3635277"/>
-                  <a:pt x="13002" y="3635277"/>
-                  <a:pt x="279969" y="3173551"/>
-                </a:cubicBezTo>
-                <a:cubicBezTo>
-                  <a:pt x="297305" y="3143614"/>
-                  <a:pt x="328508" y="3125191"/>
-                  <a:pt x="363179" y="3125191"/>
-                </a:cubicBezTo>
-                <a:close/>
-                <a:moveTo>
-                  <a:pt x="2489721" y="570035"/>
-                </a:moveTo>
-                <a:cubicBezTo>
-                  <a:pt x="2489721" y="570035"/>
-                  <a:pt x="2489721" y="570035"/>
-                  <a:pt x="2764862" y="570035"/>
-                </a:cubicBezTo>
-                <a:lnTo>
-                  <a:pt x="2796959" y="570035"/>
-                </a:lnTo>
-                <a:lnTo>
-                  <a:pt x="2827587" y="622777"/>
-                </a:lnTo>
-                <a:cubicBezTo>
-                  <a:pt x="2870233" y="696217"/>
-                  <a:pt x="2919858" y="781675"/>
-                  <a:pt x="2977604" y="881117"/>
-                </a:cubicBezTo>
-                <a:cubicBezTo>
-                  <a:pt x="3004153" y="925204"/>
-                  <a:pt x="3004153" y="981634"/>
-                  <a:pt x="2977604" y="1025720"/>
-                </a:cubicBezTo>
-                <a:cubicBezTo>
-                  <a:pt x="2977604" y="1025720"/>
-                  <a:pt x="2977604" y="1025720"/>
-                  <a:pt x="2566968" y="1732863"/>
-                </a:cubicBezTo>
-                <a:cubicBezTo>
-                  <a:pt x="2542188" y="1778712"/>
-                  <a:pt x="2492629" y="1806927"/>
-                  <a:pt x="2441299" y="1806927"/>
-                </a:cubicBezTo>
-                <a:cubicBezTo>
-                  <a:pt x="2441299" y="1806927"/>
-                  <a:pt x="2441299" y="1806927"/>
-                  <a:pt x="1621798" y="1806927"/>
-                </a:cubicBezTo>
-                <a:cubicBezTo>
-                  <a:pt x="1608523" y="1806927"/>
-                  <a:pt x="1595580" y="1805163"/>
-                  <a:pt x="1583218" y="1801802"/>
-                </a:cubicBezTo>
-                <a:lnTo>
-                  <a:pt x="1556683" y="1790677"/>
-                </a:lnTo>
-                <a:lnTo>
-                  <a:pt x="1572899" y="1762631"/>
-                </a:lnTo>
-                <a:cubicBezTo>
-                  <a:pt x="1719523" y="1509042"/>
-                  <a:pt x="1907201" y="1184448"/>
-                  <a:pt x="2147429" y="768968"/>
-                </a:cubicBezTo>
-                <a:cubicBezTo>
-                  <a:pt x="2218739" y="645819"/>
-                  <a:pt x="2347099" y="570035"/>
-                  <a:pt x="2489721" y="570035"/>
-                </a:cubicBezTo>
-                <a:close/>
-                <a:moveTo>
-                  <a:pt x="1573268" y="0"/>
-                </a:moveTo>
-                <a:cubicBezTo>
-                  <a:pt x="1573268" y="0"/>
-                  <a:pt x="1573268" y="0"/>
-                  <a:pt x="2497662" y="0"/>
-                </a:cubicBezTo>
-                <a:cubicBezTo>
-                  <a:pt x="2555561" y="0"/>
-                  <a:pt x="2611463" y="31828"/>
-                  <a:pt x="2639415" y="83546"/>
-                </a:cubicBezTo>
-                <a:cubicBezTo>
-                  <a:pt x="2639415" y="83546"/>
-                  <a:pt x="2639415" y="83546"/>
-                  <a:pt x="2887862" y="511387"/>
-                </a:cubicBezTo>
-                <a:lnTo>
-                  <a:pt x="2915928" y="559720"/>
-                </a:lnTo>
-                <a:lnTo>
-                  <a:pt x="2893844" y="559720"/>
-                </a:lnTo>
-                <a:lnTo>
-                  <a:pt x="2789466" y="559720"/>
-                </a:lnTo>
-                <a:lnTo>
-                  <a:pt x="2744122" y="481634"/>
-                </a:lnTo>
-                <a:cubicBezTo>
-                  <a:pt x="2570885" y="183309"/>
-                  <a:pt x="2570885" y="183309"/>
-                  <a:pt x="2570885" y="183309"/>
-                </a:cubicBezTo>
-                <a:cubicBezTo>
-                  <a:pt x="2546104" y="137459"/>
-                  <a:pt x="2496545" y="109244"/>
-                  <a:pt x="2445216" y="109244"/>
-                </a:cubicBezTo>
-                <a:cubicBezTo>
-                  <a:pt x="1625714" y="109244"/>
-                  <a:pt x="1625714" y="109244"/>
-                  <a:pt x="1625714" y="109244"/>
-                </a:cubicBezTo>
-                <a:cubicBezTo>
-                  <a:pt x="1572615" y="109244"/>
-                  <a:pt x="1524825" y="137459"/>
-                  <a:pt x="1498276" y="183309"/>
-                </a:cubicBezTo>
-                <a:cubicBezTo>
-                  <a:pt x="1089410" y="890450"/>
-                  <a:pt x="1089410" y="890450"/>
-                  <a:pt x="1089410" y="890450"/>
-                </a:cubicBezTo>
-                <a:cubicBezTo>
-                  <a:pt x="1062860" y="934537"/>
-                  <a:pt x="1062860" y="990968"/>
-                  <a:pt x="1089410" y="1035054"/>
-                </a:cubicBezTo>
-                <a:cubicBezTo>
-                  <a:pt x="1498276" y="1742196"/>
-                  <a:pt x="1498276" y="1742196"/>
-                  <a:pt x="1498276" y="1742196"/>
-                </a:cubicBezTo>
-                <a:cubicBezTo>
-                  <a:pt x="1511551" y="1765121"/>
-                  <a:pt x="1530135" y="1783637"/>
-                  <a:pt x="1552039" y="1796421"/>
-                </a:cubicBezTo>
-                <a:lnTo>
-                  <a:pt x="1558260" y="1799029"/>
-                </a:lnTo>
-                <a:lnTo>
-                  <a:pt x="1524911" y="1856707"/>
-                </a:lnTo>
-                <a:lnTo>
-                  <a:pt x="1500108" y="1899604"/>
-                </a:lnTo>
-                <a:lnTo>
-                  <a:pt x="1525834" y="1910390"/>
-                </a:lnTo>
-                <a:cubicBezTo>
-                  <a:pt x="1539779" y="1914181"/>
-                  <a:pt x="1554378" y="1916170"/>
-                  <a:pt x="1569352" y="1916170"/>
-                </a:cubicBezTo>
-                <a:cubicBezTo>
-                  <a:pt x="2493745" y="1916170"/>
-                  <a:pt x="2493745" y="1916170"/>
-                  <a:pt x="2493745" y="1916170"/>
-                </a:cubicBezTo>
-                <a:cubicBezTo>
-                  <a:pt x="2551645" y="1916170"/>
-                  <a:pt x="2607546" y="1884345"/>
-                  <a:pt x="2635498" y="1832627"/>
-                </a:cubicBezTo>
-                <a:cubicBezTo>
-                  <a:pt x="3098693" y="1034974"/>
-                  <a:pt x="3098693" y="1034974"/>
-                  <a:pt x="3098693" y="1034974"/>
-                </a:cubicBezTo>
-                <a:cubicBezTo>
-                  <a:pt x="3128641" y="985246"/>
-                  <a:pt x="3128641" y="921593"/>
-                  <a:pt x="3098693" y="871863"/>
-                </a:cubicBezTo>
-                <a:cubicBezTo>
-                  <a:pt x="3040794" y="772157"/>
-                  <a:pt x="2990132" y="684914"/>
-                  <a:pt x="2945803" y="608576"/>
-                </a:cubicBezTo>
-                <a:lnTo>
-                  <a:pt x="2923422" y="570035"/>
-                </a:lnTo>
-                <a:lnTo>
-                  <a:pt x="3027104" y="570035"/>
-                </a:lnTo>
-                <a:cubicBezTo>
-                  <a:pt x="3349535" y="570035"/>
-                  <a:pt x="3865424" y="570035"/>
-                  <a:pt x="4690846" y="570035"/>
-                </a:cubicBezTo>
-                <a:cubicBezTo>
-                  <a:pt x="4828714" y="570035"/>
-                  <a:pt x="4961827" y="645819"/>
-                  <a:pt x="5028384" y="768968"/>
-                </a:cubicBezTo>
-                <a:cubicBezTo>
-                  <a:pt x="5028384" y="768968"/>
-                  <a:pt x="5028384" y="768968"/>
-                  <a:pt x="6131323" y="2668304"/>
-                </a:cubicBezTo>
-                <a:cubicBezTo>
-                  <a:pt x="6202634" y="2786717"/>
-                  <a:pt x="6202634" y="2938285"/>
-                  <a:pt x="6131323" y="3056698"/>
-                </a:cubicBezTo>
-                <a:cubicBezTo>
-                  <a:pt x="6131323" y="3056698"/>
-                  <a:pt x="6131323" y="3056698"/>
-                  <a:pt x="5028384" y="4956035"/>
-                </a:cubicBezTo>
-                <a:cubicBezTo>
-                  <a:pt x="4961827" y="5079184"/>
-                  <a:pt x="4828714" y="5154967"/>
-                  <a:pt x="4690846" y="5154967"/>
-                </a:cubicBezTo>
-                <a:cubicBezTo>
-                  <a:pt x="4690846" y="5154967"/>
-                  <a:pt x="4690846" y="5154967"/>
-                  <a:pt x="2489721" y="5154967"/>
-                </a:cubicBezTo>
-                <a:cubicBezTo>
-                  <a:pt x="2347099" y="5154967"/>
-                  <a:pt x="2218739" y="5079184"/>
-                  <a:pt x="2147429" y="4956035"/>
-                </a:cubicBezTo>
-                <a:cubicBezTo>
-                  <a:pt x="2147429" y="4956035"/>
-                  <a:pt x="2147429" y="4956035"/>
-                  <a:pt x="1049243" y="3056698"/>
-                </a:cubicBezTo>
-                <a:cubicBezTo>
-                  <a:pt x="977932" y="2938285"/>
-                  <a:pt x="977932" y="2786717"/>
-                  <a:pt x="1049243" y="2668304"/>
-                </a:cubicBezTo>
-                <a:cubicBezTo>
-                  <a:pt x="1049243" y="2668304"/>
-                  <a:pt x="1049243" y="2668304"/>
-                  <a:pt x="1457007" y="1963067"/>
-                </a:cubicBezTo>
-                <a:lnTo>
-                  <a:pt x="1491373" y="1903634"/>
-                </a:lnTo>
-                <a:lnTo>
-                  <a:pt x="1490164" y="1903127"/>
-                </a:lnTo>
-                <a:cubicBezTo>
-                  <a:pt x="1465456" y="1888705"/>
-                  <a:pt x="1444493" y="1867820"/>
-                  <a:pt x="1429519" y="1841960"/>
-                </a:cubicBezTo>
-                <a:cubicBezTo>
-                  <a:pt x="1429519" y="1841960"/>
-                  <a:pt x="1429519" y="1841960"/>
-                  <a:pt x="968320" y="1044307"/>
-                </a:cubicBezTo>
-                <a:cubicBezTo>
-                  <a:pt x="938371" y="994579"/>
-                  <a:pt x="938371" y="930926"/>
-                  <a:pt x="968320" y="881196"/>
-                </a:cubicBezTo>
-                <a:cubicBezTo>
-                  <a:pt x="968320" y="881196"/>
-                  <a:pt x="968320" y="881196"/>
-                  <a:pt x="1429519" y="83546"/>
-                </a:cubicBezTo>
-                <a:cubicBezTo>
-                  <a:pt x="1459466" y="31828"/>
-                  <a:pt x="1513373" y="0"/>
-                  <a:pt x="1573268" y="0"/>
-                </a:cubicBezTo>
-                <a:close/>
-              </a:path>
-            </a:pathLst>
-          </a:custGeom>
-          <a:solidFill>
-            <a:schemeClr val="tx1">
-              <a:lumMod val="50000"/>
-              <a:lumOff val="50000"/>
-              <a:alpha val="15000"/>
-            </a:schemeClr>
-          </a:solidFill>
-          <a:ln>
-            <a:noFill/>
-          </a:ln>
-        </p:spPr>
-        <p:style>
-          <a:lnRef idx="2">
-            <a:schemeClr val="accent1">
-              <a:shade val="50000"/>
-            </a:schemeClr>
-          </a:lnRef>
-          <a:fillRef idx="1">
-            <a:schemeClr val="accent1"/>
-          </a:fillRef>
-          <a:effectRef idx="0">
-            <a:schemeClr val="accent1"/>
-          </a:effectRef>
-          <a:fontRef idx="minor">
-            <a:schemeClr val="lt1"/>
-          </a:fontRef>
-        </p:style>
-        <p:txBody>
-          <a:bodyPr wrap="square" rtlCol="0" anchor="ctr">
-            <a:noAutofit/>
-          </a:bodyPr>
-          <a:lstStyle/>
-          <a:p>
-            <a:pPr marL="0" marR="0" lvl="0" indent="0" algn="ctr" defTabSz="914400" rtl="0" eaLnBrk="1" fontAlgn="auto" latinLnBrk="0" hangingPunct="1">
-              <a:lnSpc>
-                <a:spcPct val="100000"/>
-              </a:lnSpc>
-              <a:spcBef>
-                <a:spcPts val="0"/>
-              </a:spcBef>
-              <a:spcAft>
-                <a:spcPts val="0"/>
-              </a:spcAft>
-              <a:buClrTx/>
-              <a:buSzTx/>
-              <a:buFontTx/>
-              <a:buNone/>
-              <a:tabLst/>
-              <a:defRPr/>
-            </a:pPr>
-            <a:endParaRPr kumimoji="0" lang="en-US" sz="1800" b="0" i="0" u="none" strike="noStrike" kern="1200" cap="none" spc="0" normalizeH="0" baseline="0" noProof="0">
-              <a:ln>
-                <a:noFill/>
-              </a:ln>
-              <a:solidFill>
-                <a:prstClr val="white"/>
-              </a:solidFill>
-              <a:effectLst/>
-              <a:uLnTx/>
-              <a:uFillTx/>
-              <a:latin typeface="Calibri" panose="020F0502020204030204"/>
-              <a:ea typeface="+mn-ea"/>
-              <a:cs typeface="+mn-cs"/>
-            </a:endParaRPr>
-          </a:p>
-        </p:txBody>
-      </p:sp>
-      <p:pic>
-        <p:nvPicPr>
-          <p:cNvPr id="12" name="Graphic 11" descr="Presentation with org chart outline">
-            <a:extLst>
-              <a:ext uri="{FF2B5EF4-FFF2-40B4-BE49-F238E27FC236}">
-                <a16:creationId xmlns:a16="http://schemas.microsoft.com/office/drawing/2014/main" id="{CDFDEDDB-6CAB-4D49-A9B6-27870157A86E}"/>
-              </a:ext>
-            </a:extLst>
-          </p:cNvPr>
-          <p:cNvPicPr>
-            <a:picLocks noChangeAspect="1"/>
-          </p:cNvPicPr>
-          <p:nvPr/>
-        </p:nvPicPr>
-        <p:blipFill>
-          <a:blip r:embed="rId2">
-            <a:extLst>
-              <a:ext uri="{28A0092B-C50C-407E-A947-70E740481C1C}">
-                <a14:useLocalDpi xmlns:a14="http://schemas.microsoft.com/office/drawing/2010/main" val="0"/>
-              </a:ext>
-              <a:ext uri="{96DAC541-7B7A-43D3-8B79-37D633B846F1}">
-                <asvg:svgBlip xmlns:asvg="http://schemas.microsoft.com/office/drawing/2016/SVG/main" r:embed="rId3"/>
-              </a:ext>
-            </a:extLst>
-          </a:blip>
-          <a:stretch>
-            <a:fillRect/>
-          </a:stretch>
-        </p:blipFill>
-        <p:spPr>
-          <a:xfrm>
-            <a:off x="7535330" y="2105470"/>
-            <a:ext cx="3217333" cy="3217333"/>
-          </a:xfrm>
-          <a:prstGeom prst="rect">
-            <a:avLst/>
-          </a:prstGeom>
-        </p:spPr>
-      </p:pic>
-    </p:spTree>
-    <p:extLst>
-      <p:ext uri="{BB962C8B-B14F-4D97-AF65-F5344CB8AC3E}">
-        <p14:creationId xmlns:p14="http://schemas.microsoft.com/office/powerpoint/2010/main" val="286083836"/>
-      </p:ext>
-    </p:extLst>
-  </p:cSld>
-  <p:clrMapOvr>
-    <a:masterClrMapping/>
-  </p:clrMapOvr>
-  <p:timing>
-    <p:tnLst>
-      <p:par>
-        <p:cTn id="1" dur="indefinite" restart="never" nodeType="tmRoot">
-          <p:childTnLst>
-            <p:seq concurrent="1" nextAc="seek">
-              <p:cTn id="2" dur="indefinite" nodeType="mainSeq">
-                <p:childTnLst>
-                  <p:par>
-                    <p:cTn id="3" fill="hold">
-                      <p:stCondLst>
-                        <p:cond delay="indefinite"/>
-                      </p:stCondLst>
-                      <p:childTnLst>
-                        <p:par>
-                          <p:cTn id="4" fill="hold">
-                            <p:stCondLst>
-                              <p:cond delay="0"/>
-                            </p:stCondLst>
-                            <p:childTnLst>
-                              <p:par>
-                                <p:cTn id="5" presetID="1" presetClass="entr" presetSubtype="0" fill="hold" nodeType="clickEffect">
-                                  <p:stCondLst>
-                                    <p:cond delay="0"/>
-                                  </p:stCondLst>
-                                  <p:childTnLst>
-                                    <p:set>
-                                      <p:cBhvr>
-                                        <p:cTn id="6" dur="1" fill="hold">
-                                          <p:stCondLst>
-                                            <p:cond delay="0"/>
-                                          </p:stCondLst>
-                                        </p:cTn>
-                                        <p:tgtEl>
-                                          <p:spTgt spid="13">
-                                            <p:txEl>
-                                              <p:pRg st="0" end="0"/>
-                                            </p:txEl>
-                                          </p:spTgt>
-                                        </p:tgtEl>
-                                        <p:attrNameLst>
-                                          <p:attrName>style.visibility</p:attrName>
-                                        </p:attrNameLst>
-                                      </p:cBhvr>
-                                      <p:to>
-                                        <p:strVal val="visible"/>
-                                      </p:to>
-                                    </p:set>
-                                  </p:childTnLst>
-                                </p:cTn>
-                              </p:par>
-                            </p:childTnLst>
-                          </p:cTn>
-                        </p:par>
-                      </p:childTnLst>
-                    </p:cTn>
-                  </p:par>
-                  <p:par>
-                    <p:cTn id="7" fill="hold">
-                      <p:stCondLst>
-                        <p:cond delay="indefinite"/>
-                      </p:stCondLst>
-                      <p:childTnLst>
-                        <p:par>
-                          <p:cTn id="8" fill="hold">
-                            <p:stCondLst>
-                              <p:cond delay="0"/>
-                            </p:stCondLst>
-                            <p:childTnLst>
-                              <p:par>
-                                <p:cTn id="9" presetID="1" presetClass="entr" presetSubtype="0" fill="hold" nodeType="clickEffect">
-                                  <p:stCondLst>
-                                    <p:cond delay="0"/>
-                                  </p:stCondLst>
-                                  <p:childTnLst>
-                                    <p:set>
-                                      <p:cBhvr>
-                                        <p:cTn id="10" dur="1" fill="hold">
-                                          <p:stCondLst>
-                                            <p:cond delay="0"/>
-                                          </p:stCondLst>
-                                        </p:cTn>
-                                        <p:tgtEl>
-                                          <p:spTgt spid="13">
-                                            <p:txEl>
-                                              <p:pRg st="1" end="1"/>
-                                            </p:txEl>
-                                          </p:spTgt>
-                                        </p:tgtEl>
-                                        <p:attrNameLst>
-                                          <p:attrName>style.visibility</p:attrName>
-                                        </p:attrNameLst>
-                                      </p:cBhvr>
-                                      <p:to>
-                                        <p:strVal val="visible"/>
-                                      </p:to>
-                                    </p:set>
-                                  </p:childTnLst>
-                                </p:cTn>
-                              </p:par>
-                            </p:childTnLst>
-                          </p:cTn>
-                        </p:par>
-                      </p:childTnLst>
-                    </p:cTn>
-                  </p:par>
-                  <p:par>
-                    <p:cTn id="11" fill="hold">
-                      <p:stCondLst>
-                        <p:cond delay="indefinite"/>
-                      </p:stCondLst>
-                      <p:childTnLst>
-                        <p:par>
-                          <p:cTn id="12" fill="hold">
-                            <p:stCondLst>
-                              <p:cond delay="0"/>
-                            </p:stCondLst>
-                            <p:childTnLst>
-                              <p:par>
-                                <p:cTn id="13" presetID="1" presetClass="entr" presetSubtype="0" fill="hold" nodeType="clickEffect">
-                                  <p:stCondLst>
-                                    <p:cond delay="0"/>
-                                  </p:stCondLst>
-                                  <p:childTnLst>
-                                    <p:set>
-                                      <p:cBhvr>
-                                        <p:cTn id="14" dur="1" fill="hold">
-                                          <p:stCondLst>
-                                            <p:cond delay="0"/>
-                                          </p:stCondLst>
-                                        </p:cTn>
-                                        <p:tgtEl>
-                                          <p:spTgt spid="13">
-                                            <p:txEl>
-                                              <p:pRg st="2" end="2"/>
-                                            </p:txEl>
-                                          </p:spTgt>
-                                        </p:tgtEl>
-                                        <p:attrNameLst>
-                                          <p:attrName>style.visibility</p:attrName>
-                                        </p:attrNameLst>
-                                      </p:cBhvr>
-                                      <p:to>
-                                        <p:strVal val="visible"/>
-                                      </p:to>
-                                    </p:set>
-                                  </p:childTnLst>
-                                </p:cTn>
-                              </p:par>
-                            </p:childTnLst>
-                          </p:cTn>
-                        </p:par>
-                      </p:childTnLst>
-                    </p:cTn>
-                  </p:par>
-                  <p:par>
-                    <p:cTn id="15" fill="hold">
-                      <p:stCondLst>
-                        <p:cond delay="indefinite"/>
-                      </p:stCondLst>
-                      <p:childTnLst>
-                        <p:par>
-                          <p:cTn id="16" fill="hold">
-                            <p:stCondLst>
-                              <p:cond delay="0"/>
-                            </p:stCondLst>
-                            <p:childTnLst>
-                              <p:par>
-                                <p:cTn id="17" presetID="1" presetClass="entr" presetSubtype="0" fill="hold" nodeType="clickEffect">
-                                  <p:stCondLst>
-                                    <p:cond delay="0"/>
-                                  </p:stCondLst>
-                                  <p:childTnLst>
-                                    <p:set>
-                                      <p:cBhvr>
-                                        <p:cTn id="18" dur="1" fill="hold">
-                                          <p:stCondLst>
-                                            <p:cond delay="0"/>
-                                          </p:stCondLst>
-                                        </p:cTn>
-                                        <p:tgtEl>
-                                          <p:spTgt spid="13">
-                                            <p:txEl>
-                                              <p:pRg st="3" end="3"/>
-                                            </p:txEl>
-                                          </p:spTgt>
-                                        </p:tgtEl>
-                                        <p:attrNameLst>
-                                          <p:attrName>style.visibility</p:attrName>
-                                        </p:attrNameLst>
-                                      </p:cBhvr>
-                                      <p:to>
-                                        <p:strVal val="visible"/>
-                                      </p:to>
-                                    </p:set>
-                                  </p:childTnLst>
-                                </p:cTn>
-                              </p:par>
-                            </p:childTnLst>
-                          </p:cTn>
-                        </p:par>
-                      </p:childTnLst>
-                    </p:cTn>
-                  </p:par>
-                </p:childTnLst>
-              </p:cTn>
-              <p:prevCondLst>
-                <p:cond evt="onPrev" delay="0">
-                  <p:tgtEl>
-                    <p:sldTgt/>
-                  </p:tgtEl>
-                </p:cond>
-              </p:prevCondLst>
-              <p:nextCondLst>
-                <p:cond evt="onNext" delay="0">
-                  <p:tgtEl>
-                    <p:sldTgt/>
-                  </p:tgtEl>
-                </p:cond>
-              </p:nextCondLst>
-            </p:seq>
-          </p:childTnLst>
-        </p:cTn>
-      </p:par>
-    </p:tnLst>
-  </p:timing>
-</p:sld>
-</file>
-
-<file path=ppt/slides/slide4.xml><?xml version="1.0" encoding="utf-8"?>
 <p:sld xmlns:a="http://schemas.openxmlformats.org/drawingml/2006/main" xmlns:r="http://schemas.openxmlformats.org/officeDocument/2006/relationships" xmlns:p="http://schemas.openxmlformats.org/presentationml/2006/main">
   <p:cSld>
     <p:spTree>
@@ -17413,7 +15103,7 @@
 </p:sld>
 </file>
 
-<file path=ppt/slides/slide5.xml><?xml version="1.0" encoding="utf-8"?>
+<file path=ppt/slides/slide4.xml><?xml version="1.0" encoding="utf-8"?>
 <p:sld xmlns:a="http://schemas.openxmlformats.org/drawingml/2006/main" xmlns:r="http://schemas.openxmlformats.org/officeDocument/2006/relationships" xmlns:p="http://schemas.openxmlformats.org/presentationml/2006/main">
   <p:cSld>
     <p:bg>
@@ -18567,7 +16257,7 @@
 </p:sld>
 </file>
 
-<file path=ppt/slides/slide6.xml><?xml version="1.0" encoding="utf-8"?>
+<file path=ppt/slides/slide5.xml><?xml version="1.0" encoding="utf-8"?>
 <p:sld xmlns:a="http://schemas.openxmlformats.org/drawingml/2006/main" xmlns:r="http://schemas.openxmlformats.org/officeDocument/2006/relationships" xmlns:p="http://schemas.openxmlformats.org/presentationml/2006/main">
   <p:cSld>
     <p:bg>
@@ -19118,7 +16808,7 @@
 </p:sld>
 </file>
 
-<file path=ppt/slides/slide7.xml><?xml version="1.0" encoding="utf-8"?>
+<file path=ppt/slides/slide6.xml><?xml version="1.0" encoding="utf-8"?>
 <p:sld xmlns:a="http://schemas.openxmlformats.org/drawingml/2006/main" xmlns:r="http://schemas.openxmlformats.org/officeDocument/2006/relationships" xmlns:p="http://schemas.openxmlformats.org/presentationml/2006/main">
   <p:cSld>
     <p:bg>
@@ -20272,7 +17962,7 @@
 </p:sld>
 </file>
 
-<file path=ppt/slides/slide8.xml><?xml version="1.0" encoding="utf-8"?>
+<file path=ppt/slides/slide7.xml><?xml version="1.0" encoding="utf-8"?>
 <p:sld xmlns:a="http://schemas.openxmlformats.org/drawingml/2006/main" xmlns:r="http://schemas.openxmlformats.org/officeDocument/2006/relationships" xmlns:p="http://schemas.openxmlformats.org/presentationml/2006/main">
   <p:cSld>
     <p:bg>
@@ -20556,7 +18246,7 @@
 </p:sld>
 </file>
 
-<file path=ppt/slides/slide9.xml><?xml version="1.0" encoding="utf-8"?>
+<file path=ppt/slides/slide8.xml><?xml version="1.0" encoding="utf-8"?>
 <p:sld xmlns:a="http://schemas.openxmlformats.org/drawingml/2006/main" xmlns:r="http://schemas.openxmlformats.org/officeDocument/2006/relationships" xmlns:p="http://schemas.openxmlformats.org/presentationml/2006/main">
   <p:cSld>
     <p:bg>
@@ -21177,6 +18867,1160 @@
       <p:bldP spid="6" grpId="0"/>
     </p:bldLst>
   </p:timing>
+</p:sld>
+</file>
+
+<file path=ppt/slides/slide9.xml><?xml version="1.0" encoding="utf-8"?>
+<p:sld xmlns:a="http://schemas.openxmlformats.org/drawingml/2006/main" xmlns:r="http://schemas.openxmlformats.org/officeDocument/2006/relationships" xmlns:p="http://schemas.openxmlformats.org/presentationml/2006/main">
+  <p:cSld>
+    <p:bg>
+      <p:bgPr>
+        <a:solidFill>
+          <a:srgbClr val="EAF1F6"/>
+        </a:solidFill>
+        <a:effectLst/>
+      </p:bgPr>
+    </p:bg>
+    <p:spTree>
+      <p:nvGrpSpPr>
+        <p:cNvPr id="1" name=""/>
+        <p:cNvGrpSpPr/>
+        <p:nvPr/>
+      </p:nvGrpSpPr>
+      <p:grpSpPr>
+        <a:xfrm>
+          <a:off x="0" y="0"/>
+          <a:ext cx="0" cy="0"/>
+          <a:chOff x="0" y="0"/>
+          <a:chExt cx="0" cy="0"/>
+        </a:xfrm>
+      </p:grpSpPr>
+      <p:sp useBgFill="1">
+        <p:nvSpPr>
+          <p:cNvPr id="27" name="Rectangle 26">
+            <a:extLst>
+              <a:ext uri="{FF2B5EF4-FFF2-40B4-BE49-F238E27FC236}">
+                <a16:creationId xmlns:a16="http://schemas.microsoft.com/office/drawing/2014/main" id="{C475749F-F487-4EFB-ABC7-C1359590EB76}"/>
+              </a:ext>
+              <a:ext uri="{C183D7F6-B498-43B3-948B-1728B52AA6E4}">
+                <adec:decorative xmlns:adec="http://schemas.microsoft.com/office/drawing/2017/decorative" val="1"/>
+              </a:ext>
+            </a:extLst>
+          </p:cNvPr>
+          <p:cNvSpPr>
+            <a:spLocks noGrp="1" noRot="1" noChangeAspect="1" noMove="1" noResize="1" noEditPoints="1" noAdjustHandles="1" noChangeArrowheads="1" noChangeShapeType="1" noTextEdit="1"/>
+          </p:cNvSpPr>
+          <p:nvPr>
+            <p:extLst>
+              <p:ext uri="{386F3935-93C4-4BCD-93E2-E3B085C9AB24}">
+                <p16:designElem xmlns:p16="http://schemas.microsoft.com/office/powerpoint/2015/main" val="1"/>
+              </p:ext>
+            </p:extLst>
+          </p:nvPr>
+        </p:nvSpPr>
+        <p:spPr>
+          <a:xfrm>
+            <a:off x="0" y="0"/>
+            <a:ext cx="12192000" cy="6858000"/>
+          </a:xfrm>
+          <a:prstGeom prst="rect">
+            <a:avLst/>
+          </a:prstGeom>
+          <a:ln>
+            <a:noFill/>
+          </a:ln>
+        </p:spPr>
+        <p:style>
+          <a:lnRef idx="2">
+            <a:schemeClr val="accent1">
+              <a:shade val="50000"/>
+            </a:schemeClr>
+          </a:lnRef>
+          <a:fillRef idx="1">
+            <a:schemeClr val="accent1"/>
+          </a:fillRef>
+          <a:effectRef idx="0">
+            <a:schemeClr val="accent1"/>
+          </a:effectRef>
+          <a:fontRef idx="minor">
+            <a:schemeClr val="lt1"/>
+          </a:fontRef>
+        </p:style>
+        <p:txBody>
+          <a:bodyPr rtlCol="0" anchor="ctr"/>
+          <a:lstStyle/>
+          <a:p>
+            <a:pPr algn="ctr"/>
+            <a:endParaRPr lang="en-US"/>
+          </a:p>
+        </p:txBody>
+      </p:sp>
+      <p:sp>
+        <p:nvSpPr>
+          <p:cNvPr id="29" name="Freeform 5">
+            <a:extLst>
+              <a:ext uri="{FF2B5EF4-FFF2-40B4-BE49-F238E27FC236}">
+                <a16:creationId xmlns:a16="http://schemas.microsoft.com/office/drawing/2014/main" id="{F6285A5F-6712-47A0-8A11-F0DFF60D0D20}"/>
+              </a:ext>
+              <a:ext uri="{C183D7F6-B498-43B3-948B-1728B52AA6E4}">
+                <adec:decorative xmlns:adec="http://schemas.microsoft.com/office/drawing/2017/decorative" val="1"/>
+              </a:ext>
+            </a:extLst>
+          </p:cNvPr>
+          <p:cNvSpPr>
+            <a:spLocks noGrp="1" noRot="1" noChangeAspect="1" noMove="1" noResize="1" noEditPoints="1" noAdjustHandles="1" noChangeArrowheads="1" noChangeShapeType="1" noTextEdit="1"/>
+          </p:cNvSpPr>
+          <p:nvPr>
+            <p:extLst>
+              <p:ext uri="{386F3935-93C4-4BCD-93E2-E3B085C9AB24}">
+                <p16:designElem xmlns:p16="http://schemas.microsoft.com/office/powerpoint/2015/main" val="1"/>
+              </p:ext>
+            </p:extLst>
+          </p:nvPr>
+        </p:nvSpPr>
+        <p:spPr bwMode="auto">
+          <a:xfrm>
+            <a:off x="7276856" y="1645695"/>
+            <a:ext cx="4418320" cy="3877280"/>
+          </a:xfrm>
+          <a:custGeom>
+            <a:avLst/>
+            <a:gdLst>
+              <a:gd name="T0" fmla="*/ 781 w 1099"/>
+              <a:gd name="T1" fmla="*/ 0 h 968"/>
+              <a:gd name="T2" fmla="*/ 318 w 1099"/>
+              <a:gd name="T3" fmla="*/ 0 h 968"/>
+              <a:gd name="T4" fmla="*/ 246 w 1099"/>
+              <a:gd name="T5" fmla="*/ 42 h 968"/>
+              <a:gd name="T6" fmla="*/ 15 w 1099"/>
+              <a:gd name="T7" fmla="*/ 443 h 968"/>
+              <a:gd name="T8" fmla="*/ 15 w 1099"/>
+              <a:gd name="T9" fmla="*/ 525 h 968"/>
+              <a:gd name="T10" fmla="*/ 246 w 1099"/>
+              <a:gd name="T11" fmla="*/ 926 h 968"/>
+              <a:gd name="T12" fmla="*/ 318 w 1099"/>
+              <a:gd name="T13" fmla="*/ 968 h 968"/>
+              <a:gd name="T14" fmla="*/ 781 w 1099"/>
+              <a:gd name="T15" fmla="*/ 968 h 968"/>
+              <a:gd name="T16" fmla="*/ 852 w 1099"/>
+              <a:gd name="T17" fmla="*/ 926 h 968"/>
+              <a:gd name="T18" fmla="*/ 1084 w 1099"/>
+              <a:gd name="T19" fmla="*/ 525 h 968"/>
+              <a:gd name="T20" fmla="*/ 1084 w 1099"/>
+              <a:gd name="T21" fmla="*/ 443 h 968"/>
+              <a:gd name="T22" fmla="*/ 852 w 1099"/>
+              <a:gd name="T23" fmla="*/ 42 h 968"/>
+              <a:gd name="T24" fmla="*/ 781 w 1099"/>
+              <a:gd name="T25" fmla="*/ 0 h 968"/>
+            </a:gdLst>
+            <a:ahLst/>
+            <a:cxnLst>
+              <a:cxn ang="0">
+                <a:pos x="T0" y="T1"/>
+              </a:cxn>
+              <a:cxn ang="0">
+                <a:pos x="T2" y="T3"/>
+              </a:cxn>
+              <a:cxn ang="0">
+                <a:pos x="T4" y="T5"/>
+              </a:cxn>
+              <a:cxn ang="0">
+                <a:pos x="T6" y="T7"/>
+              </a:cxn>
+              <a:cxn ang="0">
+                <a:pos x="T8" y="T9"/>
+              </a:cxn>
+              <a:cxn ang="0">
+                <a:pos x="T10" y="T11"/>
+              </a:cxn>
+              <a:cxn ang="0">
+                <a:pos x="T12" y="T13"/>
+              </a:cxn>
+              <a:cxn ang="0">
+                <a:pos x="T14" y="T15"/>
+              </a:cxn>
+              <a:cxn ang="0">
+                <a:pos x="T16" y="T17"/>
+              </a:cxn>
+              <a:cxn ang="0">
+                <a:pos x="T18" y="T19"/>
+              </a:cxn>
+              <a:cxn ang="0">
+                <a:pos x="T20" y="T21"/>
+              </a:cxn>
+              <a:cxn ang="0">
+                <a:pos x="T22" y="T23"/>
+              </a:cxn>
+              <a:cxn ang="0">
+                <a:pos x="T24" y="T25"/>
+              </a:cxn>
+            </a:cxnLst>
+            <a:rect l="0" t="0" r="r" b="b"/>
+            <a:pathLst>
+              <a:path w="1099" h="968">
+                <a:moveTo>
+                  <a:pt x="781" y="0"/>
+                </a:moveTo>
+                <a:cubicBezTo>
+                  <a:pt x="318" y="0"/>
+                  <a:pt x="318" y="0"/>
+                  <a:pt x="318" y="0"/>
+                </a:cubicBezTo>
+                <a:cubicBezTo>
+                  <a:pt x="288" y="0"/>
+                  <a:pt x="261" y="16"/>
+                  <a:pt x="246" y="42"/>
+                </a:cubicBezTo>
+                <a:cubicBezTo>
+                  <a:pt x="15" y="443"/>
+                  <a:pt x="15" y="443"/>
+                  <a:pt x="15" y="443"/>
+                </a:cubicBezTo>
+                <a:cubicBezTo>
+                  <a:pt x="0" y="468"/>
+                  <a:pt x="0" y="500"/>
+                  <a:pt x="15" y="525"/>
+                </a:cubicBezTo>
+                <a:cubicBezTo>
+                  <a:pt x="246" y="926"/>
+                  <a:pt x="246" y="926"/>
+                  <a:pt x="246" y="926"/>
+                </a:cubicBezTo>
+                <a:cubicBezTo>
+                  <a:pt x="261" y="952"/>
+                  <a:pt x="288" y="968"/>
+                  <a:pt x="318" y="968"/>
+                </a:cubicBezTo>
+                <a:cubicBezTo>
+                  <a:pt x="781" y="968"/>
+                  <a:pt x="781" y="968"/>
+                  <a:pt x="781" y="968"/>
+                </a:cubicBezTo>
+                <a:cubicBezTo>
+                  <a:pt x="810" y="968"/>
+                  <a:pt x="838" y="952"/>
+                  <a:pt x="852" y="926"/>
+                </a:cubicBezTo>
+                <a:cubicBezTo>
+                  <a:pt x="1084" y="525"/>
+                  <a:pt x="1084" y="525"/>
+                  <a:pt x="1084" y="525"/>
+                </a:cubicBezTo>
+                <a:cubicBezTo>
+                  <a:pt x="1099" y="500"/>
+                  <a:pt x="1099" y="468"/>
+                  <a:pt x="1084" y="443"/>
+                </a:cubicBezTo>
+                <a:cubicBezTo>
+                  <a:pt x="852" y="42"/>
+                  <a:pt x="852" y="42"/>
+                  <a:pt x="852" y="42"/>
+                </a:cubicBezTo>
+                <a:cubicBezTo>
+                  <a:pt x="838" y="16"/>
+                  <a:pt x="810" y="0"/>
+                  <a:pt x="781" y="0"/>
+                </a:cubicBezTo>
+                <a:close/>
+              </a:path>
+            </a:pathLst>
+          </a:custGeom>
+          <a:noFill/>
+          <a:ln w="50800" cap="flat">
+            <a:solidFill>
+              <a:schemeClr val="tx1"/>
+            </a:solidFill>
+            <a:prstDash val="solid"/>
+            <a:miter lim="800000"/>
+            <a:headEnd/>
+            <a:tailEnd/>
+          </a:ln>
+        </p:spPr>
+        <p:txBody>
+          <a:bodyPr vert="horz" wrap="square" lIns="91440" tIns="45720" rIns="91440" bIns="45720" numCol="1" anchor="t" anchorCtr="0" compatLnSpc="1">
+            <a:prstTxWarp prst="textNoShape">
+              <a:avLst/>
+            </a:prstTxWarp>
+          </a:bodyPr>
+          <a:lstStyle/>
+          <a:p>
+            <a:endParaRPr lang="en-US" dirty="0"/>
+          </a:p>
+        </p:txBody>
+      </p:sp>
+      <p:sp>
+        <p:nvSpPr>
+          <p:cNvPr id="31" name="Freeform: Shape 30">
+            <a:extLst>
+              <a:ext uri="{FF2B5EF4-FFF2-40B4-BE49-F238E27FC236}">
+                <a16:creationId xmlns:a16="http://schemas.microsoft.com/office/drawing/2014/main" id="{FA6F8ABB-6C5D-4349-9E1B-198D1ABFA804}"/>
+              </a:ext>
+              <a:ext uri="{C183D7F6-B498-43B3-948B-1728B52AA6E4}">
+                <adec:decorative xmlns:adec="http://schemas.microsoft.com/office/drawing/2017/decorative" val="1"/>
+              </a:ext>
+            </a:extLst>
+          </p:cNvPr>
+          <p:cNvSpPr>
+            <a:spLocks noGrp="1" noRot="1" noChangeAspect="1" noMove="1" noResize="1" noEditPoints="1" noAdjustHandles="1" noChangeArrowheads="1" noChangeShapeType="1" noTextEdit="1"/>
+          </p:cNvSpPr>
+          <p:nvPr>
+            <p:extLst>
+              <p:ext uri="{386F3935-93C4-4BCD-93E2-E3B085C9AB24}">
+                <p16:designElem xmlns:p16="http://schemas.microsoft.com/office/powerpoint/2015/main" val="1"/>
+              </p:ext>
+            </p:extLst>
+          </p:nvPr>
+        </p:nvSpPr>
+        <p:spPr>
+          <a:xfrm>
+            <a:off x="5952343" y="643383"/>
+            <a:ext cx="2926988" cy="2594434"/>
+          </a:xfrm>
+          <a:custGeom>
+            <a:avLst/>
+            <a:gdLst>
+              <a:gd name="connsiteX0" fmla="*/ 853538 w 2991693"/>
+              <a:gd name="connsiteY0" fmla="*/ 0 h 2651787"/>
+              <a:gd name="connsiteX1" fmla="*/ 2141030 w 2991693"/>
+              <a:gd name="connsiteY1" fmla="*/ 0 h 2651787"/>
+              <a:gd name="connsiteX2" fmla="*/ 2324957 w 2991693"/>
+              <a:gd name="connsiteY2" fmla="*/ 103466 h 2651787"/>
+              <a:gd name="connsiteX3" fmla="*/ 2968702 w 2991693"/>
+              <a:gd name="connsiteY3" fmla="*/ 1218596 h 2651787"/>
+              <a:gd name="connsiteX4" fmla="*/ 2968702 w 2991693"/>
+              <a:gd name="connsiteY4" fmla="*/ 1433192 h 2651787"/>
+              <a:gd name="connsiteX5" fmla="*/ 2324957 w 2991693"/>
+              <a:gd name="connsiteY5" fmla="*/ 2548321 h 2651787"/>
+              <a:gd name="connsiteX6" fmla="*/ 2141030 w 2991693"/>
+              <a:gd name="connsiteY6" fmla="*/ 2651787 h 2651787"/>
+              <a:gd name="connsiteX7" fmla="*/ 853538 w 2991693"/>
+              <a:gd name="connsiteY7" fmla="*/ 2651787 h 2651787"/>
+              <a:gd name="connsiteX8" fmla="*/ 669612 w 2991693"/>
+              <a:gd name="connsiteY8" fmla="*/ 2548321 h 2651787"/>
+              <a:gd name="connsiteX9" fmla="*/ 25866 w 2991693"/>
+              <a:gd name="connsiteY9" fmla="*/ 1433192 h 2651787"/>
+              <a:gd name="connsiteX10" fmla="*/ 25866 w 2991693"/>
+              <a:gd name="connsiteY10" fmla="*/ 1218596 h 2651787"/>
+              <a:gd name="connsiteX11" fmla="*/ 669612 w 2991693"/>
+              <a:gd name="connsiteY11" fmla="*/ 103466 h 2651787"/>
+              <a:gd name="connsiteX12" fmla="*/ 853538 w 2991693"/>
+              <a:gd name="connsiteY12" fmla="*/ 0 h 2651787"/>
+            </a:gdLst>
+            <a:ahLst/>
+            <a:cxnLst>
+              <a:cxn ang="0">
+                <a:pos x="connsiteX0" y="connsiteY0"/>
+              </a:cxn>
+              <a:cxn ang="0">
+                <a:pos x="connsiteX1" y="connsiteY1"/>
+              </a:cxn>
+              <a:cxn ang="0">
+                <a:pos x="connsiteX2" y="connsiteY2"/>
+              </a:cxn>
+              <a:cxn ang="0">
+                <a:pos x="connsiteX3" y="connsiteY3"/>
+              </a:cxn>
+              <a:cxn ang="0">
+                <a:pos x="connsiteX4" y="connsiteY4"/>
+              </a:cxn>
+              <a:cxn ang="0">
+                <a:pos x="connsiteX5" y="connsiteY5"/>
+              </a:cxn>
+              <a:cxn ang="0">
+                <a:pos x="connsiteX6" y="connsiteY6"/>
+              </a:cxn>
+              <a:cxn ang="0">
+                <a:pos x="connsiteX7" y="connsiteY7"/>
+              </a:cxn>
+              <a:cxn ang="0">
+                <a:pos x="connsiteX8" y="connsiteY8"/>
+              </a:cxn>
+              <a:cxn ang="0">
+                <a:pos x="connsiteX9" y="connsiteY9"/>
+              </a:cxn>
+              <a:cxn ang="0">
+                <a:pos x="connsiteX10" y="connsiteY10"/>
+              </a:cxn>
+              <a:cxn ang="0">
+                <a:pos x="connsiteX11" y="connsiteY11"/>
+              </a:cxn>
+              <a:cxn ang="0">
+                <a:pos x="connsiteX12" y="connsiteY12"/>
+              </a:cxn>
+            </a:cxnLst>
+            <a:rect l="l" t="t" r="r" b="b"/>
+            <a:pathLst>
+              <a:path w="2991693" h="2651787">
+                <a:moveTo>
+                  <a:pt x="853538" y="0"/>
+                </a:moveTo>
+                <a:cubicBezTo>
+                  <a:pt x="2141030" y="0"/>
+                  <a:pt x="2141030" y="0"/>
+                  <a:pt x="2141030" y="0"/>
+                </a:cubicBezTo>
+                <a:cubicBezTo>
+                  <a:pt x="2206170" y="0"/>
+                  <a:pt x="2290471" y="45985"/>
+                  <a:pt x="2324957" y="103466"/>
+                </a:cubicBezTo>
+                <a:cubicBezTo>
+                  <a:pt x="2968702" y="1218596"/>
+                  <a:pt x="2968702" y="1218596"/>
+                  <a:pt x="2968702" y="1218596"/>
+                </a:cubicBezTo>
+                <a:cubicBezTo>
+                  <a:pt x="2999357" y="1279909"/>
+                  <a:pt x="2999357" y="1371878"/>
+                  <a:pt x="2968702" y="1433192"/>
+                </a:cubicBezTo>
+                <a:cubicBezTo>
+                  <a:pt x="2324957" y="2548321"/>
+                  <a:pt x="2324957" y="2548321"/>
+                  <a:pt x="2324957" y="2548321"/>
+                </a:cubicBezTo>
+                <a:cubicBezTo>
+                  <a:pt x="2290471" y="2605803"/>
+                  <a:pt x="2206170" y="2651787"/>
+                  <a:pt x="2141030" y="2651787"/>
+                </a:cubicBezTo>
+                <a:lnTo>
+                  <a:pt x="853538" y="2651787"/>
+                </a:lnTo>
+                <a:cubicBezTo>
+                  <a:pt x="784566" y="2651787"/>
+                  <a:pt x="700266" y="2605803"/>
+                  <a:pt x="669612" y="2548321"/>
+                </a:cubicBezTo>
+                <a:cubicBezTo>
+                  <a:pt x="25866" y="1433192"/>
+                  <a:pt x="25866" y="1433192"/>
+                  <a:pt x="25866" y="1433192"/>
+                </a:cubicBezTo>
+                <a:cubicBezTo>
+                  <a:pt x="-8621" y="1371878"/>
+                  <a:pt x="-8621" y="1279909"/>
+                  <a:pt x="25866" y="1218596"/>
+                </a:cubicBezTo>
+                <a:cubicBezTo>
+                  <a:pt x="669612" y="103466"/>
+                  <a:pt x="669612" y="103466"/>
+                  <a:pt x="669612" y="103466"/>
+                </a:cubicBezTo>
+                <a:cubicBezTo>
+                  <a:pt x="700266" y="45985"/>
+                  <a:pt x="784566" y="0"/>
+                  <a:pt x="853538" y="0"/>
+                </a:cubicBezTo>
+                <a:close/>
+              </a:path>
+            </a:pathLst>
+          </a:custGeom>
+          <a:solidFill>
+            <a:schemeClr val="tx1"/>
+          </a:solidFill>
+          <a:ln w="50800">
+            <a:noFill/>
+          </a:ln>
+        </p:spPr>
+        <p:style>
+          <a:lnRef idx="2">
+            <a:schemeClr val="accent1">
+              <a:shade val="50000"/>
+            </a:schemeClr>
+          </a:lnRef>
+          <a:fillRef idx="1">
+            <a:schemeClr val="accent1"/>
+          </a:fillRef>
+          <a:effectRef idx="0">
+            <a:schemeClr val="accent1"/>
+          </a:effectRef>
+          <a:fontRef idx="minor">
+            <a:schemeClr val="lt1"/>
+          </a:fontRef>
+        </p:style>
+        <p:txBody>
+          <a:bodyPr wrap="square" rtlCol="0" anchor="ctr">
+            <a:noAutofit/>
+          </a:bodyPr>
+          <a:lstStyle/>
+          <a:p>
+            <a:pPr algn="ctr"/>
+            <a:endParaRPr lang="en-US" dirty="0"/>
+          </a:p>
+        </p:txBody>
+      </p:sp>
+      <p:sp>
+        <p:nvSpPr>
+          <p:cNvPr id="33" name="Freeform: Shape 32">
+            <a:extLst>
+              <a:ext uri="{FF2B5EF4-FFF2-40B4-BE49-F238E27FC236}">
+                <a16:creationId xmlns:a16="http://schemas.microsoft.com/office/drawing/2014/main" id="{B971ABA8-4CDB-4EEE-8C48-AA4FDB650782}"/>
+              </a:ext>
+              <a:ext uri="{C183D7F6-B498-43B3-948B-1728B52AA6E4}">
+                <adec:decorative xmlns:adec="http://schemas.microsoft.com/office/drawing/2017/decorative" val="1"/>
+              </a:ext>
+            </a:extLst>
+          </p:cNvPr>
+          <p:cNvSpPr>
+            <a:spLocks noGrp="1" noRot="1" noChangeAspect="1" noMove="1" noResize="1" noEditPoints="1" noAdjustHandles="1" noChangeArrowheads="1" noChangeShapeType="1" noTextEdit="1"/>
+          </p:cNvSpPr>
+          <p:nvPr>
+            <p:extLst>
+              <p:ext uri="{386F3935-93C4-4BCD-93E2-E3B085C9AB24}">
+                <p16:designElem xmlns:p16="http://schemas.microsoft.com/office/powerpoint/2015/main" val="1"/>
+              </p:ext>
+            </p:extLst>
+          </p:nvPr>
+        </p:nvSpPr>
+        <p:spPr>
+          <a:xfrm>
+            <a:off x="3" y="2071858"/>
+            <a:ext cx="8109718" cy="4786143"/>
+          </a:xfrm>
+          <a:custGeom>
+            <a:avLst/>
+            <a:gdLst>
+              <a:gd name="connsiteX0" fmla="*/ 7381313 w 8109718"/>
+              <a:gd name="connsiteY0" fmla="*/ 1839459 h 4786143"/>
+              <a:gd name="connsiteX1" fmla="*/ 7381313 w 8109718"/>
+              <a:gd name="connsiteY1" fmla="*/ 1853646 h 4786143"/>
+              <a:gd name="connsiteX2" fmla="*/ 7379359 w 8109718"/>
+              <a:gd name="connsiteY2" fmla="*/ 1846552 h 4786143"/>
+              <a:gd name="connsiteX3" fmla="*/ 1321854 w 8109718"/>
+              <a:gd name="connsiteY3" fmla="*/ 0 h 4786143"/>
+              <a:gd name="connsiteX4" fmla="*/ 5365317 w 8109718"/>
+              <a:gd name="connsiteY4" fmla="*/ 0 h 4786143"/>
+              <a:gd name="connsiteX5" fmla="*/ 5985373 w 8109718"/>
+              <a:gd name="connsiteY5" fmla="*/ 365439 h 4786143"/>
+              <a:gd name="connsiteX6" fmla="*/ 8011470 w 8109718"/>
+              <a:gd name="connsiteY6" fmla="*/ 3854515 h 4786143"/>
+              <a:gd name="connsiteX7" fmla="*/ 8011470 w 8109718"/>
+              <a:gd name="connsiteY7" fmla="*/ 4567993 h 4786143"/>
+              <a:gd name="connsiteX8" fmla="*/ 7904625 w 8109718"/>
+              <a:gd name="connsiteY8" fmla="*/ 4751987 h 4786143"/>
+              <a:gd name="connsiteX9" fmla="*/ 7884791 w 8109718"/>
+              <a:gd name="connsiteY9" fmla="*/ 4786143 h 4786143"/>
+              <a:gd name="connsiteX10" fmla="*/ 0 w 8109718"/>
+              <a:gd name="connsiteY10" fmla="*/ 4786143 h 4786143"/>
+              <a:gd name="connsiteX11" fmla="*/ 0 w 8109718"/>
+              <a:gd name="connsiteY11" fmla="*/ 1564110 h 4786143"/>
+              <a:gd name="connsiteX12" fmla="*/ 27177 w 8109718"/>
+              <a:gd name="connsiteY12" fmla="*/ 1517107 h 4786143"/>
+              <a:gd name="connsiteX13" fmla="*/ 693065 w 8109718"/>
+              <a:gd name="connsiteY13" fmla="*/ 365439 h 4786143"/>
+              <a:gd name="connsiteX14" fmla="*/ 1321854 w 8109718"/>
+              <a:gd name="connsiteY14" fmla="*/ 0 h 4786143"/>
+            </a:gdLst>
+            <a:ahLst/>
+            <a:cxnLst>
+              <a:cxn ang="0">
+                <a:pos x="connsiteX0" y="connsiteY0"/>
+              </a:cxn>
+              <a:cxn ang="0">
+                <a:pos x="connsiteX1" y="connsiteY1"/>
+              </a:cxn>
+              <a:cxn ang="0">
+                <a:pos x="connsiteX2" y="connsiteY2"/>
+              </a:cxn>
+              <a:cxn ang="0">
+                <a:pos x="connsiteX3" y="connsiteY3"/>
+              </a:cxn>
+              <a:cxn ang="0">
+                <a:pos x="connsiteX4" y="connsiteY4"/>
+              </a:cxn>
+              <a:cxn ang="0">
+                <a:pos x="connsiteX5" y="connsiteY5"/>
+              </a:cxn>
+              <a:cxn ang="0">
+                <a:pos x="connsiteX6" y="connsiteY6"/>
+              </a:cxn>
+              <a:cxn ang="0">
+                <a:pos x="connsiteX7" y="connsiteY7"/>
+              </a:cxn>
+              <a:cxn ang="0">
+                <a:pos x="connsiteX8" y="connsiteY8"/>
+              </a:cxn>
+              <a:cxn ang="0">
+                <a:pos x="connsiteX9" y="connsiteY9"/>
+              </a:cxn>
+              <a:cxn ang="0">
+                <a:pos x="connsiteX10" y="connsiteY10"/>
+              </a:cxn>
+              <a:cxn ang="0">
+                <a:pos x="connsiteX11" y="connsiteY11"/>
+              </a:cxn>
+              <a:cxn ang="0">
+                <a:pos x="connsiteX12" y="connsiteY12"/>
+              </a:cxn>
+              <a:cxn ang="0">
+                <a:pos x="connsiteX13" y="connsiteY13"/>
+              </a:cxn>
+              <a:cxn ang="0">
+                <a:pos x="connsiteX14" y="connsiteY14"/>
+              </a:cxn>
+            </a:cxnLst>
+            <a:rect l="l" t="t" r="r" b="b"/>
+            <a:pathLst>
+              <a:path w="8109718" h="4786143">
+                <a:moveTo>
+                  <a:pt x="7381313" y="1839459"/>
+                </a:moveTo>
+                <a:lnTo>
+                  <a:pt x="7381313" y="1853646"/>
+                </a:lnTo>
+                <a:lnTo>
+                  <a:pt x="7379359" y="1846552"/>
+                </a:lnTo>
+                <a:close/>
+                <a:moveTo>
+                  <a:pt x="1321854" y="0"/>
+                </a:moveTo>
+                <a:cubicBezTo>
+                  <a:pt x="1321854" y="0"/>
+                  <a:pt x="1321854" y="0"/>
+                  <a:pt x="5365317" y="0"/>
+                </a:cubicBezTo>
+                <a:cubicBezTo>
+                  <a:pt x="5618580" y="0"/>
+                  <a:pt x="5863108" y="139215"/>
+                  <a:pt x="5985373" y="365439"/>
+                </a:cubicBezTo>
+                <a:cubicBezTo>
+                  <a:pt x="5985373" y="365439"/>
+                  <a:pt x="5985373" y="365439"/>
+                  <a:pt x="8011470" y="3854515"/>
+                </a:cubicBezTo>
+                <a:cubicBezTo>
+                  <a:pt x="8142468" y="4072039"/>
+                  <a:pt x="8142468" y="4350470"/>
+                  <a:pt x="8011470" y="4567993"/>
+                </a:cubicBezTo>
+                <a:cubicBezTo>
+                  <a:pt x="8011470" y="4567993"/>
+                  <a:pt x="8011470" y="4567993"/>
+                  <a:pt x="7904625" y="4751987"/>
+                </a:cubicBezTo>
+                <a:lnTo>
+                  <a:pt x="7884791" y="4786143"/>
+                </a:lnTo>
+                <a:lnTo>
+                  <a:pt x="0" y="4786143"/>
+                </a:lnTo>
+                <a:lnTo>
+                  <a:pt x="0" y="1564110"/>
+                </a:lnTo>
+                <a:lnTo>
+                  <a:pt x="27177" y="1517107"/>
+                </a:lnTo>
+                <a:cubicBezTo>
+                  <a:pt x="220245" y="1183191"/>
+                  <a:pt x="440895" y="801574"/>
+                  <a:pt x="693065" y="365439"/>
+                </a:cubicBezTo>
+                <a:cubicBezTo>
+                  <a:pt x="824063" y="139215"/>
+                  <a:pt x="1059859" y="0"/>
+                  <a:pt x="1321854" y="0"/>
+                </a:cubicBezTo>
+                <a:close/>
+              </a:path>
+            </a:pathLst>
+          </a:custGeom>
+          <a:solidFill>
+            <a:schemeClr val="tx1">
+              <a:lumMod val="85000"/>
+              <a:lumOff val="15000"/>
+              <a:alpha val="99000"/>
+            </a:schemeClr>
+          </a:solidFill>
+          <a:ln>
+            <a:noFill/>
+          </a:ln>
+        </p:spPr>
+        <p:style>
+          <a:lnRef idx="2">
+            <a:schemeClr val="accent1">
+              <a:shade val="50000"/>
+            </a:schemeClr>
+          </a:lnRef>
+          <a:fillRef idx="1">
+            <a:schemeClr val="accent1"/>
+          </a:fillRef>
+          <a:effectRef idx="0">
+            <a:schemeClr val="accent1"/>
+          </a:effectRef>
+          <a:fontRef idx="minor">
+            <a:schemeClr val="lt1"/>
+          </a:fontRef>
+        </p:style>
+        <p:txBody>
+          <a:bodyPr wrap="square" rtlCol="0" anchor="ctr">
+            <a:noAutofit/>
+          </a:bodyPr>
+          <a:lstStyle/>
+          <a:p>
+            <a:pPr algn="ctr"/>
+            <a:endParaRPr lang="en-US"/>
+          </a:p>
+        </p:txBody>
+      </p:sp>
+      <p:sp>
+        <p:nvSpPr>
+          <p:cNvPr id="4" name="Title 3">
+            <a:extLst>
+              <a:ext uri="{FF2B5EF4-FFF2-40B4-BE49-F238E27FC236}">
+                <a16:creationId xmlns:a16="http://schemas.microsoft.com/office/drawing/2014/main" id="{BB2A1168-7759-4137-9142-9990CD1097B1}"/>
+              </a:ext>
+            </a:extLst>
+          </p:cNvPr>
+          <p:cNvSpPr>
+            <a:spLocks noGrp="1"/>
+          </p:cNvSpPr>
+          <p:nvPr>
+            <p:ph type="ctrTitle"/>
+          </p:nvPr>
+        </p:nvSpPr>
+        <p:spPr>
+          <a:xfrm>
+            <a:off x="880281" y="2961564"/>
+            <a:ext cx="5713024" cy="3268639"/>
+          </a:xfrm>
+        </p:spPr>
+        <p:txBody>
+          <a:bodyPr anchor="ctr">
+            <a:normAutofit/>
+          </a:bodyPr>
+          <a:lstStyle/>
+          <a:p>
+            <a:pPr algn="l"/>
+            <a:r>
+              <a:rPr lang="en-US" sz="5000" dirty="0">
+                <a:solidFill>
+                  <a:schemeClr val="bg1"/>
+                </a:solidFill>
+              </a:rPr>
+              <a:t>Sentence Enhancements &amp; Mitigation Measures</a:t>
+            </a:r>
+          </a:p>
+        </p:txBody>
+      </p:sp>
+      <p:grpSp>
+        <p:nvGrpSpPr>
+          <p:cNvPr id="35" name="Group 34">
+            <a:extLst>
+              <a:ext uri="{FF2B5EF4-FFF2-40B4-BE49-F238E27FC236}">
+                <a16:creationId xmlns:a16="http://schemas.microsoft.com/office/drawing/2014/main" id="{DAD463E1-6621-44B4-A995-C70A4631D388}"/>
+              </a:ext>
+              <a:ext uri="{C183D7F6-B498-43B3-948B-1728B52AA6E4}">
+                <adec:decorative xmlns:adec="http://schemas.microsoft.com/office/drawing/2017/decorative" val="1"/>
+              </a:ext>
+            </a:extLst>
+          </p:cNvPr>
+          <p:cNvGrpSpPr>
+            <a:grpSpLocks noGrp="1" noUngrp="1" noRot="1" noChangeAspect="1" noMove="1" noResize="1"/>
+          </p:cNvGrpSpPr>
+          <p:nvPr>
+            <p:extLst>
+              <p:ext uri="{386F3935-93C4-4BCD-93E2-E3B085C9AB24}">
+                <p16:designElem xmlns:p16="http://schemas.microsoft.com/office/powerpoint/2015/main" val="1"/>
+              </p:ext>
+            </p:extLst>
+          </p:nvPr>
+        </p:nvGrpSpPr>
+        <p:grpSpPr>
+          <a:xfrm>
+            <a:off x="5307830" y="385730"/>
+            <a:ext cx="1128382" cy="847206"/>
+            <a:chOff x="5307830" y="325570"/>
+            <a:chExt cx="1128382" cy="847206"/>
+          </a:xfrm>
+        </p:grpSpPr>
+        <p:sp>
+          <p:nvSpPr>
+            <p:cNvPr id="36" name="Freeform 5">
+              <a:extLst>
+                <a:ext uri="{FF2B5EF4-FFF2-40B4-BE49-F238E27FC236}">
+                  <a16:creationId xmlns:a16="http://schemas.microsoft.com/office/drawing/2014/main" id="{A152F29E-C625-4313-96BF-5675B357C03A}"/>
+                </a:ext>
+                <a:ext uri="{C183D7F6-B498-43B3-948B-1728B52AA6E4}">
+                  <adec:decorative xmlns:adec="http://schemas.microsoft.com/office/drawing/2017/decorative" val="1"/>
+                </a:ext>
+              </a:extLst>
+            </p:cNvPr>
+            <p:cNvSpPr>
+              <a:spLocks/>
+            </p:cNvSpPr>
+            <p:nvPr>
+              <p:extLst>
+                <p:ext uri="{386F3935-93C4-4BCD-93E2-E3B085C9AB24}">
+                  <p16:designElem xmlns:p16="http://schemas.microsoft.com/office/powerpoint/2015/main" val="1"/>
+                </p:ext>
+              </p:extLst>
+            </p:nvPr>
+          </p:nvSpPr>
+          <p:spPr bwMode="auto">
+            <a:xfrm>
+              <a:off x="5307830" y="577396"/>
+              <a:ext cx="675351" cy="595380"/>
+            </a:xfrm>
+            <a:custGeom>
+              <a:avLst/>
+              <a:gdLst>
+                <a:gd name="T0" fmla="*/ 225 w 785"/>
+                <a:gd name="T1" fmla="*/ 692 h 692"/>
+                <a:gd name="T2" fmla="*/ 177 w 785"/>
+                <a:gd name="T3" fmla="*/ 665 h 692"/>
+                <a:gd name="T4" fmla="*/ 9 w 785"/>
+                <a:gd name="T5" fmla="*/ 374 h 692"/>
+                <a:gd name="T6" fmla="*/ 9 w 785"/>
+                <a:gd name="T7" fmla="*/ 318 h 692"/>
+                <a:gd name="T8" fmla="*/ 177 w 785"/>
+                <a:gd name="T9" fmla="*/ 27 h 692"/>
+                <a:gd name="T10" fmla="*/ 225 w 785"/>
+                <a:gd name="T11" fmla="*/ 0 h 692"/>
+                <a:gd name="T12" fmla="*/ 561 w 785"/>
+                <a:gd name="T13" fmla="*/ 0 h 692"/>
+                <a:gd name="T14" fmla="*/ 609 w 785"/>
+                <a:gd name="T15" fmla="*/ 27 h 692"/>
+                <a:gd name="T16" fmla="*/ 777 w 785"/>
+                <a:gd name="T17" fmla="*/ 318 h 692"/>
+                <a:gd name="T18" fmla="*/ 777 w 785"/>
+                <a:gd name="T19" fmla="*/ 374 h 692"/>
+                <a:gd name="T20" fmla="*/ 609 w 785"/>
+                <a:gd name="T21" fmla="*/ 665 h 692"/>
+                <a:gd name="T22" fmla="*/ 561 w 785"/>
+                <a:gd name="T23" fmla="*/ 692 h 692"/>
+                <a:gd name="T24" fmla="*/ 225 w 785"/>
+                <a:gd name="T25" fmla="*/ 692 h 692"/>
+              </a:gdLst>
+              <a:ahLst/>
+              <a:cxnLst>
+                <a:cxn ang="0">
+                  <a:pos x="T0" y="T1"/>
+                </a:cxn>
+                <a:cxn ang="0">
+                  <a:pos x="T2" y="T3"/>
+                </a:cxn>
+                <a:cxn ang="0">
+                  <a:pos x="T4" y="T5"/>
+                </a:cxn>
+                <a:cxn ang="0">
+                  <a:pos x="T6" y="T7"/>
+                </a:cxn>
+                <a:cxn ang="0">
+                  <a:pos x="T8" y="T9"/>
+                </a:cxn>
+                <a:cxn ang="0">
+                  <a:pos x="T10" y="T11"/>
+                </a:cxn>
+                <a:cxn ang="0">
+                  <a:pos x="T12" y="T13"/>
+                </a:cxn>
+                <a:cxn ang="0">
+                  <a:pos x="T14" y="T15"/>
+                </a:cxn>
+                <a:cxn ang="0">
+                  <a:pos x="T16" y="T17"/>
+                </a:cxn>
+                <a:cxn ang="0">
+                  <a:pos x="T18" y="T19"/>
+                </a:cxn>
+                <a:cxn ang="0">
+                  <a:pos x="T20" y="T21"/>
+                </a:cxn>
+                <a:cxn ang="0">
+                  <a:pos x="T22" y="T23"/>
+                </a:cxn>
+                <a:cxn ang="0">
+                  <a:pos x="T24" y="T25"/>
+                </a:cxn>
+              </a:cxnLst>
+              <a:rect l="0" t="0" r="r" b="b"/>
+              <a:pathLst>
+                <a:path w="785" h="692">
+                  <a:moveTo>
+                    <a:pt x="225" y="692"/>
+                  </a:moveTo>
+                  <a:cubicBezTo>
+                    <a:pt x="207" y="692"/>
+                    <a:pt x="185" y="680"/>
+                    <a:pt x="177" y="665"/>
+                  </a:cubicBezTo>
+                  <a:cubicBezTo>
+                    <a:pt x="9" y="374"/>
+                    <a:pt x="9" y="374"/>
+                    <a:pt x="9" y="374"/>
+                  </a:cubicBezTo>
+                  <a:cubicBezTo>
+                    <a:pt x="0" y="358"/>
+                    <a:pt x="0" y="334"/>
+                    <a:pt x="9" y="318"/>
+                  </a:cubicBezTo>
+                  <a:cubicBezTo>
+                    <a:pt x="177" y="27"/>
+                    <a:pt x="177" y="27"/>
+                    <a:pt x="177" y="27"/>
+                  </a:cubicBezTo>
+                  <a:cubicBezTo>
+                    <a:pt x="185" y="12"/>
+                    <a:pt x="207" y="0"/>
+                    <a:pt x="225" y="0"/>
+                  </a:cubicBezTo>
+                  <a:cubicBezTo>
+                    <a:pt x="561" y="0"/>
+                    <a:pt x="561" y="0"/>
+                    <a:pt x="561" y="0"/>
+                  </a:cubicBezTo>
+                  <a:cubicBezTo>
+                    <a:pt x="578" y="0"/>
+                    <a:pt x="600" y="12"/>
+                    <a:pt x="609" y="27"/>
+                  </a:cubicBezTo>
+                  <a:cubicBezTo>
+                    <a:pt x="777" y="318"/>
+                    <a:pt x="777" y="318"/>
+                    <a:pt x="777" y="318"/>
+                  </a:cubicBezTo>
+                  <a:cubicBezTo>
+                    <a:pt x="785" y="334"/>
+                    <a:pt x="785" y="358"/>
+                    <a:pt x="777" y="374"/>
+                  </a:cubicBezTo>
+                  <a:cubicBezTo>
+                    <a:pt x="609" y="665"/>
+                    <a:pt x="609" y="665"/>
+                    <a:pt x="609" y="665"/>
+                  </a:cubicBezTo>
+                  <a:cubicBezTo>
+                    <a:pt x="600" y="680"/>
+                    <a:pt x="578" y="692"/>
+                    <a:pt x="561" y="692"/>
+                  </a:cubicBezTo>
+                  <a:lnTo>
+                    <a:pt x="225" y="692"/>
+                  </a:lnTo>
+                  <a:close/>
+                </a:path>
+              </a:pathLst>
+            </a:custGeom>
+            <a:noFill/>
+            <a:ln w="28575" cmpd="sng">
+              <a:solidFill>
+                <a:schemeClr val="tx1"/>
+              </a:solidFill>
+            </a:ln>
+          </p:spPr>
+          <p:txBody>
+            <a:bodyPr vert="horz" wrap="square" lIns="91440" tIns="45720" rIns="91440" bIns="45720" numCol="1" anchor="t" anchorCtr="0" compatLnSpc="1">
+              <a:prstTxWarp prst="textNoShape">
+                <a:avLst/>
+              </a:prstTxWarp>
+            </a:bodyPr>
+            <a:lstStyle/>
+            <a:p>
+              <a:endParaRPr lang="en-US"/>
+            </a:p>
+          </p:txBody>
+        </p:sp>
+        <p:sp>
+          <p:nvSpPr>
+            <p:cNvPr id="37" name="Freeform 5">
+              <a:extLst>
+                <a:ext uri="{FF2B5EF4-FFF2-40B4-BE49-F238E27FC236}">
+                  <a16:creationId xmlns:a16="http://schemas.microsoft.com/office/drawing/2014/main" id="{C2A5CB78-6497-4151-83B6-568BD27EC573}"/>
+                </a:ext>
+                <a:ext uri="{C183D7F6-B498-43B3-948B-1728B52AA6E4}">
+                  <adec:decorative xmlns:adec="http://schemas.microsoft.com/office/drawing/2017/decorative" val="1"/>
+                </a:ext>
+              </a:extLst>
+            </p:cNvPr>
+            <p:cNvSpPr>
+              <a:spLocks/>
+            </p:cNvSpPr>
+            <p:nvPr>
+              <p:extLst>
+                <p:ext uri="{386F3935-93C4-4BCD-93E2-E3B085C9AB24}">
+                  <p16:designElem xmlns:p16="http://schemas.microsoft.com/office/powerpoint/2015/main" val="1"/>
+                </p:ext>
+              </p:extLst>
+            </p:nvPr>
+          </p:nvSpPr>
+          <p:spPr bwMode="auto">
+            <a:xfrm>
+              <a:off x="5885720" y="325570"/>
+              <a:ext cx="550492" cy="485306"/>
+            </a:xfrm>
+            <a:custGeom>
+              <a:avLst/>
+              <a:gdLst>
+                <a:gd name="T0" fmla="*/ 225 w 785"/>
+                <a:gd name="T1" fmla="*/ 692 h 692"/>
+                <a:gd name="T2" fmla="*/ 177 w 785"/>
+                <a:gd name="T3" fmla="*/ 665 h 692"/>
+                <a:gd name="T4" fmla="*/ 9 w 785"/>
+                <a:gd name="T5" fmla="*/ 374 h 692"/>
+                <a:gd name="T6" fmla="*/ 9 w 785"/>
+                <a:gd name="T7" fmla="*/ 318 h 692"/>
+                <a:gd name="T8" fmla="*/ 177 w 785"/>
+                <a:gd name="T9" fmla="*/ 27 h 692"/>
+                <a:gd name="T10" fmla="*/ 225 w 785"/>
+                <a:gd name="T11" fmla="*/ 0 h 692"/>
+                <a:gd name="T12" fmla="*/ 561 w 785"/>
+                <a:gd name="T13" fmla="*/ 0 h 692"/>
+                <a:gd name="T14" fmla="*/ 609 w 785"/>
+                <a:gd name="T15" fmla="*/ 27 h 692"/>
+                <a:gd name="T16" fmla="*/ 777 w 785"/>
+                <a:gd name="T17" fmla="*/ 318 h 692"/>
+                <a:gd name="T18" fmla="*/ 777 w 785"/>
+                <a:gd name="T19" fmla="*/ 374 h 692"/>
+                <a:gd name="T20" fmla="*/ 609 w 785"/>
+                <a:gd name="T21" fmla="*/ 665 h 692"/>
+                <a:gd name="T22" fmla="*/ 561 w 785"/>
+                <a:gd name="T23" fmla="*/ 692 h 692"/>
+                <a:gd name="T24" fmla="*/ 225 w 785"/>
+                <a:gd name="T25" fmla="*/ 692 h 692"/>
+              </a:gdLst>
+              <a:ahLst/>
+              <a:cxnLst>
+                <a:cxn ang="0">
+                  <a:pos x="T0" y="T1"/>
+                </a:cxn>
+                <a:cxn ang="0">
+                  <a:pos x="T2" y="T3"/>
+                </a:cxn>
+                <a:cxn ang="0">
+                  <a:pos x="T4" y="T5"/>
+                </a:cxn>
+                <a:cxn ang="0">
+                  <a:pos x="T6" y="T7"/>
+                </a:cxn>
+                <a:cxn ang="0">
+                  <a:pos x="T8" y="T9"/>
+                </a:cxn>
+                <a:cxn ang="0">
+                  <a:pos x="T10" y="T11"/>
+                </a:cxn>
+                <a:cxn ang="0">
+                  <a:pos x="T12" y="T13"/>
+                </a:cxn>
+                <a:cxn ang="0">
+                  <a:pos x="T14" y="T15"/>
+                </a:cxn>
+                <a:cxn ang="0">
+                  <a:pos x="T16" y="T17"/>
+                </a:cxn>
+                <a:cxn ang="0">
+                  <a:pos x="T18" y="T19"/>
+                </a:cxn>
+                <a:cxn ang="0">
+                  <a:pos x="T20" y="T21"/>
+                </a:cxn>
+                <a:cxn ang="0">
+                  <a:pos x="T22" y="T23"/>
+                </a:cxn>
+                <a:cxn ang="0">
+                  <a:pos x="T24" y="T25"/>
+                </a:cxn>
+              </a:cxnLst>
+              <a:rect l="0" t="0" r="r" b="b"/>
+              <a:pathLst>
+                <a:path w="785" h="692">
+                  <a:moveTo>
+                    <a:pt x="225" y="692"/>
+                  </a:moveTo>
+                  <a:cubicBezTo>
+                    <a:pt x="207" y="692"/>
+                    <a:pt x="185" y="680"/>
+                    <a:pt x="177" y="665"/>
+                  </a:cubicBezTo>
+                  <a:cubicBezTo>
+                    <a:pt x="9" y="374"/>
+                    <a:pt x="9" y="374"/>
+                    <a:pt x="9" y="374"/>
+                  </a:cubicBezTo>
+                  <a:cubicBezTo>
+                    <a:pt x="0" y="358"/>
+                    <a:pt x="0" y="334"/>
+                    <a:pt x="9" y="318"/>
+                  </a:cubicBezTo>
+                  <a:cubicBezTo>
+                    <a:pt x="177" y="27"/>
+                    <a:pt x="177" y="27"/>
+                    <a:pt x="177" y="27"/>
+                  </a:cubicBezTo>
+                  <a:cubicBezTo>
+                    <a:pt x="185" y="12"/>
+                    <a:pt x="207" y="0"/>
+                    <a:pt x="225" y="0"/>
+                  </a:cubicBezTo>
+                  <a:cubicBezTo>
+                    <a:pt x="561" y="0"/>
+                    <a:pt x="561" y="0"/>
+                    <a:pt x="561" y="0"/>
+                  </a:cubicBezTo>
+                  <a:cubicBezTo>
+                    <a:pt x="578" y="0"/>
+                    <a:pt x="600" y="12"/>
+                    <a:pt x="609" y="27"/>
+                  </a:cubicBezTo>
+                  <a:cubicBezTo>
+                    <a:pt x="777" y="318"/>
+                    <a:pt x="777" y="318"/>
+                    <a:pt x="777" y="318"/>
+                  </a:cubicBezTo>
+                  <a:cubicBezTo>
+                    <a:pt x="785" y="334"/>
+                    <a:pt x="785" y="358"/>
+                    <a:pt x="777" y="374"/>
+                  </a:cubicBezTo>
+                  <a:cubicBezTo>
+                    <a:pt x="609" y="665"/>
+                    <a:pt x="609" y="665"/>
+                    <a:pt x="609" y="665"/>
+                  </a:cubicBezTo>
+                  <a:cubicBezTo>
+                    <a:pt x="600" y="680"/>
+                    <a:pt x="578" y="692"/>
+                    <a:pt x="561" y="692"/>
+                  </a:cubicBezTo>
+                  <a:lnTo>
+                    <a:pt x="225" y="692"/>
+                  </a:lnTo>
+                  <a:close/>
+                </a:path>
+              </a:pathLst>
+            </a:custGeom>
+            <a:noFill/>
+            <a:ln w="28575" cmpd="sng">
+              <a:solidFill>
+                <a:schemeClr val="tx1"/>
+              </a:solidFill>
+            </a:ln>
+          </p:spPr>
+          <p:txBody>
+            <a:bodyPr vert="horz" wrap="square" lIns="91440" tIns="45720" rIns="91440" bIns="45720" numCol="1" anchor="t" anchorCtr="0" compatLnSpc="1">
+              <a:prstTxWarp prst="textNoShape">
+                <a:avLst/>
+              </a:prstTxWarp>
+            </a:bodyPr>
+            <a:lstStyle/>
+            <a:p>
+              <a:endParaRPr lang="en-US"/>
+            </a:p>
+          </p:txBody>
+        </p:sp>
+      </p:grpSp>
+    </p:spTree>
+    <p:extLst>
+      <p:ext uri="{BB962C8B-B14F-4D97-AF65-F5344CB8AC3E}">
+        <p14:creationId xmlns:p14="http://schemas.microsoft.com/office/powerpoint/2010/main" val="3006479589"/>
+      </p:ext>
+    </p:extLst>
+  </p:cSld>
+  <p:clrMapOvr>
+    <a:masterClrMapping/>
+  </p:clrMapOvr>
 </p:sld>
 </file>
 

</xml_diff>

<commit_message>
trimming slides for time
</commit_message>
<xml_diff>
--- a/Presentation.pptx
+++ b/Presentation.pptx
@@ -248,7 +248,7 @@
           <a:p>
             <a:fld id="{4CB35077-CF4E-425A-AAA9-69F843C4878F}" type="datetimeFigureOut">
               <a:rPr lang="en-US" smtClean="0"/>
-              <a:t>4/29/2021</a:t>
+              <a:t>4/30/2021</a:t>
             </a:fld>
             <a:endParaRPr lang="en-US"/>
           </a:p>
@@ -759,7 +759,13 @@
           <a:p>
             <a:r>
               <a:rPr lang="en-US" dirty="0"/>
-              <a:t>Distribution skews heavily toward black defendants</a:t>
+              <a:t>Career offender status can be applied if a person is convicted of a felony drug crime or violent crime AND has two prior felony drug or violent convictions.</a:t>
+            </a:r>
+          </a:p>
+          <a:p>
+            <a:r>
+              <a:rPr lang="en-US" dirty="0"/>
+              <a:t>This category is applied at the judge’s discretion and can be ignored.</a:t>
             </a:r>
           </a:p>
         </p:txBody>
@@ -781,7 +787,7 @@
           <a:p>
             <a:fld id="{7DD90B5D-F117-4387-9A08-B238DF18B47B}" type="slidenum">
               <a:rPr lang="en-US" smtClean="0"/>
-              <a:t>13</a:t>
+              <a:t>11</a:t>
             </a:fld>
             <a:endParaRPr lang="en-US"/>
           </a:p>
@@ -790,7 +796,7 @@
     </p:spTree>
     <p:extLst>
       <p:ext uri="{BB962C8B-B14F-4D97-AF65-F5344CB8AC3E}">
-        <p14:creationId xmlns:p14="http://schemas.microsoft.com/office/powerpoint/2010/main" val="2184227678"/>
+        <p14:creationId xmlns:p14="http://schemas.microsoft.com/office/powerpoint/2010/main" val="4040539952"/>
       </p:ext>
     </p:extLst>
   </p:cSld>
@@ -844,7 +850,10 @@
           <a:bodyPr/>
           <a:lstStyle/>
           <a:p>
-            <a:endParaRPr lang="en-US" dirty="0"/>
+            <a:r>
+              <a:rPr lang="en-US" dirty="0"/>
+              <a:t>Distribution skews heavily toward black defendants</a:t>
+            </a:r>
           </a:p>
         </p:txBody>
       </p:sp>
@@ -865,7 +874,7 @@
           <a:p>
             <a:fld id="{7DD90B5D-F117-4387-9A08-B238DF18B47B}" type="slidenum">
               <a:rPr lang="en-US" smtClean="0"/>
-              <a:t>14</a:t>
+              <a:t>13</a:t>
             </a:fld>
             <a:endParaRPr lang="en-US"/>
           </a:p>
@@ -874,7 +883,7 @@
     </p:spTree>
     <p:extLst>
       <p:ext uri="{BB962C8B-B14F-4D97-AF65-F5344CB8AC3E}">
-        <p14:creationId xmlns:p14="http://schemas.microsoft.com/office/powerpoint/2010/main" val="247765376"/>
+        <p14:creationId xmlns:p14="http://schemas.microsoft.com/office/powerpoint/2010/main" val="2184227678"/>
       </p:ext>
     </p:extLst>
   </p:cSld>
@@ -928,16 +937,7 @@
           <a:bodyPr/>
           <a:lstStyle/>
           <a:p>
-            <a:r>
-              <a:rPr lang="en-US" dirty="0"/>
-              <a:t>Drug breakdown: 56% white, 34.2% black, 8.2% Hispanic</a:t>
-            </a:r>
-          </a:p>
-          <a:p>
-            <a:r>
-              <a:rPr lang="en-US" dirty="0"/>
-              <a:t>Safety valve breakdown: 59.9% white, 22% black, 17.2% Hispanic</a:t>
-            </a:r>
+            <a:endParaRPr lang="en-US" dirty="0"/>
           </a:p>
         </p:txBody>
       </p:sp>
@@ -958,7 +958,7 @@
           <a:p>
             <a:fld id="{7DD90B5D-F117-4387-9A08-B238DF18B47B}" type="slidenum">
               <a:rPr lang="en-US" smtClean="0"/>
-              <a:t>15</a:t>
+              <a:t>14</a:t>
             </a:fld>
             <a:endParaRPr lang="en-US"/>
           </a:p>
@@ -967,7 +967,7 @@
     </p:spTree>
     <p:extLst>
       <p:ext uri="{BB962C8B-B14F-4D97-AF65-F5344CB8AC3E}">
-        <p14:creationId xmlns:p14="http://schemas.microsoft.com/office/powerpoint/2010/main" val="3241650802"/>
+        <p14:creationId xmlns:p14="http://schemas.microsoft.com/office/powerpoint/2010/main" val="247765376"/>
       </p:ext>
     </p:extLst>
   </p:cSld>
@@ -1023,45 +1023,14 @@
           <a:p>
             <a:r>
               <a:rPr lang="en-US" dirty="0"/>
-              <a:t>Judges and juries have less discretion, due to rigid sentencing guidelines</a:t>
+              <a:t>Drug breakdown: 56% white, 34.2% black, 8.2% Hispanic</a:t>
             </a:r>
           </a:p>
           <a:p>
             <a:r>
               <a:rPr lang="en-US" dirty="0"/>
-              <a:t>Only variance is in what you’re charged with, which is determined by prosecutors</a:t>
-            </a:r>
-          </a:p>
-          <a:p>
-            <a:r>
-              <a:rPr lang="en-US" dirty="0"/>
-              <a:t>They use harsh sentences as bargaining chips to encourage </a:t>
-            </a:r>
-            <a:r>
-              <a:rPr lang="en-US" dirty="0" err="1"/>
-              <a:t>defs</a:t>
-            </a:r>
-            <a:r>
-              <a:rPr lang="en-US" dirty="0"/>
-              <a:t> to plead</a:t>
-            </a:r>
-          </a:p>
-          <a:p>
-            <a:r>
-              <a:rPr lang="en-US" dirty="0"/>
-              <a:t>This can be a problem, </a:t>
-            </a:r>
-            <a:r>
-              <a:rPr lang="en-US" dirty="0" err="1"/>
-              <a:t>bc</a:t>
-            </a:r>
-            <a:r>
-              <a:rPr lang="en-US" dirty="0"/>
-              <a:t> an innocent defendant may feel pressured to plead rather than risk a much longer sentence at trial</a:t>
-            </a:r>
-          </a:p>
-          <a:p>
-            <a:endParaRPr lang="en-US" dirty="0"/>
+              <a:t>Safety valve breakdown: 59.9% white, 22% black, 17.2% Hispanic</a:t>
+            </a:r>
           </a:p>
         </p:txBody>
       </p:sp>
@@ -1082,7 +1051,7 @@
           <a:p>
             <a:fld id="{7DD90B5D-F117-4387-9A08-B238DF18B47B}" type="slidenum">
               <a:rPr lang="en-US" smtClean="0"/>
-              <a:t>16</a:t>
+              <a:t>15</a:t>
             </a:fld>
             <a:endParaRPr lang="en-US"/>
           </a:p>
@@ -1091,7 +1060,7 @@
     </p:spTree>
     <p:extLst>
       <p:ext uri="{BB962C8B-B14F-4D97-AF65-F5344CB8AC3E}">
-        <p14:creationId xmlns:p14="http://schemas.microsoft.com/office/powerpoint/2010/main" val="3353782217"/>
+        <p14:creationId xmlns:p14="http://schemas.microsoft.com/office/powerpoint/2010/main" val="3241650802"/>
       </p:ext>
     </p:extLst>
   </p:cSld>
@@ -1184,6 +1153,9 @@
               <a:t> an innocent defendant may feel pressured to plead rather than risk a much longer sentence at trial</a:t>
             </a:r>
           </a:p>
+          <a:p>
+            <a:endParaRPr lang="en-US" dirty="0"/>
+          </a:p>
         </p:txBody>
       </p:sp>
       <p:sp>
@@ -1203,6 +1175,127 @@
           <a:p>
             <a:fld id="{7DD90B5D-F117-4387-9A08-B238DF18B47B}" type="slidenum">
               <a:rPr lang="en-US" smtClean="0"/>
+              <a:t>16</a:t>
+            </a:fld>
+            <a:endParaRPr lang="en-US"/>
+          </a:p>
+        </p:txBody>
+      </p:sp>
+    </p:spTree>
+    <p:extLst>
+      <p:ext uri="{BB962C8B-B14F-4D97-AF65-F5344CB8AC3E}">
+        <p14:creationId xmlns:p14="http://schemas.microsoft.com/office/powerpoint/2010/main" val="3353782217"/>
+      </p:ext>
+    </p:extLst>
+  </p:cSld>
+  <p:clrMapOvr>
+    <a:masterClrMapping/>
+  </p:clrMapOvr>
+</p:notes>
+</file>
+
+<file path=ppt/notesSlides/notesSlide8.xml><?xml version="1.0" encoding="utf-8"?>
+<p:notes xmlns:a="http://schemas.openxmlformats.org/drawingml/2006/main" xmlns:r="http://schemas.openxmlformats.org/officeDocument/2006/relationships" xmlns:p="http://schemas.openxmlformats.org/presentationml/2006/main">
+  <p:cSld>
+    <p:spTree>
+      <p:nvGrpSpPr>
+        <p:cNvPr id="1" name=""/>
+        <p:cNvGrpSpPr/>
+        <p:nvPr/>
+      </p:nvGrpSpPr>
+      <p:grpSpPr>
+        <a:xfrm>
+          <a:off x="0" y="0"/>
+          <a:ext cx="0" cy="0"/>
+          <a:chOff x="0" y="0"/>
+          <a:chExt cx="0" cy="0"/>
+        </a:xfrm>
+      </p:grpSpPr>
+      <p:sp>
+        <p:nvSpPr>
+          <p:cNvPr id="2" name="Slide Image Placeholder 1"/>
+          <p:cNvSpPr>
+            <a:spLocks noGrp="1" noRot="1" noChangeAspect="1"/>
+          </p:cNvSpPr>
+          <p:nvPr>
+            <p:ph type="sldImg"/>
+          </p:nvPr>
+        </p:nvSpPr>
+        <p:spPr/>
+      </p:sp>
+      <p:sp>
+        <p:nvSpPr>
+          <p:cNvPr id="3" name="Notes Placeholder 2"/>
+          <p:cNvSpPr>
+            <a:spLocks noGrp="1"/>
+          </p:cNvSpPr>
+          <p:nvPr>
+            <p:ph type="body" idx="1"/>
+          </p:nvPr>
+        </p:nvSpPr>
+        <p:spPr/>
+        <p:txBody>
+          <a:bodyPr/>
+          <a:lstStyle/>
+          <a:p>
+            <a:r>
+              <a:rPr lang="en-US" dirty="0"/>
+              <a:t>Judges and juries have less discretion, due to rigid sentencing guidelines</a:t>
+            </a:r>
+          </a:p>
+          <a:p>
+            <a:r>
+              <a:rPr lang="en-US" dirty="0"/>
+              <a:t>Only variance is in what you’re charged with, which is determined by prosecutors</a:t>
+            </a:r>
+          </a:p>
+          <a:p>
+            <a:r>
+              <a:rPr lang="en-US" dirty="0"/>
+              <a:t>They use harsh sentences as bargaining chips to encourage </a:t>
+            </a:r>
+            <a:r>
+              <a:rPr lang="en-US" dirty="0" err="1"/>
+              <a:t>defs</a:t>
+            </a:r>
+            <a:r>
+              <a:rPr lang="en-US" dirty="0"/>
+              <a:t> to plead</a:t>
+            </a:r>
+          </a:p>
+          <a:p>
+            <a:r>
+              <a:rPr lang="en-US" dirty="0"/>
+              <a:t>This can be a problem, </a:t>
+            </a:r>
+            <a:r>
+              <a:rPr lang="en-US" dirty="0" err="1"/>
+              <a:t>bc</a:t>
+            </a:r>
+            <a:r>
+              <a:rPr lang="en-US" dirty="0"/>
+              <a:t> an innocent defendant may feel pressured to plead rather than risk a much longer sentence at trial</a:t>
+            </a:r>
+          </a:p>
+        </p:txBody>
+      </p:sp>
+      <p:sp>
+        <p:nvSpPr>
+          <p:cNvPr id="4" name="Slide Number Placeholder 3"/>
+          <p:cNvSpPr>
+            <a:spLocks noGrp="1"/>
+          </p:cNvSpPr>
+          <p:nvPr>
+            <p:ph type="sldNum" sz="quarter" idx="5"/>
+          </p:nvPr>
+        </p:nvSpPr>
+        <p:spPr/>
+        <p:txBody>
+          <a:bodyPr/>
+          <a:lstStyle/>
+          <a:p>
+            <a:fld id="{7DD90B5D-F117-4387-9A08-B238DF18B47B}" type="slidenum">
+              <a:rPr lang="en-US" smtClean="0"/>
               <a:t>18</a:t>
             </a:fld>
             <a:endParaRPr lang="en-US"/>
@@ -1222,7 +1315,7 @@
 </p:notes>
 </file>
 
-<file path=ppt/notesSlides/notesSlide8.xml><?xml version="1.0" encoding="utf-8"?>
+<file path=ppt/notesSlides/notesSlide9.xml><?xml version="1.0" encoding="utf-8"?>
 <p:notes xmlns:a="http://schemas.openxmlformats.org/drawingml/2006/main" xmlns:r="http://schemas.openxmlformats.org/officeDocument/2006/relationships" xmlns:p="http://schemas.openxmlformats.org/presentationml/2006/main">
   <p:cSld>
     <p:spTree>
@@ -1490,7 +1583,7 @@
           <a:p>
             <a:fld id="{11F9EF8F-8264-40DF-BA62-43F7AC7FC3AC}" type="datetimeFigureOut">
               <a:rPr lang="en-US" smtClean="0"/>
-              <a:t>4/29/2021</a:t>
+              <a:t>4/30/2021</a:t>
             </a:fld>
             <a:endParaRPr lang="en-US"/>
           </a:p>
@@ -1688,7 +1781,7 @@
           <a:p>
             <a:fld id="{11F9EF8F-8264-40DF-BA62-43F7AC7FC3AC}" type="datetimeFigureOut">
               <a:rPr lang="en-US" smtClean="0"/>
-              <a:t>4/29/2021</a:t>
+              <a:t>4/30/2021</a:t>
             </a:fld>
             <a:endParaRPr lang="en-US"/>
           </a:p>
@@ -1896,7 +1989,7 @@
           <a:p>
             <a:fld id="{11F9EF8F-8264-40DF-BA62-43F7AC7FC3AC}" type="datetimeFigureOut">
               <a:rPr lang="en-US" smtClean="0"/>
-              <a:t>4/29/2021</a:t>
+              <a:t>4/30/2021</a:t>
             </a:fld>
             <a:endParaRPr lang="en-US"/>
           </a:p>
@@ -2094,7 +2187,7 @@
           <a:p>
             <a:fld id="{11F9EF8F-8264-40DF-BA62-43F7AC7FC3AC}" type="datetimeFigureOut">
               <a:rPr lang="en-US" smtClean="0"/>
-              <a:t>4/29/2021</a:t>
+              <a:t>4/30/2021</a:t>
             </a:fld>
             <a:endParaRPr lang="en-US"/>
           </a:p>
@@ -2369,7 +2462,7 @@
           <a:p>
             <a:fld id="{11F9EF8F-8264-40DF-BA62-43F7AC7FC3AC}" type="datetimeFigureOut">
               <a:rPr lang="en-US" smtClean="0"/>
-              <a:t>4/29/2021</a:t>
+              <a:t>4/30/2021</a:t>
             </a:fld>
             <a:endParaRPr lang="en-US"/>
           </a:p>
@@ -2634,7 +2727,7 @@
           <a:p>
             <a:fld id="{11F9EF8F-8264-40DF-BA62-43F7AC7FC3AC}" type="datetimeFigureOut">
               <a:rPr lang="en-US" smtClean="0"/>
-              <a:t>4/29/2021</a:t>
+              <a:t>4/30/2021</a:t>
             </a:fld>
             <a:endParaRPr lang="en-US"/>
           </a:p>
@@ -3046,7 +3139,7 @@
           <a:p>
             <a:fld id="{11F9EF8F-8264-40DF-BA62-43F7AC7FC3AC}" type="datetimeFigureOut">
               <a:rPr lang="en-US" smtClean="0"/>
-              <a:t>4/29/2021</a:t>
+              <a:t>4/30/2021</a:t>
             </a:fld>
             <a:endParaRPr lang="en-US"/>
           </a:p>
@@ -3187,7 +3280,7 @@
           <a:p>
             <a:fld id="{11F9EF8F-8264-40DF-BA62-43F7AC7FC3AC}" type="datetimeFigureOut">
               <a:rPr lang="en-US" smtClean="0"/>
-              <a:t>4/29/2021</a:t>
+              <a:t>4/30/2021</a:t>
             </a:fld>
             <a:endParaRPr lang="en-US"/>
           </a:p>
@@ -3300,7 +3393,7 @@
           <a:p>
             <a:fld id="{11F9EF8F-8264-40DF-BA62-43F7AC7FC3AC}" type="datetimeFigureOut">
               <a:rPr lang="en-US" smtClean="0"/>
-              <a:t>4/29/2021</a:t>
+              <a:t>4/30/2021</a:t>
             </a:fld>
             <a:endParaRPr lang="en-US"/>
           </a:p>
@@ -3611,7 +3704,7 @@
           <a:p>
             <a:fld id="{11F9EF8F-8264-40DF-BA62-43F7AC7FC3AC}" type="datetimeFigureOut">
               <a:rPr lang="en-US" smtClean="0"/>
-              <a:t>4/29/2021</a:t>
+              <a:t>4/30/2021</a:t>
             </a:fld>
             <a:endParaRPr lang="en-US"/>
           </a:p>
@@ -3899,7 +3992,7 @@
           <a:p>
             <a:fld id="{11F9EF8F-8264-40DF-BA62-43F7AC7FC3AC}" type="datetimeFigureOut">
               <a:rPr lang="en-US" smtClean="0"/>
-              <a:t>4/29/2021</a:t>
+              <a:t>4/30/2021</a:t>
             </a:fld>
             <a:endParaRPr lang="en-US"/>
           </a:p>
@@ -4140,7 +4233,7 @@
           <a:p>
             <a:fld id="{11F9EF8F-8264-40DF-BA62-43F7AC7FC3AC}" type="datetimeFigureOut">
               <a:rPr lang="en-US" smtClean="0"/>
-              <a:t>4/29/2021</a:t>
+              <a:t>4/30/2021</a:t>
             </a:fld>
             <a:endParaRPr lang="en-US"/>
           </a:p>
@@ -6968,13 +7061,13 @@
           <p:nvPr/>
         </p:nvPicPr>
         <p:blipFill>
-          <a:blip r:embed="rId2">
+          <a:blip r:embed="rId3">
             <a:extLst>
               <a:ext uri="{28A0092B-C50C-407E-A947-70E740481C1C}">
                 <a14:useLocalDpi xmlns:a14="http://schemas.microsoft.com/office/drawing/2010/main" val="0"/>
               </a:ext>
               <a:ext uri="{96DAC541-7B7A-43D3-8B79-37D633B846F1}">
-                <asvg:svgBlip xmlns:asvg="http://schemas.microsoft.com/office/drawing/2016/SVG/main" r:embed="rId3"/>
+                <asvg:svgBlip xmlns:asvg="http://schemas.microsoft.com/office/drawing/2016/SVG/main" r:embed="rId4"/>
               </a:ext>
             </a:extLst>
           </a:blip>
@@ -12833,13 +12926,13 @@
         </p:nvSpPr>
         <p:spPr>
           <a:xfrm>
-            <a:off x="756746" y="2863018"/>
-            <a:ext cx="4666592" cy="3304451"/>
+            <a:off x="496824" y="2627564"/>
+            <a:ext cx="5186856" cy="3304451"/>
           </a:xfrm>
         </p:spPr>
         <p:txBody>
           <a:bodyPr vert="horz" lIns="91440" tIns="45720" rIns="91440" bIns="45720" rtlCol="0">
-            <a:normAutofit fontScale="70000" lnSpcReduction="20000"/>
+            <a:noAutofit/>
           </a:bodyPr>
           <a:lstStyle/>
           <a:p>
@@ -12848,7 +12941,7 @@
               <a:buChar char="•"/>
             </a:pPr>
             <a:r>
-              <a:rPr lang="en-US" sz="2400" dirty="0">
+              <a:rPr lang="en-US" dirty="0">
                 <a:solidFill>
                   <a:schemeClr val="bg1"/>
                 </a:solidFill>
@@ -12858,7 +12951,7 @@
           </a:p>
           <a:p>
             <a:pPr algn="just"/>
-            <a:endParaRPr lang="en-US" sz="1400" dirty="0">
+            <a:endParaRPr lang="en-US" sz="1100" dirty="0">
               <a:solidFill>
                 <a:schemeClr val="bg1"/>
               </a:solidFill>
@@ -12870,7 +12963,7 @@
               <a:buChar char="•"/>
             </a:pPr>
             <a:r>
-              <a:rPr lang="en-US" sz="2400" dirty="0">
+              <a:rPr lang="en-US" dirty="0">
                 <a:solidFill>
                   <a:schemeClr val="bg1"/>
                 </a:solidFill>
@@ -12880,7 +12973,7 @@
           </a:p>
           <a:p>
             <a:pPr algn="just"/>
-            <a:endParaRPr lang="en-US" sz="1400" dirty="0">
+            <a:endParaRPr lang="en-US" sz="1100" dirty="0">
               <a:solidFill>
                 <a:schemeClr val="bg1"/>
               </a:solidFill>
@@ -12892,7 +12985,7 @@
               <a:buChar char="•"/>
             </a:pPr>
             <a:r>
-              <a:rPr lang="en-US" sz="2400" dirty="0">
+              <a:rPr lang="en-US" dirty="0">
                 <a:solidFill>
                   <a:schemeClr val="bg1"/>
                 </a:solidFill>
@@ -12902,7 +12995,7 @@
           </a:p>
           <a:p>
             <a:pPr algn="just"/>
-            <a:endParaRPr lang="en-US" sz="1400" dirty="0">
+            <a:endParaRPr lang="en-US" sz="1100" dirty="0">
               <a:solidFill>
                 <a:schemeClr val="bg1"/>
               </a:solidFill>
@@ -12914,7 +13007,7 @@
               <a:buChar char="•"/>
             </a:pPr>
             <a:r>
-              <a:rPr lang="en-US" sz="2400" dirty="0">
+              <a:rPr lang="en-US" dirty="0">
                 <a:solidFill>
                   <a:schemeClr val="bg1"/>
                 </a:solidFill>
@@ -14755,7 +14848,7 @@
               <a:buAutoNum type="arabicPeriod"/>
             </a:pPr>
             <a:r>
-              <a:rPr lang="en-US" sz="2000" dirty="0"/>
+              <a:rPr lang="en-US" sz="2400" dirty="0"/>
               <a:t>Are there racial disparities between the incarcerated population and the general population in Tennessee?</a:t>
             </a:r>
           </a:p>
@@ -14765,7 +14858,7 @@
               <a:buAutoNum type="arabicPeriod"/>
             </a:pPr>
             <a:r>
-              <a:rPr lang="en-US" sz="2000" dirty="0"/>
+              <a:rPr lang="en-US" sz="2400" dirty="0"/>
               <a:t>Are people of color receiving longer sentences on average for the same crimes?</a:t>
             </a:r>
           </a:p>
@@ -14775,17 +14868,7 @@
               <a:buAutoNum type="arabicPeriod"/>
             </a:pPr>
             <a:r>
-              <a:rPr lang="en-US" sz="2000" dirty="0"/>
-              <a:t>Are there disparities in the application of sentence enhancements and sentence mitigation measures?</a:t>
-            </a:r>
-          </a:p>
-          <a:p>
-            <a:pPr marL="685800" indent="-457200" algn="just">
-              <a:buFont typeface="+mj-lt"/>
-              <a:buAutoNum type="arabicPeriod"/>
-            </a:pPr>
-            <a:r>
-              <a:rPr lang="en-US" sz="2000" dirty="0"/>
+              <a:rPr lang="en-US" sz="2400" dirty="0"/>
               <a:t>Is a person’s sentence affected by whether they plead or go to trial? If so, does this difference vary by race?</a:t>
             </a:r>
           </a:p>
@@ -15216,67 +15299,6 @@
                                           <p:spTgt spid="3">
                                             <p:txEl>
                                               <p:pRg st="2" end="2"/>
-                                            </p:txEl>
-                                          </p:spTgt>
-                                        </p:tgtEl>
-                                      </p:cBhvr>
-                                    </p:animEffect>
-                                  </p:childTnLst>
-                                </p:cTn>
-                              </p:par>
-                            </p:childTnLst>
-                          </p:cTn>
-                        </p:par>
-                      </p:childTnLst>
-                    </p:cTn>
-                  </p:par>
-                  <p:par>
-                    <p:cTn id="18" fill="hold">
-                      <p:stCondLst>
-                        <p:cond delay="indefinite"/>
-                      </p:stCondLst>
-                      <p:childTnLst>
-                        <p:par>
-                          <p:cTn id="19" fill="hold">
-                            <p:stCondLst>
-                              <p:cond delay="0"/>
-                            </p:stCondLst>
-                            <p:childTnLst>
-                              <p:par>
-                                <p:cTn id="20" presetID="10" presetClass="entr" presetSubtype="0" fill="hold" nodeType="clickEffect">
-                                  <p:stCondLst>
-                                    <p:cond delay="0"/>
-                                  </p:stCondLst>
-                                  <p:childTnLst>
-                                    <p:set>
-                                      <p:cBhvr>
-                                        <p:cTn id="21" dur="1" fill="hold">
-                                          <p:stCondLst>
-                                            <p:cond delay="0"/>
-                                          </p:stCondLst>
-                                        </p:cTn>
-                                        <p:tgtEl>
-                                          <p:spTgt spid="3">
-                                            <p:txEl>
-                                              <p:pRg st="3" end="3"/>
-                                            </p:txEl>
-                                          </p:spTgt>
-                                        </p:tgtEl>
-                                        <p:attrNameLst>
-                                          <p:attrName>style.visibility</p:attrName>
-                                        </p:attrNameLst>
-                                      </p:cBhvr>
-                                      <p:to>
-                                        <p:strVal val="visible"/>
-                                      </p:to>
-                                    </p:set>
-                                    <p:animEffect transition="in" filter="fade">
-                                      <p:cBhvr>
-                                        <p:cTn id="22" dur="500"/>
-                                        <p:tgtEl>
-                                          <p:spTgt spid="3">
-                                            <p:txEl>
-                                              <p:pRg st="3" end="3"/>
                                             </p:txEl>
                                           </p:spTgt>
                                         </p:tgtEl>
@@ -16595,7 +16617,7 @@
           <a:p>
             <a:r>
               <a:rPr lang="en-US" dirty="0"/>
-              <a:t>State law:</a:t>
+              <a:t>State crime:</a:t>
             </a:r>
           </a:p>
           <a:p>
@@ -16658,7 +16680,7 @@
           <a:p>
             <a:r>
               <a:rPr lang="en-US" dirty="0"/>
-              <a:t>Federal law:</a:t>
+              <a:t>Federal crime:</a:t>
             </a:r>
           </a:p>
           <a:p>
@@ -16686,8 +16708,13 @@
             <a:pPr lvl="1"/>
             <a:r>
               <a:rPr lang="en-US" dirty="0"/>
-              <a:t>Bank robbery</a:t>
-            </a:r>
+              <a:t>Use </a:t>
+            </a:r>
+            <a:r>
+              <a:rPr lang="en-US"/>
+              <a:t>and transport of firearms</a:t>
+            </a:r>
+            <a:endParaRPr lang="en-US" dirty="0"/>
           </a:p>
           <a:p>
             <a:pPr lvl="1"/>
@@ -16714,6 +16741,13 @@
             <a:pPr lvl="2"/>
             <a:r>
               <a:rPr lang="en-US" dirty="0"/>
+              <a:t>Are investigated by a federal agency, such as the FBI;</a:t>
+            </a:r>
+          </a:p>
+          <a:p>
+            <a:pPr lvl="2"/>
+            <a:r>
+              <a:rPr lang="en-US" dirty="0"/>
               <a:t>Cross state lines;</a:t>
             </a:r>
           </a:p>
@@ -16721,14 +16755,7 @@
             <a:pPr lvl="2"/>
             <a:r>
               <a:rPr lang="en-US" dirty="0"/>
-              <a:t>Occur in Washington D.C. or in international waters;</a:t>
-            </a:r>
-          </a:p>
-          <a:p>
-            <a:pPr lvl="2"/>
-            <a:r>
-              <a:rPr lang="en-US" dirty="0"/>
-              <a:t>Are investigated by a federal agency, such as the FBI</a:t>
+              <a:t>Occur in Washington D.C. or in international waters</a:t>
             </a:r>
           </a:p>
         </p:txBody>
@@ -17353,6 +17380,14 @@
 <file path=ppt/slides/slide4.xml><?xml version="1.0" encoding="utf-8"?>
 <p:sld xmlns:a="http://schemas.openxmlformats.org/drawingml/2006/main" xmlns:r="http://schemas.openxmlformats.org/officeDocument/2006/relationships" xmlns:p="http://schemas.openxmlformats.org/presentationml/2006/main">
   <p:cSld>
+    <p:bg>
+      <p:bgPr>
+        <a:solidFill>
+          <a:schemeClr val="bg1"/>
+        </a:solidFill>
+        <a:effectLst/>
+      </p:bgPr>
+    </p:bg>
     <p:spTree>
       <p:nvGrpSpPr>
         <p:cNvPr id="1" name=""/>
@@ -17367,6 +17402,66 @@
           <a:chExt cx="0" cy="0"/>
         </a:xfrm>
       </p:grpSpPr>
+      <p:sp useBgFill="1">
+        <p:nvSpPr>
+          <p:cNvPr id="55" name="Rectangle 17">
+            <a:extLst>
+              <a:ext uri="{FF2B5EF4-FFF2-40B4-BE49-F238E27FC236}">
+                <a16:creationId xmlns:a16="http://schemas.microsoft.com/office/drawing/2014/main" id="{91F32EBA-ED97-466E-8CFA-8382584155D0}"/>
+              </a:ext>
+              <a:ext uri="{C183D7F6-B498-43B3-948B-1728B52AA6E4}">
+                <adec:decorative xmlns:adec="http://schemas.microsoft.com/office/drawing/2017/decorative" val="1"/>
+              </a:ext>
+            </a:extLst>
+          </p:cNvPr>
+          <p:cNvSpPr>
+            <a:spLocks noGrp="1" noRot="1" noChangeAspect="1" noMove="1" noResize="1" noEditPoints="1" noAdjustHandles="1" noChangeArrowheads="1" noChangeShapeType="1" noTextEdit="1"/>
+          </p:cNvSpPr>
+          <p:nvPr>
+            <p:extLst>
+              <p:ext uri="{386F3935-93C4-4BCD-93E2-E3B085C9AB24}">
+                <p16:designElem xmlns:p16="http://schemas.microsoft.com/office/powerpoint/2015/main" val="1"/>
+              </p:ext>
+            </p:extLst>
+          </p:nvPr>
+        </p:nvSpPr>
+        <p:spPr>
+          <a:xfrm>
+            <a:off x="0" y="0"/>
+            <a:ext cx="12192000" cy="6858000"/>
+          </a:xfrm>
+          <a:prstGeom prst="rect">
+            <a:avLst/>
+          </a:prstGeom>
+          <a:ln>
+            <a:noFill/>
+          </a:ln>
+        </p:spPr>
+        <p:style>
+          <a:lnRef idx="2">
+            <a:schemeClr val="accent1">
+              <a:shade val="50000"/>
+            </a:schemeClr>
+          </a:lnRef>
+          <a:fillRef idx="1">
+            <a:schemeClr val="accent1"/>
+          </a:fillRef>
+          <a:effectRef idx="0">
+            <a:schemeClr val="accent1"/>
+          </a:effectRef>
+          <a:fontRef idx="minor">
+            <a:schemeClr val="lt1"/>
+          </a:fontRef>
+        </p:style>
+        <p:txBody>
+          <a:bodyPr rtlCol="0" anchor="ctr"/>
+          <a:lstStyle/>
+          <a:p>
+            <a:pPr algn="ctr"/>
+            <a:endParaRPr lang="en-US"/>
+          </a:p>
+        </p:txBody>
+      </p:sp>
       <p:sp>
         <p:nvSpPr>
           <p:cNvPr id="2" name="Title 1">
@@ -17385,7 +17480,7 @@
         </p:nvSpPr>
         <p:spPr>
           <a:xfrm>
-            <a:off x="965199" y="851517"/>
+            <a:off x="965205" y="524477"/>
             <a:ext cx="5130795" cy="1461778"/>
           </a:xfrm>
         </p:spPr>
@@ -17396,7 +17491,7 @@
           <a:lstStyle/>
           <a:p>
             <a:r>
-              <a:rPr lang="en-US" sz="4000"/>
+              <a:rPr lang="en-US" sz="4000" dirty="0"/>
               <a:t>Data Collection and Cleaning</a:t>
             </a:r>
           </a:p>
@@ -17420,8 +17515,8 @@
         </p:nvSpPr>
         <p:spPr>
           <a:xfrm>
-            <a:off x="965200" y="2470248"/>
-            <a:ext cx="4185640" cy="3536236"/>
+            <a:off x="965205" y="2132775"/>
+            <a:ext cx="4157513" cy="3536236"/>
           </a:xfrm>
         </p:spPr>
         <p:txBody>
@@ -17430,35 +17525,810 @@
           </a:bodyPr>
           <a:lstStyle/>
           <a:p>
+            <a:pPr algn="just"/>
             <a:r>
               <a:rPr lang="en-US" sz="2400" dirty="0"/>
               <a:t>SAS files from ussc.gov (The U.S. Sentencing Commission)</a:t>
             </a:r>
           </a:p>
           <a:p>
+            <a:pPr algn="just"/>
             <a:r>
               <a:rPr lang="en-US" sz="2400" dirty="0"/>
               <a:t>Nationwide dataset with over 300k rows and 1000+ columns</a:t>
             </a:r>
           </a:p>
           <a:p>
-            <a:r>
-              <a:rPr lang="en-US" sz="2400"/>
-              <a:t>Identified 201 </a:t>
-            </a:r>
+            <a:pPr algn="just"/>
             <a:r>
               <a:rPr lang="en-US" sz="2400" dirty="0"/>
-              <a:t>columns for analysis</a:t>
-            </a:r>
-          </a:p>
-          <a:p>
+              <a:t>Identified 201 columns for analysis</a:t>
+            </a:r>
+          </a:p>
+          <a:p>
+            <a:pPr algn="just"/>
             <a:r>
               <a:rPr lang="en-US" sz="2400" dirty="0"/>
               <a:t>Extracted Tennessee specific data </a:t>
             </a:r>
           </a:p>
           <a:p>
+            <a:pPr algn="just"/>
             <a:endParaRPr lang="en-US" sz="2400" dirty="0"/>
+          </a:p>
+        </p:txBody>
+      </p:sp>
+      <p:sp>
+        <p:nvSpPr>
+          <p:cNvPr id="56" name="Freeform: Shape 19">
+            <a:extLst>
+              <a:ext uri="{FF2B5EF4-FFF2-40B4-BE49-F238E27FC236}">
+                <a16:creationId xmlns:a16="http://schemas.microsoft.com/office/drawing/2014/main" id="{62A38935-BB53-4DF7-A56E-48DD25B685D7}"/>
+              </a:ext>
+              <a:ext uri="{C183D7F6-B498-43B3-948B-1728B52AA6E4}">
+                <adec:decorative xmlns:adec="http://schemas.microsoft.com/office/drawing/2017/decorative" val="1"/>
+              </a:ext>
+            </a:extLst>
+          </p:cNvPr>
+          <p:cNvSpPr>
+            <a:spLocks noGrp="1" noRot="1" noChangeAspect="1" noMove="1" noResize="1" noEditPoints="1" noAdjustHandles="1" noChangeArrowheads="1" noChangeShapeType="1" noTextEdit="1"/>
+          </p:cNvSpPr>
+          <p:nvPr>
+            <p:extLst>
+              <p:ext uri="{386F3935-93C4-4BCD-93E2-E3B085C9AB24}">
+                <p16:designElem xmlns:p16="http://schemas.microsoft.com/office/powerpoint/2015/main" val="1"/>
+              </p:ext>
+            </p:extLst>
+          </p:nvPr>
+        </p:nvSpPr>
+        <p:spPr>
+          <a:xfrm>
+            <a:off x="5510370" y="851518"/>
+            <a:ext cx="6184806" cy="5154967"/>
+          </a:xfrm>
+          <a:custGeom>
+            <a:avLst/>
+            <a:gdLst>
+              <a:gd name="connsiteX0" fmla="*/ 363179 w 6184806"/>
+              <a:gd name="connsiteY0" fmla="*/ 3125191 h 5154967"/>
+              <a:gd name="connsiteX1" fmla="*/ 898270 w 6184806"/>
+              <a:gd name="connsiteY1" fmla="*/ 3125191 h 5154967"/>
+              <a:gd name="connsiteX2" fmla="*/ 980326 w 6184806"/>
+              <a:gd name="connsiteY2" fmla="*/ 3173551 h 5154967"/>
+              <a:gd name="connsiteX3" fmla="*/ 1248448 w 6184806"/>
+              <a:gd name="connsiteY3" fmla="*/ 3635277 h 5154967"/>
+              <a:gd name="connsiteX4" fmla="*/ 1248448 w 6184806"/>
+              <a:gd name="connsiteY4" fmla="*/ 3729695 h 5154967"/>
+              <a:gd name="connsiteX5" fmla="*/ 980326 w 6184806"/>
+              <a:gd name="connsiteY5" fmla="*/ 4191421 h 5154967"/>
+              <a:gd name="connsiteX6" fmla="*/ 898270 w 6184806"/>
+              <a:gd name="connsiteY6" fmla="*/ 4239781 h 5154967"/>
+              <a:gd name="connsiteX7" fmla="*/ 363179 w 6184806"/>
+              <a:gd name="connsiteY7" fmla="*/ 4239781 h 5154967"/>
+              <a:gd name="connsiteX8" fmla="*/ 279969 w 6184806"/>
+              <a:gd name="connsiteY8" fmla="*/ 4191421 h 5154967"/>
+              <a:gd name="connsiteX9" fmla="*/ 13002 w 6184806"/>
+              <a:gd name="connsiteY9" fmla="*/ 3729695 h 5154967"/>
+              <a:gd name="connsiteX10" fmla="*/ 13002 w 6184806"/>
+              <a:gd name="connsiteY10" fmla="*/ 3635277 h 5154967"/>
+              <a:gd name="connsiteX11" fmla="*/ 279969 w 6184806"/>
+              <a:gd name="connsiteY11" fmla="*/ 3173551 h 5154967"/>
+              <a:gd name="connsiteX12" fmla="*/ 363179 w 6184806"/>
+              <a:gd name="connsiteY12" fmla="*/ 3125191 h 5154967"/>
+              <a:gd name="connsiteX13" fmla="*/ 2489721 w 6184806"/>
+              <a:gd name="connsiteY13" fmla="*/ 570035 h 5154967"/>
+              <a:gd name="connsiteX14" fmla="*/ 2764862 w 6184806"/>
+              <a:gd name="connsiteY14" fmla="*/ 570035 h 5154967"/>
+              <a:gd name="connsiteX15" fmla="*/ 2796959 w 6184806"/>
+              <a:gd name="connsiteY15" fmla="*/ 570035 h 5154967"/>
+              <a:gd name="connsiteX16" fmla="*/ 2827587 w 6184806"/>
+              <a:gd name="connsiteY16" fmla="*/ 622777 h 5154967"/>
+              <a:gd name="connsiteX17" fmla="*/ 2977604 w 6184806"/>
+              <a:gd name="connsiteY17" fmla="*/ 881117 h 5154967"/>
+              <a:gd name="connsiteX18" fmla="*/ 2977604 w 6184806"/>
+              <a:gd name="connsiteY18" fmla="*/ 1025720 h 5154967"/>
+              <a:gd name="connsiteX19" fmla="*/ 2566968 w 6184806"/>
+              <a:gd name="connsiteY19" fmla="*/ 1732863 h 5154967"/>
+              <a:gd name="connsiteX20" fmla="*/ 2441299 w 6184806"/>
+              <a:gd name="connsiteY20" fmla="*/ 1806927 h 5154967"/>
+              <a:gd name="connsiteX21" fmla="*/ 1621798 w 6184806"/>
+              <a:gd name="connsiteY21" fmla="*/ 1806927 h 5154967"/>
+              <a:gd name="connsiteX22" fmla="*/ 1583218 w 6184806"/>
+              <a:gd name="connsiteY22" fmla="*/ 1801802 h 5154967"/>
+              <a:gd name="connsiteX23" fmla="*/ 1556683 w 6184806"/>
+              <a:gd name="connsiteY23" fmla="*/ 1790677 h 5154967"/>
+              <a:gd name="connsiteX24" fmla="*/ 1572899 w 6184806"/>
+              <a:gd name="connsiteY24" fmla="*/ 1762631 h 5154967"/>
+              <a:gd name="connsiteX25" fmla="*/ 2147429 w 6184806"/>
+              <a:gd name="connsiteY25" fmla="*/ 768968 h 5154967"/>
+              <a:gd name="connsiteX26" fmla="*/ 2489721 w 6184806"/>
+              <a:gd name="connsiteY26" fmla="*/ 570035 h 5154967"/>
+              <a:gd name="connsiteX27" fmla="*/ 1573268 w 6184806"/>
+              <a:gd name="connsiteY27" fmla="*/ 0 h 5154967"/>
+              <a:gd name="connsiteX28" fmla="*/ 2497662 w 6184806"/>
+              <a:gd name="connsiteY28" fmla="*/ 0 h 5154967"/>
+              <a:gd name="connsiteX29" fmla="*/ 2639415 w 6184806"/>
+              <a:gd name="connsiteY29" fmla="*/ 83546 h 5154967"/>
+              <a:gd name="connsiteX30" fmla="*/ 2887862 w 6184806"/>
+              <a:gd name="connsiteY30" fmla="*/ 511387 h 5154967"/>
+              <a:gd name="connsiteX31" fmla="*/ 2915928 w 6184806"/>
+              <a:gd name="connsiteY31" fmla="*/ 559720 h 5154967"/>
+              <a:gd name="connsiteX32" fmla="*/ 2893844 w 6184806"/>
+              <a:gd name="connsiteY32" fmla="*/ 559720 h 5154967"/>
+              <a:gd name="connsiteX33" fmla="*/ 2789466 w 6184806"/>
+              <a:gd name="connsiteY33" fmla="*/ 559720 h 5154967"/>
+              <a:gd name="connsiteX34" fmla="*/ 2744122 w 6184806"/>
+              <a:gd name="connsiteY34" fmla="*/ 481634 h 5154967"/>
+              <a:gd name="connsiteX35" fmla="*/ 2570885 w 6184806"/>
+              <a:gd name="connsiteY35" fmla="*/ 183309 h 5154967"/>
+              <a:gd name="connsiteX36" fmla="*/ 2445216 w 6184806"/>
+              <a:gd name="connsiteY36" fmla="*/ 109244 h 5154967"/>
+              <a:gd name="connsiteX37" fmla="*/ 1625714 w 6184806"/>
+              <a:gd name="connsiteY37" fmla="*/ 109244 h 5154967"/>
+              <a:gd name="connsiteX38" fmla="*/ 1498276 w 6184806"/>
+              <a:gd name="connsiteY38" fmla="*/ 183309 h 5154967"/>
+              <a:gd name="connsiteX39" fmla="*/ 1089410 w 6184806"/>
+              <a:gd name="connsiteY39" fmla="*/ 890450 h 5154967"/>
+              <a:gd name="connsiteX40" fmla="*/ 1089410 w 6184806"/>
+              <a:gd name="connsiteY40" fmla="*/ 1035054 h 5154967"/>
+              <a:gd name="connsiteX41" fmla="*/ 1498276 w 6184806"/>
+              <a:gd name="connsiteY41" fmla="*/ 1742196 h 5154967"/>
+              <a:gd name="connsiteX42" fmla="*/ 1552039 w 6184806"/>
+              <a:gd name="connsiteY42" fmla="*/ 1796421 h 5154967"/>
+              <a:gd name="connsiteX43" fmla="*/ 1558260 w 6184806"/>
+              <a:gd name="connsiteY43" fmla="*/ 1799029 h 5154967"/>
+              <a:gd name="connsiteX44" fmla="*/ 1524911 w 6184806"/>
+              <a:gd name="connsiteY44" fmla="*/ 1856707 h 5154967"/>
+              <a:gd name="connsiteX45" fmla="*/ 1500108 w 6184806"/>
+              <a:gd name="connsiteY45" fmla="*/ 1899604 h 5154967"/>
+              <a:gd name="connsiteX46" fmla="*/ 1525834 w 6184806"/>
+              <a:gd name="connsiteY46" fmla="*/ 1910390 h 5154967"/>
+              <a:gd name="connsiteX47" fmla="*/ 1569352 w 6184806"/>
+              <a:gd name="connsiteY47" fmla="*/ 1916170 h 5154967"/>
+              <a:gd name="connsiteX48" fmla="*/ 2493745 w 6184806"/>
+              <a:gd name="connsiteY48" fmla="*/ 1916170 h 5154967"/>
+              <a:gd name="connsiteX49" fmla="*/ 2635498 w 6184806"/>
+              <a:gd name="connsiteY49" fmla="*/ 1832627 h 5154967"/>
+              <a:gd name="connsiteX50" fmla="*/ 3098693 w 6184806"/>
+              <a:gd name="connsiteY50" fmla="*/ 1034974 h 5154967"/>
+              <a:gd name="connsiteX51" fmla="*/ 3098693 w 6184806"/>
+              <a:gd name="connsiteY51" fmla="*/ 871863 h 5154967"/>
+              <a:gd name="connsiteX52" fmla="*/ 2945803 w 6184806"/>
+              <a:gd name="connsiteY52" fmla="*/ 608576 h 5154967"/>
+              <a:gd name="connsiteX53" fmla="*/ 2923422 w 6184806"/>
+              <a:gd name="connsiteY53" fmla="*/ 570035 h 5154967"/>
+              <a:gd name="connsiteX54" fmla="*/ 3027104 w 6184806"/>
+              <a:gd name="connsiteY54" fmla="*/ 570035 h 5154967"/>
+              <a:gd name="connsiteX55" fmla="*/ 4690846 w 6184806"/>
+              <a:gd name="connsiteY55" fmla="*/ 570035 h 5154967"/>
+              <a:gd name="connsiteX56" fmla="*/ 5028384 w 6184806"/>
+              <a:gd name="connsiteY56" fmla="*/ 768968 h 5154967"/>
+              <a:gd name="connsiteX57" fmla="*/ 6131323 w 6184806"/>
+              <a:gd name="connsiteY57" fmla="*/ 2668304 h 5154967"/>
+              <a:gd name="connsiteX58" fmla="*/ 6131323 w 6184806"/>
+              <a:gd name="connsiteY58" fmla="*/ 3056698 h 5154967"/>
+              <a:gd name="connsiteX59" fmla="*/ 5028384 w 6184806"/>
+              <a:gd name="connsiteY59" fmla="*/ 4956035 h 5154967"/>
+              <a:gd name="connsiteX60" fmla="*/ 4690846 w 6184806"/>
+              <a:gd name="connsiteY60" fmla="*/ 5154967 h 5154967"/>
+              <a:gd name="connsiteX61" fmla="*/ 2489721 w 6184806"/>
+              <a:gd name="connsiteY61" fmla="*/ 5154967 h 5154967"/>
+              <a:gd name="connsiteX62" fmla="*/ 2147429 w 6184806"/>
+              <a:gd name="connsiteY62" fmla="*/ 4956035 h 5154967"/>
+              <a:gd name="connsiteX63" fmla="*/ 1049243 w 6184806"/>
+              <a:gd name="connsiteY63" fmla="*/ 3056698 h 5154967"/>
+              <a:gd name="connsiteX64" fmla="*/ 1049243 w 6184806"/>
+              <a:gd name="connsiteY64" fmla="*/ 2668304 h 5154967"/>
+              <a:gd name="connsiteX65" fmla="*/ 1457007 w 6184806"/>
+              <a:gd name="connsiteY65" fmla="*/ 1963067 h 5154967"/>
+              <a:gd name="connsiteX66" fmla="*/ 1491373 w 6184806"/>
+              <a:gd name="connsiteY66" fmla="*/ 1903634 h 5154967"/>
+              <a:gd name="connsiteX67" fmla="*/ 1490164 w 6184806"/>
+              <a:gd name="connsiteY67" fmla="*/ 1903127 h 5154967"/>
+              <a:gd name="connsiteX68" fmla="*/ 1429519 w 6184806"/>
+              <a:gd name="connsiteY68" fmla="*/ 1841960 h 5154967"/>
+              <a:gd name="connsiteX69" fmla="*/ 968320 w 6184806"/>
+              <a:gd name="connsiteY69" fmla="*/ 1044307 h 5154967"/>
+              <a:gd name="connsiteX70" fmla="*/ 968320 w 6184806"/>
+              <a:gd name="connsiteY70" fmla="*/ 881196 h 5154967"/>
+              <a:gd name="connsiteX71" fmla="*/ 1429519 w 6184806"/>
+              <a:gd name="connsiteY71" fmla="*/ 83546 h 5154967"/>
+              <a:gd name="connsiteX72" fmla="*/ 1573268 w 6184806"/>
+              <a:gd name="connsiteY72" fmla="*/ 0 h 5154967"/>
+            </a:gdLst>
+            <a:ahLst/>
+            <a:cxnLst>
+              <a:cxn ang="0">
+                <a:pos x="connsiteX0" y="connsiteY0"/>
+              </a:cxn>
+              <a:cxn ang="0">
+                <a:pos x="connsiteX1" y="connsiteY1"/>
+              </a:cxn>
+              <a:cxn ang="0">
+                <a:pos x="connsiteX2" y="connsiteY2"/>
+              </a:cxn>
+              <a:cxn ang="0">
+                <a:pos x="connsiteX3" y="connsiteY3"/>
+              </a:cxn>
+              <a:cxn ang="0">
+                <a:pos x="connsiteX4" y="connsiteY4"/>
+              </a:cxn>
+              <a:cxn ang="0">
+                <a:pos x="connsiteX5" y="connsiteY5"/>
+              </a:cxn>
+              <a:cxn ang="0">
+                <a:pos x="connsiteX6" y="connsiteY6"/>
+              </a:cxn>
+              <a:cxn ang="0">
+                <a:pos x="connsiteX7" y="connsiteY7"/>
+              </a:cxn>
+              <a:cxn ang="0">
+                <a:pos x="connsiteX8" y="connsiteY8"/>
+              </a:cxn>
+              <a:cxn ang="0">
+                <a:pos x="connsiteX9" y="connsiteY9"/>
+              </a:cxn>
+              <a:cxn ang="0">
+                <a:pos x="connsiteX10" y="connsiteY10"/>
+              </a:cxn>
+              <a:cxn ang="0">
+                <a:pos x="connsiteX11" y="connsiteY11"/>
+              </a:cxn>
+              <a:cxn ang="0">
+                <a:pos x="connsiteX12" y="connsiteY12"/>
+              </a:cxn>
+              <a:cxn ang="0">
+                <a:pos x="connsiteX13" y="connsiteY13"/>
+              </a:cxn>
+              <a:cxn ang="0">
+                <a:pos x="connsiteX14" y="connsiteY14"/>
+              </a:cxn>
+              <a:cxn ang="0">
+                <a:pos x="connsiteX15" y="connsiteY15"/>
+              </a:cxn>
+              <a:cxn ang="0">
+                <a:pos x="connsiteX16" y="connsiteY16"/>
+              </a:cxn>
+              <a:cxn ang="0">
+                <a:pos x="connsiteX17" y="connsiteY17"/>
+              </a:cxn>
+              <a:cxn ang="0">
+                <a:pos x="connsiteX18" y="connsiteY18"/>
+              </a:cxn>
+              <a:cxn ang="0">
+                <a:pos x="connsiteX19" y="connsiteY19"/>
+              </a:cxn>
+              <a:cxn ang="0">
+                <a:pos x="connsiteX20" y="connsiteY20"/>
+              </a:cxn>
+              <a:cxn ang="0">
+                <a:pos x="connsiteX21" y="connsiteY21"/>
+              </a:cxn>
+              <a:cxn ang="0">
+                <a:pos x="connsiteX22" y="connsiteY22"/>
+              </a:cxn>
+              <a:cxn ang="0">
+                <a:pos x="connsiteX23" y="connsiteY23"/>
+              </a:cxn>
+              <a:cxn ang="0">
+                <a:pos x="connsiteX24" y="connsiteY24"/>
+              </a:cxn>
+              <a:cxn ang="0">
+                <a:pos x="connsiteX25" y="connsiteY25"/>
+              </a:cxn>
+              <a:cxn ang="0">
+                <a:pos x="connsiteX26" y="connsiteY26"/>
+              </a:cxn>
+              <a:cxn ang="0">
+                <a:pos x="connsiteX27" y="connsiteY27"/>
+              </a:cxn>
+              <a:cxn ang="0">
+                <a:pos x="connsiteX28" y="connsiteY28"/>
+              </a:cxn>
+              <a:cxn ang="0">
+                <a:pos x="connsiteX29" y="connsiteY29"/>
+              </a:cxn>
+              <a:cxn ang="0">
+                <a:pos x="connsiteX30" y="connsiteY30"/>
+              </a:cxn>
+              <a:cxn ang="0">
+                <a:pos x="connsiteX31" y="connsiteY31"/>
+              </a:cxn>
+              <a:cxn ang="0">
+                <a:pos x="connsiteX32" y="connsiteY32"/>
+              </a:cxn>
+              <a:cxn ang="0">
+                <a:pos x="connsiteX33" y="connsiteY33"/>
+              </a:cxn>
+              <a:cxn ang="0">
+                <a:pos x="connsiteX34" y="connsiteY34"/>
+              </a:cxn>
+              <a:cxn ang="0">
+                <a:pos x="connsiteX35" y="connsiteY35"/>
+              </a:cxn>
+              <a:cxn ang="0">
+                <a:pos x="connsiteX36" y="connsiteY36"/>
+              </a:cxn>
+              <a:cxn ang="0">
+                <a:pos x="connsiteX37" y="connsiteY37"/>
+              </a:cxn>
+              <a:cxn ang="0">
+                <a:pos x="connsiteX38" y="connsiteY38"/>
+              </a:cxn>
+              <a:cxn ang="0">
+                <a:pos x="connsiteX39" y="connsiteY39"/>
+              </a:cxn>
+              <a:cxn ang="0">
+                <a:pos x="connsiteX40" y="connsiteY40"/>
+              </a:cxn>
+              <a:cxn ang="0">
+                <a:pos x="connsiteX41" y="connsiteY41"/>
+              </a:cxn>
+              <a:cxn ang="0">
+                <a:pos x="connsiteX42" y="connsiteY42"/>
+              </a:cxn>
+              <a:cxn ang="0">
+                <a:pos x="connsiteX43" y="connsiteY43"/>
+              </a:cxn>
+              <a:cxn ang="0">
+                <a:pos x="connsiteX44" y="connsiteY44"/>
+              </a:cxn>
+              <a:cxn ang="0">
+                <a:pos x="connsiteX45" y="connsiteY45"/>
+              </a:cxn>
+              <a:cxn ang="0">
+                <a:pos x="connsiteX46" y="connsiteY46"/>
+              </a:cxn>
+              <a:cxn ang="0">
+                <a:pos x="connsiteX47" y="connsiteY47"/>
+              </a:cxn>
+              <a:cxn ang="0">
+                <a:pos x="connsiteX48" y="connsiteY48"/>
+              </a:cxn>
+              <a:cxn ang="0">
+                <a:pos x="connsiteX49" y="connsiteY49"/>
+              </a:cxn>
+              <a:cxn ang="0">
+                <a:pos x="connsiteX50" y="connsiteY50"/>
+              </a:cxn>
+              <a:cxn ang="0">
+                <a:pos x="connsiteX51" y="connsiteY51"/>
+              </a:cxn>
+              <a:cxn ang="0">
+                <a:pos x="connsiteX52" y="connsiteY52"/>
+              </a:cxn>
+              <a:cxn ang="0">
+                <a:pos x="connsiteX53" y="connsiteY53"/>
+              </a:cxn>
+              <a:cxn ang="0">
+                <a:pos x="connsiteX54" y="connsiteY54"/>
+              </a:cxn>
+              <a:cxn ang="0">
+                <a:pos x="connsiteX55" y="connsiteY55"/>
+              </a:cxn>
+              <a:cxn ang="0">
+                <a:pos x="connsiteX56" y="connsiteY56"/>
+              </a:cxn>
+              <a:cxn ang="0">
+                <a:pos x="connsiteX57" y="connsiteY57"/>
+              </a:cxn>
+              <a:cxn ang="0">
+                <a:pos x="connsiteX58" y="connsiteY58"/>
+              </a:cxn>
+              <a:cxn ang="0">
+                <a:pos x="connsiteX59" y="connsiteY59"/>
+              </a:cxn>
+              <a:cxn ang="0">
+                <a:pos x="connsiteX60" y="connsiteY60"/>
+              </a:cxn>
+              <a:cxn ang="0">
+                <a:pos x="connsiteX61" y="connsiteY61"/>
+              </a:cxn>
+              <a:cxn ang="0">
+                <a:pos x="connsiteX62" y="connsiteY62"/>
+              </a:cxn>
+              <a:cxn ang="0">
+                <a:pos x="connsiteX63" y="connsiteY63"/>
+              </a:cxn>
+              <a:cxn ang="0">
+                <a:pos x="connsiteX64" y="connsiteY64"/>
+              </a:cxn>
+              <a:cxn ang="0">
+                <a:pos x="connsiteX65" y="connsiteY65"/>
+              </a:cxn>
+              <a:cxn ang="0">
+                <a:pos x="connsiteX66" y="connsiteY66"/>
+              </a:cxn>
+              <a:cxn ang="0">
+                <a:pos x="connsiteX67" y="connsiteY67"/>
+              </a:cxn>
+              <a:cxn ang="0">
+                <a:pos x="connsiteX68" y="connsiteY68"/>
+              </a:cxn>
+              <a:cxn ang="0">
+                <a:pos x="connsiteX69" y="connsiteY69"/>
+              </a:cxn>
+              <a:cxn ang="0">
+                <a:pos x="connsiteX70" y="connsiteY70"/>
+              </a:cxn>
+              <a:cxn ang="0">
+                <a:pos x="connsiteX71" y="connsiteY71"/>
+              </a:cxn>
+              <a:cxn ang="0">
+                <a:pos x="connsiteX72" y="connsiteY72"/>
+              </a:cxn>
+            </a:cxnLst>
+            <a:rect l="l" t="t" r="r" b="b"/>
+            <a:pathLst>
+              <a:path w="6184806" h="5154967">
+                <a:moveTo>
+                  <a:pt x="363179" y="3125191"/>
+                </a:moveTo>
+                <a:cubicBezTo>
+                  <a:pt x="363179" y="3125191"/>
+                  <a:pt x="363179" y="3125191"/>
+                  <a:pt x="898270" y="3125191"/>
+                </a:cubicBezTo>
+                <a:cubicBezTo>
+                  <a:pt x="931786" y="3125191"/>
+                  <a:pt x="964145" y="3143614"/>
+                  <a:pt x="980326" y="3173551"/>
+                </a:cubicBezTo>
+                <a:cubicBezTo>
+                  <a:pt x="980326" y="3173551"/>
+                  <a:pt x="980326" y="3173551"/>
+                  <a:pt x="1248448" y="3635277"/>
+                </a:cubicBezTo>
+                <a:cubicBezTo>
+                  <a:pt x="1265784" y="3664063"/>
+                  <a:pt x="1265784" y="3700909"/>
+                  <a:pt x="1248448" y="3729695"/>
+                </a:cubicBezTo>
+                <a:cubicBezTo>
+                  <a:pt x="1248448" y="3729695"/>
+                  <a:pt x="1248448" y="3729695"/>
+                  <a:pt x="980326" y="4191421"/>
+                </a:cubicBezTo>
+                <a:cubicBezTo>
+                  <a:pt x="964145" y="4221358"/>
+                  <a:pt x="931786" y="4239781"/>
+                  <a:pt x="898270" y="4239781"/>
+                </a:cubicBezTo>
+                <a:cubicBezTo>
+                  <a:pt x="898270" y="4239781"/>
+                  <a:pt x="898270" y="4239781"/>
+                  <a:pt x="363179" y="4239781"/>
+                </a:cubicBezTo>
+                <a:cubicBezTo>
+                  <a:pt x="328508" y="4239781"/>
+                  <a:pt x="297305" y="4221358"/>
+                  <a:pt x="279969" y="4191421"/>
+                </a:cubicBezTo>
+                <a:cubicBezTo>
+                  <a:pt x="279969" y="4191421"/>
+                  <a:pt x="279969" y="4191421"/>
+                  <a:pt x="13002" y="3729695"/>
+                </a:cubicBezTo>
+                <a:cubicBezTo>
+                  <a:pt x="-4334" y="3700909"/>
+                  <a:pt x="-4334" y="3664063"/>
+                  <a:pt x="13002" y="3635277"/>
+                </a:cubicBezTo>
+                <a:cubicBezTo>
+                  <a:pt x="13002" y="3635277"/>
+                  <a:pt x="13002" y="3635277"/>
+                  <a:pt x="279969" y="3173551"/>
+                </a:cubicBezTo>
+                <a:cubicBezTo>
+                  <a:pt x="297305" y="3143614"/>
+                  <a:pt x="328508" y="3125191"/>
+                  <a:pt x="363179" y="3125191"/>
+                </a:cubicBezTo>
+                <a:close/>
+                <a:moveTo>
+                  <a:pt x="2489721" y="570035"/>
+                </a:moveTo>
+                <a:cubicBezTo>
+                  <a:pt x="2489721" y="570035"/>
+                  <a:pt x="2489721" y="570035"/>
+                  <a:pt x="2764862" y="570035"/>
+                </a:cubicBezTo>
+                <a:lnTo>
+                  <a:pt x="2796959" y="570035"/>
+                </a:lnTo>
+                <a:lnTo>
+                  <a:pt x="2827587" y="622777"/>
+                </a:lnTo>
+                <a:cubicBezTo>
+                  <a:pt x="2870233" y="696217"/>
+                  <a:pt x="2919858" y="781675"/>
+                  <a:pt x="2977604" y="881117"/>
+                </a:cubicBezTo>
+                <a:cubicBezTo>
+                  <a:pt x="3004153" y="925204"/>
+                  <a:pt x="3004153" y="981634"/>
+                  <a:pt x="2977604" y="1025720"/>
+                </a:cubicBezTo>
+                <a:cubicBezTo>
+                  <a:pt x="2977604" y="1025720"/>
+                  <a:pt x="2977604" y="1025720"/>
+                  <a:pt x="2566968" y="1732863"/>
+                </a:cubicBezTo>
+                <a:cubicBezTo>
+                  <a:pt x="2542188" y="1778712"/>
+                  <a:pt x="2492629" y="1806927"/>
+                  <a:pt x="2441299" y="1806927"/>
+                </a:cubicBezTo>
+                <a:cubicBezTo>
+                  <a:pt x="2441299" y="1806927"/>
+                  <a:pt x="2441299" y="1806927"/>
+                  <a:pt x="1621798" y="1806927"/>
+                </a:cubicBezTo>
+                <a:cubicBezTo>
+                  <a:pt x="1608523" y="1806927"/>
+                  <a:pt x="1595580" y="1805163"/>
+                  <a:pt x="1583218" y="1801802"/>
+                </a:cubicBezTo>
+                <a:lnTo>
+                  <a:pt x="1556683" y="1790677"/>
+                </a:lnTo>
+                <a:lnTo>
+                  <a:pt x="1572899" y="1762631"/>
+                </a:lnTo>
+                <a:cubicBezTo>
+                  <a:pt x="1719523" y="1509042"/>
+                  <a:pt x="1907201" y="1184448"/>
+                  <a:pt x="2147429" y="768968"/>
+                </a:cubicBezTo>
+                <a:cubicBezTo>
+                  <a:pt x="2218739" y="645819"/>
+                  <a:pt x="2347099" y="570035"/>
+                  <a:pt x="2489721" y="570035"/>
+                </a:cubicBezTo>
+                <a:close/>
+                <a:moveTo>
+                  <a:pt x="1573268" y="0"/>
+                </a:moveTo>
+                <a:cubicBezTo>
+                  <a:pt x="1573268" y="0"/>
+                  <a:pt x="1573268" y="0"/>
+                  <a:pt x="2497662" y="0"/>
+                </a:cubicBezTo>
+                <a:cubicBezTo>
+                  <a:pt x="2555561" y="0"/>
+                  <a:pt x="2611463" y="31828"/>
+                  <a:pt x="2639415" y="83546"/>
+                </a:cubicBezTo>
+                <a:cubicBezTo>
+                  <a:pt x="2639415" y="83546"/>
+                  <a:pt x="2639415" y="83546"/>
+                  <a:pt x="2887862" y="511387"/>
+                </a:cubicBezTo>
+                <a:lnTo>
+                  <a:pt x="2915928" y="559720"/>
+                </a:lnTo>
+                <a:lnTo>
+                  <a:pt x="2893844" y="559720"/>
+                </a:lnTo>
+                <a:lnTo>
+                  <a:pt x="2789466" y="559720"/>
+                </a:lnTo>
+                <a:lnTo>
+                  <a:pt x="2744122" y="481634"/>
+                </a:lnTo>
+                <a:cubicBezTo>
+                  <a:pt x="2570885" y="183309"/>
+                  <a:pt x="2570885" y="183309"/>
+                  <a:pt x="2570885" y="183309"/>
+                </a:cubicBezTo>
+                <a:cubicBezTo>
+                  <a:pt x="2546104" y="137459"/>
+                  <a:pt x="2496545" y="109244"/>
+                  <a:pt x="2445216" y="109244"/>
+                </a:cubicBezTo>
+                <a:cubicBezTo>
+                  <a:pt x="1625714" y="109244"/>
+                  <a:pt x="1625714" y="109244"/>
+                  <a:pt x="1625714" y="109244"/>
+                </a:cubicBezTo>
+                <a:cubicBezTo>
+                  <a:pt x="1572615" y="109244"/>
+                  <a:pt x="1524825" y="137459"/>
+                  <a:pt x="1498276" y="183309"/>
+                </a:cubicBezTo>
+                <a:cubicBezTo>
+                  <a:pt x="1089410" y="890450"/>
+                  <a:pt x="1089410" y="890450"/>
+                  <a:pt x="1089410" y="890450"/>
+                </a:cubicBezTo>
+                <a:cubicBezTo>
+                  <a:pt x="1062860" y="934537"/>
+                  <a:pt x="1062860" y="990968"/>
+                  <a:pt x="1089410" y="1035054"/>
+                </a:cubicBezTo>
+                <a:cubicBezTo>
+                  <a:pt x="1498276" y="1742196"/>
+                  <a:pt x="1498276" y="1742196"/>
+                  <a:pt x="1498276" y="1742196"/>
+                </a:cubicBezTo>
+                <a:cubicBezTo>
+                  <a:pt x="1511551" y="1765121"/>
+                  <a:pt x="1530135" y="1783637"/>
+                  <a:pt x="1552039" y="1796421"/>
+                </a:cubicBezTo>
+                <a:lnTo>
+                  <a:pt x="1558260" y="1799029"/>
+                </a:lnTo>
+                <a:lnTo>
+                  <a:pt x="1524911" y="1856707"/>
+                </a:lnTo>
+                <a:lnTo>
+                  <a:pt x="1500108" y="1899604"/>
+                </a:lnTo>
+                <a:lnTo>
+                  <a:pt x="1525834" y="1910390"/>
+                </a:lnTo>
+                <a:cubicBezTo>
+                  <a:pt x="1539779" y="1914181"/>
+                  <a:pt x="1554378" y="1916170"/>
+                  <a:pt x="1569352" y="1916170"/>
+                </a:cubicBezTo>
+                <a:cubicBezTo>
+                  <a:pt x="2493745" y="1916170"/>
+                  <a:pt x="2493745" y="1916170"/>
+                  <a:pt x="2493745" y="1916170"/>
+                </a:cubicBezTo>
+                <a:cubicBezTo>
+                  <a:pt x="2551645" y="1916170"/>
+                  <a:pt x="2607546" y="1884345"/>
+                  <a:pt x="2635498" y="1832627"/>
+                </a:cubicBezTo>
+                <a:cubicBezTo>
+                  <a:pt x="3098693" y="1034974"/>
+                  <a:pt x="3098693" y="1034974"/>
+                  <a:pt x="3098693" y="1034974"/>
+                </a:cubicBezTo>
+                <a:cubicBezTo>
+                  <a:pt x="3128641" y="985246"/>
+                  <a:pt x="3128641" y="921593"/>
+                  <a:pt x="3098693" y="871863"/>
+                </a:cubicBezTo>
+                <a:cubicBezTo>
+                  <a:pt x="3040794" y="772157"/>
+                  <a:pt x="2990132" y="684914"/>
+                  <a:pt x="2945803" y="608576"/>
+                </a:cubicBezTo>
+                <a:lnTo>
+                  <a:pt x="2923422" y="570035"/>
+                </a:lnTo>
+                <a:lnTo>
+                  <a:pt x="3027104" y="570035"/>
+                </a:lnTo>
+                <a:cubicBezTo>
+                  <a:pt x="3349535" y="570035"/>
+                  <a:pt x="3865424" y="570035"/>
+                  <a:pt x="4690846" y="570035"/>
+                </a:cubicBezTo>
+                <a:cubicBezTo>
+                  <a:pt x="4828714" y="570035"/>
+                  <a:pt x="4961827" y="645819"/>
+                  <a:pt x="5028384" y="768968"/>
+                </a:cubicBezTo>
+                <a:cubicBezTo>
+                  <a:pt x="5028384" y="768968"/>
+                  <a:pt x="5028384" y="768968"/>
+                  <a:pt x="6131323" y="2668304"/>
+                </a:cubicBezTo>
+                <a:cubicBezTo>
+                  <a:pt x="6202634" y="2786717"/>
+                  <a:pt x="6202634" y="2938285"/>
+                  <a:pt x="6131323" y="3056698"/>
+                </a:cubicBezTo>
+                <a:cubicBezTo>
+                  <a:pt x="6131323" y="3056698"/>
+                  <a:pt x="6131323" y="3056698"/>
+                  <a:pt x="5028384" y="4956035"/>
+                </a:cubicBezTo>
+                <a:cubicBezTo>
+                  <a:pt x="4961827" y="5079184"/>
+                  <a:pt x="4828714" y="5154967"/>
+                  <a:pt x="4690846" y="5154967"/>
+                </a:cubicBezTo>
+                <a:cubicBezTo>
+                  <a:pt x="4690846" y="5154967"/>
+                  <a:pt x="4690846" y="5154967"/>
+                  <a:pt x="2489721" y="5154967"/>
+                </a:cubicBezTo>
+                <a:cubicBezTo>
+                  <a:pt x="2347099" y="5154967"/>
+                  <a:pt x="2218739" y="5079184"/>
+                  <a:pt x="2147429" y="4956035"/>
+                </a:cubicBezTo>
+                <a:cubicBezTo>
+                  <a:pt x="2147429" y="4956035"/>
+                  <a:pt x="2147429" y="4956035"/>
+                  <a:pt x="1049243" y="3056698"/>
+                </a:cubicBezTo>
+                <a:cubicBezTo>
+                  <a:pt x="977932" y="2938285"/>
+                  <a:pt x="977932" y="2786717"/>
+                  <a:pt x="1049243" y="2668304"/>
+                </a:cubicBezTo>
+                <a:cubicBezTo>
+                  <a:pt x="1049243" y="2668304"/>
+                  <a:pt x="1049243" y="2668304"/>
+                  <a:pt x="1457007" y="1963067"/>
+                </a:cubicBezTo>
+                <a:lnTo>
+                  <a:pt x="1491373" y="1903634"/>
+                </a:lnTo>
+                <a:lnTo>
+                  <a:pt x="1490164" y="1903127"/>
+                </a:lnTo>
+                <a:cubicBezTo>
+                  <a:pt x="1465456" y="1888705"/>
+                  <a:pt x="1444493" y="1867820"/>
+                  <a:pt x="1429519" y="1841960"/>
+                </a:cubicBezTo>
+                <a:cubicBezTo>
+                  <a:pt x="1429519" y="1841960"/>
+                  <a:pt x="1429519" y="1841960"/>
+                  <a:pt x="968320" y="1044307"/>
+                </a:cubicBezTo>
+                <a:cubicBezTo>
+                  <a:pt x="938371" y="994579"/>
+                  <a:pt x="938371" y="930926"/>
+                  <a:pt x="968320" y="881196"/>
+                </a:cubicBezTo>
+                <a:cubicBezTo>
+                  <a:pt x="968320" y="881196"/>
+                  <a:pt x="968320" y="881196"/>
+                  <a:pt x="1429519" y="83546"/>
+                </a:cubicBezTo>
+                <a:cubicBezTo>
+                  <a:pt x="1459466" y="31828"/>
+                  <a:pt x="1513373" y="0"/>
+                  <a:pt x="1573268" y="0"/>
+                </a:cubicBezTo>
+                <a:close/>
+              </a:path>
+            </a:pathLst>
+          </a:custGeom>
+          <a:solidFill>
+            <a:schemeClr val="tx1">
+              <a:lumMod val="50000"/>
+              <a:lumOff val="50000"/>
+              <a:alpha val="15000"/>
+            </a:schemeClr>
+          </a:solidFill>
+          <a:ln>
+            <a:noFill/>
+          </a:ln>
+        </p:spPr>
+        <p:style>
+          <a:lnRef idx="2">
+            <a:schemeClr val="accent1">
+              <a:shade val="50000"/>
+            </a:schemeClr>
+          </a:lnRef>
+          <a:fillRef idx="1">
+            <a:schemeClr val="accent1"/>
+          </a:fillRef>
+          <a:effectRef idx="0">
+            <a:schemeClr val="accent1"/>
+          </a:effectRef>
+          <a:fontRef idx="minor">
+            <a:schemeClr val="lt1"/>
+          </a:fontRef>
+        </p:style>
+        <p:txBody>
+          <a:bodyPr wrap="square" rtlCol="0" anchor="ctr">
+            <a:noAutofit/>
+          </a:bodyPr>
+          <a:lstStyle/>
+          <a:p>
+            <a:pPr algn="ctr"/>
+            <a:endParaRPr lang="en-US"/>
           </a:p>
         </p:txBody>
       </p:sp>
@@ -18453,24 +19323,24 @@
         </p:nvSpPr>
         <p:spPr>
           <a:xfrm>
-            <a:off x="846940" y="2945978"/>
-            <a:ext cx="6107660" cy="3268639"/>
+            <a:off x="1106060" y="2924291"/>
+            <a:ext cx="5897603" cy="3268639"/>
           </a:xfrm>
         </p:spPr>
         <p:txBody>
           <a:bodyPr anchor="ctr">
-            <a:normAutofit/>
+            <a:noAutofit/>
           </a:bodyPr>
           <a:lstStyle/>
           <a:p>
             <a:pPr algn="l"/>
             <a:r>
-              <a:rPr lang="en-US" sz="4800" dirty="0">
+              <a:rPr lang="en-US" dirty="0">
                 <a:solidFill>
                   <a:schemeClr val="bg1"/>
                 </a:solidFill>
               </a:rPr>
-              <a:t>Demographics of General Population v. Incarcerated Population</a:t>
+              <a:t>General Population v. Incarcerated Population</a:t>
             </a:r>
           </a:p>
         </p:txBody>
@@ -20170,12 +21040,12 @@
           <a:p>
             <a:pPr algn="l"/>
             <a:r>
-              <a:rPr lang="en-US" sz="5000" dirty="0">
+              <a:rPr lang="en-US" sz="8000" dirty="0">
                 <a:solidFill>
                   <a:schemeClr val="bg1"/>
                 </a:solidFill>
               </a:rPr>
-              <a:t>Sentence Length by Crime Category</a:t>
+              <a:t>Sentence Lengths</a:t>
             </a:r>
           </a:p>
         </p:txBody>
@@ -20686,41 +21556,6 @@
       </p:sp>
       <p:pic>
         <p:nvPicPr>
-          <p:cNvPr id="7" name="Picture 6">
-            <a:extLst>
-              <a:ext uri="{FF2B5EF4-FFF2-40B4-BE49-F238E27FC236}">
-                <a16:creationId xmlns:a16="http://schemas.microsoft.com/office/drawing/2014/main" id="{FFFD7035-B509-414B-A6E7-1ECD87F95E77}"/>
-              </a:ext>
-            </a:extLst>
-          </p:cNvPr>
-          <p:cNvPicPr>
-            <a:picLocks noChangeAspect="1"/>
-          </p:cNvPicPr>
-          <p:nvPr/>
-        </p:nvPicPr>
-        <p:blipFill>
-          <a:blip r:embed="rId3">
-            <a:extLst>
-              <a:ext uri="{28A0092B-C50C-407E-A947-70E740481C1C}">
-                <a14:useLocalDpi xmlns:a14="http://schemas.microsoft.com/office/drawing/2010/main" val="0"/>
-              </a:ext>
-            </a:extLst>
-          </a:blip>
-          <a:srcRect/>
-          <a:stretch/>
-        </p:blipFill>
-        <p:spPr>
-          <a:xfrm>
-            <a:off x="5795" y="1452386"/>
-            <a:ext cx="6572345" cy="5257876"/>
-          </a:xfrm>
-          <a:prstGeom prst="rect">
-            <a:avLst/>
-          </a:prstGeom>
-        </p:spPr>
-      </p:pic>
-      <p:pic>
-        <p:nvPicPr>
           <p:cNvPr id="5" name="Content Placeholder 4">
             <a:extLst>
               <a:ext uri="{FF2B5EF4-FFF2-40B4-BE49-F238E27FC236}">
@@ -20736,7 +21571,7 @@
           </p:nvPr>
         </p:nvPicPr>
         <p:blipFill>
-          <a:blip r:embed="rId4">
+          <a:blip r:embed="rId3">
             <a:extLst>
               <a:ext uri="{28A0092B-C50C-407E-A947-70E740481C1C}">
                 <a14:useLocalDpi xmlns:a14="http://schemas.microsoft.com/office/drawing/2010/main" val="0"/>
@@ -20748,8 +21583,8 @@
         </p:blipFill>
         <p:spPr>
           <a:xfrm>
-            <a:off x="6578140" y="1875492"/>
-            <a:ext cx="4908550" cy="4411663"/>
+            <a:off x="6096000" y="1395664"/>
+            <a:ext cx="5442422" cy="4891492"/>
           </a:xfrm>
           <a:prstGeom prst="rect">
             <a:avLst/>
@@ -20793,17 +21628,29 @@
                 <a:ea typeface="+mj-ea"/>
                 <a:cs typeface="+mj-cs"/>
               </a:rPr>
-              <a:t>Sentence Length by Crime Category</a:t>
-            </a:r>
+              <a:t>Sentence </a:t>
+            </a:r>
+            <a:r>
+              <a:rPr lang="en-US" sz="5200" dirty="0"/>
+              <a:t>Lengths</a:t>
+            </a:r>
+            <a:endParaRPr lang="en-US" sz="5200" kern="1200" dirty="0">
+              <a:solidFill>
+                <a:schemeClr val="tx1"/>
+              </a:solidFill>
+              <a:latin typeface="+mj-lt"/>
+              <a:ea typeface="+mj-ea"/>
+              <a:cs typeface="+mj-cs"/>
+            </a:endParaRPr>
           </a:p>
         </p:txBody>
       </p:sp>
       <p:sp>
         <p:nvSpPr>
-          <p:cNvPr id="3" name="TextBox 2">
+          <p:cNvPr id="10" name="TextBox 9">
             <a:extLst>
               <a:ext uri="{FF2B5EF4-FFF2-40B4-BE49-F238E27FC236}">
-                <a16:creationId xmlns:a16="http://schemas.microsoft.com/office/drawing/2014/main" id="{C679AD20-730D-457E-93EE-B7DB38C66944}"/>
+                <a16:creationId xmlns:a16="http://schemas.microsoft.com/office/drawing/2014/main" id="{C8332938-638D-4DED-B5C6-5617ADFE9044}"/>
               </a:ext>
             </a:extLst>
           </p:cNvPr>
@@ -20812,8 +21659,8 @@
         </p:nvSpPr>
         <p:spPr>
           <a:xfrm>
-            <a:off x="2360176" y="1567272"/>
-            <a:ext cx="2516956" cy="369332"/>
+            <a:off x="7027279" y="1026332"/>
+            <a:ext cx="3579863" cy="369332"/>
           </a:xfrm>
           <a:prstGeom prst="rect">
             <a:avLst/>
@@ -20829,17 +21676,17 @@
             <a:pPr algn="ctr"/>
             <a:r>
               <a:rPr lang="en-US" dirty="0"/>
-              <a:t>Sentence Distribution</a:t>
+              <a:t>Sentence Length by Crime Category</a:t>
             </a:r>
           </a:p>
         </p:txBody>
       </p:sp>
       <p:sp>
         <p:nvSpPr>
-          <p:cNvPr id="10" name="TextBox 9">
+          <p:cNvPr id="4" name="TextBox 3">
             <a:extLst>
               <a:ext uri="{FF2B5EF4-FFF2-40B4-BE49-F238E27FC236}">
-                <a16:creationId xmlns:a16="http://schemas.microsoft.com/office/drawing/2014/main" id="{C8332938-638D-4DED-B5C6-5617ADFE9044}"/>
+                <a16:creationId xmlns:a16="http://schemas.microsoft.com/office/drawing/2014/main" id="{4504FF55-BE47-4B40-B556-203917A02C8A}"/>
               </a:ext>
             </a:extLst>
           </p:cNvPr>
@@ -20848,8 +21695,8 @@
         </p:nvSpPr>
         <p:spPr>
           <a:xfrm>
-            <a:off x="7773937" y="1567272"/>
-            <a:ext cx="2516956" cy="369332"/>
+            <a:off x="838200" y="1690688"/>
+            <a:ext cx="4455695" cy="3477875"/>
           </a:xfrm>
           <a:prstGeom prst="rect">
             <a:avLst/>
@@ -20862,10 +21709,33 @@
           </a:bodyPr>
           <a:lstStyle/>
           <a:p>
-            <a:pPr algn="ctr"/>
-            <a:r>
-              <a:rPr lang="en-US" dirty="0"/>
-              <a:t>Racial Breakdown</a:t>
+            <a:pPr marL="285750" indent="-285750" algn="just">
+              <a:buFont typeface="Arial" panose="020B0604020202020204" pitchFamily="34" charset="0"/>
+              <a:buChar char="•"/>
+            </a:pPr>
+            <a:r>
+              <a:rPr lang="en-US" sz="2000" dirty="0"/>
+              <a:t>Excluding sexual crimes, black sentences are 6 months to 2 years longer on average than white sentences</a:t>
+            </a:r>
+          </a:p>
+          <a:p>
+            <a:pPr marL="285750" indent="-285750" algn="just">
+              <a:buFont typeface="Arial" panose="020B0604020202020204" pitchFamily="34" charset="0"/>
+              <a:buChar char="•"/>
+            </a:pPr>
+            <a:r>
+              <a:rPr lang="en-US" sz="2000" dirty="0"/>
+              <a:t>Excluding sexual crimes, Hispanic sentences are 2-4 years shorter on average</a:t>
+            </a:r>
+          </a:p>
+          <a:p>
+            <a:pPr marL="285750" indent="-285750" algn="just">
+              <a:buFont typeface="Arial" panose="020B0604020202020204" pitchFamily="34" charset="0"/>
+              <a:buChar char="•"/>
+            </a:pPr>
+            <a:r>
+              <a:rPr lang="en-US" sz="2000" dirty="0"/>
+              <a:t>For sexual crimes, the average white sentence far exceeds average black and Hispanic sentences, but all 3 amount to life in prison</a:t>
             </a:r>
           </a:p>
         </p:txBody>
@@ -20880,6 +21750,183 @@
   <p:clrMapOvr>
     <a:masterClrMapping/>
   </p:clrMapOvr>
+  <p:timing>
+    <p:tnLst>
+      <p:par>
+        <p:cTn id="1" dur="indefinite" restart="never" nodeType="tmRoot">
+          <p:childTnLst>
+            <p:seq concurrent="1" nextAc="seek">
+              <p:cTn id="2" dur="indefinite" nodeType="mainSeq">
+                <p:childTnLst>
+                  <p:par>
+                    <p:cTn id="3" fill="hold">
+                      <p:stCondLst>
+                        <p:cond delay="indefinite"/>
+                      </p:stCondLst>
+                      <p:childTnLst>
+                        <p:par>
+                          <p:cTn id="4" fill="hold">
+                            <p:stCondLst>
+                              <p:cond delay="0"/>
+                            </p:stCondLst>
+                            <p:childTnLst>
+                              <p:par>
+                                <p:cTn id="5" presetID="1" presetClass="entr" presetSubtype="0" fill="hold" nodeType="clickEffect">
+                                  <p:stCondLst>
+                                    <p:cond delay="0"/>
+                                  </p:stCondLst>
+                                  <p:childTnLst>
+                                    <p:set>
+                                      <p:cBhvr>
+                                        <p:cTn id="6" dur="1" fill="hold">
+                                          <p:stCondLst>
+                                            <p:cond delay="0"/>
+                                          </p:stCondLst>
+                                        </p:cTn>
+                                        <p:tgtEl>
+                                          <p:spTgt spid="4">
+                                            <p:txEl>
+                                              <p:pRg st="0" end="0"/>
+                                            </p:txEl>
+                                          </p:spTgt>
+                                        </p:tgtEl>
+                                        <p:attrNameLst>
+                                          <p:attrName>style.visibility</p:attrName>
+                                        </p:attrNameLst>
+                                      </p:cBhvr>
+                                      <p:to>
+                                        <p:strVal val="visible"/>
+                                      </p:to>
+                                    </p:set>
+                                  </p:childTnLst>
+                                </p:cTn>
+                              </p:par>
+                            </p:childTnLst>
+                          </p:cTn>
+                        </p:par>
+                      </p:childTnLst>
+                    </p:cTn>
+                  </p:par>
+                  <p:par>
+                    <p:cTn id="7" fill="hold">
+                      <p:stCondLst>
+                        <p:cond delay="indefinite"/>
+                      </p:stCondLst>
+                      <p:childTnLst>
+                        <p:par>
+                          <p:cTn id="8" fill="hold">
+                            <p:stCondLst>
+                              <p:cond delay="0"/>
+                            </p:stCondLst>
+                            <p:childTnLst>
+                              <p:par>
+                                <p:cTn id="9" presetID="1" presetClass="entr" presetSubtype="0" fill="hold" nodeType="clickEffect">
+                                  <p:stCondLst>
+                                    <p:cond delay="0"/>
+                                  </p:stCondLst>
+                                  <p:childTnLst>
+                                    <p:set>
+                                      <p:cBhvr>
+                                        <p:cTn id="10" dur="1" fill="hold">
+                                          <p:stCondLst>
+                                            <p:cond delay="0"/>
+                                          </p:stCondLst>
+                                        </p:cTn>
+                                        <p:tgtEl>
+                                          <p:spTgt spid="4">
+                                            <p:txEl>
+                                              <p:pRg st="1" end="1"/>
+                                            </p:txEl>
+                                          </p:spTgt>
+                                        </p:tgtEl>
+                                        <p:attrNameLst>
+                                          <p:attrName>style.visibility</p:attrName>
+                                        </p:attrNameLst>
+                                      </p:cBhvr>
+                                      <p:to>
+                                        <p:strVal val="visible"/>
+                                      </p:to>
+                                    </p:set>
+                                  </p:childTnLst>
+                                </p:cTn>
+                              </p:par>
+                            </p:childTnLst>
+                          </p:cTn>
+                        </p:par>
+                      </p:childTnLst>
+                    </p:cTn>
+                  </p:par>
+                  <p:par>
+                    <p:cTn id="11" fill="hold">
+                      <p:stCondLst>
+                        <p:cond delay="indefinite"/>
+                      </p:stCondLst>
+                      <p:childTnLst>
+                        <p:par>
+                          <p:cTn id="12" fill="hold">
+                            <p:stCondLst>
+                              <p:cond delay="0"/>
+                            </p:stCondLst>
+                            <p:childTnLst>
+                              <p:par>
+                                <p:cTn id="13" presetID="1" presetClass="entr" presetSubtype="0" fill="hold" nodeType="clickEffect">
+                                  <p:stCondLst>
+                                    <p:cond delay="0"/>
+                                  </p:stCondLst>
+                                  <p:childTnLst>
+                                    <p:set>
+                                      <p:cBhvr>
+                                        <p:cTn id="14" dur="1" fill="hold">
+                                          <p:stCondLst>
+                                            <p:cond delay="0"/>
+                                          </p:stCondLst>
+                                        </p:cTn>
+                                        <p:tgtEl>
+                                          <p:spTgt spid="4">
+                                            <p:txEl>
+                                              <p:pRg st="2" end="2"/>
+                                            </p:txEl>
+                                          </p:spTgt>
+                                        </p:tgtEl>
+                                        <p:attrNameLst>
+                                          <p:attrName>style.visibility</p:attrName>
+                                        </p:attrNameLst>
+                                      </p:cBhvr>
+                                      <p:to>
+                                        <p:strVal val="visible"/>
+                                      </p:to>
+                                    </p:set>
+                                  </p:childTnLst>
+                                </p:cTn>
+                              </p:par>
+                            </p:childTnLst>
+                          </p:cTn>
+                        </p:par>
+                      </p:childTnLst>
+                    </p:cTn>
+                  </p:par>
+                </p:childTnLst>
+              </p:cTn>
+              <p:prevCondLst>
+                <p:cond evt="onPrev" delay="0">
+                  <p:tgtEl>
+                    <p:sldTgt/>
+                  </p:tgtEl>
+                </p:cond>
+              </p:prevCondLst>
+              <p:nextCondLst>
+                <p:cond evt="onNext" delay="0">
+                  <p:tgtEl>
+                    <p:sldTgt/>
+                  </p:tgtEl>
+                </p:cond>
+              </p:nextCondLst>
+            </p:seq>
+          </p:childTnLst>
+        </p:cTn>
+      </p:par>
+    </p:tnLst>
+  </p:timing>
 </p:sld>
 </file>
 

</xml_diff>

<commit_message>
updated plea analysis based on demo day feedback
</commit_message>
<xml_diff>
--- a/Presentation.pptx
+++ b/Presentation.pptx
@@ -26,7 +26,7 @@
     <p:sldId id="311" r:id="rId17"/>
     <p:sldId id="314" r:id="rId18"/>
     <p:sldId id="289" r:id="rId19"/>
-    <p:sldId id="312" r:id="rId20"/>
+    <p:sldId id="315" r:id="rId20"/>
     <p:sldId id="303" r:id="rId21"/>
   </p:sldIdLst>
   <p:sldSz cx="12192000" cy="6858000"/>
@@ -153,7 +153,7 @@
             <p14:sldId id="311"/>
             <p14:sldId id="314"/>
             <p14:sldId id="289"/>
-            <p14:sldId id="312"/>
+            <p14:sldId id="315"/>
             <p14:sldId id="303"/>
           </p14:sldIdLst>
         </p14:section>
@@ -248,7 +248,7 @@
           <a:p>
             <a:fld id="{4CB35077-CF4E-425A-AAA9-69F843C4878F}" type="datetimeFigureOut">
               <a:rPr lang="en-US" smtClean="0"/>
-              <a:t>4/30/2021</a:t>
+              <a:t>5/7/2021</a:t>
             </a:fld>
             <a:endParaRPr lang="en-US"/>
           </a:p>
@@ -1426,7 +1426,7 @@
     </p:spTree>
     <p:extLst>
       <p:ext uri="{BB962C8B-B14F-4D97-AF65-F5344CB8AC3E}">
-        <p14:creationId xmlns:p14="http://schemas.microsoft.com/office/powerpoint/2010/main" val="1601457874"/>
+        <p14:creationId xmlns:p14="http://schemas.microsoft.com/office/powerpoint/2010/main" val="539571444"/>
       </p:ext>
     </p:extLst>
   </p:cSld>
@@ -1583,7 +1583,7 @@
           <a:p>
             <a:fld id="{11F9EF8F-8264-40DF-BA62-43F7AC7FC3AC}" type="datetimeFigureOut">
               <a:rPr lang="en-US" smtClean="0"/>
-              <a:t>4/30/2021</a:t>
+              <a:t>5/7/2021</a:t>
             </a:fld>
             <a:endParaRPr lang="en-US"/>
           </a:p>
@@ -1781,7 +1781,7 @@
           <a:p>
             <a:fld id="{11F9EF8F-8264-40DF-BA62-43F7AC7FC3AC}" type="datetimeFigureOut">
               <a:rPr lang="en-US" smtClean="0"/>
-              <a:t>4/30/2021</a:t>
+              <a:t>5/7/2021</a:t>
             </a:fld>
             <a:endParaRPr lang="en-US"/>
           </a:p>
@@ -1989,7 +1989,7 @@
           <a:p>
             <a:fld id="{11F9EF8F-8264-40DF-BA62-43F7AC7FC3AC}" type="datetimeFigureOut">
               <a:rPr lang="en-US" smtClean="0"/>
-              <a:t>4/30/2021</a:t>
+              <a:t>5/7/2021</a:t>
             </a:fld>
             <a:endParaRPr lang="en-US"/>
           </a:p>
@@ -2187,7 +2187,7 @@
           <a:p>
             <a:fld id="{11F9EF8F-8264-40DF-BA62-43F7AC7FC3AC}" type="datetimeFigureOut">
               <a:rPr lang="en-US" smtClean="0"/>
-              <a:t>4/30/2021</a:t>
+              <a:t>5/7/2021</a:t>
             </a:fld>
             <a:endParaRPr lang="en-US"/>
           </a:p>
@@ -2462,7 +2462,7 @@
           <a:p>
             <a:fld id="{11F9EF8F-8264-40DF-BA62-43F7AC7FC3AC}" type="datetimeFigureOut">
               <a:rPr lang="en-US" smtClean="0"/>
-              <a:t>4/30/2021</a:t>
+              <a:t>5/7/2021</a:t>
             </a:fld>
             <a:endParaRPr lang="en-US"/>
           </a:p>
@@ -2727,7 +2727,7 @@
           <a:p>
             <a:fld id="{11F9EF8F-8264-40DF-BA62-43F7AC7FC3AC}" type="datetimeFigureOut">
               <a:rPr lang="en-US" smtClean="0"/>
-              <a:t>4/30/2021</a:t>
+              <a:t>5/7/2021</a:t>
             </a:fld>
             <a:endParaRPr lang="en-US"/>
           </a:p>
@@ -3139,7 +3139,7 @@
           <a:p>
             <a:fld id="{11F9EF8F-8264-40DF-BA62-43F7AC7FC3AC}" type="datetimeFigureOut">
               <a:rPr lang="en-US" smtClean="0"/>
-              <a:t>4/30/2021</a:t>
+              <a:t>5/7/2021</a:t>
             </a:fld>
             <a:endParaRPr lang="en-US"/>
           </a:p>
@@ -3280,7 +3280,7 @@
           <a:p>
             <a:fld id="{11F9EF8F-8264-40DF-BA62-43F7AC7FC3AC}" type="datetimeFigureOut">
               <a:rPr lang="en-US" smtClean="0"/>
-              <a:t>4/30/2021</a:t>
+              <a:t>5/7/2021</a:t>
             </a:fld>
             <a:endParaRPr lang="en-US"/>
           </a:p>
@@ -3393,7 +3393,7 @@
           <a:p>
             <a:fld id="{11F9EF8F-8264-40DF-BA62-43F7AC7FC3AC}" type="datetimeFigureOut">
               <a:rPr lang="en-US" smtClean="0"/>
-              <a:t>4/30/2021</a:t>
+              <a:t>5/7/2021</a:t>
             </a:fld>
             <a:endParaRPr lang="en-US"/>
           </a:p>
@@ -3704,7 +3704,7 @@
           <a:p>
             <a:fld id="{11F9EF8F-8264-40DF-BA62-43F7AC7FC3AC}" type="datetimeFigureOut">
               <a:rPr lang="en-US" smtClean="0"/>
-              <a:t>4/30/2021</a:t>
+              <a:t>5/7/2021</a:t>
             </a:fld>
             <a:endParaRPr lang="en-US"/>
           </a:p>
@@ -3992,7 +3992,7 @@
           <a:p>
             <a:fld id="{11F9EF8F-8264-40DF-BA62-43F7AC7FC3AC}" type="datetimeFigureOut">
               <a:rPr lang="en-US" smtClean="0"/>
-              <a:t>4/30/2021</a:t>
+              <a:t>5/7/2021</a:t>
             </a:fld>
             <a:endParaRPr lang="en-US"/>
           </a:p>
@@ -4233,7 +4233,7 @@
           <a:p>
             <a:fld id="{11F9EF8F-8264-40DF-BA62-43F7AC7FC3AC}" type="datetimeFigureOut">
               <a:rPr lang="en-US" smtClean="0"/>
-              <a:t>4/30/2021</a:t>
+              <a:t>5/7/2021</a:t>
             </a:fld>
             <a:endParaRPr lang="en-US"/>
           </a:p>
@@ -13490,124 +13490,6 @@
           </a:p>
         </p:txBody>
       </p:sp>
-      <p:pic>
-        <p:nvPicPr>
-          <p:cNvPr id="9" name="Picture 8">
-            <a:extLst>
-              <a:ext uri="{FF2B5EF4-FFF2-40B4-BE49-F238E27FC236}">
-                <a16:creationId xmlns:a16="http://schemas.microsoft.com/office/drawing/2014/main" id="{63246AD8-3A52-436E-8521-83FB1E4415AD}"/>
-              </a:ext>
-            </a:extLst>
-          </p:cNvPr>
-          <p:cNvPicPr>
-            <a:picLocks noChangeAspect="1"/>
-          </p:cNvPicPr>
-          <p:nvPr/>
-        </p:nvPicPr>
-        <p:blipFill rotWithShape="1">
-          <a:blip r:embed="rId3">
-            <a:extLst>
-              <a:ext uri="{28A0092B-C50C-407E-A947-70E740481C1C}">
-                <a14:useLocalDpi xmlns:a14="http://schemas.microsoft.com/office/drawing/2010/main" val="0"/>
-              </a:ext>
-            </a:extLst>
-          </a:blip>
-          <a:srcRect l="-4446" t="655" r="-3818" b="27"/>
-          <a:stretch/>
-        </p:blipFill>
-        <p:spPr>
-          <a:xfrm>
-            <a:off x="5176911" y="720190"/>
-            <a:ext cx="6833848" cy="5584353"/>
-          </a:xfrm>
-          <a:prstGeom prst="rect">
-            <a:avLst/>
-          </a:prstGeom>
-        </p:spPr>
-      </p:pic>
-      <p:sp>
-        <p:nvSpPr>
-          <p:cNvPr id="10" name="TextBox 9">
-            <a:extLst>
-              <a:ext uri="{FF2B5EF4-FFF2-40B4-BE49-F238E27FC236}">
-                <a16:creationId xmlns:a16="http://schemas.microsoft.com/office/drawing/2014/main" id="{91097034-5955-46F6-94A5-18E3D5985947}"/>
-              </a:ext>
-            </a:extLst>
-          </p:cNvPr>
-          <p:cNvSpPr txBox="1"/>
-          <p:nvPr/>
-        </p:nvSpPr>
-        <p:spPr>
-          <a:xfrm>
-            <a:off x="563196" y="3341688"/>
-            <a:ext cx="4050519" cy="2308324"/>
-          </a:xfrm>
-          <a:prstGeom prst="rect">
-            <a:avLst/>
-          </a:prstGeom>
-          <a:noFill/>
-        </p:spPr>
-        <p:txBody>
-          <a:bodyPr wrap="square" rtlCol="0">
-            <a:spAutoFit/>
-          </a:bodyPr>
-          <a:lstStyle/>
-          <a:p>
-            <a:pPr marL="285750" indent="-285750">
-              <a:buFont typeface="Arial" panose="020B0604020202020204" pitchFamily="34" charset="0"/>
-              <a:buChar char="•"/>
-            </a:pPr>
-            <a:r>
-              <a:rPr lang="en-US" dirty="0"/>
-              <a:t>Difference between average sentence length for plea v. trial:</a:t>
-            </a:r>
-          </a:p>
-          <a:p>
-            <a:pPr marL="742950" lvl="1" indent="-285750">
-              <a:buFont typeface="Arial" panose="020B0604020202020204" pitchFamily="34" charset="0"/>
-              <a:buChar char="•"/>
-            </a:pPr>
-            <a:r>
-              <a:rPr lang="en-US" dirty="0"/>
-              <a:t>Black: 45.4 years</a:t>
-            </a:r>
-          </a:p>
-          <a:p>
-            <a:pPr marL="742950" lvl="1" indent="-285750">
-              <a:buFont typeface="Arial" panose="020B0604020202020204" pitchFamily="34" charset="0"/>
-              <a:buChar char="•"/>
-            </a:pPr>
-            <a:r>
-              <a:rPr lang="en-US" dirty="0"/>
-              <a:t>White: 59.3 years</a:t>
-            </a:r>
-          </a:p>
-          <a:p>
-            <a:pPr marL="742950" lvl="1" indent="-285750">
-              <a:buFont typeface="Arial" panose="020B0604020202020204" pitchFamily="34" charset="0"/>
-              <a:buChar char="•"/>
-            </a:pPr>
-            <a:r>
-              <a:rPr lang="en-US" dirty="0"/>
-              <a:t>Hispanic 81.5 years</a:t>
-            </a:r>
-          </a:p>
-          <a:p>
-            <a:pPr marL="285750" indent="-285750">
-              <a:buFont typeface="Arial" panose="020B0604020202020204" pitchFamily="34" charset="0"/>
-              <a:buChar char="•"/>
-            </a:pPr>
-            <a:r>
-              <a:rPr lang="en-US" dirty="0"/>
-              <a:t>Median sentences are dramatically lower, but going to trial still increases the median sentence by </a:t>
-            </a:r>
-            <a:r>
-              <a:rPr lang="en-US" b="1" dirty="0"/>
-              <a:t>6.6 years</a:t>
-            </a:r>
-          </a:p>
-        </p:txBody>
-      </p:sp>
       <p:sp>
         <p:nvSpPr>
           <p:cNvPr id="11" name="Rectangle: Rounded Corners 10">
@@ -13622,8 +13504,8 @@
         </p:nvSpPr>
         <p:spPr>
           <a:xfrm>
-            <a:off x="651369" y="1416740"/>
-            <a:ext cx="1754480" cy="1693072"/>
+            <a:off x="485114" y="1900215"/>
+            <a:ext cx="1754480" cy="1154712"/>
           </a:xfrm>
           <a:prstGeom prst="roundRect">
             <a:avLst/>
@@ -13658,39 +13540,75 @@
         </p:style>
         <p:txBody>
           <a:bodyPr rtlCol="0" anchor="ctr">
-            <a:normAutofit fontScale="92500" lnSpcReduction="10000"/>
+            <a:normAutofit fontScale="70000" lnSpcReduction="20000"/>
           </a:bodyPr>
           <a:lstStyle/>
           <a:p>
             <a:pPr algn="ctr"/>
             <a:r>
               <a:rPr lang="en-US" sz="1400" dirty="0"/>
-              <a:t>Average sentence for a plea:</a:t>
+              <a:t>Drug and racketeering sentences are over</a:t>
             </a:r>
           </a:p>
           <a:p>
             <a:pPr algn="ctr"/>
             <a:r>
               <a:rPr lang="en-US" sz="6600" dirty="0"/>
-              <a:t>5.9</a:t>
+              <a:t>110</a:t>
             </a:r>
           </a:p>
           <a:p>
             <a:pPr algn="ctr"/>
             <a:r>
               <a:rPr lang="en-US" sz="1400" dirty="0"/>
-              <a:t>years</a:t>
+              <a:t>years longer on average</a:t>
             </a:r>
             <a:endParaRPr lang="en-US" dirty="0"/>
           </a:p>
         </p:txBody>
       </p:sp>
+      <p:pic>
+        <p:nvPicPr>
+          <p:cNvPr id="5" name="Picture 4" descr="Chart&#10;&#10;Description automatically generated">
+            <a:extLst>
+              <a:ext uri="{FF2B5EF4-FFF2-40B4-BE49-F238E27FC236}">
+                <a16:creationId xmlns:a16="http://schemas.microsoft.com/office/drawing/2014/main" id="{CC5AFBE8-5344-4DCC-BDF9-39F0AD7BE34A}"/>
+              </a:ext>
+            </a:extLst>
+          </p:cNvPr>
+          <p:cNvPicPr>
+            <a:picLocks noChangeAspect="1"/>
+          </p:cNvPicPr>
+          <p:nvPr/>
+        </p:nvPicPr>
+        <p:blipFill>
+          <a:blip r:embed="rId3">
+            <a:extLst>
+              <a:ext uri="{28A0092B-C50C-407E-A947-70E740481C1C}">
+                <a14:useLocalDpi xmlns:a14="http://schemas.microsoft.com/office/drawing/2010/main" val="0"/>
+              </a:ext>
+            </a:extLst>
+          </a:blip>
+          <a:stretch>
+            <a:fillRect/>
+          </a:stretch>
+        </p:blipFill>
+        <p:spPr>
+          <a:xfrm>
+            <a:off x="1745672" y="1253836"/>
+            <a:ext cx="10446327" cy="5223164"/>
+          </a:xfrm>
+          <a:prstGeom prst="rect">
+            <a:avLst/>
+          </a:prstGeom>
+        </p:spPr>
+      </p:pic>
       <p:sp>
         <p:nvSpPr>
-          <p:cNvPr id="13" name="Rectangle: Rounded Corners 12">
+          <p:cNvPr id="12" name="Rectangle: Rounded Corners 11">
             <a:extLst>
               <a:ext uri="{FF2B5EF4-FFF2-40B4-BE49-F238E27FC236}">
-                <a16:creationId xmlns:a16="http://schemas.microsoft.com/office/drawing/2014/main" id="{404822C7-33D6-4D38-A7A1-93FA7702FD69}"/>
+                <a16:creationId xmlns:a16="http://schemas.microsoft.com/office/drawing/2014/main" id="{D0AD5FE3-74B0-4D52-B35A-664213EDEF71}"/>
               </a:ext>
             </a:extLst>
           </p:cNvPr>
@@ -13699,8 +13617,8 @@
         </p:nvSpPr>
         <p:spPr>
           <a:xfrm>
-            <a:off x="2914140" y="1386038"/>
-            <a:ext cx="1754480" cy="1693072"/>
+            <a:off x="485114" y="4722765"/>
+            <a:ext cx="1754480" cy="1154712"/>
           </a:xfrm>
           <a:prstGeom prst="roundRect">
             <a:avLst/>
@@ -13735,28 +13653,28 @@
         </p:style>
         <p:txBody>
           <a:bodyPr rtlCol="0" anchor="ctr">
-            <a:normAutofit fontScale="92500" lnSpcReduction="10000"/>
+            <a:normAutofit fontScale="70000" lnSpcReduction="20000"/>
           </a:bodyPr>
           <a:lstStyle/>
           <a:p>
             <a:pPr algn="ctr"/>
             <a:r>
               <a:rPr lang="en-US" sz="1400" dirty="0"/>
-              <a:t>Average sentence for a trial:</a:t>
+              <a:t>Firearm sentences are over</a:t>
             </a:r>
           </a:p>
           <a:p>
             <a:pPr algn="ctr"/>
             <a:r>
               <a:rPr lang="en-US" sz="6600" dirty="0"/>
-              <a:t>58.3</a:t>
+              <a:t>19</a:t>
             </a:r>
           </a:p>
           <a:p>
             <a:pPr algn="ctr"/>
             <a:r>
               <a:rPr lang="en-US" sz="1400" dirty="0"/>
-              <a:t>years</a:t>
+              <a:t>years longer on average</a:t>
             </a:r>
             <a:endParaRPr lang="en-US" dirty="0"/>
           </a:p>
@@ -13764,39 +13682,111 @@
       </p:sp>
       <p:sp>
         <p:nvSpPr>
-          <p:cNvPr id="3" name="TextBox 2">
+          <p:cNvPr id="15" name="Rectangle: Rounded Corners 14">
             <a:extLst>
               <a:ext uri="{FF2B5EF4-FFF2-40B4-BE49-F238E27FC236}">
-                <a16:creationId xmlns:a16="http://schemas.microsoft.com/office/drawing/2014/main" id="{DA188A66-082D-4F86-8E5E-C9A24D6B95B1}"/>
+                <a16:creationId xmlns:a16="http://schemas.microsoft.com/office/drawing/2014/main" id="{75F0EB31-4208-485B-83A6-E5994414E95A}"/>
               </a:ext>
             </a:extLst>
           </p:cNvPr>
-          <p:cNvSpPr txBox="1"/>
+          <p:cNvSpPr/>
           <p:nvPr/>
         </p:nvSpPr>
         <p:spPr>
           <a:xfrm>
-            <a:off x="6928956" y="350858"/>
-            <a:ext cx="3329758" cy="369332"/>
+            <a:off x="485114" y="3288062"/>
+            <a:ext cx="1754480" cy="1154712"/>
+          </a:xfrm>
+          <a:prstGeom prst="roundRect">
+            <a:avLst/>
+          </a:prstGeom>
+          <a:solidFill>
+            <a:srgbClr val="EAF1F6"/>
+          </a:solidFill>
+          <a:ln>
+            <a:noFill/>
+          </a:ln>
+          <a:effectLst>
+            <a:outerShdw blurRad="50800" dist="38100" dir="2700000" algn="tl" rotWithShape="0">
+              <a:prstClr val="black">
+                <a:alpha val="40000"/>
+              </a:prstClr>
+            </a:outerShdw>
+          </a:effectLst>
+        </p:spPr>
+        <p:style>
+          <a:lnRef idx="2">
+            <a:schemeClr val="dk1"/>
+          </a:lnRef>
+          <a:fillRef idx="1">
+            <a:schemeClr val="lt1"/>
+          </a:fillRef>
+          <a:effectRef idx="0">
+            <a:schemeClr val="dk1"/>
+          </a:effectRef>
+          <a:fontRef idx="minor">
+            <a:schemeClr val="dk1"/>
+          </a:fontRef>
+        </p:style>
+        <p:txBody>
+          <a:bodyPr rtlCol="0" anchor="ctr">
+            <a:normAutofit fontScale="70000" lnSpcReduction="20000"/>
+          </a:bodyPr>
+          <a:lstStyle/>
+          <a:p>
+            <a:pPr algn="ctr"/>
+            <a:r>
+              <a:rPr lang="en-US" sz="1400" dirty="0"/>
+              <a:t>Robbery sentences are over</a:t>
+            </a:r>
+          </a:p>
+          <a:p>
+            <a:pPr algn="ctr"/>
+            <a:r>
+              <a:rPr lang="en-US" sz="6600" dirty="0"/>
+              <a:t>42</a:t>
+            </a:r>
+          </a:p>
+          <a:p>
+            <a:pPr algn="ctr"/>
+            <a:r>
+              <a:rPr lang="en-US" sz="1400" dirty="0"/>
+              <a:t>years longer on average</a:t>
+            </a:r>
+            <a:endParaRPr lang="en-US" dirty="0"/>
+          </a:p>
+        </p:txBody>
+      </p:sp>
+      <p:pic>
+        <p:nvPicPr>
+          <p:cNvPr id="7" name="Picture 6">
+            <a:extLst>
+              <a:ext uri="{FF2B5EF4-FFF2-40B4-BE49-F238E27FC236}">
+                <a16:creationId xmlns:a16="http://schemas.microsoft.com/office/drawing/2014/main" id="{E9CE70EE-4BE8-4E08-9A8C-242C99057F73}"/>
+              </a:ext>
+            </a:extLst>
+          </p:cNvPr>
+          <p:cNvPicPr>
+            <a:picLocks noChangeAspect="1"/>
+          </p:cNvPicPr>
+          <p:nvPr/>
+        </p:nvPicPr>
+        <p:blipFill>
+          <a:blip r:embed="rId4"/>
+          <a:stretch>
+            <a:fillRect/>
+          </a:stretch>
+        </p:blipFill>
+        <p:spPr>
+          <a:xfrm>
+            <a:off x="2988686" y="5877477"/>
+            <a:ext cx="8137172" cy="935882"/>
           </a:xfrm>
           <a:prstGeom prst="rect">
             <a:avLst/>
           </a:prstGeom>
-          <a:noFill/>
         </p:spPr>
-        <p:txBody>
-          <a:bodyPr wrap="none" rtlCol="0">
-            <a:spAutoFit/>
-          </a:bodyPr>
-          <a:lstStyle/>
-          <a:p>
-            <a:r>
-              <a:rPr lang="en-US" dirty="0"/>
-              <a:t>Average Sentence Length by Race</a:t>
-            </a:r>
-          </a:p>
-        </p:txBody>
-      </p:sp>
+      </p:pic>
     </p:spTree>
     <p:extLst>
       <p:ext uri="{BB962C8B-B14F-4D97-AF65-F5344CB8AC3E}">
@@ -13841,7 +13831,7 @@
                                           </p:stCondLst>
                                         </p:cTn>
                                         <p:tgtEl>
-                                          <p:spTgt spid="10"/>
+                                          <p:spTgt spid="11"/>
                                         </p:tgtEl>
                                         <p:attrNameLst>
                                           <p:attrName>style.visibility</p:attrName>
@@ -13855,7 +13845,77 @@
                                       <p:cBhvr>
                                         <p:cTn id="7" dur="500"/>
                                         <p:tgtEl>
-                                          <p:spTgt spid="10"/>
+                                          <p:spTgt spid="11"/>
+                                        </p:tgtEl>
+                                      </p:cBhvr>
+                                    </p:animEffect>
+                                  </p:childTnLst>
+                                </p:cTn>
+                              </p:par>
+                              <p:par>
+                                <p:cTn id="8" presetID="10" presetClass="entr" presetSubtype="0" fill="hold" grpId="0" nodeType="withEffect">
+                                  <p:stCondLst>
+                                    <p:cond delay="0"/>
+                                  </p:stCondLst>
+                                  <p:childTnLst>
+                                    <p:set>
+                                      <p:cBhvr>
+                                        <p:cTn id="9" dur="1" fill="hold">
+                                          <p:stCondLst>
+                                            <p:cond delay="0"/>
+                                          </p:stCondLst>
+                                        </p:cTn>
+                                        <p:tgtEl>
+                                          <p:spTgt spid="15"/>
+                                        </p:tgtEl>
+                                        <p:attrNameLst>
+                                          <p:attrName>style.visibility</p:attrName>
+                                        </p:attrNameLst>
+                                      </p:cBhvr>
+                                      <p:to>
+                                        <p:strVal val="visible"/>
+                                      </p:to>
+                                    </p:set>
+                                    <p:animEffect transition="in" filter="fade">
+                                      <p:cBhvr>
+                                        <p:cTn id="10" dur="500"/>
+                                        <p:tgtEl>
+                                          <p:spTgt spid="15"/>
+                                        </p:tgtEl>
+                                      </p:cBhvr>
+                                    </p:animEffect>
+                                  </p:childTnLst>
+                                </p:cTn>
+                              </p:par>
+                              <p:par>
+                                <p:cTn id="11" presetID="10" presetClass="entr" presetSubtype="0" fill="hold" grpId="0" nodeType="withEffect">
+                                  <p:stCondLst>
+                                    <p:cond delay="0"/>
+                                  </p:stCondLst>
+                                  <p:childTnLst>
+                                    <p:set>
+                                      <p:cBhvr>
+                                        <p:cTn id="12" dur="1" fill="hold">
+                                          <p:stCondLst>
+                                            <p:cond delay="0"/>
+                                          </p:stCondLst>
+                                        </p:cTn>
+                                        <p:tgtEl>
+                                          <p:spTgt spid="12"/>
+                                        </p:tgtEl>
+                                        <p:attrNameLst>
+                                          <p:attrName>style.visibility</p:attrName>
+                                        </p:attrNameLst>
+                                      </p:cBhvr>
+                                      <p:to>
+                                        <p:strVal val="visible"/>
+                                      </p:to>
+                                    </p:set>
+                                    <p:animEffect transition="in" filter="fade">
+                                      <p:cBhvr>
+                                        <p:cTn id="13" dur="500"/>
+                                        <p:tgtEl>
+                                          <p:spTgt spid="12"/>
                                         </p:tgtEl>
                                       </p:cBhvr>
                                     </p:animEffect>
@@ -13890,7 +13950,9 @@
       </p:par>
     </p:tnLst>
     <p:bldLst>
-      <p:bldP spid="10" grpId="0"/>
+      <p:bldP spid="11" grpId="0" animBg="1"/>
+      <p:bldP spid="12" grpId="0" animBg="1"/>
+      <p:bldP spid="15" grpId="0" animBg="1"/>
     </p:bldLst>
   </p:timing>
 </p:sld>
@@ -14016,106 +14078,12 @@
           </a:p>
         </p:txBody>
       </p:sp>
-      <p:pic>
-        <p:nvPicPr>
-          <p:cNvPr id="9" name="Picture 8">
+      <p:sp>
+        <p:nvSpPr>
+          <p:cNvPr id="11" name="Rectangle: Rounded Corners 10">
             <a:extLst>
               <a:ext uri="{FF2B5EF4-FFF2-40B4-BE49-F238E27FC236}">
-                <a16:creationId xmlns:a16="http://schemas.microsoft.com/office/drawing/2014/main" id="{63246AD8-3A52-436E-8521-83FB1E4415AD}"/>
-              </a:ext>
-            </a:extLst>
-          </p:cNvPr>
-          <p:cNvPicPr>
-            <a:picLocks noChangeAspect="1"/>
-          </p:cNvPicPr>
-          <p:nvPr/>
-        </p:nvPicPr>
-        <p:blipFill rotWithShape="1">
-          <a:blip r:embed="rId3">
-            <a:extLst>
-              <a:ext uri="{28A0092B-C50C-407E-A947-70E740481C1C}">
-                <a14:useLocalDpi xmlns:a14="http://schemas.microsoft.com/office/drawing/2010/main" val="0"/>
-              </a:ext>
-            </a:extLst>
-          </a:blip>
-          <a:srcRect l="-4626" t="142" r="-4487"/>
-          <a:stretch/>
-        </p:blipFill>
-        <p:spPr>
-          <a:xfrm>
-            <a:off x="5176911" y="720190"/>
-            <a:ext cx="6833848" cy="5584353"/>
-          </a:xfrm>
-          <a:prstGeom prst="rect">
-            <a:avLst/>
-          </a:prstGeom>
-        </p:spPr>
-      </p:pic>
-      <p:sp>
-        <p:nvSpPr>
-          <p:cNvPr id="10" name="TextBox 9">
-            <a:extLst>
-              <a:ext uri="{FF2B5EF4-FFF2-40B4-BE49-F238E27FC236}">
-                <a16:creationId xmlns:a16="http://schemas.microsoft.com/office/drawing/2014/main" id="{91097034-5955-46F6-94A5-18E3D5985947}"/>
-              </a:ext>
-            </a:extLst>
-          </p:cNvPr>
-          <p:cNvSpPr txBox="1"/>
-          <p:nvPr/>
-        </p:nvSpPr>
-        <p:spPr>
-          <a:xfrm>
-            <a:off x="563196" y="3512366"/>
-            <a:ext cx="4050519" cy="1200329"/>
-          </a:xfrm>
-          <a:prstGeom prst="rect">
-            <a:avLst/>
-          </a:prstGeom>
-          <a:noFill/>
-        </p:spPr>
-        <p:txBody>
-          <a:bodyPr wrap="square" rtlCol="0">
-            <a:spAutoFit/>
-          </a:bodyPr>
-          <a:lstStyle/>
-          <a:p>
-            <a:pPr marL="285750" indent="-285750">
-              <a:buFont typeface="Arial" panose="020B0604020202020204" pitchFamily="34" charset="0"/>
-              <a:buChar char="•"/>
-            </a:pPr>
-            <a:r>
-              <a:rPr lang="en-US" dirty="0"/>
-              <a:t>3.9% of black defendants pursue trial</a:t>
-            </a:r>
-          </a:p>
-          <a:p>
-            <a:pPr marL="285750" indent="-285750">
-              <a:buFont typeface="Arial" panose="020B0604020202020204" pitchFamily="34" charset="0"/>
-              <a:buChar char="•"/>
-            </a:pPr>
-            <a:r>
-              <a:rPr lang="en-US" dirty="0"/>
-              <a:t>2.4% of white defendants pursue trial</a:t>
-            </a:r>
-          </a:p>
-          <a:p>
-            <a:pPr marL="285750" indent="-285750">
-              <a:buFont typeface="Arial" panose="020B0604020202020204" pitchFamily="34" charset="0"/>
-              <a:buChar char="•"/>
-            </a:pPr>
-            <a:r>
-              <a:rPr lang="en-US" dirty="0"/>
-              <a:t>1.3% of Hispanic defendants pursue trial</a:t>
-            </a:r>
-          </a:p>
-        </p:txBody>
-      </p:sp>
-      <p:sp>
-        <p:nvSpPr>
-          <p:cNvPr id="13" name="Rectangle: Rounded Corners 12">
-            <a:extLst>
-              <a:ext uri="{FF2B5EF4-FFF2-40B4-BE49-F238E27FC236}">
-                <a16:creationId xmlns:a16="http://schemas.microsoft.com/office/drawing/2014/main" id="{404822C7-33D6-4D38-A7A1-93FA7702FD69}"/>
+                <a16:creationId xmlns:a16="http://schemas.microsoft.com/office/drawing/2014/main" id="{6B2C90E6-A701-43CF-88E4-66F2BAD893A7}"/>
               </a:ext>
             </a:extLst>
           </p:cNvPr>
@@ -14124,8 +14092,8 @@
         </p:nvSpPr>
         <p:spPr>
           <a:xfrm>
-            <a:off x="1639325" y="1607419"/>
-            <a:ext cx="1898259" cy="1540042"/>
+            <a:off x="485114" y="1900215"/>
+            <a:ext cx="1754480" cy="1154712"/>
           </a:xfrm>
           <a:prstGeom prst="roundRect">
             <a:avLst/>
@@ -14166,26 +14134,91 @@
           <a:p>
             <a:pPr algn="ctr"/>
             <a:r>
-              <a:rPr lang="en-US" sz="8000" dirty="0"/>
+              <a:rPr lang="en-US" sz="6600" dirty="0"/>
               <a:t>97%</a:t>
             </a:r>
           </a:p>
           <a:p>
             <a:pPr algn="ctr"/>
             <a:r>
-              <a:rPr lang="en-US" sz="1300" dirty="0"/>
-              <a:t>of all defendants plead out</a:t>
-            </a:r>
-            <a:endParaRPr lang="en-US" sz="1600" dirty="0"/>
+              <a:rPr lang="en-US" sz="1400" dirty="0"/>
+              <a:t>of all defendants plead</a:t>
+            </a:r>
+            <a:endParaRPr lang="en-US" dirty="0"/>
           </a:p>
         </p:txBody>
       </p:sp>
+      <p:pic>
+        <p:nvPicPr>
+          <p:cNvPr id="5" name="Picture 4">
+            <a:extLst>
+              <a:ext uri="{FF2B5EF4-FFF2-40B4-BE49-F238E27FC236}">
+                <a16:creationId xmlns:a16="http://schemas.microsoft.com/office/drawing/2014/main" id="{CC5AFBE8-5344-4DCC-BDF9-39F0AD7BE34A}"/>
+              </a:ext>
+            </a:extLst>
+          </p:cNvPr>
+          <p:cNvPicPr>
+            <a:picLocks noChangeAspect="1"/>
+          </p:cNvPicPr>
+          <p:nvPr/>
+        </p:nvPicPr>
+        <p:blipFill>
+          <a:blip r:embed="rId3">
+            <a:extLst>
+              <a:ext uri="{28A0092B-C50C-407E-A947-70E740481C1C}">
+                <a14:useLocalDpi xmlns:a14="http://schemas.microsoft.com/office/drawing/2010/main" val="0"/>
+              </a:ext>
+            </a:extLst>
+          </a:blip>
+          <a:srcRect/>
+          <a:stretch/>
+        </p:blipFill>
+        <p:spPr>
+          <a:xfrm>
+            <a:off x="1745672" y="1253836"/>
+            <a:ext cx="10446327" cy="5223163"/>
+          </a:xfrm>
+          <a:prstGeom prst="rect">
+            <a:avLst/>
+          </a:prstGeom>
+        </p:spPr>
+      </p:pic>
+      <p:pic>
+        <p:nvPicPr>
+          <p:cNvPr id="4" name="Picture 3">
+            <a:extLst>
+              <a:ext uri="{FF2B5EF4-FFF2-40B4-BE49-F238E27FC236}">
+                <a16:creationId xmlns:a16="http://schemas.microsoft.com/office/drawing/2014/main" id="{5A588C37-34E7-4514-8DB8-84665086AB06}"/>
+              </a:ext>
+            </a:extLst>
+          </p:cNvPr>
+          <p:cNvPicPr>
+            <a:picLocks noChangeAspect="1"/>
+          </p:cNvPicPr>
+          <p:nvPr/>
+        </p:nvPicPr>
+        <p:blipFill>
+          <a:blip r:embed="rId4"/>
+          <a:stretch>
+            <a:fillRect/>
+          </a:stretch>
+        </p:blipFill>
+        <p:spPr>
+          <a:xfrm>
+            <a:off x="3023755" y="5881752"/>
+            <a:ext cx="8156863" cy="938147"/>
+          </a:xfrm>
+          <a:prstGeom prst="rect">
+            <a:avLst/>
+          </a:prstGeom>
+        </p:spPr>
+      </p:pic>
       <p:sp>
         <p:nvSpPr>
-          <p:cNvPr id="3" name="TextBox 2">
+          <p:cNvPr id="7" name="TextBox 6">
             <a:extLst>
               <a:ext uri="{FF2B5EF4-FFF2-40B4-BE49-F238E27FC236}">
-                <a16:creationId xmlns:a16="http://schemas.microsoft.com/office/drawing/2014/main" id="{F733432A-56EC-4F5B-BB08-5FE46961B5F7}"/>
+                <a16:creationId xmlns:a16="http://schemas.microsoft.com/office/drawing/2014/main" id="{A9BF7C9B-AF75-4AD4-B16E-AF5DF51CD260}"/>
               </a:ext>
             </a:extLst>
           </p:cNvPr>
@@ -14194,8 +14227,8 @@
         </p:nvSpPr>
         <p:spPr>
           <a:xfrm>
-            <a:off x="6829345" y="350858"/>
-            <a:ext cx="3528979" cy="369332"/>
+            <a:off x="485113" y="3325091"/>
+            <a:ext cx="1925578" cy="1384995"/>
           </a:xfrm>
           <a:prstGeom prst="rect">
             <a:avLst/>
@@ -14203,14 +14236,18 @@
           <a:noFill/>
         </p:spPr>
         <p:txBody>
-          <a:bodyPr wrap="none" rtlCol="0">
+          <a:bodyPr wrap="square" rtlCol="0">
             <a:spAutoFit/>
           </a:bodyPr>
           <a:lstStyle/>
           <a:p>
-            <a:r>
-              <a:rPr lang="en-US" dirty="0"/>
-              <a:t>Percentage of Pleas v. Trials by Race</a:t>
+            <a:pPr marL="285750" indent="-285750" algn="just">
+              <a:buFont typeface="Arial" panose="020B0604020202020204" pitchFamily="34" charset="0"/>
+              <a:buChar char="•"/>
+            </a:pPr>
+            <a:r>
+              <a:rPr lang="en-US" sz="1400" dirty="0"/>
+              <a:t>Many of the most serious crimes have smaller sentencing differentials and shorter sentences on average</a:t>
             </a:r>
           </a:p>
         </p:txBody>
@@ -14218,99 +14255,13 @@
     </p:spTree>
     <p:extLst>
       <p:ext uri="{BB962C8B-B14F-4D97-AF65-F5344CB8AC3E}">
-        <p14:creationId xmlns:p14="http://schemas.microsoft.com/office/powerpoint/2010/main" val="1118056672"/>
+        <p14:creationId xmlns:p14="http://schemas.microsoft.com/office/powerpoint/2010/main" val="2509163612"/>
       </p:ext>
     </p:extLst>
   </p:cSld>
   <p:clrMapOvr>
     <a:masterClrMapping/>
   </p:clrMapOvr>
-  <p:timing>
-    <p:tnLst>
-      <p:par>
-        <p:cTn id="1" dur="indefinite" restart="never" nodeType="tmRoot">
-          <p:childTnLst>
-            <p:seq concurrent="1" nextAc="seek">
-              <p:cTn id="2" dur="indefinite" nodeType="mainSeq">
-                <p:childTnLst>
-                  <p:par>
-                    <p:cTn id="3" fill="hold">
-                      <p:stCondLst>
-                        <p:cond delay="indefinite"/>
-                      </p:stCondLst>
-                      <p:childTnLst>
-                        <p:par>
-                          <p:cTn id="4" fill="hold">
-                            <p:stCondLst>
-                              <p:cond delay="0"/>
-                            </p:stCondLst>
-                            <p:childTnLst>
-                              <p:par>
-                                <p:cTn id="5" presetID="10" presetClass="entr" presetSubtype="0" fill="hold" grpId="0" nodeType="clickEffect">
-                                  <p:stCondLst>
-                                    <p:cond delay="0"/>
-                                  </p:stCondLst>
-                                  <p:childTnLst>
-                                    <p:set>
-                                      <p:cBhvr>
-                                        <p:cTn id="6" dur="1" fill="hold">
-                                          <p:stCondLst>
-                                            <p:cond delay="0"/>
-                                          </p:stCondLst>
-                                        </p:cTn>
-                                        <p:tgtEl>
-                                          <p:spTgt spid="10"/>
-                                        </p:tgtEl>
-                                        <p:attrNameLst>
-                                          <p:attrName>style.visibility</p:attrName>
-                                        </p:attrNameLst>
-                                      </p:cBhvr>
-                                      <p:to>
-                                        <p:strVal val="visible"/>
-                                      </p:to>
-                                    </p:set>
-                                    <p:animEffect transition="in" filter="fade">
-                                      <p:cBhvr>
-                                        <p:cTn id="7" dur="500"/>
-                                        <p:tgtEl>
-                                          <p:spTgt spid="10"/>
-                                        </p:tgtEl>
-                                      </p:cBhvr>
-                                    </p:animEffect>
-                                  </p:childTnLst>
-                                </p:cTn>
-                              </p:par>
-                            </p:childTnLst>
-                          </p:cTn>
-                        </p:par>
-                      </p:childTnLst>
-                    </p:cTn>
-                  </p:par>
-                </p:childTnLst>
-              </p:cTn>
-              <p:prevCondLst>
-                <p:cond evt="onPrev" delay="0">
-                  <p:tgtEl>
-                    <p:sldTgt/>
-                  </p:tgtEl>
-                </p:cond>
-              </p:prevCondLst>
-              <p:nextCondLst>
-                <p:cond evt="onNext" delay="0">
-                  <p:tgtEl>
-                    <p:sldTgt/>
-                  </p:tgtEl>
-                </p:cond>
-              </p:nextCondLst>
-            </p:seq>
-          </p:childTnLst>
-        </p:cTn>
-      </p:par>
-    </p:tnLst>
-    <p:bldLst>
-      <p:bldP spid="10" grpId="0"/>
-    </p:bldLst>
-  </p:timing>
 </p:sld>
 </file>
 
@@ -15541,7 +15492,7 @@
             </a:pPr>
             <a:r>
               <a:rPr lang="en-US" dirty="0"/>
-              <a:t>Defendants across racial lines receive sentences 10x longer on average than defendants who plead. This creates a strong incentive for defendants (regardless of race) to plead out rather than pursue their constitutional right to a trial by jury.</a:t>
+              <a:t>Defendants across racial lines receive sentences substantially longer sentences for many nonviolent crimes at trial than by plea. This creates a strong incentive for defendants (regardless of race) to plead out rather than pursue their constitutional right to a trial by jury.</a:t>
             </a:r>
           </a:p>
         </p:txBody>

</xml_diff>